<commit_message>
Virtual calls from constructor example
</commit_message>
<xml_diff>
--- a/Presentation/lesson-02-oop.pptx
+++ b/Presentation/lesson-02-oop.pptx
@@ -313,7 +313,7 @@
           <a:p>
             <a:fld id="{8E6E6A2A-E9D3-4A0D-B04A-ABDD367A1E08}" type="datetimeFigureOut">
               <a:rPr lang="ru-RU" smtClean="0"/>
-              <a:t>27.03.2013</a:t>
+              <a:t>02.04.2013</a:t>
             </a:fld>
             <a:endParaRPr lang="ru-RU"/>
           </a:p>
@@ -483,7 +483,7 @@
           <a:p>
             <a:fld id="{8E6E6A2A-E9D3-4A0D-B04A-ABDD367A1E08}" type="datetimeFigureOut">
               <a:rPr lang="ru-RU" smtClean="0"/>
-              <a:t>27.03.2013</a:t>
+              <a:t>02.04.2013</a:t>
             </a:fld>
             <a:endParaRPr lang="ru-RU"/>
           </a:p>
@@ -663,7 +663,7 @@
           <a:p>
             <a:fld id="{8E6E6A2A-E9D3-4A0D-B04A-ABDD367A1E08}" type="datetimeFigureOut">
               <a:rPr lang="ru-RU" smtClean="0"/>
-              <a:t>27.03.2013</a:t>
+              <a:t>02.04.2013</a:t>
             </a:fld>
             <a:endParaRPr lang="ru-RU"/>
           </a:p>
@@ -833,7 +833,7 @@
           <a:p>
             <a:fld id="{8E6E6A2A-E9D3-4A0D-B04A-ABDD367A1E08}" type="datetimeFigureOut">
               <a:rPr lang="ru-RU" smtClean="0"/>
-              <a:t>27.03.2013</a:t>
+              <a:t>02.04.2013</a:t>
             </a:fld>
             <a:endParaRPr lang="ru-RU"/>
           </a:p>
@@ -1079,7 +1079,7 @@
           <a:p>
             <a:fld id="{8E6E6A2A-E9D3-4A0D-B04A-ABDD367A1E08}" type="datetimeFigureOut">
               <a:rPr lang="ru-RU" smtClean="0"/>
-              <a:t>27.03.2013</a:t>
+              <a:t>02.04.2013</a:t>
             </a:fld>
             <a:endParaRPr lang="ru-RU"/>
           </a:p>
@@ -1367,7 +1367,7 @@
           <a:p>
             <a:fld id="{8E6E6A2A-E9D3-4A0D-B04A-ABDD367A1E08}" type="datetimeFigureOut">
               <a:rPr lang="ru-RU" smtClean="0"/>
-              <a:t>27.03.2013</a:t>
+              <a:t>02.04.2013</a:t>
             </a:fld>
             <a:endParaRPr lang="ru-RU"/>
           </a:p>
@@ -1789,7 +1789,7 @@
           <a:p>
             <a:fld id="{8E6E6A2A-E9D3-4A0D-B04A-ABDD367A1E08}" type="datetimeFigureOut">
               <a:rPr lang="ru-RU" smtClean="0"/>
-              <a:t>27.03.2013</a:t>
+              <a:t>02.04.2013</a:t>
             </a:fld>
             <a:endParaRPr lang="ru-RU"/>
           </a:p>
@@ -1907,7 +1907,7 @@
           <a:p>
             <a:fld id="{8E6E6A2A-E9D3-4A0D-B04A-ABDD367A1E08}" type="datetimeFigureOut">
               <a:rPr lang="ru-RU" smtClean="0"/>
-              <a:t>27.03.2013</a:t>
+              <a:t>02.04.2013</a:t>
             </a:fld>
             <a:endParaRPr lang="ru-RU"/>
           </a:p>
@@ -2002,7 +2002,7 @@
           <a:p>
             <a:fld id="{8E6E6A2A-E9D3-4A0D-B04A-ABDD367A1E08}" type="datetimeFigureOut">
               <a:rPr lang="ru-RU" smtClean="0"/>
-              <a:t>27.03.2013</a:t>
+              <a:t>02.04.2013</a:t>
             </a:fld>
             <a:endParaRPr lang="ru-RU"/>
           </a:p>
@@ -2279,7 +2279,7 @@
           <a:p>
             <a:fld id="{8E6E6A2A-E9D3-4A0D-B04A-ABDD367A1E08}" type="datetimeFigureOut">
               <a:rPr lang="ru-RU" smtClean="0"/>
-              <a:t>27.03.2013</a:t>
+              <a:t>02.04.2013</a:t>
             </a:fld>
             <a:endParaRPr lang="ru-RU"/>
           </a:p>
@@ -2532,7 +2532,7 @@
           <a:p>
             <a:fld id="{8E6E6A2A-E9D3-4A0D-B04A-ABDD367A1E08}" type="datetimeFigureOut">
               <a:rPr lang="ru-RU" smtClean="0"/>
-              <a:t>27.03.2013</a:t>
+              <a:t>02.04.2013</a:t>
             </a:fld>
             <a:endParaRPr lang="ru-RU"/>
           </a:p>
@@ -2745,7 +2745,7 @@
           <a:p>
             <a:fld id="{8E6E6A2A-E9D3-4A0D-B04A-ABDD367A1E08}" type="datetimeFigureOut">
               <a:rPr lang="ru-RU" smtClean="0"/>
-              <a:t>27.03.2013</a:t>
+              <a:t>02.04.2013</a:t>
             </a:fld>
             <a:endParaRPr lang="ru-RU"/>
           </a:p>
@@ -6668,7 +6668,34 @@
                 </a:solidFill>
                 <a:cs typeface="Times New Roman" pitchFamily="18" charset="0"/>
               </a:rPr>
-              <a:t>Виртуальные методы и конструктор</a:t>
+              <a:t>Виртуальные </a:t>
+            </a:r>
+            <a:r>
+              <a:rPr lang="ru-RU" sz="2400" b="1" dirty="0" smtClean="0">
+                <a:solidFill>
+                  <a:schemeClr val="bg1"/>
+                </a:solidFill>
+                <a:cs typeface="Times New Roman" pitchFamily="18" charset="0"/>
+              </a:rPr>
+              <a:t>члены класса</a:t>
+            </a:r>
+            <a:r>
+              <a:rPr lang="ru-RU" sz="2400" b="1" dirty="0" smtClean="0">
+                <a:solidFill>
+                  <a:schemeClr val="bg1"/>
+                </a:solidFill>
+                <a:cs typeface="Times New Roman" pitchFamily="18" charset="0"/>
+              </a:rPr>
+              <a:t> </a:t>
+            </a:r>
+            <a:r>
+              <a:rPr lang="ru-RU" sz="2400" b="1" dirty="0" smtClean="0">
+                <a:solidFill>
+                  <a:schemeClr val="bg1"/>
+                </a:solidFill>
+                <a:cs typeface="Times New Roman" pitchFamily="18" charset="0"/>
+              </a:rPr>
+              <a:t>и конструктор</a:t>
             </a:r>
             <a:endParaRPr lang="en-US" sz="2400" dirty="0">
               <a:solidFill>
@@ -6676,6 +6703,676 @@
               </a:solidFill>
               <a:cs typeface="Times New Roman" pitchFamily="18" charset="0"/>
             </a:endParaRPr>
+          </a:p>
+        </p:txBody>
+      </p:sp>
+      <p:sp>
+        <p:nvSpPr>
+          <p:cNvPr id="2" name="TextBox 1"/>
+          <p:cNvSpPr txBox="1"/>
+          <p:nvPr/>
+        </p:nvSpPr>
+        <p:spPr>
+          <a:xfrm>
+            <a:off x="381000" y="1988840"/>
+            <a:ext cx="8305800" cy="4154984"/>
+          </a:xfrm>
+          <a:prstGeom prst="rect">
+            <a:avLst/>
+          </a:prstGeom>
+          <a:noFill/>
+        </p:spPr>
+        <p:txBody>
+          <a:bodyPr wrap="square" rtlCol="0">
+            <a:spAutoFit/>
+          </a:bodyPr>
+          <a:lstStyle/>
+          <a:p>
+            <a:r>
+              <a:rPr lang="en-US" sz="1100" dirty="0" smtClean="0">
+                <a:solidFill>
+                  <a:schemeClr val="bg1"/>
+                </a:solidFill>
+                <a:latin typeface="Courier New" pitchFamily="49" charset="0"/>
+                <a:cs typeface="Courier New" pitchFamily="49" charset="0"/>
+              </a:rPr>
+              <a:t>// </a:t>
+            </a:r>
+            <a:r>
+              <a:rPr lang="ru-RU" sz="1100" dirty="0" smtClean="0">
+                <a:solidFill>
+                  <a:schemeClr val="bg1"/>
+                </a:solidFill>
+                <a:latin typeface="Courier New" pitchFamily="49" charset="0"/>
+                <a:cs typeface="Courier New" pitchFamily="49" charset="0"/>
+              </a:rPr>
+              <a:t>ВНИМАНИЕ!</a:t>
+            </a:r>
+            <a:endParaRPr lang="en-US" sz="1100" dirty="0" smtClean="0">
+              <a:solidFill>
+                <a:schemeClr val="bg1"/>
+              </a:solidFill>
+              <a:latin typeface="Courier New" pitchFamily="49" charset="0"/>
+              <a:cs typeface="Courier New" pitchFamily="49" charset="0"/>
+            </a:endParaRPr>
+          </a:p>
+          <a:p>
+            <a:r>
+              <a:rPr lang="en-US" sz="1100" dirty="0" smtClean="0">
+                <a:solidFill>
+                  <a:schemeClr val="bg1"/>
+                </a:solidFill>
+                <a:latin typeface="Courier New" pitchFamily="49" charset="0"/>
+                <a:cs typeface="Courier New" pitchFamily="49" charset="0"/>
+              </a:rPr>
+              <a:t>//</a:t>
+            </a:r>
+            <a:r>
+              <a:rPr lang="ru-RU" sz="1100" dirty="0" smtClean="0">
+                <a:solidFill>
+                  <a:schemeClr val="bg1"/>
+                </a:solidFill>
+                <a:latin typeface="Courier New" pitchFamily="49" charset="0"/>
+                <a:cs typeface="Courier New" pitchFamily="49" charset="0"/>
+              </a:rPr>
+              <a:t> Никогда не пишите такой код!</a:t>
+            </a:r>
+            <a:endParaRPr lang="en-US" sz="1100" dirty="0" smtClean="0">
+              <a:solidFill>
+                <a:schemeClr val="bg1"/>
+              </a:solidFill>
+              <a:latin typeface="Courier New" pitchFamily="49" charset="0"/>
+              <a:cs typeface="Courier New" pitchFamily="49" charset="0"/>
+            </a:endParaRPr>
+          </a:p>
+          <a:p>
+            <a:r>
+              <a:rPr lang="en-US" sz="1100" dirty="0" smtClean="0">
+                <a:solidFill>
+                  <a:schemeClr val="bg1"/>
+                </a:solidFill>
+                <a:latin typeface="Courier New" pitchFamily="49" charset="0"/>
+                <a:cs typeface="Courier New" pitchFamily="49" charset="0"/>
+              </a:rPr>
+              <a:t>internal </a:t>
+            </a:r>
+            <a:r>
+              <a:rPr lang="en-US" sz="1100" dirty="0">
+                <a:solidFill>
+                  <a:schemeClr val="bg1"/>
+                </a:solidFill>
+                <a:latin typeface="Courier New" pitchFamily="49" charset="0"/>
+                <a:cs typeface="Courier New" pitchFamily="49" charset="0"/>
+              </a:rPr>
+              <a:t>class Parent</a:t>
+            </a:r>
+          </a:p>
+          <a:p>
+            <a:r>
+              <a:rPr lang="en-US" sz="1100" dirty="0">
+                <a:solidFill>
+                  <a:schemeClr val="bg1"/>
+                </a:solidFill>
+                <a:latin typeface="Courier New" pitchFamily="49" charset="0"/>
+                <a:cs typeface="Courier New" pitchFamily="49" charset="0"/>
+              </a:rPr>
+              <a:t>{</a:t>
+            </a:r>
+          </a:p>
+          <a:p>
+            <a:r>
+              <a:rPr lang="en-US" sz="1100" dirty="0" smtClean="0">
+                <a:solidFill>
+                  <a:schemeClr val="bg1"/>
+                </a:solidFill>
+                <a:latin typeface="Courier New" pitchFamily="49" charset="0"/>
+                <a:cs typeface="Courier New" pitchFamily="49" charset="0"/>
+              </a:rPr>
+              <a:t>   public </a:t>
+            </a:r>
+            <a:r>
+              <a:rPr lang="en-US" sz="1100" dirty="0">
+                <a:solidFill>
+                  <a:schemeClr val="bg1"/>
+                </a:solidFill>
+                <a:latin typeface="Courier New" pitchFamily="49" charset="0"/>
+                <a:cs typeface="Courier New" pitchFamily="49" charset="0"/>
+              </a:rPr>
+              <a:t>Parent()</a:t>
+            </a:r>
+          </a:p>
+          <a:p>
+            <a:r>
+              <a:rPr lang="en-US" sz="1100" dirty="0">
+                <a:solidFill>
+                  <a:schemeClr val="bg1"/>
+                </a:solidFill>
+                <a:latin typeface="Courier New" pitchFamily="49" charset="0"/>
+                <a:cs typeface="Courier New" pitchFamily="49" charset="0"/>
+              </a:rPr>
+              <a:t> </a:t>
+            </a:r>
+            <a:r>
+              <a:rPr lang="en-US" sz="1100" dirty="0" smtClean="0">
+                <a:solidFill>
+                  <a:schemeClr val="bg1"/>
+                </a:solidFill>
+                <a:latin typeface="Courier New" pitchFamily="49" charset="0"/>
+                <a:cs typeface="Courier New" pitchFamily="49" charset="0"/>
+              </a:rPr>
+              <a:t>  {</a:t>
+            </a:r>
+            <a:endParaRPr lang="en-US" sz="1100" dirty="0">
+              <a:solidFill>
+                <a:schemeClr val="bg1"/>
+              </a:solidFill>
+              <a:latin typeface="Courier New" pitchFamily="49" charset="0"/>
+              <a:cs typeface="Courier New" pitchFamily="49" charset="0"/>
+            </a:endParaRPr>
+          </a:p>
+          <a:p>
+            <a:r>
+              <a:rPr lang="en-US" sz="1100" dirty="0" smtClean="0">
+                <a:solidFill>
+                  <a:schemeClr val="bg1"/>
+                </a:solidFill>
+                <a:latin typeface="Courier New" pitchFamily="49" charset="0"/>
+                <a:cs typeface="Courier New" pitchFamily="49" charset="0"/>
+              </a:rPr>
+              <a:t>      </a:t>
+            </a:r>
+            <a:r>
+              <a:rPr lang="en-US" sz="1100" dirty="0" err="1" smtClean="0">
+                <a:solidFill>
+                  <a:schemeClr val="bg1"/>
+                </a:solidFill>
+                <a:latin typeface="Courier New" pitchFamily="49" charset="0"/>
+                <a:cs typeface="Courier New" pitchFamily="49" charset="0"/>
+              </a:rPr>
+              <a:t>DoSomething</a:t>
+            </a:r>
+            <a:r>
+              <a:rPr lang="en-US" sz="1100" dirty="0">
+                <a:solidFill>
+                  <a:schemeClr val="bg1"/>
+                </a:solidFill>
+                <a:latin typeface="Courier New" pitchFamily="49" charset="0"/>
+                <a:cs typeface="Courier New" pitchFamily="49" charset="0"/>
+              </a:rPr>
+              <a:t>();</a:t>
+            </a:r>
+          </a:p>
+          <a:p>
+            <a:r>
+              <a:rPr lang="en-US" sz="1100" dirty="0" smtClean="0">
+                <a:solidFill>
+                  <a:schemeClr val="bg1"/>
+                </a:solidFill>
+                <a:latin typeface="Courier New" pitchFamily="49" charset="0"/>
+                <a:cs typeface="Courier New" pitchFamily="49" charset="0"/>
+              </a:rPr>
+              <a:t>   }</a:t>
+            </a:r>
+            <a:endParaRPr lang="en-US" sz="1100" dirty="0">
+              <a:solidFill>
+                <a:schemeClr val="bg1"/>
+              </a:solidFill>
+              <a:latin typeface="Courier New" pitchFamily="49" charset="0"/>
+              <a:cs typeface="Courier New" pitchFamily="49" charset="0"/>
+            </a:endParaRPr>
+          </a:p>
+          <a:p>
+            <a:endParaRPr lang="en-US" sz="1100" dirty="0">
+              <a:solidFill>
+                <a:schemeClr val="bg1"/>
+              </a:solidFill>
+              <a:latin typeface="Courier New" pitchFamily="49" charset="0"/>
+              <a:cs typeface="Courier New" pitchFamily="49" charset="0"/>
+            </a:endParaRPr>
+          </a:p>
+          <a:p>
+            <a:r>
+              <a:rPr lang="en-US" sz="1100" dirty="0" smtClean="0">
+                <a:solidFill>
+                  <a:schemeClr val="bg1"/>
+                </a:solidFill>
+                <a:latin typeface="Courier New" pitchFamily="49" charset="0"/>
+                <a:cs typeface="Courier New" pitchFamily="49" charset="0"/>
+              </a:rPr>
+              <a:t>   protected </a:t>
+            </a:r>
+            <a:r>
+              <a:rPr lang="en-US" sz="1100" dirty="0">
+                <a:solidFill>
+                  <a:schemeClr val="bg1"/>
+                </a:solidFill>
+                <a:latin typeface="Courier New" pitchFamily="49" charset="0"/>
+                <a:cs typeface="Courier New" pitchFamily="49" charset="0"/>
+              </a:rPr>
+              <a:t>virtual void </a:t>
+            </a:r>
+            <a:r>
+              <a:rPr lang="en-US" sz="1100" dirty="0" err="1">
+                <a:solidFill>
+                  <a:schemeClr val="bg1"/>
+                </a:solidFill>
+                <a:latin typeface="Courier New" pitchFamily="49" charset="0"/>
+                <a:cs typeface="Courier New" pitchFamily="49" charset="0"/>
+              </a:rPr>
+              <a:t>DoSomething</a:t>
+            </a:r>
+            <a:r>
+              <a:rPr lang="en-US" sz="1100" dirty="0">
+                <a:solidFill>
+                  <a:schemeClr val="bg1"/>
+                </a:solidFill>
+                <a:latin typeface="Courier New" pitchFamily="49" charset="0"/>
+                <a:cs typeface="Courier New" pitchFamily="49" charset="0"/>
+              </a:rPr>
+              <a:t>()</a:t>
+            </a:r>
+          </a:p>
+          <a:p>
+            <a:r>
+              <a:rPr lang="en-US" sz="1100" dirty="0" smtClean="0">
+                <a:solidFill>
+                  <a:schemeClr val="bg1"/>
+                </a:solidFill>
+                <a:latin typeface="Courier New" pitchFamily="49" charset="0"/>
+                <a:cs typeface="Courier New" pitchFamily="49" charset="0"/>
+              </a:rPr>
+              <a:t>   {</a:t>
+            </a:r>
+            <a:endParaRPr lang="en-US" sz="1100" dirty="0">
+              <a:solidFill>
+                <a:schemeClr val="bg1"/>
+              </a:solidFill>
+              <a:latin typeface="Courier New" pitchFamily="49" charset="0"/>
+              <a:cs typeface="Courier New" pitchFamily="49" charset="0"/>
+            </a:endParaRPr>
+          </a:p>
+          <a:p>
+            <a:r>
+              <a:rPr lang="en-US" sz="1100" dirty="0" smtClean="0">
+                <a:solidFill>
+                  <a:schemeClr val="bg1"/>
+                </a:solidFill>
+                <a:latin typeface="Courier New" pitchFamily="49" charset="0"/>
+                <a:cs typeface="Courier New" pitchFamily="49" charset="0"/>
+              </a:rPr>
+              <a:t>   }</a:t>
+            </a:r>
+            <a:endParaRPr lang="en-US" sz="1100" dirty="0">
+              <a:solidFill>
+                <a:schemeClr val="bg1"/>
+              </a:solidFill>
+              <a:latin typeface="Courier New" pitchFamily="49" charset="0"/>
+              <a:cs typeface="Courier New" pitchFamily="49" charset="0"/>
+            </a:endParaRPr>
+          </a:p>
+          <a:p>
+            <a:r>
+              <a:rPr lang="en-US" sz="1100" dirty="0">
+                <a:solidFill>
+                  <a:schemeClr val="bg1"/>
+                </a:solidFill>
+                <a:latin typeface="Courier New" pitchFamily="49" charset="0"/>
+                <a:cs typeface="Courier New" pitchFamily="49" charset="0"/>
+              </a:rPr>
+              <a:t>}</a:t>
+            </a:r>
+          </a:p>
+          <a:p>
+            <a:endParaRPr lang="en-US" sz="1100" dirty="0">
+              <a:solidFill>
+                <a:schemeClr val="bg1"/>
+              </a:solidFill>
+              <a:latin typeface="Courier New" pitchFamily="49" charset="0"/>
+              <a:cs typeface="Courier New" pitchFamily="49" charset="0"/>
+            </a:endParaRPr>
+          </a:p>
+          <a:p>
+            <a:r>
+              <a:rPr lang="en-US" sz="1100" dirty="0">
+                <a:solidFill>
+                  <a:schemeClr val="bg1"/>
+                </a:solidFill>
+                <a:latin typeface="Courier New" pitchFamily="49" charset="0"/>
+                <a:cs typeface="Courier New" pitchFamily="49" charset="0"/>
+              </a:rPr>
+              <a:t>internal class Child : Parent</a:t>
+            </a:r>
+          </a:p>
+          <a:p>
+            <a:r>
+              <a:rPr lang="en-US" sz="1100" dirty="0">
+                <a:solidFill>
+                  <a:schemeClr val="bg1"/>
+                </a:solidFill>
+                <a:latin typeface="Courier New" pitchFamily="49" charset="0"/>
+                <a:cs typeface="Courier New" pitchFamily="49" charset="0"/>
+              </a:rPr>
+              <a:t>{</a:t>
+            </a:r>
+          </a:p>
+          <a:p>
+            <a:r>
+              <a:rPr lang="en-US" sz="1100" dirty="0" smtClean="0">
+                <a:solidFill>
+                  <a:schemeClr val="bg1"/>
+                </a:solidFill>
+                <a:latin typeface="Courier New" pitchFamily="49" charset="0"/>
+                <a:cs typeface="Courier New" pitchFamily="49" charset="0"/>
+              </a:rPr>
+              <a:t>   private </a:t>
+            </a:r>
+            <a:r>
+              <a:rPr lang="en-US" sz="1100" dirty="0">
+                <a:solidFill>
+                  <a:schemeClr val="bg1"/>
+                </a:solidFill>
+                <a:latin typeface="Courier New" pitchFamily="49" charset="0"/>
+                <a:cs typeface="Courier New" pitchFamily="49" charset="0"/>
+              </a:rPr>
+              <a:t>string _foo;</a:t>
+            </a:r>
+          </a:p>
+          <a:p>
+            <a:r>
+              <a:rPr lang="en-US" sz="1100" dirty="0" smtClean="0">
+                <a:solidFill>
+                  <a:schemeClr val="bg1"/>
+                </a:solidFill>
+                <a:latin typeface="Courier New" pitchFamily="49" charset="0"/>
+                <a:cs typeface="Courier New" pitchFamily="49" charset="0"/>
+              </a:rPr>
+              <a:t>   public </a:t>
+            </a:r>
+            <a:r>
+              <a:rPr lang="en-US" sz="1100" dirty="0">
+                <a:solidFill>
+                  <a:schemeClr val="bg1"/>
+                </a:solidFill>
+                <a:latin typeface="Courier New" pitchFamily="49" charset="0"/>
+                <a:cs typeface="Courier New" pitchFamily="49" charset="0"/>
+              </a:rPr>
+              <a:t>Child() { _foo = "HELLO"; }</a:t>
+            </a:r>
+          </a:p>
+          <a:p>
+            <a:endParaRPr lang="en-US" sz="1100" dirty="0">
+              <a:solidFill>
+                <a:schemeClr val="bg1"/>
+              </a:solidFill>
+              <a:latin typeface="Courier New" pitchFamily="49" charset="0"/>
+              <a:cs typeface="Courier New" pitchFamily="49" charset="0"/>
+            </a:endParaRPr>
+          </a:p>
+          <a:p>
+            <a:r>
+              <a:rPr lang="en-US" sz="1100" dirty="0" smtClean="0">
+                <a:solidFill>
+                  <a:schemeClr val="bg1"/>
+                </a:solidFill>
+                <a:latin typeface="Courier New" pitchFamily="49" charset="0"/>
+                <a:cs typeface="Courier New" pitchFamily="49" charset="0"/>
+              </a:rPr>
+              <a:t>   protected </a:t>
+            </a:r>
+            <a:r>
+              <a:rPr lang="en-US" sz="1100" dirty="0">
+                <a:solidFill>
+                  <a:schemeClr val="bg1"/>
+                </a:solidFill>
+                <a:latin typeface="Courier New" pitchFamily="49" charset="0"/>
+                <a:cs typeface="Courier New" pitchFamily="49" charset="0"/>
+              </a:rPr>
+              <a:t>override void </a:t>
+            </a:r>
+            <a:r>
+              <a:rPr lang="en-US" sz="1100" dirty="0" err="1">
+                <a:solidFill>
+                  <a:schemeClr val="bg1"/>
+                </a:solidFill>
+                <a:latin typeface="Courier New" pitchFamily="49" charset="0"/>
+                <a:cs typeface="Courier New" pitchFamily="49" charset="0"/>
+              </a:rPr>
+              <a:t>DoSomething</a:t>
+            </a:r>
+            <a:r>
+              <a:rPr lang="en-US" sz="1100" dirty="0">
+                <a:solidFill>
+                  <a:schemeClr val="bg1"/>
+                </a:solidFill>
+                <a:latin typeface="Courier New" pitchFamily="49" charset="0"/>
+                <a:cs typeface="Courier New" pitchFamily="49" charset="0"/>
+              </a:rPr>
+              <a:t>()</a:t>
+            </a:r>
+          </a:p>
+          <a:p>
+            <a:r>
+              <a:rPr lang="en-US" sz="1100" dirty="0" smtClean="0">
+                <a:solidFill>
+                  <a:schemeClr val="bg1"/>
+                </a:solidFill>
+                <a:latin typeface="Courier New" pitchFamily="49" charset="0"/>
+                <a:cs typeface="Courier New" pitchFamily="49" charset="0"/>
+              </a:rPr>
+              <a:t>   {</a:t>
+            </a:r>
+            <a:endParaRPr lang="en-US" sz="1100" dirty="0">
+              <a:solidFill>
+                <a:schemeClr val="bg1"/>
+              </a:solidFill>
+              <a:latin typeface="Courier New" pitchFamily="49" charset="0"/>
+              <a:cs typeface="Courier New" pitchFamily="49" charset="0"/>
+            </a:endParaRPr>
+          </a:p>
+          <a:p>
+            <a:r>
+              <a:rPr lang="en-US" sz="1100" dirty="0" smtClean="0">
+                <a:solidFill>
+                  <a:schemeClr val="bg1"/>
+                </a:solidFill>
+                <a:latin typeface="Courier New" pitchFamily="49" charset="0"/>
+                <a:cs typeface="Courier New" pitchFamily="49" charset="0"/>
+              </a:rPr>
+              <a:t>      </a:t>
+            </a:r>
+            <a:r>
+              <a:rPr lang="en-US" sz="1100" dirty="0" err="1" smtClean="0">
+                <a:solidFill>
+                  <a:schemeClr val="bg1"/>
+                </a:solidFill>
+                <a:latin typeface="Courier New" pitchFamily="49" charset="0"/>
+                <a:cs typeface="Courier New" pitchFamily="49" charset="0"/>
+              </a:rPr>
+              <a:t>Console.WriteLine</a:t>
+            </a:r>
+            <a:r>
+              <a:rPr lang="en-US" sz="1100" dirty="0">
+                <a:solidFill>
+                  <a:schemeClr val="bg1"/>
+                </a:solidFill>
+                <a:latin typeface="Courier New" pitchFamily="49" charset="0"/>
+                <a:cs typeface="Courier New" pitchFamily="49" charset="0"/>
+              </a:rPr>
+              <a:t>(_</a:t>
+            </a:r>
+            <a:r>
+              <a:rPr lang="en-US" sz="1100" dirty="0" err="1">
+                <a:solidFill>
+                  <a:schemeClr val="bg1"/>
+                </a:solidFill>
+                <a:latin typeface="Courier New" pitchFamily="49" charset="0"/>
+                <a:cs typeface="Courier New" pitchFamily="49" charset="0"/>
+              </a:rPr>
+              <a:t>foo.ToLower</a:t>
+            </a:r>
+            <a:r>
+              <a:rPr lang="en-US" sz="1100" dirty="0">
+                <a:solidFill>
+                  <a:schemeClr val="bg1"/>
+                </a:solidFill>
+                <a:latin typeface="Courier New" pitchFamily="49" charset="0"/>
+                <a:cs typeface="Courier New" pitchFamily="49" charset="0"/>
+              </a:rPr>
+              <a:t>());</a:t>
+            </a:r>
+          </a:p>
+          <a:p>
+            <a:r>
+              <a:rPr lang="en-US" sz="1100" dirty="0" smtClean="0">
+                <a:solidFill>
+                  <a:schemeClr val="bg1"/>
+                </a:solidFill>
+                <a:latin typeface="Courier New" pitchFamily="49" charset="0"/>
+                <a:cs typeface="Courier New" pitchFamily="49" charset="0"/>
+              </a:rPr>
+              <a:t>   }</a:t>
+            </a:r>
+            <a:endParaRPr lang="en-US" sz="1100" dirty="0">
+              <a:solidFill>
+                <a:schemeClr val="bg1"/>
+              </a:solidFill>
+              <a:latin typeface="Courier New" pitchFamily="49" charset="0"/>
+              <a:cs typeface="Courier New" pitchFamily="49" charset="0"/>
+            </a:endParaRPr>
+          </a:p>
+          <a:p>
+            <a:r>
+              <a:rPr lang="en-US" sz="1100" dirty="0" smtClean="0">
+                <a:solidFill>
+                  <a:schemeClr val="bg1"/>
+                </a:solidFill>
+                <a:latin typeface="Courier New" pitchFamily="49" charset="0"/>
+                <a:cs typeface="Courier New" pitchFamily="49" charset="0"/>
+              </a:rPr>
+              <a:t>}</a:t>
+            </a:r>
+            <a:endParaRPr lang="en-US" sz="1100" dirty="0">
+              <a:solidFill>
+                <a:schemeClr val="bg1"/>
+              </a:solidFill>
+              <a:latin typeface="Courier New" pitchFamily="49" charset="0"/>
+              <a:cs typeface="Courier New" pitchFamily="49" charset="0"/>
+            </a:endParaRPr>
+          </a:p>
+        </p:txBody>
+      </p:sp>
+      <p:sp>
+        <p:nvSpPr>
+          <p:cNvPr id="4" name="TextBox 3"/>
+          <p:cNvSpPr txBox="1"/>
+          <p:nvPr/>
+        </p:nvSpPr>
+        <p:spPr>
+          <a:xfrm>
+            <a:off x="370656" y="548680"/>
+            <a:ext cx="8305800" cy="1200329"/>
+          </a:xfrm>
+          <a:prstGeom prst="rect">
+            <a:avLst/>
+          </a:prstGeom>
+          <a:noFill/>
+        </p:spPr>
+        <p:txBody>
+          <a:bodyPr wrap="square" rtlCol="0">
+            <a:spAutoFit/>
+          </a:bodyPr>
+          <a:lstStyle/>
+          <a:p>
+            <a:r>
+              <a:rPr lang="ru-RU" dirty="0" smtClean="0">
+                <a:solidFill>
+                  <a:schemeClr val="bg1"/>
+                </a:solidFill>
+                <a:cs typeface="Courier New" pitchFamily="49" charset="0"/>
+              </a:rPr>
+              <a:t>Обращение к виртуальным членам класса из конструктора — потенциально опасная операция</a:t>
+            </a:r>
+            <a:r>
+              <a:rPr lang="en-US" dirty="0" smtClean="0">
+                <a:solidFill>
+                  <a:schemeClr val="bg1"/>
+                </a:solidFill>
+                <a:cs typeface="Courier New" pitchFamily="49" charset="0"/>
+              </a:rPr>
+              <a:t> </a:t>
+            </a:r>
+            <a:r>
+              <a:rPr lang="ru-RU" dirty="0" smtClean="0">
+                <a:solidFill>
+                  <a:schemeClr val="bg1"/>
+                </a:solidFill>
+                <a:cs typeface="Courier New" pitchFamily="49" charset="0"/>
+              </a:rPr>
+              <a:t>т.к. конструкторы выполняются начиная с родительского класса, а виртуальные члены всегда использются «самы последние». В примере ниже вызов </a:t>
+            </a:r>
+            <a:r>
+              <a:rPr lang="en-US" dirty="0" err="1" smtClean="0">
+                <a:solidFill>
+                  <a:schemeClr val="bg1"/>
+                </a:solidFill>
+                <a:cs typeface="Courier New" pitchFamily="49" charset="0"/>
+              </a:rPr>
+              <a:t>DoSometing</a:t>
+            </a:r>
+            <a:r>
+              <a:rPr lang="en-US" dirty="0" smtClean="0">
+                <a:solidFill>
+                  <a:schemeClr val="bg1"/>
+                </a:solidFill>
+                <a:cs typeface="Courier New" pitchFamily="49" charset="0"/>
+              </a:rPr>
+              <a:t>() </a:t>
+            </a:r>
+            <a:r>
+              <a:rPr lang="ru-RU" dirty="0" smtClean="0">
+                <a:solidFill>
+                  <a:schemeClr val="bg1"/>
+                </a:solidFill>
+                <a:cs typeface="Courier New" pitchFamily="49" charset="0"/>
+              </a:rPr>
+              <a:t>из конструктора </a:t>
+            </a:r>
+            <a:r>
+              <a:rPr lang="en-US" dirty="0" smtClean="0">
+                <a:solidFill>
+                  <a:schemeClr val="bg1"/>
+                </a:solidFill>
+                <a:cs typeface="Courier New" pitchFamily="49" charset="0"/>
+              </a:rPr>
+              <a:t>Parent </a:t>
+            </a:r>
+            <a:r>
+              <a:rPr lang="ru-RU" dirty="0" smtClean="0">
+                <a:solidFill>
+                  <a:schemeClr val="bg1"/>
+                </a:solidFill>
+                <a:cs typeface="Courier New" pitchFamily="49" charset="0"/>
+              </a:rPr>
+              <a:t>приведет к </a:t>
+            </a:r>
+            <a:r>
+              <a:rPr lang="en-US" dirty="0" err="1" smtClean="0">
+                <a:solidFill>
+                  <a:schemeClr val="bg1"/>
+                </a:solidFill>
+                <a:cs typeface="Courier New" pitchFamily="49" charset="0"/>
+              </a:rPr>
+              <a:t>NullReferenceException</a:t>
+            </a:r>
+            <a:r>
+              <a:rPr lang="en-US" dirty="0">
+                <a:solidFill>
+                  <a:schemeClr val="bg1"/>
+                </a:solidFill>
+                <a:cs typeface="Courier New" pitchFamily="49" charset="0"/>
+              </a:rPr>
+              <a:t>.</a:t>
+            </a:r>
           </a:p>
         </p:txBody>
       </p:sp>

</xml_diff>

<commit_message>
Added link to C5 collections
</commit_message>
<xml_diff>
--- a/Presentation/lesson-02-oop.pptx
+++ b/Presentation/lesson-02-oop.pptx
@@ -29,8 +29,9 @@
     <p:sldId id="277" r:id="rId23"/>
     <p:sldId id="278" r:id="rId24"/>
     <p:sldId id="282" r:id="rId25"/>
-    <p:sldId id="281" r:id="rId26"/>
-    <p:sldId id="279" r:id="rId27"/>
+    <p:sldId id="285" r:id="rId26"/>
+    <p:sldId id="281" r:id="rId27"/>
+    <p:sldId id="279" r:id="rId28"/>
   </p:sldIdLst>
   <p:sldSz cx="9144000" cy="6858000" type="screen4x3"/>
   <p:notesSz cx="6858000" cy="9144000"/>
@@ -313,7 +314,7 @@
           <a:p>
             <a:fld id="{8E6E6A2A-E9D3-4A0D-B04A-ABDD367A1E08}" type="datetimeFigureOut">
               <a:rPr lang="ru-RU" smtClean="0"/>
-              <a:t>02.04.2013</a:t>
+              <a:t>03.04.2013</a:t>
             </a:fld>
             <a:endParaRPr lang="ru-RU"/>
           </a:p>
@@ -483,7 +484,7 @@
           <a:p>
             <a:fld id="{8E6E6A2A-E9D3-4A0D-B04A-ABDD367A1E08}" type="datetimeFigureOut">
               <a:rPr lang="ru-RU" smtClean="0"/>
-              <a:t>02.04.2013</a:t>
+              <a:t>03.04.2013</a:t>
             </a:fld>
             <a:endParaRPr lang="ru-RU"/>
           </a:p>
@@ -663,7 +664,7 @@
           <a:p>
             <a:fld id="{8E6E6A2A-E9D3-4A0D-B04A-ABDD367A1E08}" type="datetimeFigureOut">
               <a:rPr lang="ru-RU" smtClean="0"/>
-              <a:t>02.04.2013</a:t>
+              <a:t>03.04.2013</a:t>
             </a:fld>
             <a:endParaRPr lang="ru-RU"/>
           </a:p>
@@ -833,7 +834,7 @@
           <a:p>
             <a:fld id="{8E6E6A2A-E9D3-4A0D-B04A-ABDD367A1E08}" type="datetimeFigureOut">
               <a:rPr lang="ru-RU" smtClean="0"/>
-              <a:t>02.04.2013</a:t>
+              <a:t>03.04.2013</a:t>
             </a:fld>
             <a:endParaRPr lang="ru-RU"/>
           </a:p>
@@ -1079,7 +1080,7 @@
           <a:p>
             <a:fld id="{8E6E6A2A-E9D3-4A0D-B04A-ABDD367A1E08}" type="datetimeFigureOut">
               <a:rPr lang="ru-RU" smtClean="0"/>
-              <a:t>02.04.2013</a:t>
+              <a:t>03.04.2013</a:t>
             </a:fld>
             <a:endParaRPr lang="ru-RU"/>
           </a:p>
@@ -1367,7 +1368,7 @@
           <a:p>
             <a:fld id="{8E6E6A2A-E9D3-4A0D-B04A-ABDD367A1E08}" type="datetimeFigureOut">
               <a:rPr lang="ru-RU" smtClean="0"/>
-              <a:t>02.04.2013</a:t>
+              <a:t>03.04.2013</a:t>
             </a:fld>
             <a:endParaRPr lang="ru-RU"/>
           </a:p>
@@ -1789,7 +1790,7 @@
           <a:p>
             <a:fld id="{8E6E6A2A-E9D3-4A0D-B04A-ABDD367A1E08}" type="datetimeFigureOut">
               <a:rPr lang="ru-RU" smtClean="0"/>
-              <a:t>02.04.2013</a:t>
+              <a:t>03.04.2013</a:t>
             </a:fld>
             <a:endParaRPr lang="ru-RU"/>
           </a:p>
@@ -1907,7 +1908,7 @@
           <a:p>
             <a:fld id="{8E6E6A2A-E9D3-4A0D-B04A-ABDD367A1E08}" type="datetimeFigureOut">
               <a:rPr lang="ru-RU" smtClean="0"/>
-              <a:t>02.04.2013</a:t>
+              <a:t>03.04.2013</a:t>
             </a:fld>
             <a:endParaRPr lang="ru-RU"/>
           </a:p>
@@ -2002,7 +2003,7 @@
           <a:p>
             <a:fld id="{8E6E6A2A-E9D3-4A0D-B04A-ABDD367A1E08}" type="datetimeFigureOut">
               <a:rPr lang="ru-RU" smtClean="0"/>
-              <a:t>02.04.2013</a:t>
+              <a:t>03.04.2013</a:t>
             </a:fld>
             <a:endParaRPr lang="ru-RU"/>
           </a:p>
@@ -2279,7 +2280,7 @@
           <a:p>
             <a:fld id="{8E6E6A2A-E9D3-4A0D-B04A-ABDD367A1E08}" type="datetimeFigureOut">
               <a:rPr lang="ru-RU" smtClean="0"/>
-              <a:t>02.04.2013</a:t>
+              <a:t>03.04.2013</a:t>
             </a:fld>
             <a:endParaRPr lang="ru-RU"/>
           </a:p>
@@ -2532,7 +2533,7 @@
           <a:p>
             <a:fld id="{8E6E6A2A-E9D3-4A0D-B04A-ABDD367A1E08}" type="datetimeFigureOut">
               <a:rPr lang="ru-RU" smtClean="0"/>
-              <a:t>02.04.2013</a:t>
+              <a:t>03.04.2013</a:t>
             </a:fld>
             <a:endParaRPr lang="ru-RU"/>
           </a:p>
@@ -2745,7 +2746,7 @@
           <a:p>
             <a:fld id="{8E6E6A2A-E9D3-4A0D-B04A-ABDD367A1E08}" type="datetimeFigureOut">
               <a:rPr lang="ru-RU" smtClean="0"/>
-              <a:t>02.04.2013</a:t>
+              <a:t>03.04.2013</a:t>
             </a:fld>
             <a:endParaRPr lang="ru-RU"/>
           </a:p>
@@ -6668,34 +6669,7 @@
                 </a:solidFill>
                 <a:cs typeface="Times New Roman" pitchFamily="18" charset="0"/>
               </a:rPr>
-              <a:t>Виртуальные </a:t>
-            </a:r>
-            <a:r>
-              <a:rPr lang="ru-RU" sz="2400" b="1" dirty="0" smtClean="0">
-                <a:solidFill>
-                  <a:schemeClr val="bg1"/>
-                </a:solidFill>
-                <a:cs typeface="Times New Roman" pitchFamily="18" charset="0"/>
-              </a:rPr>
-              <a:t>члены класса</a:t>
-            </a:r>
-            <a:r>
-              <a:rPr lang="ru-RU" sz="2400" b="1" dirty="0" smtClean="0">
-                <a:solidFill>
-                  <a:schemeClr val="bg1"/>
-                </a:solidFill>
-                <a:cs typeface="Times New Roman" pitchFamily="18" charset="0"/>
-              </a:rPr>
-              <a:t> </a:t>
-            </a:r>
-            <a:r>
-              <a:rPr lang="ru-RU" sz="2400" b="1" dirty="0" smtClean="0">
-                <a:solidFill>
-                  <a:schemeClr val="bg1"/>
-                </a:solidFill>
-                <a:cs typeface="Times New Roman" pitchFamily="18" charset="0"/>
-              </a:rPr>
-              <a:t>и конструктор</a:t>
+              <a:t>Виртуальные члены класса и конструктор</a:t>
             </a:r>
             <a:endParaRPr lang="en-US" sz="2400" dirty="0">
               <a:solidFill>
@@ -7290,7 +7264,16 @@
                 </a:solidFill>
                 <a:cs typeface="Courier New" pitchFamily="49" charset="0"/>
               </a:rPr>
-              <a:t>Обращение к виртуальным членам класса из конструктора — потенциально опасная операция</a:t>
+              <a:t>Обращение к виртуальным членам класса из </a:t>
+            </a:r>
+            <a:r>
+              <a:rPr lang="ru-RU" dirty="0" smtClean="0">
+                <a:solidFill>
+                  <a:schemeClr val="bg1"/>
+                </a:solidFill>
+                <a:cs typeface="Courier New" pitchFamily="49" charset="0"/>
+              </a:rPr>
+              <a:t>конструктора</a:t>
             </a:r>
             <a:r>
               <a:rPr lang="en-US" dirty="0" smtClean="0">
@@ -7308,7 +7291,70 @@
                 </a:solidFill>
                 <a:cs typeface="Courier New" pitchFamily="49" charset="0"/>
               </a:rPr>
-              <a:t>т.к. конструкторы выполняются начиная с родительского класса, а виртуальные члены всегда использются «самы последние». В примере ниже вызов </a:t>
+              <a:t>потенциально </a:t>
+            </a:r>
+            <a:r>
+              <a:rPr lang="ru-RU" dirty="0" smtClean="0">
+                <a:solidFill>
+                  <a:schemeClr val="bg1"/>
+                </a:solidFill>
+                <a:cs typeface="Courier New" pitchFamily="49" charset="0"/>
+              </a:rPr>
+              <a:t>опасная операция</a:t>
+            </a:r>
+            <a:r>
+              <a:rPr lang="en-US" dirty="0" smtClean="0">
+                <a:solidFill>
+                  <a:schemeClr val="bg1"/>
+                </a:solidFill>
+                <a:cs typeface="Courier New" pitchFamily="49" charset="0"/>
+              </a:rPr>
+              <a:t> </a:t>
+            </a:r>
+            <a:r>
+              <a:rPr lang="ru-RU" dirty="0" smtClean="0">
+                <a:solidFill>
+                  <a:schemeClr val="bg1"/>
+                </a:solidFill>
+                <a:cs typeface="Courier New" pitchFamily="49" charset="0"/>
+              </a:rPr>
+              <a:t>т.к. конструкторы выполняются начиная с родительского класса, а виртуальные члены всегда использются «</a:t>
+            </a:r>
+            <a:r>
+              <a:rPr lang="ru-RU" dirty="0" smtClean="0">
+                <a:solidFill>
+                  <a:schemeClr val="bg1"/>
+                </a:solidFill>
+                <a:cs typeface="Courier New" pitchFamily="49" charset="0"/>
+              </a:rPr>
+              <a:t>самы</a:t>
+            </a:r>
+            <a:r>
+              <a:rPr lang="ru-RU" dirty="0">
+                <a:solidFill>
+                  <a:schemeClr val="bg1"/>
+                </a:solidFill>
+                <a:cs typeface="Courier New" pitchFamily="49" charset="0"/>
+              </a:rPr>
+              <a:t>е</a:t>
+            </a:r>
+            <a:r>
+              <a:rPr lang="ru-RU" dirty="0" smtClean="0">
+                <a:solidFill>
+                  <a:schemeClr val="bg1"/>
+                </a:solidFill>
+                <a:cs typeface="Courier New" pitchFamily="49" charset="0"/>
+              </a:rPr>
+              <a:t> </a:t>
+            </a:r>
+            <a:r>
+              <a:rPr lang="ru-RU" dirty="0" smtClean="0">
+                <a:solidFill>
+                  <a:schemeClr val="bg1"/>
+                </a:solidFill>
+                <a:cs typeface="Courier New" pitchFamily="49" charset="0"/>
+              </a:rPr>
+              <a:t>последние». В примере ниже вызов </a:t>
             </a:r>
             <a:r>
               <a:rPr lang="en-US" dirty="0" err="1" smtClean="0">
@@ -17303,18 +17349,18 @@
                 <a:ea typeface="Calibri" pitchFamily="34" charset="0"/>
                 <a:cs typeface="Courier New" pitchFamily="49" charset="0"/>
               </a:rPr>
-              <a:t>using System.Collections;		//</a:t>
-            </a:r>
-            <a:r>
-              <a:rPr lang="ru-RU" sz="1000" dirty="0">
-                <a:solidFill>
-                  <a:schemeClr val="bg1"/>
-                </a:solidFill>
-                <a:latin typeface="Courier New" pitchFamily="49" charset="0"/>
-                <a:ea typeface="Calibri" pitchFamily="34" charset="0"/>
-                <a:cs typeface="Courier New" pitchFamily="49" charset="0"/>
-              </a:rPr>
-              <a:t>Обязательно использование пространства имен</a:t>
+              <a:t>using System.Collections</a:t>
+            </a:r>
+            <a:r>
+              <a:rPr lang="be-BY" sz="1000" dirty="0" smtClean="0">
+                <a:solidFill>
+                  <a:schemeClr val="bg1"/>
+                </a:solidFill>
+                <a:latin typeface="Courier New" pitchFamily="49" charset="0"/>
+                <a:ea typeface="Calibri" pitchFamily="34" charset="0"/>
+                <a:cs typeface="Courier New" pitchFamily="49" charset="0"/>
+              </a:rPr>
+              <a:t>;</a:t>
             </a:r>
             <a:endParaRPr lang="be-BY" sz="1000" dirty="0">
               <a:solidFill>
@@ -18482,6 +18528,357 @@
         </p:nvSpPr>
         <p:spPr bwMode="auto">
           <a:xfrm>
+            <a:off x="370656" y="293747"/>
+            <a:ext cx="8305800" cy="830997"/>
+          </a:xfrm>
+          <a:prstGeom prst="rect">
+            <a:avLst/>
+          </a:prstGeom>
+          <a:noFill/>
+          <a:ln>
+            <a:noFill/>
+          </a:ln>
+          <a:extLst>
+            <a:ext uri="{909E8E84-426E-40DD-AFC4-6F175D3DCCD1}">
+              <a14:hiddenFill xmlns:a14="http://schemas.microsoft.com/office/drawing/2010/main">
+                <a:solidFill>
+                  <a:srgbClr val="FFFFFF"/>
+                </a:solidFill>
+              </a14:hiddenFill>
+            </a:ext>
+            <a:ext uri="{91240B29-F687-4F45-9708-019B960494DF}">
+              <a14:hiddenLine xmlns:a14="http://schemas.microsoft.com/office/drawing/2010/main" w="9525">
+                <a:solidFill>
+                  <a:srgbClr val="000000"/>
+                </a:solidFill>
+                <a:miter lim="800000"/>
+                <a:headEnd/>
+                <a:tailEnd/>
+              </a14:hiddenLine>
+            </a:ext>
+          </a:extLst>
+        </p:spPr>
+        <p:txBody>
+          <a:bodyPr anchor="ctr">
+            <a:spAutoFit/>
+          </a:bodyPr>
+          <a:lstStyle/>
+          <a:p>
+            <a:pPr algn="ctr">
+              <a:tabLst>
+                <a:tab pos="457200" algn="l"/>
+              </a:tabLst>
+            </a:pPr>
+            <a:r>
+              <a:rPr lang="ru-RU" sz="2400" b="1" dirty="0" smtClean="0">
+                <a:solidFill>
+                  <a:schemeClr val="bg1"/>
+                </a:solidFill>
+                <a:cs typeface="Times New Roman" pitchFamily="18" charset="0"/>
+              </a:rPr>
+              <a:t>Дополнительные </a:t>
+            </a:r>
+            <a:r>
+              <a:rPr lang="ru-RU" sz="2400" b="1" dirty="0">
+                <a:solidFill>
+                  <a:schemeClr val="bg1"/>
+                </a:solidFill>
+                <a:cs typeface="Times New Roman" pitchFamily="18" charset="0"/>
+              </a:rPr>
+              <a:t>к</a:t>
+            </a:r>
+            <a:r>
+              <a:rPr lang="ru-RU" sz="2400" b="1" dirty="0" smtClean="0">
+                <a:solidFill>
+                  <a:schemeClr val="bg1"/>
+                </a:solidFill>
+                <a:cs typeface="Times New Roman" pitchFamily="18" charset="0"/>
+              </a:rPr>
+              <a:t>оллекции</a:t>
+            </a:r>
+            <a:r>
+              <a:rPr lang="en-US" sz="2400" b="1" dirty="0" smtClean="0">
+                <a:solidFill>
+                  <a:schemeClr val="bg1"/>
+                </a:solidFill>
+                <a:cs typeface="Times New Roman" pitchFamily="18" charset="0"/>
+              </a:rPr>
+              <a:t> </a:t>
+            </a:r>
+            <a:r>
+              <a:rPr lang="ru-RU" sz="2400" b="1" dirty="0" smtClean="0">
+                <a:solidFill>
+                  <a:schemeClr val="bg1"/>
+                </a:solidFill>
+                <a:cs typeface="Times New Roman" pitchFamily="18" charset="0"/>
+              </a:rPr>
+              <a:t>— </a:t>
+            </a:r>
+            <a:br>
+              <a:rPr lang="ru-RU" sz="2400" b="1" dirty="0" smtClean="0">
+                <a:solidFill>
+                  <a:schemeClr val="bg1"/>
+                </a:solidFill>
+                <a:cs typeface="Times New Roman" pitchFamily="18" charset="0"/>
+              </a:rPr>
+            </a:br>
+            <a:r>
+              <a:rPr lang="en-US" sz="2400" b="1" dirty="0" smtClean="0">
+                <a:solidFill>
+                  <a:schemeClr val="bg1"/>
+                </a:solidFill>
+                <a:cs typeface="Times New Roman" pitchFamily="18" charset="0"/>
+              </a:rPr>
+              <a:t>The </a:t>
+            </a:r>
+            <a:r>
+              <a:rPr lang="en-US" sz="2400" b="1" dirty="0">
+                <a:solidFill>
+                  <a:schemeClr val="bg1"/>
+                </a:solidFill>
+                <a:cs typeface="Times New Roman" pitchFamily="18" charset="0"/>
+              </a:rPr>
+              <a:t>C5 Generic Collection Library</a:t>
+            </a:r>
+            <a:endParaRPr lang="en-US" sz="1200" dirty="0">
+              <a:solidFill>
+                <a:schemeClr val="bg1"/>
+              </a:solidFill>
+              <a:cs typeface="Times New Roman" pitchFamily="18" charset="0"/>
+            </a:endParaRPr>
+          </a:p>
+        </p:txBody>
+      </p:sp>
+      <p:sp>
+        <p:nvSpPr>
+          <p:cNvPr id="5" name="Rectangle 1"/>
+          <p:cNvSpPr>
+            <a:spLocks noChangeArrowheads="1"/>
+          </p:cNvSpPr>
+          <p:nvPr/>
+        </p:nvSpPr>
+        <p:spPr bwMode="auto">
+          <a:xfrm>
+            <a:off x="370656" y="1412776"/>
+            <a:ext cx="8305800" cy="1477328"/>
+          </a:xfrm>
+          <a:prstGeom prst="rect">
+            <a:avLst/>
+          </a:prstGeom>
+          <a:noFill/>
+          <a:ln>
+            <a:noFill/>
+          </a:ln>
+          <a:extLst>
+            <a:ext uri="{909E8E84-426E-40DD-AFC4-6F175D3DCCD1}">
+              <a14:hiddenFill xmlns:a14="http://schemas.microsoft.com/office/drawing/2010/main">
+                <a:solidFill>
+                  <a:srgbClr val="FFFFFF"/>
+                </a:solidFill>
+              </a14:hiddenFill>
+            </a:ext>
+            <a:ext uri="{91240B29-F687-4F45-9708-019B960494DF}">
+              <a14:hiddenLine xmlns:a14="http://schemas.microsoft.com/office/drawing/2010/main" w="9525">
+                <a:solidFill>
+                  <a:srgbClr val="000000"/>
+                </a:solidFill>
+                <a:miter lim="800000"/>
+                <a:headEnd/>
+                <a:tailEnd/>
+              </a14:hiddenLine>
+            </a:ext>
+          </a:extLst>
+        </p:spPr>
+        <p:txBody>
+          <a:bodyPr anchor="ctr">
+            <a:spAutoFit/>
+          </a:bodyPr>
+          <a:lstStyle/>
+          <a:p>
+            <a:pPr>
+              <a:tabLst>
+                <a:tab pos="457200" algn="l"/>
+              </a:tabLst>
+            </a:pPr>
+            <a:r>
+              <a:rPr lang="ru-RU" dirty="0" smtClean="0">
+                <a:solidFill>
+                  <a:schemeClr val="bg1"/>
+                </a:solidFill>
+                <a:cs typeface="Times New Roman" pitchFamily="18" charset="0"/>
+              </a:rPr>
+              <a:t>Если вам не хватает стандартных коллекций, то можно использовать биббиотеку </a:t>
+            </a:r>
+            <a:r>
+              <a:rPr lang="en-US" dirty="0">
+                <a:solidFill>
+                  <a:schemeClr val="bg1"/>
+                </a:solidFill>
+                <a:cs typeface="Times New Roman" pitchFamily="18" charset="0"/>
+              </a:rPr>
+              <a:t>C5 — </a:t>
+            </a:r>
+            <a:r>
+              <a:rPr lang="en-US" dirty="0">
+                <a:solidFill>
+                  <a:schemeClr val="bg1"/>
+                </a:solidFill>
+                <a:cs typeface="Times New Roman" pitchFamily="18" charset="0"/>
+                <a:hlinkClick r:id="rId3"/>
+              </a:rPr>
+              <a:t>http://www.itu.dk/research/c5</a:t>
+            </a:r>
+            <a:r>
+              <a:rPr lang="en-US" dirty="0" smtClean="0">
+                <a:solidFill>
+                  <a:schemeClr val="bg1"/>
+                </a:solidFill>
+                <a:cs typeface="Times New Roman" pitchFamily="18" charset="0"/>
+                <a:hlinkClick r:id="rId3"/>
+              </a:rPr>
+              <a:t>/</a:t>
+            </a:r>
+            <a:endParaRPr lang="en-US" dirty="0" smtClean="0">
+              <a:solidFill>
+                <a:schemeClr val="bg1"/>
+              </a:solidFill>
+              <a:cs typeface="Times New Roman" pitchFamily="18" charset="0"/>
+            </a:endParaRPr>
+          </a:p>
+          <a:p>
+            <a:pPr>
+              <a:tabLst>
+                <a:tab pos="457200" algn="l"/>
+              </a:tabLst>
+            </a:pPr>
+            <a:endParaRPr lang="en-US" dirty="0">
+              <a:solidFill>
+                <a:schemeClr val="bg1"/>
+              </a:solidFill>
+              <a:cs typeface="Times New Roman" pitchFamily="18" charset="0"/>
+            </a:endParaRPr>
+          </a:p>
+          <a:p>
+            <a:pPr>
+              <a:tabLst>
+                <a:tab pos="457200" algn="l"/>
+              </a:tabLst>
+            </a:pPr>
+            <a:r>
+              <a:rPr lang="ru-RU" dirty="0" smtClean="0">
+                <a:solidFill>
+                  <a:schemeClr val="bg1"/>
+                </a:solidFill>
+                <a:cs typeface="Times New Roman" pitchFamily="18" charset="0"/>
+              </a:rPr>
+              <a:t>Подключить библиотеку к проекту можно также через </a:t>
+            </a:r>
+            <a:r>
+              <a:rPr lang="en-US" dirty="0" smtClean="0">
+                <a:solidFill>
+                  <a:schemeClr val="bg1"/>
+                </a:solidFill>
+                <a:cs typeface="Times New Roman" pitchFamily="18" charset="0"/>
+              </a:rPr>
+              <a:t>NuGet</a:t>
+            </a:r>
+          </a:p>
+          <a:p>
+            <a:pPr>
+              <a:tabLst>
+                <a:tab pos="457200" algn="l"/>
+              </a:tabLst>
+            </a:pPr>
+            <a:r>
+              <a:rPr lang="en-US" dirty="0">
+                <a:solidFill>
+                  <a:schemeClr val="bg1"/>
+                </a:solidFill>
+                <a:cs typeface="Times New Roman" pitchFamily="18" charset="0"/>
+                <a:hlinkClick r:id="rId4"/>
+              </a:rPr>
+              <a:t>http://www.nuget.org/packages/C5</a:t>
+            </a:r>
+            <a:r>
+              <a:rPr lang="en-US" dirty="0" smtClean="0">
+                <a:solidFill>
+                  <a:schemeClr val="bg1"/>
+                </a:solidFill>
+                <a:cs typeface="Times New Roman" pitchFamily="18" charset="0"/>
+                <a:hlinkClick r:id="rId4"/>
+              </a:rPr>
+              <a:t>/</a:t>
+            </a:r>
+            <a:endParaRPr lang="en-US" dirty="0">
+              <a:solidFill>
+                <a:schemeClr val="bg1"/>
+              </a:solidFill>
+              <a:cs typeface="Times New Roman" pitchFamily="18" charset="0"/>
+            </a:endParaRPr>
+          </a:p>
+        </p:txBody>
+      </p:sp>
+    </p:spTree>
+    <p:extLst>
+      <p:ext uri="{BB962C8B-B14F-4D97-AF65-F5344CB8AC3E}">
+        <p14:creationId xmlns:p14="http://schemas.microsoft.com/office/powerpoint/2010/main" val="2769392668"/>
+      </p:ext>
+    </p:extLst>
+  </p:cSld>
+  <p:clrMapOvr>
+    <a:masterClrMapping/>
+  </p:clrMapOvr>
+  <p:timing>
+    <p:tnLst>
+      <p:par>
+        <p:cTn id="1" dur="indefinite" restart="never" nodeType="tmRoot"/>
+      </p:par>
+    </p:tnLst>
+  </p:timing>
+</p:sld>
+</file>
+
+<file path=ppt/slides/slide26.xml><?xml version="1.0" encoding="utf-8"?>
+<p:sld xmlns:a="http://schemas.openxmlformats.org/drawingml/2006/main" xmlns:r="http://schemas.openxmlformats.org/officeDocument/2006/relationships" xmlns:p="http://schemas.openxmlformats.org/presentationml/2006/main">
+  <p:cSld>
+    <p:bg>
+      <p:bgPr>
+        <a:blipFill dpi="0" rotWithShape="1">
+          <a:blip r:embed="rId2">
+            <a:lum/>
+          </a:blip>
+          <a:srcRect/>
+          <a:stretch>
+            <a:fillRect/>
+          </a:stretch>
+        </a:blipFill>
+        <a:effectLst/>
+      </p:bgPr>
+    </p:bg>
+    <p:spTree>
+      <p:nvGrpSpPr>
+        <p:cNvPr id="1" name=""/>
+        <p:cNvGrpSpPr/>
+        <p:nvPr/>
+      </p:nvGrpSpPr>
+      <p:grpSpPr>
+        <a:xfrm>
+          <a:off x="0" y="0"/>
+          <a:ext cx="0" cy="0"/>
+          <a:chOff x="0" y="0"/>
+          <a:chExt cx="0" cy="0"/>
+        </a:xfrm>
+      </p:grpSpPr>
+      <p:sp>
+        <p:nvSpPr>
+          <p:cNvPr id="22530" name="Rectangle 1"/>
+          <p:cNvSpPr>
+            <a:spLocks noChangeArrowheads="1"/>
+          </p:cNvSpPr>
+          <p:nvPr/>
+        </p:nvSpPr>
+        <p:spPr bwMode="auto">
+          <a:xfrm>
             <a:off x="381000" y="-76051"/>
             <a:ext cx="8305800" cy="461665"/>
           </a:xfrm>
@@ -18550,7 +18947,7 @@
         <p:spPr>
           <a:xfrm>
             <a:off x="141412" y="764704"/>
-            <a:ext cx="8784976" cy="3416320"/>
+            <a:ext cx="8784976" cy="3970318"/>
           </a:xfrm>
           <a:prstGeom prst="rect">
             <a:avLst/>
@@ -18654,6 +19051,17 @@
               <a:buFont typeface="Arial" pitchFamily="34" charset="0"/>
               <a:buChar char="•"/>
             </a:pPr>
+            <a:endParaRPr lang="en-US" dirty="0" smtClean="0">
+              <a:solidFill>
+                <a:schemeClr val="bg1"/>
+              </a:solidFill>
+            </a:endParaRPr>
+          </a:p>
+          <a:p>
+            <a:pPr marL="285750" indent="-285750">
+              <a:buFont typeface="Arial" pitchFamily="34" charset="0"/>
+              <a:buChar char="•"/>
+            </a:pPr>
             <a:r>
               <a:rPr lang="en-US" dirty="0" smtClean="0">
                 <a:solidFill>
@@ -18715,6 +19123,17 @@
             </a:r>
           </a:p>
           <a:p>
+            <a:pPr marL="742950" lvl="1" indent="-285750">
+              <a:buFont typeface="Arial" pitchFamily="34" charset="0"/>
+              <a:buChar char="•"/>
+            </a:pPr>
+            <a:endParaRPr lang="en-US" dirty="0" smtClean="0">
+              <a:solidFill>
+                <a:schemeClr val="bg1"/>
+              </a:solidFill>
+            </a:endParaRPr>
+          </a:p>
+          <a:p>
             <a:pPr marL="285750" indent="-285750">
               <a:buFont typeface="Arial" pitchFamily="34" charset="0"/>
               <a:buChar char="•"/>
@@ -18753,7 +19172,7 @@
               <a:buChar char="•"/>
             </a:pPr>
             <a:r>
-              <a:rPr lang="ru-RU" smtClean="0">
+              <a:rPr lang="ru-RU" dirty="0" smtClean="0">
                 <a:solidFill>
                   <a:schemeClr val="bg1"/>
                 </a:solidFill>
@@ -18788,7 +19207,7 @@
 </p:sld>
 </file>
 
-<file path=ppt/slides/slide26.xml><?xml version="1.0" encoding="utf-8"?>
+<file path=ppt/slides/slide27.xml><?xml version="1.0" encoding="utf-8"?>
 <p:sld xmlns:a="http://schemas.openxmlformats.org/drawingml/2006/main" xmlns:r="http://schemas.openxmlformats.org/officeDocument/2006/relationships" xmlns:p="http://schemas.openxmlformats.org/presentationml/2006/main">
   <p:cSld>
     <p:bg>

</xml_diff>

<commit_message>
Amended sample for Virtual Call In Constructor case
</commit_message>
<xml_diff>
--- a/Presentation/lesson-02-oop.pptx
+++ b/Presentation/lesson-02-oop.pptx
@@ -314,7 +314,7 @@
           <a:p>
             <a:fld id="{8E6E6A2A-E9D3-4A0D-B04A-ABDD367A1E08}" type="datetimeFigureOut">
               <a:rPr lang="ru-RU" smtClean="0"/>
-              <a:t>03.04.2013</a:t>
+              <a:t>06.05.2013</a:t>
             </a:fld>
             <a:endParaRPr lang="ru-RU"/>
           </a:p>
@@ -484,7 +484,7 @@
           <a:p>
             <a:fld id="{8E6E6A2A-E9D3-4A0D-B04A-ABDD367A1E08}" type="datetimeFigureOut">
               <a:rPr lang="ru-RU" smtClean="0"/>
-              <a:t>03.04.2013</a:t>
+              <a:t>06.05.2013</a:t>
             </a:fld>
             <a:endParaRPr lang="ru-RU"/>
           </a:p>
@@ -664,7 +664,7 @@
           <a:p>
             <a:fld id="{8E6E6A2A-E9D3-4A0D-B04A-ABDD367A1E08}" type="datetimeFigureOut">
               <a:rPr lang="ru-RU" smtClean="0"/>
-              <a:t>03.04.2013</a:t>
+              <a:t>06.05.2013</a:t>
             </a:fld>
             <a:endParaRPr lang="ru-RU"/>
           </a:p>
@@ -834,7 +834,7 @@
           <a:p>
             <a:fld id="{8E6E6A2A-E9D3-4A0D-B04A-ABDD367A1E08}" type="datetimeFigureOut">
               <a:rPr lang="ru-RU" smtClean="0"/>
-              <a:t>03.04.2013</a:t>
+              <a:t>06.05.2013</a:t>
             </a:fld>
             <a:endParaRPr lang="ru-RU"/>
           </a:p>
@@ -1080,7 +1080,7 @@
           <a:p>
             <a:fld id="{8E6E6A2A-E9D3-4A0D-B04A-ABDD367A1E08}" type="datetimeFigureOut">
               <a:rPr lang="ru-RU" smtClean="0"/>
-              <a:t>03.04.2013</a:t>
+              <a:t>06.05.2013</a:t>
             </a:fld>
             <a:endParaRPr lang="ru-RU"/>
           </a:p>
@@ -1368,7 +1368,7 @@
           <a:p>
             <a:fld id="{8E6E6A2A-E9D3-4A0D-B04A-ABDD367A1E08}" type="datetimeFigureOut">
               <a:rPr lang="ru-RU" smtClean="0"/>
-              <a:t>03.04.2013</a:t>
+              <a:t>06.05.2013</a:t>
             </a:fld>
             <a:endParaRPr lang="ru-RU"/>
           </a:p>
@@ -1790,7 +1790,7 @@
           <a:p>
             <a:fld id="{8E6E6A2A-E9D3-4A0D-B04A-ABDD367A1E08}" type="datetimeFigureOut">
               <a:rPr lang="ru-RU" smtClean="0"/>
-              <a:t>03.04.2013</a:t>
+              <a:t>06.05.2013</a:t>
             </a:fld>
             <a:endParaRPr lang="ru-RU"/>
           </a:p>
@@ -1908,7 +1908,7 @@
           <a:p>
             <a:fld id="{8E6E6A2A-E9D3-4A0D-B04A-ABDD367A1E08}" type="datetimeFigureOut">
               <a:rPr lang="ru-RU" smtClean="0"/>
-              <a:t>03.04.2013</a:t>
+              <a:t>06.05.2013</a:t>
             </a:fld>
             <a:endParaRPr lang="ru-RU"/>
           </a:p>
@@ -2003,7 +2003,7 @@
           <a:p>
             <a:fld id="{8E6E6A2A-E9D3-4A0D-B04A-ABDD367A1E08}" type="datetimeFigureOut">
               <a:rPr lang="ru-RU" smtClean="0"/>
-              <a:t>03.04.2013</a:t>
+              <a:t>06.05.2013</a:t>
             </a:fld>
             <a:endParaRPr lang="ru-RU"/>
           </a:p>
@@ -2280,7 +2280,7 @@
           <a:p>
             <a:fld id="{8E6E6A2A-E9D3-4A0D-B04A-ABDD367A1E08}" type="datetimeFigureOut">
               <a:rPr lang="ru-RU" smtClean="0"/>
-              <a:t>03.04.2013</a:t>
+              <a:t>06.05.2013</a:t>
             </a:fld>
             <a:endParaRPr lang="ru-RU"/>
           </a:p>
@@ -2533,7 +2533,7 @@
           <a:p>
             <a:fld id="{8E6E6A2A-E9D3-4A0D-B04A-ABDD367A1E08}" type="datetimeFigureOut">
               <a:rPr lang="ru-RU" smtClean="0"/>
-              <a:t>03.04.2013</a:t>
+              <a:t>06.05.2013</a:t>
             </a:fld>
             <a:endParaRPr lang="ru-RU"/>
           </a:p>
@@ -2746,7 +2746,7 @@
           <a:p>
             <a:fld id="{8E6E6A2A-E9D3-4A0D-B04A-ABDD367A1E08}" type="datetimeFigureOut">
               <a:rPr lang="ru-RU" smtClean="0"/>
-              <a:t>03.04.2013</a:t>
+              <a:t>06.05.2013</a:t>
             </a:fld>
             <a:endParaRPr lang="ru-RU"/>
           </a:p>
@@ -6853,7 +6853,17 @@
                 <a:latin typeface="Courier New" pitchFamily="49" charset="0"/>
                 <a:cs typeface="Courier New" pitchFamily="49" charset="0"/>
               </a:rPr>
-              <a:t>      </a:t>
+              <a:t> </a:t>
+            </a:r>
+            <a:r>
+              <a:rPr lang="en-US" sz="1100" dirty="0">
+                <a:solidFill>
+                  <a:schemeClr val="bg1"/>
+                </a:solidFill>
+                <a:latin typeface="Courier New" pitchFamily="49" charset="0"/>
+                <a:cs typeface="Courier New" pitchFamily="49" charset="0"/>
+              </a:rPr>
+              <a:t>     </a:t>
             </a:r>
             <a:r>
               <a:rPr lang="en-US" sz="1100" dirty="0" err="1" smtClean="0">
@@ -6863,7 +6873,64 @@
                 <a:latin typeface="Courier New" pitchFamily="49" charset="0"/>
                 <a:cs typeface="Courier New" pitchFamily="49" charset="0"/>
               </a:rPr>
-              <a:t>DoSomething</a:t>
+              <a:t>VirtualFunc</a:t>
+            </a:r>
+            <a:r>
+              <a:rPr lang="en-US" sz="1100" dirty="0" smtClean="0">
+                <a:solidFill>
+                  <a:schemeClr val="bg1"/>
+                </a:solidFill>
+                <a:latin typeface="Courier New" pitchFamily="49" charset="0"/>
+                <a:cs typeface="Courier New" pitchFamily="49" charset="0"/>
+              </a:rPr>
+              <a:t>();</a:t>
+            </a:r>
+            <a:endParaRPr lang="en-US" sz="1100" dirty="0">
+              <a:solidFill>
+                <a:schemeClr val="bg1"/>
+              </a:solidFill>
+              <a:latin typeface="Courier New" pitchFamily="49" charset="0"/>
+              <a:cs typeface="Courier New" pitchFamily="49" charset="0"/>
+            </a:endParaRPr>
+          </a:p>
+          <a:p>
+            <a:r>
+              <a:rPr lang="en-US" sz="1100" dirty="0" smtClean="0">
+                <a:solidFill>
+                  <a:schemeClr val="bg1"/>
+                </a:solidFill>
+                <a:latin typeface="Courier New" pitchFamily="49" charset="0"/>
+                <a:cs typeface="Courier New" pitchFamily="49" charset="0"/>
+              </a:rPr>
+              <a:t>   }</a:t>
+            </a:r>
+            <a:endParaRPr lang="en-US" sz="1100" dirty="0">
+              <a:solidFill>
+                <a:schemeClr val="bg1"/>
+              </a:solidFill>
+              <a:latin typeface="Courier New" pitchFamily="49" charset="0"/>
+              <a:cs typeface="Courier New" pitchFamily="49" charset="0"/>
+            </a:endParaRPr>
+          </a:p>
+          <a:p>
+            <a:endParaRPr lang="en-US" sz="1100" dirty="0">
+              <a:solidFill>
+                <a:schemeClr val="bg1"/>
+              </a:solidFill>
+              <a:latin typeface="Courier New" pitchFamily="49" charset="0"/>
+              <a:cs typeface="Courier New" pitchFamily="49" charset="0"/>
+            </a:endParaRPr>
+          </a:p>
+          <a:p>
+            <a:r>
+              <a:rPr lang="en-US" sz="1100" dirty="0" smtClean="0">
+                <a:solidFill>
+                  <a:schemeClr val="bg1"/>
+                </a:solidFill>
+                <a:latin typeface="Courier New" pitchFamily="49" charset="0"/>
+                <a:cs typeface="Courier New" pitchFamily="49" charset="0"/>
+              </a:rPr>
+              <a:t>   protected </a:t>
             </a:r>
             <a:r>
               <a:rPr lang="en-US" sz="1100" dirty="0">
@@ -6873,8 +6940,35 @@
                 <a:latin typeface="Courier New" pitchFamily="49" charset="0"/>
                 <a:cs typeface="Courier New" pitchFamily="49" charset="0"/>
               </a:rPr>
-              <a:t>();</a:t>
-            </a:r>
+              <a:t>virtual void </a:t>
+            </a:r>
+            <a:r>
+              <a:rPr lang="en-US" sz="1100" dirty="0" err="1">
+                <a:solidFill>
+                  <a:schemeClr val="bg1"/>
+                </a:solidFill>
+                <a:latin typeface="Courier New" pitchFamily="49" charset="0"/>
+                <a:cs typeface="Courier New" pitchFamily="49" charset="0"/>
+              </a:rPr>
+              <a:t>VirtualFunc</a:t>
+            </a:r>
+            <a:r>
+              <a:rPr lang="en-US" sz="1100" dirty="0">
+                <a:solidFill>
+                  <a:schemeClr val="bg1"/>
+                </a:solidFill>
+                <a:latin typeface="Courier New" pitchFamily="49" charset="0"/>
+                <a:cs typeface="Courier New" pitchFamily="49" charset="0"/>
+              </a:rPr>
+              <a:t>()</a:t>
+            </a:r>
+            <a:endParaRPr lang="en-US" sz="1100" dirty="0">
+              <a:solidFill>
+                <a:schemeClr val="bg1"/>
+              </a:solidFill>
+              <a:latin typeface="Courier New" pitchFamily="49" charset="0"/>
+              <a:cs typeface="Courier New" pitchFamily="49" charset="0"/>
+            </a:endParaRPr>
           </a:p>
           <a:p>
             <a:r>
@@ -6885,6 +6979,25 @@
                 <a:latin typeface="Courier New" pitchFamily="49" charset="0"/>
                 <a:cs typeface="Courier New" pitchFamily="49" charset="0"/>
               </a:rPr>
+              <a:t>   {</a:t>
+            </a:r>
+            <a:endParaRPr lang="en-US" sz="1100" dirty="0">
+              <a:solidFill>
+                <a:schemeClr val="bg1"/>
+              </a:solidFill>
+              <a:latin typeface="Courier New" pitchFamily="49" charset="0"/>
+              <a:cs typeface="Courier New" pitchFamily="49" charset="0"/>
+            </a:endParaRPr>
+          </a:p>
+          <a:p>
+            <a:r>
+              <a:rPr lang="en-US" sz="1100" dirty="0" smtClean="0">
+                <a:solidFill>
+                  <a:schemeClr val="bg1"/>
+                </a:solidFill>
+                <a:latin typeface="Courier New" pitchFamily="49" charset="0"/>
+                <a:cs typeface="Courier New" pitchFamily="49" charset="0"/>
+              </a:rPr>
               <a:t>   }</a:t>
             </a:r>
             <a:endParaRPr lang="en-US" sz="1100" dirty="0">
@@ -6896,6 +7009,18 @@
             </a:endParaRPr>
           </a:p>
           <a:p>
+            <a:r>
+              <a:rPr lang="en-US" sz="1100" dirty="0">
+                <a:solidFill>
+                  <a:schemeClr val="bg1"/>
+                </a:solidFill>
+                <a:latin typeface="Courier New" pitchFamily="49" charset="0"/>
+                <a:cs typeface="Courier New" pitchFamily="49" charset="0"/>
+              </a:rPr>
+              <a:t>}</a:t>
+            </a:r>
+          </a:p>
+          <a:p>
             <a:endParaRPr lang="en-US" sz="1100" dirty="0">
               <a:solidFill>
                 <a:schemeClr val="bg1"/>
@@ -6906,6 +7031,30 @@
           </a:p>
           <a:p>
             <a:r>
+              <a:rPr lang="en-US" sz="1100" dirty="0">
+                <a:solidFill>
+                  <a:schemeClr val="bg1"/>
+                </a:solidFill>
+                <a:latin typeface="Courier New" pitchFamily="49" charset="0"/>
+                <a:cs typeface="Courier New" pitchFamily="49" charset="0"/>
+              </a:rPr>
+              <a:t>internal class Child : Parent</a:t>
+            </a:r>
+          </a:p>
+          <a:p>
+            <a:r>
+              <a:rPr lang="en-US" sz="1100" dirty="0">
+                <a:solidFill>
+                  <a:schemeClr val="bg1"/>
+                </a:solidFill>
+                <a:latin typeface="Courier New" pitchFamily="49" charset="0"/>
+                <a:cs typeface="Courier New" pitchFamily="49" charset="0"/>
+              </a:rPr>
+              <a:t>{</a:t>
+            </a:r>
+          </a:p>
+          <a:p>
+            <a:r>
               <a:rPr lang="en-US" sz="1100" dirty="0" smtClean="0">
                 <a:solidFill>
                   <a:schemeClr val="bg1"/>
@@ -6913,6 +7062,59 @@
                 <a:latin typeface="Courier New" pitchFamily="49" charset="0"/>
                 <a:cs typeface="Courier New" pitchFamily="49" charset="0"/>
               </a:rPr>
+              <a:t>   private </a:t>
+            </a:r>
+            <a:r>
+              <a:rPr lang="en-US" sz="1100" dirty="0">
+                <a:solidFill>
+                  <a:schemeClr val="bg1"/>
+                </a:solidFill>
+                <a:latin typeface="Courier New" pitchFamily="49" charset="0"/>
+                <a:cs typeface="Courier New" pitchFamily="49" charset="0"/>
+              </a:rPr>
+              <a:t>string _foo;</a:t>
+            </a:r>
+          </a:p>
+          <a:p>
+            <a:r>
+              <a:rPr lang="en-US" sz="1100" dirty="0" smtClean="0">
+                <a:solidFill>
+                  <a:schemeClr val="bg1"/>
+                </a:solidFill>
+                <a:latin typeface="Courier New" pitchFamily="49" charset="0"/>
+                <a:cs typeface="Courier New" pitchFamily="49" charset="0"/>
+              </a:rPr>
+              <a:t>   public </a:t>
+            </a:r>
+            <a:r>
+              <a:rPr lang="en-US" sz="1100" dirty="0">
+                <a:solidFill>
+                  <a:schemeClr val="bg1"/>
+                </a:solidFill>
+                <a:latin typeface="Courier New" pitchFamily="49" charset="0"/>
+                <a:cs typeface="Courier New" pitchFamily="49" charset="0"/>
+              </a:rPr>
+              <a:t>Child() { _foo = "HELLO"; }</a:t>
+            </a:r>
+          </a:p>
+          <a:p>
+            <a:endParaRPr lang="en-US" sz="1100" dirty="0">
+              <a:solidFill>
+                <a:schemeClr val="bg1"/>
+              </a:solidFill>
+              <a:latin typeface="Courier New" pitchFamily="49" charset="0"/>
+              <a:cs typeface="Courier New" pitchFamily="49" charset="0"/>
+            </a:endParaRPr>
+          </a:p>
+          <a:p>
+            <a:r>
+              <a:rPr lang="en-US" sz="1100" dirty="0" smtClean="0">
+                <a:solidFill>
+                  <a:schemeClr val="bg1"/>
+                </a:solidFill>
+                <a:latin typeface="Courier New" pitchFamily="49" charset="0"/>
+                <a:cs typeface="Courier New" pitchFamily="49" charset="0"/>
+              </a:rPr>
               <a:t>   protected </a:t>
             </a:r>
             <a:r>
@@ -6923,7 +7125,7 @@
                 <a:latin typeface="Courier New" pitchFamily="49" charset="0"/>
                 <a:cs typeface="Courier New" pitchFamily="49" charset="0"/>
               </a:rPr>
-              <a:t>virtual void </a:t>
+              <a:t>override void </a:t>
             </a:r>
             <a:r>
               <a:rPr lang="en-US" sz="1100" dirty="0" err="1">
@@ -6933,7 +7135,7 @@
                 <a:latin typeface="Courier New" pitchFamily="49" charset="0"/>
                 <a:cs typeface="Courier New" pitchFamily="49" charset="0"/>
               </a:rPr>
-              <a:t>DoSomething</a:t>
+              <a:t>VirtualFunc</a:t>
             </a:r>
             <a:r>
               <a:rPr lang="en-US" sz="1100" dirty="0">
@@ -6945,18 +7147,6 @@
               </a:rPr>
               <a:t>()</a:t>
             </a:r>
-          </a:p>
-          <a:p>
-            <a:r>
-              <a:rPr lang="en-US" sz="1100" dirty="0" smtClean="0">
-                <a:solidFill>
-                  <a:schemeClr val="bg1"/>
-                </a:solidFill>
-                <a:latin typeface="Courier New" pitchFamily="49" charset="0"/>
-                <a:cs typeface="Courier New" pitchFamily="49" charset="0"/>
-              </a:rPr>
-              <a:t>   {</a:t>
-            </a:r>
             <a:endParaRPr lang="en-US" sz="1100" dirty="0">
               <a:solidFill>
                 <a:schemeClr val="bg1"/>
@@ -6964,165 +7154,6 @@
               <a:latin typeface="Courier New" pitchFamily="49" charset="0"/>
               <a:cs typeface="Courier New" pitchFamily="49" charset="0"/>
             </a:endParaRPr>
-          </a:p>
-          <a:p>
-            <a:r>
-              <a:rPr lang="en-US" sz="1100" dirty="0" smtClean="0">
-                <a:solidFill>
-                  <a:schemeClr val="bg1"/>
-                </a:solidFill>
-                <a:latin typeface="Courier New" pitchFamily="49" charset="0"/>
-                <a:cs typeface="Courier New" pitchFamily="49" charset="0"/>
-              </a:rPr>
-              <a:t>   }</a:t>
-            </a:r>
-            <a:endParaRPr lang="en-US" sz="1100" dirty="0">
-              <a:solidFill>
-                <a:schemeClr val="bg1"/>
-              </a:solidFill>
-              <a:latin typeface="Courier New" pitchFamily="49" charset="0"/>
-              <a:cs typeface="Courier New" pitchFamily="49" charset="0"/>
-            </a:endParaRPr>
-          </a:p>
-          <a:p>
-            <a:r>
-              <a:rPr lang="en-US" sz="1100" dirty="0">
-                <a:solidFill>
-                  <a:schemeClr val="bg1"/>
-                </a:solidFill>
-                <a:latin typeface="Courier New" pitchFamily="49" charset="0"/>
-                <a:cs typeface="Courier New" pitchFamily="49" charset="0"/>
-              </a:rPr>
-              <a:t>}</a:t>
-            </a:r>
-          </a:p>
-          <a:p>
-            <a:endParaRPr lang="en-US" sz="1100" dirty="0">
-              <a:solidFill>
-                <a:schemeClr val="bg1"/>
-              </a:solidFill>
-              <a:latin typeface="Courier New" pitchFamily="49" charset="0"/>
-              <a:cs typeface="Courier New" pitchFamily="49" charset="0"/>
-            </a:endParaRPr>
-          </a:p>
-          <a:p>
-            <a:r>
-              <a:rPr lang="en-US" sz="1100" dirty="0">
-                <a:solidFill>
-                  <a:schemeClr val="bg1"/>
-                </a:solidFill>
-                <a:latin typeface="Courier New" pitchFamily="49" charset="0"/>
-                <a:cs typeface="Courier New" pitchFamily="49" charset="0"/>
-              </a:rPr>
-              <a:t>internal class Child : Parent</a:t>
-            </a:r>
-          </a:p>
-          <a:p>
-            <a:r>
-              <a:rPr lang="en-US" sz="1100" dirty="0">
-                <a:solidFill>
-                  <a:schemeClr val="bg1"/>
-                </a:solidFill>
-                <a:latin typeface="Courier New" pitchFamily="49" charset="0"/>
-                <a:cs typeface="Courier New" pitchFamily="49" charset="0"/>
-              </a:rPr>
-              <a:t>{</a:t>
-            </a:r>
-          </a:p>
-          <a:p>
-            <a:r>
-              <a:rPr lang="en-US" sz="1100" dirty="0" smtClean="0">
-                <a:solidFill>
-                  <a:schemeClr val="bg1"/>
-                </a:solidFill>
-                <a:latin typeface="Courier New" pitchFamily="49" charset="0"/>
-                <a:cs typeface="Courier New" pitchFamily="49" charset="0"/>
-              </a:rPr>
-              <a:t>   private </a:t>
-            </a:r>
-            <a:r>
-              <a:rPr lang="en-US" sz="1100" dirty="0">
-                <a:solidFill>
-                  <a:schemeClr val="bg1"/>
-                </a:solidFill>
-                <a:latin typeface="Courier New" pitchFamily="49" charset="0"/>
-                <a:cs typeface="Courier New" pitchFamily="49" charset="0"/>
-              </a:rPr>
-              <a:t>string _foo;</a:t>
-            </a:r>
-          </a:p>
-          <a:p>
-            <a:r>
-              <a:rPr lang="en-US" sz="1100" dirty="0" smtClean="0">
-                <a:solidFill>
-                  <a:schemeClr val="bg1"/>
-                </a:solidFill>
-                <a:latin typeface="Courier New" pitchFamily="49" charset="0"/>
-                <a:cs typeface="Courier New" pitchFamily="49" charset="0"/>
-              </a:rPr>
-              <a:t>   public </a:t>
-            </a:r>
-            <a:r>
-              <a:rPr lang="en-US" sz="1100" dirty="0">
-                <a:solidFill>
-                  <a:schemeClr val="bg1"/>
-                </a:solidFill>
-                <a:latin typeface="Courier New" pitchFamily="49" charset="0"/>
-                <a:cs typeface="Courier New" pitchFamily="49" charset="0"/>
-              </a:rPr>
-              <a:t>Child() { _foo = "HELLO"; }</a:t>
-            </a:r>
-          </a:p>
-          <a:p>
-            <a:endParaRPr lang="en-US" sz="1100" dirty="0">
-              <a:solidFill>
-                <a:schemeClr val="bg1"/>
-              </a:solidFill>
-              <a:latin typeface="Courier New" pitchFamily="49" charset="0"/>
-              <a:cs typeface="Courier New" pitchFamily="49" charset="0"/>
-            </a:endParaRPr>
-          </a:p>
-          <a:p>
-            <a:r>
-              <a:rPr lang="en-US" sz="1100" dirty="0" smtClean="0">
-                <a:solidFill>
-                  <a:schemeClr val="bg1"/>
-                </a:solidFill>
-                <a:latin typeface="Courier New" pitchFamily="49" charset="0"/>
-                <a:cs typeface="Courier New" pitchFamily="49" charset="0"/>
-              </a:rPr>
-              <a:t>   protected </a:t>
-            </a:r>
-            <a:r>
-              <a:rPr lang="en-US" sz="1100" dirty="0">
-                <a:solidFill>
-                  <a:schemeClr val="bg1"/>
-                </a:solidFill>
-                <a:latin typeface="Courier New" pitchFamily="49" charset="0"/>
-                <a:cs typeface="Courier New" pitchFamily="49" charset="0"/>
-              </a:rPr>
-              <a:t>override void </a:t>
-            </a:r>
-            <a:r>
-              <a:rPr lang="en-US" sz="1100" dirty="0" err="1">
-                <a:solidFill>
-                  <a:schemeClr val="bg1"/>
-                </a:solidFill>
-                <a:latin typeface="Courier New" pitchFamily="49" charset="0"/>
-                <a:cs typeface="Courier New" pitchFamily="49" charset="0"/>
-              </a:rPr>
-              <a:t>DoSomething</a:t>
-            </a:r>
-            <a:r>
-              <a:rPr lang="en-US" sz="1100" dirty="0">
-                <a:solidFill>
-                  <a:schemeClr val="bg1"/>
-                </a:solidFill>
-                <a:latin typeface="Courier New" pitchFamily="49" charset="0"/>
-                <a:cs typeface="Courier New" pitchFamily="49" charset="0"/>
-              </a:rPr>
-              <a:t>()</a:t>
-            </a:r>
           </a:p>
           <a:p>
             <a:r>
@@ -7264,7 +7295,16 @@
                 </a:solidFill>
                 <a:cs typeface="Courier New" pitchFamily="49" charset="0"/>
               </a:rPr>
-              <a:t>Обращение к виртуальным членам класса из </a:t>
+              <a:t>Обращение к виртуальным членам класса из конструктора</a:t>
+            </a:r>
+            <a:r>
+              <a:rPr lang="en-US" dirty="0" smtClean="0">
+                <a:solidFill>
+                  <a:schemeClr val="bg1"/>
+                </a:solidFill>
+                <a:cs typeface="Courier New" pitchFamily="49" charset="0"/>
+              </a:rPr>
+              <a:t> </a:t>
             </a:r>
             <a:r>
               <a:rPr lang="ru-RU" dirty="0" smtClean="0">
@@ -7273,7 +7313,7 @@
                 </a:solidFill>
                 <a:cs typeface="Courier New" pitchFamily="49" charset="0"/>
               </a:rPr>
-              <a:t>конструктора</a:t>
+              <a:t>потенциально опасная операция</a:t>
             </a:r>
             <a:r>
               <a:rPr lang="en-US" dirty="0" smtClean="0">
@@ -7291,7 +7331,16 @@
                 </a:solidFill>
                 <a:cs typeface="Courier New" pitchFamily="49" charset="0"/>
               </a:rPr>
-              <a:t>потенциально </a:t>
+              <a:t>т.к. конструкторы выполняются начиная с родительского класса, а виртуальные члены всегда использются «самы</a:t>
+            </a:r>
+            <a:r>
+              <a:rPr lang="ru-RU" dirty="0">
+                <a:solidFill>
+                  <a:schemeClr val="bg1"/>
+                </a:solidFill>
+                <a:cs typeface="Courier New" pitchFamily="49" charset="0"/>
+              </a:rPr>
+              <a:t>е</a:t>
             </a:r>
             <a:r>
               <a:rPr lang="ru-RU" dirty="0" smtClean="0">
@@ -7300,61 +7349,7 @@
                 </a:solidFill>
                 <a:cs typeface="Courier New" pitchFamily="49" charset="0"/>
               </a:rPr>
-              <a:t>опасная операция</a:t>
-            </a:r>
-            <a:r>
-              <a:rPr lang="en-US" dirty="0" smtClean="0">
-                <a:solidFill>
-                  <a:schemeClr val="bg1"/>
-                </a:solidFill>
-                <a:cs typeface="Courier New" pitchFamily="49" charset="0"/>
-              </a:rPr>
-              <a:t> </a:t>
-            </a:r>
-            <a:r>
-              <a:rPr lang="ru-RU" dirty="0" smtClean="0">
-                <a:solidFill>
-                  <a:schemeClr val="bg1"/>
-                </a:solidFill>
-                <a:cs typeface="Courier New" pitchFamily="49" charset="0"/>
-              </a:rPr>
-              <a:t>т.к. конструкторы выполняются начиная с родительского класса, а виртуальные члены всегда использются «</a:t>
-            </a:r>
-            <a:r>
-              <a:rPr lang="ru-RU" dirty="0" smtClean="0">
-                <a:solidFill>
-                  <a:schemeClr val="bg1"/>
-                </a:solidFill>
-                <a:cs typeface="Courier New" pitchFamily="49" charset="0"/>
-              </a:rPr>
-              <a:t>самы</a:t>
-            </a:r>
-            <a:r>
-              <a:rPr lang="ru-RU" dirty="0">
-                <a:solidFill>
-                  <a:schemeClr val="bg1"/>
-                </a:solidFill>
-                <a:cs typeface="Courier New" pitchFamily="49" charset="0"/>
-              </a:rPr>
-              <a:t>е</a:t>
-            </a:r>
-            <a:r>
-              <a:rPr lang="ru-RU" dirty="0" smtClean="0">
-                <a:solidFill>
-                  <a:schemeClr val="bg1"/>
-                </a:solidFill>
-                <a:cs typeface="Courier New" pitchFamily="49" charset="0"/>
-              </a:rPr>
-              <a:t> </a:t>
-            </a:r>
-            <a:r>
-              <a:rPr lang="ru-RU" dirty="0" smtClean="0">
-                <a:solidFill>
-                  <a:schemeClr val="bg1"/>
-                </a:solidFill>
-                <a:cs typeface="Courier New" pitchFamily="49" charset="0"/>
-              </a:rPr>
-              <a:t>последние». В примере ниже вызов </a:t>
+              <a:t> последние». В примере ниже вызов </a:t>
             </a:r>
             <a:r>
               <a:rPr lang="en-US" dirty="0" err="1" smtClean="0">
@@ -7363,7 +7358,7 @@
                 </a:solidFill>
                 <a:cs typeface="Courier New" pitchFamily="49" charset="0"/>
               </a:rPr>
-              <a:t>DoSometing</a:t>
+              <a:t>VirtualFunc</a:t>
             </a:r>
             <a:r>
               <a:rPr lang="en-US" dirty="0" smtClean="0">

</xml_diff>

<commit_message>
Updated IComparable examples to use generics
</commit_message>
<xml_diff>
--- a/Presentation/lesson-02-oop.pptx
+++ b/Presentation/lesson-02-oop.pptx
@@ -315,7 +315,7 @@
           <a:p>
             <a:fld id="{8E6E6A2A-E9D3-4A0D-B04A-ABDD367A1E08}" type="datetimeFigureOut">
               <a:rPr lang="ru-RU" smtClean="0"/>
-              <a:t>19.06.2013</a:t>
+              <a:t>24.06.2013</a:t>
             </a:fld>
             <a:endParaRPr lang="ru-RU"/>
           </a:p>
@@ -485,7 +485,7 @@
           <a:p>
             <a:fld id="{8E6E6A2A-E9D3-4A0D-B04A-ABDD367A1E08}" type="datetimeFigureOut">
               <a:rPr lang="ru-RU" smtClean="0"/>
-              <a:t>19.06.2013</a:t>
+              <a:t>24.06.2013</a:t>
             </a:fld>
             <a:endParaRPr lang="ru-RU"/>
           </a:p>
@@ -665,7 +665,7 @@
           <a:p>
             <a:fld id="{8E6E6A2A-E9D3-4A0D-B04A-ABDD367A1E08}" type="datetimeFigureOut">
               <a:rPr lang="ru-RU" smtClean="0"/>
-              <a:t>19.06.2013</a:t>
+              <a:t>24.06.2013</a:t>
             </a:fld>
             <a:endParaRPr lang="ru-RU"/>
           </a:p>
@@ -835,7 +835,7 @@
           <a:p>
             <a:fld id="{8E6E6A2A-E9D3-4A0D-B04A-ABDD367A1E08}" type="datetimeFigureOut">
               <a:rPr lang="ru-RU" smtClean="0"/>
-              <a:t>19.06.2013</a:t>
+              <a:t>24.06.2013</a:t>
             </a:fld>
             <a:endParaRPr lang="ru-RU"/>
           </a:p>
@@ -1081,7 +1081,7 @@
           <a:p>
             <a:fld id="{8E6E6A2A-E9D3-4A0D-B04A-ABDD367A1E08}" type="datetimeFigureOut">
               <a:rPr lang="ru-RU" smtClean="0"/>
-              <a:t>19.06.2013</a:t>
+              <a:t>24.06.2013</a:t>
             </a:fld>
             <a:endParaRPr lang="ru-RU"/>
           </a:p>
@@ -1369,7 +1369,7 @@
           <a:p>
             <a:fld id="{8E6E6A2A-E9D3-4A0D-B04A-ABDD367A1E08}" type="datetimeFigureOut">
               <a:rPr lang="ru-RU" smtClean="0"/>
-              <a:t>19.06.2013</a:t>
+              <a:t>24.06.2013</a:t>
             </a:fld>
             <a:endParaRPr lang="ru-RU"/>
           </a:p>
@@ -1791,7 +1791,7 @@
           <a:p>
             <a:fld id="{8E6E6A2A-E9D3-4A0D-B04A-ABDD367A1E08}" type="datetimeFigureOut">
               <a:rPr lang="ru-RU" smtClean="0"/>
-              <a:t>19.06.2013</a:t>
+              <a:t>24.06.2013</a:t>
             </a:fld>
             <a:endParaRPr lang="ru-RU"/>
           </a:p>
@@ -1909,7 +1909,7 @@
           <a:p>
             <a:fld id="{8E6E6A2A-E9D3-4A0D-B04A-ABDD367A1E08}" type="datetimeFigureOut">
               <a:rPr lang="ru-RU" smtClean="0"/>
-              <a:t>19.06.2013</a:t>
+              <a:t>24.06.2013</a:t>
             </a:fld>
             <a:endParaRPr lang="ru-RU"/>
           </a:p>
@@ -2004,7 +2004,7 @@
           <a:p>
             <a:fld id="{8E6E6A2A-E9D3-4A0D-B04A-ABDD367A1E08}" type="datetimeFigureOut">
               <a:rPr lang="ru-RU" smtClean="0"/>
-              <a:t>19.06.2013</a:t>
+              <a:t>24.06.2013</a:t>
             </a:fld>
             <a:endParaRPr lang="ru-RU"/>
           </a:p>
@@ -2281,7 +2281,7 @@
           <a:p>
             <a:fld id="{8E6E6A2A-E9D3-4A0D-B04A-ABDD367A1E08}" type="datetimeFigureOut">
               <a:rPr lang="ru-RU" smtClean="0"/>
-              <a:t>19.06.2013</a:t>
+              <a:t>24.06.2013</a:t>
             </a:fld>
             <a:endParaRPr lang="ru-RU"/>
           </a:p>
@@ -2534,7 +2534,7 @@
           <a:p>
             <a:fld id="{8E6E6A2A-E9D3-4A0D-B04A-ABDD367A1E08}" type="datetimeFigureOut">
               <a:rPr lang="ru-RU" smtClean="0"/>
-              <a:t>19.06.2013</a:t>
+              <a:t>24.06.2013</a:t>
             </a:fld>
             <a:endParaRPr lang="ru-RU"/>
           </a:p>
@@ -2747,7 +2747,7 @@
           <a:p>
             <a:fld id="{8E6E6A2A-E9D3-4A0D-B04A-ABDD367A1E08}" type="datetimeFigureOut">
               <a:rPr lang="ru-RU" smtClean="0"/>
-              <a:t>19.06.2013</a:t>
+              <a:t>24.06.2013</a:t>
             </a:fld>
             <a:endParaRPr lang="ru-RU"/>
           </a:p>
@@ -12100,7 +12100,16 @@
                 </a:solidFill>
                 <a:cs typeface="Times New Roman" pitchFamily="18" charset="0"/>
               </a:rPr>
-              <a:t>Используется для сортировки в массивах и т.д.</a:t>
+              <a:t>Используется для сортировки в массивах и т.д</a:t>
+            </a:r>
+            <a:r>
+              <a:rPr lang="ru-RU" sz="1200" dirty="0" smtClean="0">
+                <a:solidFill>
+                  <a:schemeClr val="bg1"/>
+                </a:solidFill>
+                <a:cs typeface="Times New Roman" pitchFamily="18" charset="0"/>
+              </a:rPr>
+              <a:t>. Реализуется в том типе который необходимо будет упорядочивать.</a:t>
             </a:r>
             <a:endParaRPr lang="en-US" sz="1200" dirty="0">
               <a:solidFill>
@@ -12121,8 +12130,8 @@
         </p:nvSpPr>
         <p:spPr bwMode="auto">
           <a:xfrm>
-            <a:off x="2667000" y="663575"/>
-            <a:ext cx="3733800" cy="708025"/>
+            <a:off x="1475656" y="663645"/>
+            <a:ext cx="4925144" cy="707886"/>
           </a:xfrm>
           <a:prstGeom prst="rect">
             <a:avLst/>
@@ -12147,22 +12156,66 @@
           </a:extLst>
         </p:spPr>
         <p:txBody>
-          <a:bodyPr anchor="ctr">
+          <a:bodyPr wrap="square" anchor="ctr">
             <a:spAutoFit/>
           </a:bodyPr>
           <a:lstStyle/>
           <a:p>
             <a:pPr eaLnBrk="0" hangingPunct="0"/>
             <a:r>
-              <a:rPr lang="be-BY" sz="1000" dirty="0">
-                <a:solidFill>
-                  <a:schemeClr val="bg1"/>
-                </a:solidFill>
-                <a:latin typeface="Courier New" pitchFamily="49" charset="0"/>
-                <a:ea typeface="Calibri" pitchFamily="34" charset="0"/>
-                <a:cs typeface="Courier New" pitchFamily="49" charset="0"/>
-              </a:rPr>
-              <a:t>    interface IComparable</a:t>
+              <a:rPr lang="be-BY" sz="1000" dirty="0" smtClean="0">
+                <a:solidFill>
+                  <a:schemeClr val="bg1"/>
+                </a:solidFill>
+                <a:latin typeface="Courier New" pitchFamily="49" charset="0"/>
+                <a:ea typeface="Calibri" pitchFamily="34" charset="0"/>
+                <a:cs typeface="Courier New" pitchFamily="49" charset="0"/>
+              </a:rPr>
+              <a:t>interface I</a:t>
+            </a:r>
+            <a:r>
+              <a:rPr lang="en-US" sz="1000" dirty="0" smtClean="0">
+                <a:solidFill>
+                  <a:schemeClr val="bg1"/>
+                </a:solidFill>
+                <a:latin typeface="Courier New" pitchFamily="49" charset="0"/>
+                <a:ea typeface="Calibri" pitchFamily="34" charset="0"/>
+                <a:cs typeface="Courier New" pitchFamily="49" charset="0"/>
+              </a:rPr>
+              <a:t>C</a:t>
+            </a:r>
+            <a:r>
+              <a:rPr lang="be-BY" sz="1000" dirty="0" smtClean="0">
+                <a:solidFill>
+                  <a:schemeClr val="bg1"/>
+                </a:solidFill>
+                <a:latin typeface="Courier New" pitchFamily="49" charset="0"/>
+                <a:ea typeface="Calibri" pitchFamily="34" charset="0"/>
+                <a:cs typeface="Courier New" pitchFamily="49" charset="0"/>
+              </a:rPr>
+              <a:t>omparable</a:t>
+            </a:r>
+            <a:r>
+              <a:rPr lang="en-US" sz="1000" dirty="0" smtClean="0">
+                <a:solidFill>
+                  <a:schemeClr val="bg1"/>
+                </a:solidFill>
+                <a:latin typeface="Courier New" pitchFamily="49" charset="0"/>
+                <a:ea typeface="Calibri" pitchFamily="34" charset="0"/>
+                <a:cs typeface="Courier New" pitchFamily="49" charset="0"/>
+              </a:rPr>
+              <a:t>&lt;T&gt; // </a:t>
+            </a:r>
+            <a:r>
+              <a:rPr lang="en-US" sz="900" dirty="0" err="1" smtClean="0">
+                <a:solidFill>
+                  <a:schemeClr val="bg1"/>
+                </a:solidFill>
+                <a:latin typeface="Courier New" pitchFamily="49" charset="0"/>
+                <a:ea typeface="Calibri" pitchFamily="34" charset="0"/>
+                <a:cs typeface="Courier New" pitchFamily="49" charset="0"/>
+              </a:rPr>
+              <a:t>System.Collections.Generic</a:t>
             </a:r>
             <a:endParaRPr lang="be-BY" sz="900" dirty="0">
               <a:solidFill>
@@ -12175,15 +12228,15 @@
           <a:p>
             <a:pPr eaLnBrk="0" hangingPunct="0"/>
             <a:r>
-              <a:rPr lang="be-BY" sz="1000" dirty="0">
-                <a:solidFill>
-                  <a:schemeClr val="bg1"/>
-                </a:solidFill>
-                <a:latin typeface="Courier New" pitchFamily="49" charset="0"/>
-                <a:ea typeface="Calibri" pitchFamily="34" charset="0"/>
-                <a:cs typeface="Courier New" pitchFamily="49" charset="0"/>
-              </a:rPr>
-              <a:t>    {</a:t>
+              <a:rPr lang="be-BY" sz="1000" dirty="0" smtClean="0">
+                <a:solidFill>
+                  <a:schemeClr val="bg1"/>
+                </a:solidFill>
+                <a:latin typeface="Courier New" pitchFamily="49" charset="0"/>
+                <a:ea typeface="Calibri" pitchFamily="34" charset="0"/>
+                <a:cs typeface="Courier New" pitchFamily="49" charset="0"/>
+              </a:rPr>
+              <a:t>{</a:t>
             </a:r>
             <a:endParaRPr lang="be-BY" sz="900" dirty="0">
               <a:solidFill>
@@ -12196,29 +12249,62 @@
           <a:p>
             <a:pPr eaLnBrk="0" hangingPunct="0"/>
             <a:r>
-              <a:rPr lang="be-BY" sz="1000" dirty="0">
-                <a:solidFill>
-                  <a:schemeClr val="bg1"/>
-                </a:solidFill>
-                <a:latin typeface="Courier New" pitchFamily="49" charset="0"/>
-                <a:ea typeface="Calibri" pitchFamily="34" charset="0"/>
-                <a:cs typeface="Courier New" pitchFamily="49" charset="0"/>
-              </a:rPr>
-              <a:t>        int CompareTo(object </a:t>
-            </a:r>
-            <a:r>
-              <a:rPr lang="en-US" sz="1000" dirty="0">
-                <a:solidFill>
-                  <a:schemeClr val="bg1"/>
-                </a:solidFill>
-                <a:latin typeface="Courier New" pitchFamily="49" charset="0"/>
-                <a:ea typeface="Calibri" pitchFamily="34" charset="0"/>
-                <a:cs typeface="Courier New" pitchFamily="49" charset="0"/>
-              </a:rPr>
-              <a:t>o</a:t>
-            </a:r>
-            <a:r>
-              <a:rPr lang="be-BY" sz="1000" dirty="0">
+              <a:rPr lang="en-US" sz="1000" dirty="0" smtClean="0">
+                <a:solidFill>
+                  <a:schemeClr val="bg1"/>
+                </a:solidFill>
+                <a:latin typeface="Courier New" pitchFamily="49" charset="0"/>
+                <a:ea typeface="Calibri" pitchFamily="34" charset="0"/>
+                <a:cs typeface="Courier New" pitchFamily="49" charset="0"/>
+              </a:rPr>
+              <a:t>    </a:t>
+            </a:r>
+            <a:r>
+              <a:rPr lang="be-BY" sz="1000" dirty="0" smtClean="0">
+                <a:solidFill>
+                  <a:schemeClr val="bg1"/>
+                </a:solidFill>
+                <a:latin typeface="Courier New" pitchFamily="49" charset="0"/>
+                <a:ea typeface="Calibri" pitchFamily="34" charset="0"/>
+                <a:cs typeface="Courier New" pitchFamily="49" charset="0"/>
+              </a:rPr>
+              <a:t>int CompareTo(</a:t>
+            </a:r>
+            <a:r>
+              <a:rPr lang="en-US" sz="1000" dirty="0" smtClean="0">
+                <a:solidFill>
+                  <a:schemeClr val="bg1"/>
+                </a:solidFill>
+                <a:latin typeface="Courier New" pitchFamily="49" charset="0"/>
+                <a:ea typeface="Calibri" pitchFamily="34" charset="0"/>
+                <a:cs typeface="Courier New" pitchFamily="49" charset="0"/>
+              </a:rPr>
+              <a:t>T</a:t>
+            </a:r>
+            <a:r>
+              <a:rPr lang="be-BY" sz="1000" dirty="0" smtClean="0">
+                <a:solidFill>
+                  <a:schemeClr val="bg1"/>
+                </a:solidFill>
+                <a:latin typeface="Courier New" pitchFamily="49" charset="0"/>
+                <a:ea typeface="Calibri" pitchFamily="34" charset="0"/>
+                <a:cs typeface="Courier New" pitchFamily="49" charset="0"/>
+              </a:rPr>
+              <a:t> </a:t>
+            </a:r>
+            <a:r>
+              <a:rPr lang="en-US" sz="1000" dirty="0" smtClean="0">
+                <a:solidFill>
+                  <a:schemeClr val="bg1"/>
+                </a:solidFill>
+                <a:latin typeface="Courier New" pitchFamily="49" charset="0"/>
+                <a:ea typeface="Calibri" pitchFamily="34" charset="0"/>
+                <a:cs typeface="Courier New" pitchFamily="49" charset="0"/>
+              </a:rPr>
+              <a:t>other</a:t>
+            </a:r>
+            <a:r>
+              <a:rPr lang="be-BY" sz="1000" dirty="0" smtClean="0">
                 <a:solidFill>
                   <a:schemeClr val="bg1"/>
                 </a:solidFill>
@@ -12239,15 +12325,15 @@
           <a:p>
             <a:pPr eaLnBrk="0" hangingPunct="0"/>
             <a:r>
-              <a:rPr lang="be-BY" sz="1000" dirty="0">
-                <a:solidFill>
-                  <a:schemeClr val="bg1"/>
-                </a:solidFill>
-                <a:latin typeface="Courier New" pitchFamily="49" charset="0"/>
-                <a:ea typeface="Calibri" pitchFamily="34" charset="0"/>
-                <a:cs typeface="Courier New" pitchFamily="49" charset="0"/>
-              </a:rPr>
-              <a:t>    }</a:t>
+              <a:rPr lang="be-BY" sz="1000" dirty="0" smtClean="0">
+                <a:solidFill>
+                  <a:schemeClr val="bg1"/>
+                </a:solidFill>
+                <a:latin typeface="Courier New" pitchFamily="49" charset="0"/>
+                <a:ea typeface="Calibri" pitchFamily="34" charset="0"/>
+                <a:cs typeface="Courier New" pitchFamily="49" charset="0"/>
+              </a:rPr>
+              <a:t>}</a:t>
             </a:r>
             <a:endParaRPr lang="be-BY" dirty="0">
               <a:solidFill>
@@ -12456,8 +12542,8 @@
         </p:nvSpPr>
         <p:spPr bwMode="auto">
           <a:xfrm>
-            <a:off x="304800" y="1981200"/>
-            <a:ext cx="8686800" cy="4708525"/>
+            <a:off x="304800" y="2057916"/>
+            <a:ext cx="8686800" cy="4555093"/>
           </a:xfrm>
           <a:prstGeom prst="rect">
             <a:avLst/>
@@ -12502,93 +12588,40 @@
                 <a:ea typeface="Calibri" pitchFamily="34" charset="0"/>
                 <a:cs typeface="Courier New" pitchFamily="49" charset="0"/>
               </a:rPr>
-              <a:t>    class Point : IComparable</a:t>
-            </a:r>
-            <a:endParaRPr lang="be-BY" sz="900" dirty="0">
-              <a:solidFill>
-                <a:schemeClr val="bg1"/>
-              </a:solidFill>
-              <a:ea typeface="Calibri" pitchFamily="34" charset="0"/>
-              <a:cs typeface="Courier New" pitchFamily="49" charset="0"/>
+              <a:t>using System.Collections</a:t>
+            </a:r>
+            <a:r>
+              <a:rPr lang="en-US" sz="1000" dirty="0">
+                <a:solidFill>
+                  <a:schemeClr val="bg1"/>
+                </a:solidFill>
+                <a:latin typeface="Courier New" pitchFamily="49" charset="0"/>
+                <a:ea typeface="Calibri" pitchFamily="34" charset="0"/>
+                <a:cs typeface="Courier New" pitchFamily="49" charset="0"/>
+              </a:rPr>
+              <a:t>.Generic</a:t>
+            </a:r>
+            <a:r>
+              <a:rPr lang="be-BY" sz="1000" dirty="0">
+                <a:solidFill>
+                  <a:schemeClr val="bg1"/>
+                </a:solidFill>
+                <a:latin typeface="Courier New" pitchFamily="49" charset="0"/>
+                <a:ea typeface="Calibri" pitchFamily="34" charset="0"/>
+                <a:cs typeface="Courier New" pitchFamily="49" charset="0"/>
+              </a:rPr>
+              <a:t>;</a:t>
+            </a:r>
+            <a:endParaRPr lang="be-BY" sz="900" dirty="0">
+              <a:solidFill>
+                <a:schemeClr val="bg1"/>
+              </a:solidFill>
+              <a:latin typeface="Arial" pitchFamily="34" charset="0"/>
             </a:endParaRPr>
           </a:p>
           <a:p>
             <a:pPr eaLnBrk="0" hangingPunct="0"/>
-            <a:r>
-              <a:rPr lang="be-BY" sz="1000" dirty="0">
-                <a:solidFill>
-                  <a:schemeClr val="bg1"/>
-                </a:solidFill>
-                <a:latin typeface="Courier New" pitchFamily="49" charset="0"/>
-                <a:ea typeface="Calibri" pitchFamily="34" charset="0"/>
-                <a:cs typeface="Courier New" pitchFamily="49" charset="0"/>
-              </a:rPr>
-              <a:t>    {</a:t>
-            </a:r>
-            <a:endParaRPr lang="be-BY" sz="900" dirty="0">
-              <a:solidFill>
-                <a:schemeClr val="bg1"/>
-              </a:solidFill>
-              <a:ea typeface="Calibri" pitchFamily="34" charset="0"/>
-              <a:cs typeface="Courier New" pitchFamily="49" charset="0"/>
-            </a:endParaRPr>
-          </a:p>
-          <a:p>
-            <a:pPr eaLnBrk="0" hangingPunct="0"/>
-            <a:r>
-              <a:rPr lang="be-BY" sz="1000" dirty="0">
-                <a:solidFill>
-                  <a:schemeClr val="bg1"/>
-                </a:solidFill>
-                <a:latin typeface="Courier New" pitchFamily="49" charset="0"/>
-                <a:ea typeface="Calibri" pitchFamily="34" charset="0"/>
-                <a:cs typeface="Courier New" pitchFamily="49" charset="0"/>
-              </a:rPr>
-              <a:t>        private int x;</a:t>
-            </a:r>
-            <a:endParaRPr lang="be-BY" sz="900" dirty="0">
-              <a:solidFill>
-                <a:schemeClr val="bg1"/>
-              </a:solidFill>
-              <a:ea typeface="Calibri" pitchFamily="34" charset="0"/>
-              <a:cs typeface="Courier New" pitchFamily="49" charset="0"/>
-            </a:endParaRPr>
-          </a:p>
-          <a:p>
-            <a:pPr eaLnBrk="0" hangingPunct="0"/>
-            <a:r>
-              <a:rPr lang="be-BY" sz="1000" dirty="0">
-                <a:solidFill>
-                  <a:schemeClr val="bg1"/>
-                </a:solidFill>
-                <a:latin typeface="Courier New" pitchFamily="49" charset="0"/>
-                <a:ea typeface="Calibri" pitchFamily="34" charset="0"/>
-                <a:cs typeface="Courier New" pitchFamily="49" charset="0"/>
-              </a:rPr>
-              <a:t>        private int y;</a:t>
-            </a:r>
-            <a:endParaRPr lang="be-BY" sz="900" dirty="0">
-              <a:solidFill>
-                <a:schemeClr val="bg1"/>
-              </a:solidFill>
-              <a:ea typeface="Calibri" pitchFamily="34" charset="0"/>
-              <a:cs typeface="Courier New" pitchFamily="49" charset="0"/>
-            </a:endParaRPr>
-          </a:p>
-          <a:p>
-            <a:pPr eaLnBrk="0" hangingPunct="0"/>
-            <a:r>
-              <a:rPr lang="ru-RU" sz="1000" dirty="0">
-                <a:solidFill>
-                  <a:schemeClr val="bg1"/>
-                </a:solidFill>
-                <a:latin typeface="Courier New" pitchFamily="49" charset="0"/>
-                <a:ea typeface="Calibri" pitchFamily="34" charset="0"/>
-                <a:cs typeface="Courier New" pitchFamily="49" charset="0"/>
-              </a:rPr>
-              <a:t>        . . . . . . . . . . . . . . . . . . . . . . . . . . . . . .</a:t>
-            </a:r>
-            <a:endParaRPr lang="be-BY" sz="1000" dirty="0">
+            <a:endParaRPr lang="en-US" sz="1000" dirty="0" smtClean="0">
               <a:solidFill>
                 <a:schemeClr val="bg1"/>
               </a:solidFill>
@@ -12600,15 +12633,70 @@
           <a:p>
             <a:pPr eaLnBrk="0" hangingPunct="0"/>
             <a:r>
-              <a:rPr lang="be-BY" sz="1000" dirty="0">
-                <a:solidFill>
-                  <a:schemeClr val="bg1"/>
-                </a:solidFill>
-                <a:latin typeface="Courier New" pitchFamily="49" charset="0"/>
-                <a:ea typeface="Calibri" pitchFamily="34" charset="0"/>
-                <a:cs typeface="Courier New" pitchFamily="49" charset="0"/>
-              </a:rPr>
-              <a:t>        public int CompareTo(object o)	//Реализация интерфейса</a:t>
+              <a:rPr lang="be-BY" sz="1000" dirty="0" smtClean="0">
+                <a:solidFill>
+                  <a:schemeClr val="bg1"/>
+                </a:solidFill>
+                <a:latin typeface="Courier New" pitchFamily="49" charset="0"/>
+                <a:ea typeface="Calibri" pitchFamily="34" charset="0"/>
+                <a:cs typeface="Courier New" pitchFamily="49" charset="0"/>
+              </a:rPr>
+              <a:t>    </a:t>
+            </a:r>
+            <a:r>
+              <a:rPr lang="be-BY" sz="1000" dirty="0">
+                <a:solidFill>
+                  <a:schemeClr val="bg1"/>
+                </a:solidFill>
+                <a:latin typeface="Courier New" pitchFamily="49" charset="0"/>
+                <a:ea typeface="Calibri" pitchFamily="34" charset="0"/>
+                <a:cs typeface="Courier New" pitchFamily="49" charset="0"/>
+              </a:rPr>
+              <a:t>class Point : </a:t>
+            </a:r>
+            <a:r>
+              <a:rPr lang="be-BY" sz="1000" dirty="0" smtClean="0">
+                <a:solidFill>
+                  <a:schemeClr val="bg1"/>
+                </a:solidFill>
+                <a:latin typeface="Courier New" pitchFamily="49" charset="0"/>
+                <a:ea typeface="Calibri" pitchFamily="34" charset="0"/>
+                <a:cs typeface="Courier New" pitchFamily="49" charset="0"/>
+              </a:rPr>
+              <a:t>I</a:t>
+            </a:r>
+            <a:r>
+              <a:rPr lang="en-US" sz="1000" dirty="0" smtClean="0">
+                <a:solidFill>
+                  <a:schemeClr val="bg1"/>
+                </a:solidFill>
+                <a:latin typeface="Courier New" pitchFamily="49" charset="0"/>
+                <a:ea typeface="Calibri" pitchFamily="34" charset="0"/>
+                <a:cs typeface="Courier New" pitchFamily="49" charset="0"/>
+              </a:rPr>
+              <a:t>C</a:t>
+            </a:r>
+            <a:r>
+              <a:rPr lang="be-BY" sz="1000" dirty="0" smtClean="0">
+                <a:solidFill>
+                  <a:schemeClr val="bg1"/>
+                </a:solidFill>
+                <a:latin typeface="Courier New" pitchFamily="49" charset="0"/>
+                <a:ea typeface="Calibri" pitchFamily="34" charset="0"/>
+                <a:cs typeface="Courier New" pitchFamily="49" charset="0"/>
+              </a:rPr>
+              <a:t>omparable</a:t>
+            </a:r>
+            <a:r>
+              <a:rPr lang="en-US" sz="1000" dirty="0" smtClean="0">
+                <a:solidFill>
+                  <a:schemeClr val="bg1"/>
+                </a:solidFill>
+                <a:latin typeface="Courier New" pitchFamily="49" charset="0"/>
+                <a:ea typeface="Calibri" pitchFamily="34" charset="0"/>
+                <a:cs typeface="Courier New" pitchFamily="49" charset="0"/>
+              </a:rPr>
+              <a:t>&lt;Point&gt;</a:t>
             </a:r>
             <a:endParaRPr lang="be-BY" sz="900" dirty="0">
               <a:solidFill>
@@ -12629,6 +12717,156 @@
                 <a:ea typeface="Calibri" pitchFamily="34" charset="0"/>
                 <a:cs typeface="Courier New" pitchFamily="49" charset="0"/>
               </a:rPr>
+              <a:t>    {</a:t>
+            </a:r>
+            <a:endParaRPr lang="be-BY" sz="900" dirty="0">
+              <a:solidFill>
+                <a:schemeClr val="bg1"/>
+              </a:solidFill>
+              <a:ea typeface="Calibri" pitchFamily="34" charset="0"/>
+              <a:cs typeface="Courier New" pitchFamily="49" charset="0"/>
+            </a:endParaRPr>
+          </a:p>
+          <a:p>
+            <a:pPr eaLnBrk="0" hangingPunct="0"/>
+            <a:r>
+              <a:rPr lang="be-BY" sz="1000" dirty="0">
+                <a:solidFill>
+                  <a:schemeClr val="bg1"/>
+                </a:solidFill>
+                <a:latin typeface="Courier New" pitchFamily="49" charset="0"/>
+                <a:ea typeface="Calibri" pitchFamily="34" charset="0"/>
+                <a:cs typeface="Courier New" pitchFamily="49" charset="0"/>
+              </a:rPr>
+              <a:t>        private int x;</a:t>
+            </a:r>
+            <a:endParaRPr lang="be-BY" sz="900" dirty="0">
+              <a:solidFill>
+                <a:schemeClr val="bg1"/>
+              </a:solidFill>
+              <a:ea typeface="Calibri" pitchFamily="34" charset="0"/>
+              <a:cs typeface="Courier New" pitchFamily="49" charset="0"/>
+            </a:endParaRPr>
+          </a:p>
+          <a:p>
+            <a:pPr eaLnBrk="0" hangingPunct="0"/>
+            <a:r>
+              <a:rPr lang="be-BY" sz="1000" dirty="0">
+                <a:solidFill>
+                  <a:schemeClr val="bg1"/>
+                </a:solidFill>
+                <a:latin typeface="Courier New" pitchFamily="49" charset="0"/>
+                <a:ea typeface="Calibri" pitchFamily="34" charset="0"/>
+                <a:cs typeface="Courier New" pitchFamily="49" charset="0"/>
+              </a:rPr>
+              <a:t>        private int y;</a:t>
+            </a:r>
+            <a:endParaRPr lang="be-BY" sz="900" dirty="0">
+              <a:solidFill>
+                <a:schemeClr val="bg1"/>
+              </a:solidFill>
+              <a:ea typeface="Calibri" pitchFamily="34" charset="0"/>
+              <a:cs typeface="Courier New" pitchFamily="49" charset="0"/>
+            </a:endParaRPr>
+          </a:p>
+          <a:p>
+            <a:pPr eaLnBrk="0" hangingPunct="0"/>
+            <a:r>
+              <a:rPr lang="ru-RU" sz="1000" dirty="0">
+                <a:solidFill>
+                  <a:schemeClr val="bg1"/>
+                </a:solidFill>
+                <a:latin typeface="Courier New" pitchFamily="49" charset="0"/>
+                <a:ea typeface="Calibri" pitchFamily="34" charset="0"/>
+                <a:cs typeface="Courier New" pitchFamily="49" charset="0"/>
+              </a:rPr>
+              <a:t>        . . . . . . . . . . . . . . . . . . . . . . . . . . . . . .</a:t>
+            </a:r>
+            <a:endParaRPr lang="be-BY" sz="1000" dirty="0">
+              <a:solidFill>
+                <a:schemeClr val="bg1"/>
+              </a:solidFill>
+              <a:latin typeface="Courier New" pitchFamily="49" charset="0"/>
+              <a:ea typeface="Calibri" pitchFamily="34" charset="0"/>
+              <a:cs typeface="Courier New" pitchFamily="49" charset="0"/>
+            </a:endParaRPr>
+          </a:p>
+          <a:p>
+            <a:pPr eaLnBrk="0" hangingPunct="0"/>
+            <a:r>
+              <a:rPr lang="be-BY" sz="1000" dirty="0">
+                <a:solidFill>
+                  <a:schemeClr val="bg1"/>
+                </a:solidFill>
+                <a:latin typeface="Courier New" pitchFamily="49" charset="0"/>
+                <a:ea typeface="Calibri" pitchFamily="34" charset="0"/>
+                <a:cs typeface="Courier New" pitchFamily="49" charset="0"/>
+              </a:rPr>
+              <a:t>        public int </a:t>
+            </a:r>
+            <a:r>
+              <a:rPr lang="be-BY" sz="1000" dirty="0" smtClean="0">
+                <a:solidFill>
+                  <a:schemeClr val="bg1"/>
+                </a:solidFill>
+                <a:latin typeface="Courier New" pitchFamily="49" charset="0"/>
+                <a:ea typeface="Calibri" pitchFamily="34" charset="0"/>
+                <a:cs typeface="Courier New" pitchFamily="49" charset="0"/>
+              </a:rPr>
+              <a:t>CompareTo(</a:t>
+            </a:r>
+            <a:r>
+              <a:rPr lang="en-US" sz="1000" dirty="0" smtClean="0">
+                <a:solidFill>
+                  <a:schemeClr val="bg1"/>
+                </a:solidFill>
+                <a:latin typeface="Courier New" pitchFamily="49" charset="0"/>
+                <a:ea typeface="Calibri" pitchFamily="34" charset="0"/>
+                <a:cs typeface="Courier New" pitchFamily="49" charset="0"/>
+              </a:rPr>
+              <a:t>Point p</a:t>
+            </a:r>
+            <a:r>
+              <a:rPr lang="be-BY" sz="1000" dirty="0" smtClean="0">
+                <a:solidFill>
+                  <a:schemeClr val="bg1"/>
+                </a:solidFill>
+                <a:latin typeface="Courier New" pitchFamily="49" charset="0"/>
+                <a:ea typeface="Calibri" pitchFamily="34" charset="0"/>
+                <a:cs typeface="Courier New" pitchFamily="49" charset="0"/>
+              </a:rPr>
+              <a:t>)</a:t>
+            </a:r>
+            <a:r>
+              <a:rPr lang="be-BY" sz="1000" dirty="0">
+                <a:solidFill>
+                  <a:schemeClr val="bg1"/>
+                </a:solidFill>
+                <a:latin typeface="Courier New" pitchFamily="49" charset="0"/>
+                <a:ea typeface="Calibri" pitchFamily="34" charset="0"/>
+                <a:cs typeface="Courier New" pitchFamily="49" charset="0"/>
+              </a:rPr>
+              <a:t>	//Реализация интерфейса</a:t>
+            </a:r>
+            <a:endParaRPr lang="be-BY" sz="900" dirty="0">
+              <a:solidFill>
+                <a:schemeClr val="bg1"/>
+              </a:solidFill>
+              <a:ea typeface="Calibri" pitchFamily="34" charset="0"/>
+              <a:cs typeface="Courier New" pitchFamily="49" charset="0"/>
+            </a:endParaRPr>
+          </a:p>
+          <a:p>
+            <a:pPr eaLnBrk="0" hangingPunct="0"/>
+            <a:r>
+              <a:rPr lang="be-BY" sz="1000" dirty="0">
+                <a:solidFill>
+                  <a:schemeClr val="bg1"/>
+                </a:solidFill>
+                <a:latin typeface="Courier New" pitchFamily="49" charset="0"/>
+                <a:ea typeface="Calibri" pitchFamily="34" charset="0"/>
+                <a:cs typeface="Courier New" pitchFamily="49" charset="0"/>
+              </a:rPr>
               <a:t>        {</a:t>
             </a:r>
             <a:endParaRPr lang="be-BY" sz="900" dirty="0">
@@ -12642,78 +12880,37 @@
           <a:p>
             <a:pPr eaLnBrk="0" hangingPunct="0"/>
             <a:r>
-              <a:rPr lang="be-BY" sz="1000" dirty="0">
-                <a:solidFill>
-                  <a:schemeClr val="bg1"/>
-                </a:solidFill>
-                <a:latin typeface="Courier New" pitchFamily="49" charset="0"/>
-                <a:ea typeface="Calibri" pitchFamily="34" charset="0"/>
-                <a:cs typeface="Courier New" pitchFamily="49" charset="0"/>
-              </a:rPr>
-              <a:t>            Point p = o as Point;</a:t>
-            </a:r>
-            <a:endParaRPr lang="be-BY" sz="900" dirty="0">
-              <a:solidFill>
-                <a:schemeClr val="bg1"/>
-              </a:solidFill>
-              <a:ea typeface="Calibri" pitchFamily="34" charset="0"/>
-              <a:cs typeface="Courier New" pitchFamily="49" charset="0"/>
-            </a:endParaRPr>
-          </a:p>
-          <a:p>
-            <a:pPr eaLnBrk="0" hangingPunct="0"/>
-            <a:r>
-              <a:rPr lang="be-BY" sz="1000" dirty="0">
-                <a:solidFill>
-                  <a:schemeClr val="bg1"/>
-                </a:solidFill>
-                <a:latin typeface="Courier New" pitchFamily="49" charset="0"/>
-                <a:ea typeface="Calibri" pitchFamily="34" charset="0"/>
-                <a:cs typeface="Courier New" pitchFamily="49" charset="0"/>
-              </a:rPr>
-              <a:t>            if (p == null)</a:t>
-            </a:r>
-            <a:endParaRPr lang="be-BY" sz="900" dirty="0">
-              <a:solidFill>
-                <a:schemeClr val="bg1"/>
-              </a:solidFill>
-              <a:ea typeface="Calibri" pitchFamily="34" charset="0"/>
-              <a:cs typeface="Courier New" pitchFamily="49" charset="0"/>
-            </a:endParaRPr>
-          </a:p>
-          <a:p>
-            <a:pPr eaLnBrk="0" hangingPunct="0"/>
-            <a:r>
-              <a:rPr lang="be-BY" sz="1000" dirty="0">
-                <a:solidFill>
-                  <a:schemeClr val="bg1"/>
-                </a:solidFill>
-                <a:latin typeface="Courier New" pitchFamily="49" charset="0"/>
-                <a:ea typeface="Calibri" pitchFamily="34" charset="0"/>
-                <a:cs typeface="Courier New" pitchFamily="49" charset="0"/>
-              </a:rPr>
-              <a:t>                return 0;</a:t>
-            </a:r>
-            <a:endParaRPr lang="be-BY" sz="900" dirty="0">
-              <a:solidFill>
-                <a:schemeClr val="bg1"/>
-              </a:solidFill>
-              <a:ea typeface="Calibri" pitchFamily="34" charset="0"/>
-              <a:cs typeface="Courier New" pitchFamily="49" charset="0"/>
-            </a:endParaRPr>
-          </a:p>
-          <a:p>
-            <a:pPr eaLnBrk="0" hangingPunct="0"/>
-            <a:r>
-              <a:rPr lang="be-BY" sz="1000" dirty="0">
-                <a:solidFill>
-                  <a:schemeClr val="bg1"/>
-                </a:solidFill>
-                <a:latin typeface="Courier New" pitchFamily="49" charset="0"/>
-                <a:ea typeface="Calibri" pitchFamily="34" charset="0"/>
-                <a:cs typeface="Courier New" pitchFamily="49" charset="0"/>
-              </a:rPr>
-              <a:t>            return x - p.x;</a:t>
+              <a:rPr lang="en-US" sz="1000" dirty="0" smtClean="0">
+                <a:solidFill>
+                  <a:schemeClr val="bg1"/>
+                </a:solidFill>
+                <a:latin typeface="Courier New" pitchFamily="49" charset="0"/>
+                <a:ea typeface="Calibri" pitchFamily="34" charset="0"/>
+                <a:cs typeface="Courier New" pitchFamily="49" charset="0"/>
+              </a:rPr>
+              <a:t>            </a:t>
+            </a:r>
+            <a:r>
+              <a:rPr lang="be-BY" sz="1000" dirty="0" smtClean="0">
+                <a:solidFill>
+                  <a:schemeClr val="bg1"/>
+                </a:solidFill>
+                <a:latin typeface="Courier New" pitchFamily="49" charset="0"/>
+                <a:ea typeface="Calibri" pitchFamily="34" charset="0"/>
+                <a:cs typeface="Courier New" pitchFamily="49" charset="0"/>
+              </a:rPr>
+              <a:t>return </a:t>
+            </a:r>
+            <a:r>
+              <a:rPr lang="be-BY" sz="1000" dirty="0">
+                <a:solidFill>
+                  <a:schemeClr val="bg1"/>
+                </a:solidFill>
+                <a:latin typeface="Courier New" pitchFamily="49" charset="0"/>
+                <a:ea typeface="Calibri" pitchFamily="34" charset="0"/>
+                <a:cs typeface="Courier New" pitchFamily="49" charset="0"/>
+              </a:rPr>
+              <a:t>x - p.x;</a:t>
             </a:r>
             <a:endParaRPr lang="be-BY" sz="900" dirty="0">
               <a:solidFill>
@@ -13185,8 +13382,8 @@
         </p:nvSpPr>
         <p:spPr bwMode="auto">
           <a:xfrm>
-            <a:off x="381000" y="-4763"/>
-            <a:ext cx="8305800" cy="646113"/>
+            <a:off x="381000" y="-97205"/>
+            <a:ext cx="8305800" cy="830997"/>
           </a:xfrm>
           <a:prstGeom prst="rect">
             <a:avLst/>
@@ -13273,7 +13470,43 @@
                 </a:solidFill>
                 <a:cs typeface="Times New Roman" pitchFamily="18" charset="0"/>
               </a:rPr>
-              <a:t>Используется для сортировки в массивах и т.д.</a:t>
+              <a:t>Используется </a:t>
+            </a:r>
+            <a:r>
+              <a:rPr lang="ru-RU" sz="1200" dirty="0" smtClean="0">
+                <a:solidFill>
+                  <a:schemeClr val="bg1"/>
+                </a:solidFill>
+                <a:cs typeface="Times New Roman" pitchFamily="18" charset="0"/>
+              </a:rPr>
+              <a:t>для сортировки классов у которых уже есть реализация </a:t>
+            </a:r>
+            <a:r>
+              <a:rPr lang="en-US" sz="1200" dirty="0" err="1" smtClean="0">
+                <a:solidFill>
+                  <a:schemeClr val="bg1"/>
+                </a:solidFill>
+                <a:cs typeface="Times New Roman" pitchFamily="18" charset="0"/>
+              </a:rPr>
+              <a:t>IComparable</a:t>
+            </a:r>
+            <a:r>
+              <a:rPr lang="en-US" sz="1200" dirty="0" smtClean="0">
+                <a:solidFill>
+                  <a:schemeClr val="bg1"/>
+                </a:solidFill>
+                <a:cs typeface="Times New Roman" pitchFamily="18" charset="0"/>
+              </a:rPr>
+              <a:t> </a:t>
+            </a:r>
+            <a:r>
+              <a:rPr lang="ru-RU" sz="1200" dirty="0" smtClean="0">
+                <a:solidFill>
+                  <a:schemeClr val="bg1"/>
+                </a:solidFill>
+                <a:cs typeface="Times New Roman" pitchFamily="18" charset="0"/>
+              </a:rPr>
+              <a:t> или если есть классы нелья модифицировать. Реализуется в отдельном классе.</a:t>
             </a:r>
             <a:endParaRPr lang="en-US" sz="1200" dirty="0">
               <a:solidFill>
@@ -13294,7 +13527,7 @@
         </p:nvSpPr>
         <p:spPr bwMode="auto">
           <a:xfrm>
-            <a:off x="2667000" y="663575"/>
+            <a:off x="2667000" y="848767"/>
             <a:ext cx="3733800" cy="708025"/>
           </a:xfrm>
           <a:prstGeom prst="rect">
@@ -13335,10 +13568,43 @@
                 <a:ea typeface="Calibri" pitchFamily="34" charset="0"/>
                 <a:cs typeface="Courier New" pitchFamily="49" charset="0"/>
               </a:rPr>
-              <a:t>    interface ICompar</a:t>
-            </a:r>
-            <a:r>
-              <a:rPr lang="en-US" sz="1000" dirty="0" err="1">
+              <a:t>    interface </a:t>
+            </a:r>
+            <a:r>
+              <a:rPr lang="be-BY" sz="1000" dirty="0" smtClean="0">
+                <a:solidFill>
+                  <a:schemeClr val="bg1"/>
+                </a:solidFill>
+                <a:latin typeface="Courier New" pitchFamily="49" charset="0"/>
+                <a:ea typeface="Calibri" pitchFamily="34" charset="0"/>
+                <a:cs typeface="Courier New" pitchFamily="49" charset="0"/>
+              </a:rPr>
+              <a:t>I</a:t>
+            </a:r>
+            <a:r>
+              <a:rPr lang="en-US" sz="1000" dirty="0" smtClean="0">
+                <a:solidFill>
+                  <a:schemeClr val="bg1"/>
+                </a:solidFill>
+                <a:latin typeface="Courier New" pitchFamily="49" charset="0"/>
+                <a:ea typeface="Calibri" pitchFamily="34" charset="0"/>
+                <a:cs typeface="Courier New" pitchFamily="49" charset="0"/>
+              </a:rPr>
+              <a:t>C</a:t>
+            </a:r>
+            <a:r>
+              <a:rPr lang="be-BY" sz="1000" dirty="0" smtClean="0">
+                <a:solidFill>
+                  <a:schemeClr val="bg1"/>
+                </a:solidFill>
+                <a:latin typeface="Courier New" pitchFamily="49" charset="0"/>
+                <a:ea typeface="Calibri" pitchFamily="34" charset="0"/>
+                <a:cs typeface="Courier New" pitchFamily="49" charset="0"/>
+              </a:rPr>
+              <a:t>ompar</a:t>
+            </a:r>
+            <a:r>
+              <a:rPr lang="en-US" sz="1000" dirty="0" err="1" smtClean="0">
                 <a:solidFill>
                   <a:schemeClr val="bg1"/>
                 </a:solidFill>
@@ -13348,6 +13614,17 @@
               </a:rPr>
               <a:t>er</a:t>
             </a:r>
+            <a:r>
+              <a:rPr lang="en-US" sz="1000" dirty="0" smtClean="0">
+                <a:solidFill>
+                  <a:schemeClr val="bg1"/>
+                </a:solidFill>
+                <a:latin typeface="Courier New" pitchFamily="49" charset="0"/>
+                <a:ea typeface="Calibri" pitchFamily="34" charset="0"/>
+                <a:cs typeface="Courier New" pitchFamily="49" charset="0"/>
+              </a:rPr>
+              <a:t>&lt;T&gt;</a:t>
+            </a:r>
             <a:endParaRPr lang="be-BY" sz="900" dirty="0">
               <a:solidFill>
                 <a:schemeClr val="bg1"/>
@@ -13388,43 +13665,76 @@
                 <a:ea typeface="Calibri" pitchFamily="34" charset="0"/>
                 <a:cs typeface="Courier New" pitchFamily="49" charset="0"/>
               </a:rPr>
-              <a:t>        int Compare(object </a:t>
-            </a:r>
-            <a:r>
-              <a:rPr lang="en-US" sz="1000" dirty="0">
-                <a:solidFill>
-                  <a:schemeClr val="bg1"/>
-                </a:solidFill>
-                <a:latin typeface="Courier New" pitchFamily="49" charset="0"/>
-                <a:ea typeface="Calibri" pitchFamily="34" charset="0"/>
-                <a:cs typeface="Courier New" pitchFamily="49" charset="0"/>
-              </a:rPr>
-              <a:t>o1,</a:t>
-            </a:r>
-            <a:r>
-              <a:rPr lang="be-BY" sz="1000" dirty="0">
-                <a:solidFill>
-                  <a:schemeClr val="bg1"/>
-                </a:solidFill>
-                <a:latin typeface="Courier New" pitchFamily="49" charset="0"/>
-                <a:ea typeface="Calibri" pitchFamily="34" charset="0"/>
-                <a:cs typeface="Courier New" pitchFamily="49" charset="0"/>
-              </a:rPr>
-              <a:t> object </a:t>
-            </a:r>
-            <a:r>
-              <a:rPr lang="en-US" sz="1000" dirty="0">
-                <a:solidFill>
-                  <a:schemeClr val="bg1"/>
-                </a:solidFill>
-                <a:latin typeface="Courier New" pitchFamily="49" charset="0"/>
-                <a:ea typeface="Calibri" pitchFamily="34" charset="0"/>
-                <a:cs typeface="Courier New" pitchFamily="49" charset="0"/>
-              </a:rPr>
-              <a:t>o2</a:t>
-            </a:r>
-            <a:r>
-              <a:rPr lang="be-BY" sz="1000" dirty="0">
+              <a:t>        int </a:t>
+            </a:r>
+            <a:r>
+              <a:rPr lang="be-BY" sz="1000" dirty="0" smtClean="0">
+                <a:solidFill>
+                  <a:schemeClr val="bg1"/>
+                </a:solidFill>
+                <a:latin typeface="Courier New" pitchFamily="49" charset="0"/>
+                <a:ea typeface="Calibri" pitchFamily="34" charset="0"/>
+                <a:cs typeface="Courier New" pitchFamily="49" charset="0"/>
+              </a:rPr>
+              <a:t>Compare(</a:t>
+            </a:r>
+            <a:r>
+              <a:rPr lang="en-US" sz="1000" dirty="0" smtClean="0">
+                <a:solidFill>
+                  <a:schemeClr val="bg1"/>
+                </a:solidFill>
+                <a:latin typeface="Courier New" pitchFamily="49" charset="0"/>
+                <a:ea typeface="Calibri" pitchFamily="34" charset="0"/>
+                <a:cs typeface="Courier New" pitchFamily="49" charset="0"/>
+              </a:rPr>
+              <a:t>T</a:t>
+            </a:r>
+            <a:r>
+              <a:rPr lang="be-BY" sz="1000" dirty="0" smtClean="0">
+                <a:solidFill>
+                  <a:schemeClr val="bg1"/>
+                </a:solidFill>
+                <a:latin typeface="Courier New" pitchFamily="49" charset="0"/>
+                <a:ea typeface="Calibri" pitchFamily="34" charset="0"/>
+                <a:cs typeface="Courier New" pitchFamily="49" charset="0"/>
+              </a:rPr>
+              <a:t> </a:t>
+            </a:r>
+            <a:r>
+              <a:rPr lang="en-US" sz="1000" dirty="0" smtClean="0">
+                <a:solidFill>
+                  <a:schemeClr val="bg1"/>
+                </a:solidFill>
+                <a:latin typeface="Courier New" pitchFamily="49" charset="0"/>
+                <a:ea typeface="Calibri" pitchFamily="34" charset="0"/>
+                <a:cs typeface="Courier New" pitchFamily="49" charset="0"/>
+              </a:rPr>
+              <a:t>x,</a:t>
+            </a:r>
+            <a:r>
+              <a:rPr lang="be-BY" sz="1000" dirty="0" smtClean="0">
+                <a:solidFill>
+                  <a:schemeClr val="bg1"/>
+                </a:solidFill>
+                <a:latin typeface="Courier New" pitchFamily="49" charset="0"/>
+                <a:ea typeface="Calibri" pitchFamily="34" charset="0"/>
+                <a:cs typeface="Courier New" pitchFamily="49" charset="0"/>
+              </a:rPr>
+              <a:t> </a:t>
+            </a:r>
+            <a:r>
+              <a:rPr lang="en-US" sz="1000" dirty="0" smtClean="0">
+                <a:solidFill>
+                  <a:schemeClr val="bg1"/>
+                </a:solidFill>
+                <a:latin typeface="Courier New" pitchFamily="49" charset="0"/>
+                <a:ea typeface="Calibri" pitchFamily="34" charset="0"/>
+                <a:cs typeface="Courier New" pitchFamily="49" charset="0"/>
+              </a:rPr>
+              <a:t>T y</a:t>
+            </a:r>
+            <a:r>
+              <a:rPr lang="be-BY" sz="1000" dirty="0" smtClean="0">
                 <a:solidFill>
                   <a:schemeClr val="bg1"/>
                 </a:solidFill>
@@ -13475,8 +13785,8 @@
         </p:nvSpPr>
         <p:spPr bwMode="auto">
           <a:xfrm>
-            <a:off x="304800" y="1447800"/>
-            <a:ext cx="8534400" cy="5308600"/>
+            <a:off x="304800" y="1755303"/>
+            <a:ext cx="8534400" cy="4693593"/>
           </a:xfrm>
           <a:prstGeom prst="rect">
             <a:avLst/>
@@ -13512,7 +13822,40 @@
                 <a:ea typeface="Calibri" pitchFamily="34" charset="0"/>
                 <a:cs typeface="Courier New" pitchFamily="49" charset="0"/>
               </a:rPr>
-              <a:t>using System.Collections;</a:t>
+              <a:t>using </a:t>
+            </a:r>
+            <a:r>
+              <a:rPr lang="be-BY" sz="1000" dirty="0" smtClean="0">
+                <a:solidFill>
+                  <a:schemeClr val="bg1"/>
+                </a:solidFill>
+                <a:latin typeface="Courier New" pitchFamily="49" charset="0"/>
+                <a:ea typeface="Calibri" pitchFamily="34" charset="0"/>
+                <a:cs typeface="Courier New" pitchFamily="49" charset="0"/>
+              </a:rPr>
+              <a:t>System.Collections</a:t>
+            </a:r>
+            <a:r>
+              <a:rPr lang="en-US" sz="1000" dirty="0" smtClean="0">
+                <a:solidFill>
+                  <a:schemeClr val="bg1"/>
+                </a:solidFill>
+                <a:latin typeface="Courier New" pitchFamily="49" charset="0"/>
+                <a:ea typeface="Calibri" pitchFamily="34" charset="0"/>
+                <a:cs typeface="Courier New" pitchFamily="49" charset="0"/>
+              </a:rPr>
+              <a:t>.Generic</a:t>
+            </a:r>
+            <a:r>
+              <a:rPr lang="be-BY" sz="1000" dirty="0" smtClean="0">
+                <a:solidFill>
+                  <a:schemeClr val="bg1"/>
+                </a:solidFill>
+                <a:latin typeface="Courier New" pitchFamily="49" charset="0"/>
+                <a:ea typeface="Calibri" pitchFamily="34" charset="0"/>
+                <a:cs typeface="Courier New" pitchFamily="49" charset="0"/>
+              </a:rPr>
+              <a:t>;</a:t>
             </a:r>
             <a:endParaRPr lang="be-BY" sz="900" dirty="0">
               <a:solidFill>
@@ -13534,7 +13877,51 @@
                 <a:ea typeface="Calibri" pitchFamily="34" charset="0"/>
                 <a:cs typeface="Courier New" pitchFamily="49" charset="0"/>
               </a:rPr>
-              <a:t>    class Point : IComparable</a:t>
+              <a:t>    class Point : </a:t>
+            </a:r>
+            <a:r>
+              <a:rPr lang="be-BY" sz="1000" dirty="0" smtClean="0">
+                <a:solidFill>
+                  <a:schemeClr val="bg1"/>
+                </a:solidFill>
+                <a:latin typeface="Courier New" pitchFamily="49" charset="0"/>
+                <a:ea typeface="Calibri" pitchFamily="34" charset="0"/>
+                <a:cs typeface="Courier New" pitchFamily="49" charset="0"/>
+              </a:rPr>
+              <a:t>I</a:t>
+            </a:r>
+            <a:r>
+              <a:rPr lang="en-US" sz="1000" dirty="0" smtClean="0">
+                <a:solidFill>
+                  <a:schemeClr val="bg1"/>
+                </a:solidFill>
+                <a:latin typeface="Courier New" pitchFamily="49" charset="0"/>
+                <a:ea typeface="Calibri" pitchFamily="34" charset="0"/>
+                <a:cs typeface="Courier New" pitchFamily="49" charset="0"/>
+              </a:rPr>
+              <a:t>C</a:t>
+            </a:r>
+            <a:r>
+              <a:rPr lang="be-BY" sz="1000" dirty="0" smtClean="0">
+                <a:solidFill>
+                  <a:schemeClr val="bg1"/>
+                </a:solidFill>
+                <a:latin typeface="Courier New" pitchFamily="49" charset="0"/>
+                <a:ea typeface="Calibri" pitchFamily="34" charset="0"/>
+                <a:cs typeface="Courier New" pitchFamily="49" charset="0"/>
+              </a:rPr>
+              <a:t>omparable</a:t>
+            </a:r>
+            <a:r>
+              <a:rPr lang="en-US" sz="1000" dirty="0" smtClean="0">
+                <a:solidFill>
+                  <a:schemeClr val="bg1"/>
+                </a:solidFill>
+                <a:latin typeface="Courier New" pitchFamily="49" charset="0"/>
+                <a:ea typeface="Calibri" pitchFamily="34" charset="0"/>
+                <a:cs typeface="Courier New" pitchFamily="49" charset="0"/>
+              </a:rPr>
+              <a:t>&lt;Point&gt;</a:t>
             </a:r>
             <a:endParaRPr lang="be-BY" sz="900" dirty="0">
               <a:solidFill>
@@ -13622,7 +14009,51 @@
                 <a:ea typeface="Calibri" pitchFamily="34" charset="0"/>
                 <a:cs typeface="Courier New" pitchFamily="49" charset="0"/>
               </a:rPr>
-              <a:t>    class SortPointsByY : IComparer</a:t>
+              <a:t>    class SortPointsByY : </a:t>
+            </a:r>
+            <a:r>
+              <a:rPr lang="be-BY" sz="1000" dirty="0" smtClean="0">
+                <a:solidFill>
+                  <a:schemeClr val="bg1"/>
+                </a:solidFill>
+                <a:latin typeface="Courier New" pitchFamily="49" charset="0"/>
+                <a:ea typeface="Calibri" pitchFamily="34" charset="0"/>
+                <a:cs typeface="Courier New" pitchFamily="49" charset="0"/>
+              </a:rPr>
+              <a:t>I</a:t>
+            </a:r>
+            <a:r>
+              <a:rPr lang="en-US" sz="1000" dirty="0" smtClean="0">
+                <a:solidFill>
+                  <a:schemeClr val="bg1"/>
+                </a:solidFill>
+                <a:latin typeface="Courier New" pitchFamily="49" charset="0"/>
+                <a:ea typeface="Calibri" pitchFamily="34" charset="0"/>
+                <a:cs typeface="Courier New" pitchFamily="49" charset="0"/>
+              </a:rPr>
+              <a:t>C</a:t>
+            </a:r>
+            <a:r>
+              <a:rPr lang="be-BY" sz="1000" dirty="0" smtClean="0">
+                <a:solidFill>
+                  <a:schemeClr val="bg1"/>
+                </a:solidFill>
+                <a:latin typeface="Courier New" pitchFamily="49" charset="0"/>
+                <a:ea typeface="Calibri" pitchFamily="34" charset="0"/>
+                <a:cs typeface="Courier New" pitchFamily="49" charset="0"/>
+              </a:rPr>
+              <a:t>omparer</a:t>
+            </a:r>
+            <a:r>
+              <a:rPr lang="en-US" sz="1000" dirty="0" smtClean="0">
+                <a:solidFill>
+                  <a:schemeClr val="bg1"/>
+                </a:solidFill>
+                <a:latin typeface="Courier New" pitchFamily="49" charset="0"/>
+                <a:ea typeface="Calibri" pitchFamily="34" charset="0"/>
+                <a:cs typeface="Courier New" pitchFamily="49" charset="0"/>
+              </a:rPr>
+              <a:t>&lt;Point&gt;</a:t>
             </a:r>
             <a:endParaRPr lang="be-BY" sz="900" dirty="0">
               <a:solidFill>
@@ -13666,7 +14097,62 @@
                 <a:ea typeface="Calibri" pitchFamily="34" charset="0"/>
                 <a:cs typeface="Courier New" pitchFamily="49" charset="0"/>
               </a:rPr>
-              <a:t>        int IComparer.Compare(object o1, object o2)</a:t>
+              <a:t>        int </a:t>
+            </a:r>
+            <a:r>
+              <a:rPr lang="be-BY" sz="1000" dirty="0" smtClean="0">
+                <a:solidFill>
+                  <a:schemeClr val="bg1"/>
+                </a:solidFill>
+                <a:latin typeface="Courier New" pitchFamily="49" charset="0"/>
+                <a:ea typeface="Calibri" pitchFamily="34" charset="0"/>
+                <a:cs typeface="Courier New" pitchFamily="49" charset="0"/>
+              </a:rPr>
+              <a:t>IComparer.Compare(</a:t>
+            </a:r>
+            <a:r>
+              <a:rPr lang="en-US" sz="1000" dirty="0" smtClean="0">
+                <a:solidFill>
+                  <a:schemeClr val="bg1"/>
+                </a:solidFill>
+                <a:latin typeface="Courier New" pitchFamily="49" charset="0"/>
+                <a:ea typeface="Calibri" pitchFamily="34" charset="0"/>
+                <a:cs typeface="Courier New" pitchFamily="49" charset="0"/>
+              </a:rPr>
+              <a:t>Point first</a:t>
+            </a:r>
+            <a:r>
+              <a:rPr lang="be-BY" sz="1000" dirty="0" smtClean="0">
+                <a:solidFill>
+                  <a:schemeClr val="bg1"/>
+                </a:solidFill>
+                <a:latin typeface="Courier New" pitchFamily="49" charset="0"/>
+                <a:ea typeface="Calibri" pitchFamily="34" charset="0"/>
+                <a:cs typeface="Courier New" pitchFamily="49" charset="0"/>
+              </a:rPr>
+              <a:t>,</a:t>
+            </a:r>
+            <a:r>
+              <a:rPr lang="en-US" sz="1000" dirty="0" smtClean="0">
+                <a:solidFill>
+                  <a:schemeClr val="bg1"/>
+                </a:solidFill>
+                <a:latin typeface="Courier New" pitchFamily="49" charset="0"/>
+                <a:ea typeface="Calibri" pitchFamily="34" charset="0"/>
+                <a:cs typeface="Courier New" pitchFamily="49" charset="0"/>
+              </a:rPr>
+              <a:t> Point second</a:t>
+            </a:r>
+            <a:r>
+              <a:rPr lang="be-BY" sz="1000" dirty="0" smtClean="0">
+                <a:solidFill>
+                  <a:schemeClr val="bg1"/>
+                </a:solidFill>
+                <a:latin typeface="Courier New" pitchFamily="49" charset="0"/>
+                <a:ea typeface="Calibri" pitchFamily="34" charset="0"/>
+                <a:cs typeface="Courier New" pitchFamily="49" charset="0"/>
+              </a:rPr>
+              <a:t>)</a:t>
             </a:r>
             <a:endParaRPr lang="be-BY" sz="900" dirty="0">
               <a:solidFill>
@@ -13702,103 +14188,37 @@
               <a:defRPr/>
             </a:pPr>
             <a:r>
-              <a:rPr lang="be-BY" sz="1000" dirty="0">
-                <a:solidFill>
-                  <a:schemeClr val="bg1"/>
-                </a:solidFill>
-                <a:latin typeface="Courier New" pitchFamily="49" charset="0"/>
-                <a:ea typeface="Calibri" pitchFamily="34" charset="0"/>
-                <a:cs typeface="Courier New" pitchFamily="49" charset="0"/>
-              </a:rPr>
-              <a:t>            Point p1 = o1 as Point;</a:t>
-            </a:r>
-            <a:endParaRPr lang="be-BY" sz="900" dirty="0">
-              <a:solidFill>
-                <a:schemeClr val="bg1"/>
-              </a:solidFill>
-              <a:latin typeface="Arial" pitchFamily="34" charset="0"/>
-            </a:endParaRPr>
-          </a:p>
-          <a:p>
-            <a:pPr eaLnBrk="0" hangingPunct="0">
-              <a:defRPr/>
-            </a:pPr>
-            <a:r>
-              <a:rPr lang="be-BY" sz="1000" dirty="0">
-                <a:solidFill>
-                  <a:schemeClr val="bg1"/>
-                </a:solidFill>
-                <a:latin typeface="Courier New" pitchFamily="49" charset="0"/>
-                <a:ea typeface="Calibri" pitchFamily="34" charset="0"/>
-                <a:cs typeface="Courier New" pitchFamily="49" charset="0"/>
-              </a:rPr>
-              <a:t>            Point p2 = o2 as Point;</a:t>
-            </a:r>
-            <a:endParaRPr lang="be-BY" sz="900" dirty="0">
-              <a:solidFill>
-                <a:schemeClr val="bg1"/>
-              </a:solidFill>
-              <a:latin typeface="Arial" pitchFamily="34" charset="0"/>
-            </a:endParaRPr>
-          </a:p>
-          <a:p>
-            <a:pPr eaLnBrk="0" hangingPunct="0">
-              <a:defRPr/>
-            </a:pPr>
-            <a:r>
-              <a:rPr lang="be-BY" sz="1000" dirty="0">
-                <a:solidFill>
-                  <a:schemeClr val="bg1"/>
-                </a:solidFill>
-                <a:latin typeface="Courier New" pitchFamily="49" charset="0"/>
-                <a:ea typeface="Calibri" pitchFamily="34" charset="0"/>
-                <a:cs typeface="Courier New" pitchFamily="49" charset="0"/>
-              </a:rPr>
-              <a:t>            if (p1 == null || p2 == null)</a:t>
-            </a:r>
-            <a:endParaRPr lang="be-BY" sz="900" dirty="0">
-              <a:solidFill>
-                <a:schemeClr val="bg1"/>
-              </a:solidFill>
-              <a:latin typeface="Arial" pitchFamily="34" charset="0"/>
-            </a:endParaRPr>
-          </a:p>
-          <a:p>
-            <a:pPr eaLnBrk="0" hangingPunct="0">
-              <a:defRPr/>
-            </a:pPr>
-            <a:r>
-              <a:rPr lang="be-BY" sz="1000" dirty="0">
-                <a:solidFill>
-                  <a:schemeClr val="bg1"/>
-                </a:solidFill>
-                <a:latin typeface="Courier New" pitchFamily="49" charset="0"/>
-                <a:ea typeface="Calibri" pitchFamily="34" charset="0"/>
-                <a:cs typeface="Courier New" pitchFamily="49" charset="0"/>
-              </a:rPr>
-              <a:t>                return 0;</a:t>
-            </a:r>
-            <a:endParaRPr lang="be-BY" sz="900" dirty="0">
-              <a:solidFill>
-                <a:schemeClr val="bg1"/>
-              </a:solidFill>
-              <a:latin typeface="Arial" pitchFamily="34" charset="0"/>
-            </a:endParaRPr>
-          </a:p>
-          <a:p>
-            <a:pPr eaLnBrk="0" hangingPunct="0">
-              <a:defRPr/>
-            </a:pPr>
-            <a:r>
-              <a:rPr lang="be-BY" sz="1000" dirty="0">
-                <a:solidFill>
-                  <a:schemeClr val="bg1"/>
-                </a:solidFill>
-                <a:latin typeface="Courier New" pitchFamily="49" charset="0"/>
-                <a:ea typeface="Calibri" pitchFamily="34" charset="0"/>
-                <a:cs typeface="Courier New" pitchFamily="49" charset="0"/>
-              </a:rPr>
-              <a:t>            return p1.Y - p2.Y;</a:t>
+              <a:rPr lang="en-US" sz="1000" dirty="0" smtClean="0">
+                <a:solidFill>
+                  <a:schemeClr val="bg1"/>
+                </a:solidFill>
+                <a:latin typeface="Courier New" pitchFamily="49" charset="0"/>
+                <a:ea typeface="Calibri" pitchFamily="34" charset="0"/>
+                <a:cs typeface="Courier New" pitchFamily="49" charset="0"/>
+              </a:rPr>
+              <a:t>            </a:t>
+            </a:r>
+            <a:r>
+              <a:rPr lang="be-BY" sz="1000" dirty="0" smtClean="0">
+                <a:solidFill>
+                  <a:schemeClr val="bg1"/>
+                </a:solidFill>
+                <a:latin typeface="Courier New" pitchFamily="49" charset="0"/>
+                <a:ea typeface="Calibri" pitchFamily="34" charset="0"/>
+                <a:cs typeface="Courier New" pitchFamily="49" charset="0"/>
+              </a:rPr>
+              <a:t>return </a:t>
+            </a:r>
+            <a:r>
+              <a:rPr lang="be-BY" sz="1000" dirty="0">
+                <a:solidFill>
+                  <a:schemeClr val="bg1"/>
+                </a:solidFill>
+                <a:latin typeface="Courier New" pitchFamily="49" charset="0"/>
+                <a:ea typeface="Calibri" pitchFamily="34" charset="0"/>
+                <a:cs typeface="Courier New" pitchFamily="49" charset="0"/>
+              </a:rPr>
+              <a:t>p1.Y - p2.Y;</a:t>
             </a:r>
             <a:endParaRPr lang="be-BY" sz="900" dirty="0">
               <a:solidFill>
@@ -18891,16 +19311,7 @@
                 </a:solidFill>
                 <a:cs typeface="Times New Roman" pitchFamily="18" charset="0"/>
               </a:rPr>
-              <a:t>Если вам не хватает стандартных коллекций, то можно использовать </a:t>
-            </a:r>
-            <a:r>
-              <a:rPr lang="ru-RU" dirty="0" smtClean="0">
-                <a:solidFill>
-                  <a:schemeClr val="bg1"/>
-                </a:solidFill>
-                <a:cs typeface="Times New Roman" pitchFamily="18" charset="0"/>
-              </a:rPr>
-              <a:t>библиотеку </a:t>
+              <a:t>Если вам не хватает стандартных коллекций, то можно использовать библиотеку </a:t>
             </a:r>
             <a:r>
               <a:rPr lang="en-US" dirty="0">

</xml_diff>

<commit_message>
Updated example for equal comparsion
</commit_message>
<xml_diff>
--- a/Presentation/lesson-02-oop.pptx
+++ b/Presentation/lesson-02-oop.pptx
@@ -317,7 +317,7 @@
             <a:fld id="{8E6E6A2A-E9D3-4A0D-B04A-ABDD367A1E08}" type="datetimeFigureOut">
               <a:rPr lang="ru-RU" smtClean="0"/>
               <a:pPr/>
-              <a:t>04.10.2013</a:t>
+              <a:t>07.10.2013</a:t>
             </a:fld>
             <a:endParaRPr lang="ru-RU"/>
           </a:p>
@@ -489,7 +489,7 @@
             <a:fld id="{8E6E6A2A-E9D3-4A0D-B04A-ABDD367A1E08}" type="datetimeFigureOut">
               <a:rPr lang="ru-RU" smtClean="0"/>
               <a:pPr/>
-              <a:t>04.10.2013</a:t>
+              <a:t>07.10.2013</a:t>
             </a:fld>
             <a:endParaRPr lang="ru-RU"/>
           </a:p>
@@ -671,7 +671,7 @@
             <a:fld id="{8E6E6A2A-E9D3-4A0D-B04A-ABDD367A1E08}" type="datetimeFigureOut">
               <a:rPr lang="ru-RU" smtClean="0"/>
               <a:pPr/>
-              <a:t>04.10.2013</a:t>
+              <a:t>07.10.2013</a:t>
             </a:fld>
             <a:endParaRPr lang="ru-RU"/>
           </a:p>
@@ -843,7 +843,7 @@
             <a:fld id="{8E6E6A2A-E9D3-4A0D-B04A-ABDD367A1E08}" type="datetimeFigureOut">
               <a:rPr lang="ru-RU" smtClean="0"/>
               <a:pPr/>
-              <a:t>04.10.2013</a:t>
+              <a:t>07.10.2013</a:t>
             </a:fld>
             <a:endParaRPr lang="ru-RU"/>
           </a:p>
@@ -1091,7 +1091,7 @@
             <a:fld id="{8E6E6A2A-E9D3-4A0D-B04A-ABDD367A1E08}" type="datetimeFigureOut">
               <a:rPr lang="ru-RU" smtClean="0"/>
               <a:pPr/>
-              <a:t>04.10.2013</a:t>
+              <a:t>07.10.2013</a:t>
             </a:fld>
             <a:endParaRPr lang="ru-RU"/>
           </a:p>
@@ -1381,7 +1381,7 @@
             <a:fld id="{8E6E6A2A-E9D3-4A0D-B04A-ABDD367A1E08}" type="datetimeFigureOut">
               <a:rPr lang="ru-RU" smtClean="0"/>
               <a:pPr/>
-              <a:t>04.10.2013</a:t>
+              <a:t>07.10.2013</a:t>
             </a:fld>
             <a:endParaRPr lang="ru-RU"/>
           </a:p>
@@ -1805,7 +1805,7 @@
             <a:fld id="{8E6E6A2A-E9D3-4A0D-B04A-ABDD367A1E08}" type="datetimeFigureOut">
               <a:rPr lang="ru-RU" smtClean="0"/>
               <a:pPr/>
-              <a:t>04.10.2013</a:t>
+              <a:t>07.10.2013</a:t>
             </a:fld>
             <a:endParaRPr lang="ru-RU"/>
           </a:p>
@@ -1925,7 +1925,7 @@
             <a:fld id="{8E6E6A2A-E9D3-4A0D-B04A-ABDD367A1E08}" type="datetimeFigureOut">
               <a:rPr lang="ru-RU" smtClean="0"/>
               <a:pPr/>
-              <a:t>04.10.2013</a:t>
+              <a:t>07.10.2013</a:t>
             </a:fld>
             <a:endParaRPr lang="ru-RU"/>
           </a:p>
@@ -2022,7 +2022,7 @@
             <a:fld id="{8E6E6A2A-E9D3-4A0D-B04A-ABDD367A1E08}" type="datetimeFigureOut">
               <a:rPr lang="ru-RU" smtClean="0"/>
               <a:pPr/>
-              <a:t>04.10.2013</a:t>
+              <a:t>07.10.2013</a:t>
             </a:fld>
             <a:endParaRPr lang="ru-RU"/>
           </a:p>
@@ -2301,7 +2301,7 @@
             <a:fld id="{8E6E6A2A-E9D3-4A0D-B04A-ABDD367A1E08}" type="datetimeFigureOut">
               <a:rPr lang="ru-RU" smtClean="0"/>
               <a:pPr/>
-              <a:t>04.10.2013</a:t>
+              <a:t>07.10.2013</a:t>
             </a:fld>
             <a:endParaRPr lang="ru-RU"/>
           </a:p>
@@ -2556,7 +2556,7 @@
             <a:fld id="{8E6E6A2A-E9D3-4A0D-B04A-ABDD367A1E08}" type="datetimeFigureOut">
               <a:rPr lang="ru-RU" smtClean="0"/>
               <a:pPr/>
-              <a:t>04.10.2013</a:t>
+              <a:t>07.10.2013</a:t>
             </a:fld>
             <a:endParaRPr lang="ru-RU"/>
           </a:p>
@@ -2771,7 +2771,7 @@
             <a:fld id="{8E6E6A2A-E9D3-4A0D-B04A-ABDD367A1E08}" type="datetimeFigureOut">
               <a:rPr lang="ru-RU" smtClean="0"/>
               <a:pPr/>
-              <a:t>04.10.2013</a:t>
+              <a:t>07.10.2013</a:t>
             </a:fld>
             <a:endParaRPr lang="ru-RU"/>
           </a:p>
@@ -16271,13 +16271,15 @@
         </p:nvSpPr>
         <p:spPr bwMode="auto">
           <a:xfrm>
-            <a:off x="228600" y="533400"/>
-            <a:ext cx="8686800" cy="6248400"/>
+            <a:off x="228600" y="564446"/>
+            <a:ext cx="8686800" cy="6186309"/>
           </a:xfrm>
           <a:prstGeom prst="rect">
             <a:avLst/>
           </a:prstGeom>
-          <a:noFill/>
+          <a:solidFill>
+            <a:schemeClr val="bg1"/>
+          </a:solidFill>
           <a:ln w="9525">
             <a:solidFill>
               <a:schemeClr val="bg1">
@@ -16296,877 +16298,2065 @@
           </a:bodyPr>
           <a:lstStyle/>
           <a:p>
-            <a:pPr eaLnBrk="0" hangingPunct="0">
-              <a:defRPr/>
-            </a:pPr>
-            <a:r>
-              <a:rPr lang="be-BY" sz="1000" dirty="0">
-                <a:solidFill>
-                  <a:schemeClr val="bg1"/>
-                </a:solidFill>
-                <a:latin typeface="Courier New" pitchFamily="49" charset="0"/>
-                <a:ea typeface="Calibri" pitchFamily="34" charset="0"/>
-                <a:cs typeface="Courier New" pitchFamily="49" charset="0"/>
-              </a:rPr>
-              <a:t>using System.Collections;</a:t>
-            </a:r>
-            <a:endParaRPr lang="be-BY" sz="900" dirty="0">
-              <a:solidFill>
-                <a:schemeClr val="bg1"/>
-              </a:solidFill>
-              <a:latin typeface="Arial" pitchFamily="34" charset="0"/>
-            </a:endParaRPr>
-          </a:p>
-          <a:p>
-            <a:pPr eaLnBrk="0" hangingPunct="0">
-              <a:defRPr/>
-            </a:pPr>
-            <a:r>
-              <a:rPr lang="be-BY" sz="1000" dirty="0">
-                <a:solidFill>
-                  <a:schemeClr val="bg1"/>
-                </a:solidFill>
-                <a:latin typeface="Courier New" pitchFamily="49" charset="0"/>
-                <a:ea typeface="Calibri" pitchFamily="34" charset="0"/>
-                <a:cs typeface="Courier New" pitchFamily="49" charset="0"/>
-              </a:rPr>
-              <a:t>    class Point : IComparable</a:t>
-            </a:r>
-            <a:endParaRPr lang="be-BY" sz="900" dirty="0">
-              <a:solidFill>
-                <a:schemeClr val="bg1"/>
-              </a:solidFill>
-              <a:latin typeface="Arial" pitchFamily="34" charset="0"/>
-            </a:endParaRPr>
-          </a:p>
-          <a:p>
-            <a:pPr eaLnBrk="0" hangingPunct="0">
-              <a:defRPr/>
-            </a:pPr>
-            <a:r>
-              <a:rPr lang="be-BY" sz="1000" dirty="0">
-                <a:solidFill>
-                  <a:schemeClr val="bg1"/>
-                </a:solidFill>
-                <a:latin typeface="Courier New" pitchFamily="49" charset="0"/>
-                <a:ea typeface="Calibri" pitchFamily="34" charset="0"/>
-                <a:cs typeface="Courier New" pitchFamily="49" charset="0"/>
+            <a:r>
+              <a:rPr lang="en-US" sz="900" dirty="0">
+                <a:solidFill>
+                  <a:srgbClr val="0000FF"/>
+                </a:solidFill>
+                <a:latin typeface="Consolas"/>
+              </a:rPr>
+              <a:t>class</a:t>
+            </a:r>
+            <a:r>
+              <a:rPr lang="en-US" sz="900" dirty="0">
+                <a:solidFill>
+                  <a:prstClr val="black"/>
+                </a:solidFill>
+                <a:latin typeface="Consolas"/>
+              </a:rPr>
+              <a:t> </a:t>
+            </a:r>
+            <a:r>
+              <a:rPr lang="en-US" sz="900" dirty="0">
+                <a:solidFill>
+                  <a:srgbClr val="2B91AF"/>
+                </a:solidFill>
+                <a:latin typeface="Consolas"/>
+              </a:rPr>
+              <a:t>Point</a:t>
+            </a:r>
+            <a:endParaRPr lang="en-US" sz="900" dirty="0">
+              <a:solidFill>
+                <a:prstClr val="black"/>
+              </a:solidFill>
+              <a:latin typeface="Consolas"/>
+            </a:endParaRPr>
+          </a:p>
+          <a:p>
+            <a:r>
+              <a:rPr lang="en-US" sz="900" dirty="0">
+                <a:solidFill>
+                  <a:prstClr val="black"/>
+                </a:solidFill>
+                <a:latin typeface="Consolas"/>
+              </a:rPr>
+              <a:t>{</a:t>
+            </a:r>
+          </a:p>
+          <a:p>
+            <a:r>
+              <a:rPr lang="en-US" sz="900" dirty="0" smtClean="0">
+                <a:solidFill>
+                  <a:srgbClr val="0000FF"/>
+                </a:solidFill>
+                <a:latin typeface="Consolas"/>
+              </a:rPr>
+              <a:t>    public</a:t>
+            </a:r>
+            <a:r>
+              <a:rPr lang="en-US" sz="900" dirty="0" smtClean="0">
+                <a:solidFill>
+                  <a:prstClr val="black"/>
+                </a:solidFill>
+                <a:latin typeface="Consolas"/>
+              </a:rPr>
+              <a:t> </a:t>
+            </a:r>
+            <a:r>
+              <a:rPr lang="en-US" sz="900" dirty="0">
+                <a:solidFill>
+                  <a:srgbClr val="0000FF"/>
+                </a:solidFill>
+                <a:latin typeface="Consolas"/>
+              </a:rPr>
+              <a:t>static</a:t>
+            </a:r>
+            <a:r>
+              <a:rPr lang="en-US" sz="900" dirty="0">
+                <a:solidFill>
+                  <a:prstClr val="black"/>
+                </a:solidFill>
+                <a:latin typeface="Consolas"/>
+              </a:rPr>
+              <a:t> </a:t>
+            </a:r>
+            <a:r>
+              <a:rPr lang="en-US" sz="900" dirty="0">
+                <a:solidFill>
+                  <a:srgbClr val="2B91AF"/>
+                </a:solidFill>
+                <a:latin typeface="Consolas"/>
+              </a:rPr>
+              <a:t>Point</a:t>
+            </a:r>
+            <a:r>
+              <a:rPr lang="en-US" sz="900" dirty="0">
+                <a:solidFill>
+                  <a:prstClr val="black"/>
+                </a:solidFill>
+                <a:latin typeface="Consolas"/>
+              </a:rPr>
+              <a:t> </a:t>
+            </a:r>
+            <a:r>
+              <a:rPr lang="en-US" sz="900" dirty="0">
+                <a:solidFill>
+                  <a:srgbClr val="0000FF"/>
+                </a:solidFill>
+                <a:latin typeface="Consolas"/>
+              </a:rPr>
+              <a:t>operator</a:t>
+            </a:r>
+            <a:r>
+              <a:rPr lang="en-US" sz="900" dirty="0">
+                <a:solidFill>
+                  <a:prstClr val="black"/>
+                </a:solidFill>
+                <a:latin typeface="Consolas"/>
+              </a:rPr>
+              <a:t> +(</a:t>
+            </a:r>
+            <a:r>
+              <a:rPr lang="en-US" sz="900" dirty="0">
+                <a:solidFill>
+                  <a:srgbClr val="2B91AF"/>
+                </a:solidFill>
+                <a:latin typeface="Consolas"/>
+              </a:rPr>
+              <a:t>Point</a:t>
+            </a:r>
+            <a:r>
+              <a:rPr lang="en-US" sz="900" dirty="0">
+                <a:solidFill>
+                  <a:prstClr val="black"/>
+                </a:solidFill>
+                <a:latin typeface="Consolas"/>
+              </a:rPr>
+              <a:t> point1, </a:t>
+            </a:r>
+            <a:r>
+              <a:rPr lang="en-US" sz="900" dirty="0">
+                <a:solidFill>
+                  <a:srgbClr val="2B91AF"/>
+                </a:solidFill>
+                <a:latin typeface="Consolas"/>
+              </a:rPr>
+              <a:t>Point</a:t>
+            </a:r>
+            <a:r>
+              <a:rPr lang="en-US" sz="900" dirty="0">
+                <a:solidFill>
+                  <a:prstClr val="black"/>
+                </a:solidFill>
+                <a:latin typeface="Consolas"/>
+              </a:rPr>
+              <a:t> point2)</a:t>
+            </a:r>
+          </a:p>
+          <a:p>
+            <a:r>
+              <a:rPr lang="en-US" sz="900" dirty="0">
+                <a:solidFill>
+                  <a:prstClr val="black"/>
+                </a:solidFill>
+                <a:latin typeface="Consolas"/>
               </a:rPr>
               <a:t>    {</a:t>
             </a:r>
-            <a:endParaRPr lang="be-BY" sz="900" dirty="0">
-              <a:solidFill>
-                <a:schemeClr val="bg1"/>
-              </a:solidFill>
-              <a:latin typeface="Arial" pitchFamily="34" charset="0"/>
-            </a:endParaRPr>
-          </a:p>
-          <a:p>
-            <a:pPr eaLnBrk="0" hangingPunct="0">
-              <a:defRPr/>
-            </a:pPr>
-            <a:r>
-              <a:rPr lang="be-BY" sz="1000" dirty="0">
-                <a:solidFill>
-                  <a:schemeClr val="bg1"/>
-                </a:solidFill>
-                <a:latin typeface="Courier New" pitchFamily="49" charset="0"/>
-                <a:ea typeface="Calibri" pitchFamily="34" charset="0"/>
-                <a:cs typeface="Courier New" pitchFamily="49" charset="0"/>
-              </a:rPr>
-              <a:t>        public static Point operator +(Point o1, Point o2)</a:t>
-            </a:r>
-            <a:endParaRPr lang="be-BY" sz="900" dirty="0">
-              <a:solidFill>
-                <a:schemeClr val="bg1"/>
-              </a:solidFill>
-              <a:latin typeface="Arial" pitchFamily="34" charset="0"/>
-            </a:endParaRPr>
-          </a:p>
-          <a:p>
-            <a:pPr eaLnBrk="0" hangingPunct="0">
-              <a:defRPr/>
-            </a:pPr>
-            <a:r>
-              <a:rPr lang="be-BY" sz="1000" dirty="0">
-                <a:solidFill>
-                  <a:schemeClr val="bg1"/>
-                </a:solidFill>
-                <a:latin typeface="Courier New" pitchFamily="49" charset="0"/>
-                <a:ea typeface="Calibri" pitchFamily="34" charset="0"/>
-                <a:cs typeface="Courier New" pitchFamily="49" charset="0"/>
-              </a:rPr>
-              <a:t>        {</a:t>
-            </a:r>
-            <a:endParaRPr lang="be-BY" sz="900" dirty="0">
-              <a:solidFill>
-                <a:schemeClr val="bg1"/>
-              </a:solidFill>
-              <a:latin typeface="Arial" pitchFamily="34" charset="0"/>
-            </a:endParaRPr>
-          </a:p>
-          <a:p>
-            <a:pPr eaLnBrk="0" hangingPunct="0">
-              <a:defRPr/>
-            </a:pPr>
-            <a:r>
-              <a:rPr lang="be-BY" sz="1000" dirty="0">
-                <a:solidFill>
-                  <a:schemeClr val="bg1"/>
-                </a:solidFill>
-                <a:latin typeface="Courier New" pitchFamily="49" charset="0"/>
-                <a:ea typeface="Calibri" pitchFamily="34" charset="0"/>
-                <a:cs typeface="Courier New" pitchFamily="49" charset="0"/>
-              </a:rPr>
-              <a:t>            return new Point(o1.x + o2.x, o1.y + o2.y);</a:t>
-            </a:r>
-            <a:endParaRPr lang="be-BY" sz="900" dirty="0">
-              <a:solidFill>
-                <a:schemeClr val="bg1"/>
-              </a:solidFill>
-              <a:latin typeface="Arial" pitchFamily="34" charset="0"/>
-            </a:endParaRPr>
-          </a:p>
-          <a:p>
-            <a:pPr eaLnBrk="0" hangingPunct="0">
-              <a:defRPr/>
-            </a:pPr>
-            <a:r>
-              <a:rPr lang="be-BY" sz="1000" dirty="0">
-                <a:solidFill>
-                  <a:schemeClr val="bg1"/>
-                </a:solidFill>
-                <a:latin typeface="Courier New" pitchFamily="49" charset="0"/>
-                <a:ea typeface="Calibri" pitchFamily="34" charset="0"/>
-                <a:cs typeface="Courier New" pitchFamily="49" charset="0"/>
-              </a:rPr>
-              <a:t>        }</a:t>
-            </a:r>
-            <a:endParaRPr lang="be-BY" sz="900" dirty="0">
-              <a:solidFill>
-                <a:schemeClr val="bg1"/>
-              </a:solidFill>
-              <a:latin typeface="Arial" pitchFamily="34" charset="0"/>
-            </a:endParaRPr>
-          </a:p>
-          <a:p>
-            <a:pPr eaLnBrk="0" hangingPunct="0">
-              <a:defRPr/>
-            </a:pPr>
-            <a:r>
-              <a:rPr lang="be-BY" sz="1000" dirty="0">
-                <a:solidFill>
-                  <a:schemeClr val="bg1"/>
-                </a:solidFill>
-                <a:latin typeface="Courier New" pitchFamily="49" charset="0"/>
-                <a:ea typeface="Calibri" pitchFamily="34" charset="0"/>
-                <a:cs typeface="Courier New" pitchFamily="49" charset="0"/>
-              </a:rPr>
-              <a:t>        public static Point operator +(Point obj, int a)</a:t>
-            </a:r>
-            <a:endParaRPr lang="be-BY" sz="900" dirty="0">
-              <a:solidFill>
-                <a:schemeClr val="bg1"/>
-              </a:solidFill>
-              <a:latin typeface="Arial" pitchFamily="34" charset="0"/>
-            </a:endParaRPr>
-          </a:p>
-          <a:p>
-            <a:pPr eaLnBrk="0" hangingPunct="0">
-              <a:defRPr/>
-            </a:pPr>
-            <a:r>
-              <a:rPr lang="be-BY" sz="1000" dirty="0">
-                <a:solidFill>
-                  <a:schemeClr val="bg1"/>
-                </a:solidFill>
-                <a:latin typeface="Courier New" pitchFamily="49" charset="0"/>
-                <a:ea typeface="Calibri" pitchFamily="34" charset="0"/>
-                <a:cs typeface="Courier New" pitchFamily="49" charset="0"/>
-              </a:rPr>
-              <a:t>        {</a:t>
-            </a:r>
-            <a:endParaRPr lang="be-BY" sz="900" dirty="0">
-              <a:solidFill>
-                <a:schemeClr val="bg1"/>
-              </a:solidFill>
-              <a:latin typeface="Arial" pitchFamily="34" charset="0"/>
-            </a:endParaRPr>
-          </a:p>
-          <a:p>
-            <a:pPr eaLnBrk="0" hangingPunct="0">
-              <a:defRPr/>
-            </a:pPr>
-            <a:r>
-              <a:rPr lang="be-BY" sz="1000" dirty="0">
-                <a:solidFill>
-                  <a:schemeClr val="bg1"/>
-                </a:solidFill>
-                <a:latin typeface="Courier New" pitchFamily="49" charset="0"/>
-                <a:ea typeface="Calibri" pitchFamily="34" charset="0"/>
-                <a:cs typeface="Courier New" pitchFamily="49" charset="0"/>
-              </a:rPr>
-              <a:t>            return new Point(obj.x + a, obj.y + a);</a:t>
-            </a:r>
-            <a:endParaRPr lang="be-BY" sz="900" dirty="0">
-              <a:solidFill>
-                <a:schemeClr val="bg1"/>
-              </a:solidFill>
-              <a:latin typeface="Arial" pitchFamily="34" charset="0"/>
-            </a:endParaRPr>
-          </a:p>
-          <a:p>
-            <a:pPr eaLnBrk="0" hangingPunct="0">
-              <a:defRPr/>
-            </a:pPr>
-            <a:r>
-              <a:rPr lang="be-BY" sz="1000" dirty="0">
-                <a:solidFill>
-                  <a:schemeClr val="bg1"/>
-                </a:solidFill>
-                <a:latin typeface="Courier New" pitchFamily="49" charset="0"/>
-                <a:ea typeface="Calibri" pitchFamily="34" charset="0"/>
-                <a:cs typeface="Courier New" pitchFamily="49" charset="0"/>
-              </a:rPr>
-              <a:t>        }</a:t>
-            </a:r>
-            <a:endParaRPr lang="be-BY" sz="900" dirty="0">
-              <a:solidFill>
-                <a:schemeClr val="bg1"/>
-              </a:solidFill>
-              <a:latin typeface="Arial" pitchFamily="34" charset="0"/>
-            </a:endParaRPr>
-          </a:p>
-          <a:p>
-            <a:pPr eaLnBrk="0" hangingPunct="0">
-              <a:defRPr/>
-            </a:pPr>
-            <a:r>
-              <a:rPr lang="be-BY" sz="1000" dirty="0">
-                <a:solidFill>
-                  <a:schemeClr val="bg1"/>
-                </a:solidFill>
-                <a:latin typeface="Courier New" pitchFamily="49" charset="0"/>
-                <a:ea typeface="Calibri" pitchFamily="34" charset="0"/>
-                <a:cs typeface="Courier New" pitchFamily="49" charset="0"/>
-              </a:rPr>
-              <a:t>        public static Point operator -(Point obj)</a:t>
-            </a:r>
-            <a:endParaRPr lang="be-BY" sz="900" dirty="0">
-              <a:solidFill>
-                <a:schemeClr val="bg1"/>
-              </a:solidFill>
-              <a:latin typeface="Arial" pitchFamily="34" charset="0"/>
-            </a:endParaRPr>
-          </a:p>
-          <a:p>
-            <a:pPr eaLnBrk="0" hangingPunct="0">
-              <a:defRPr/>
-            </a:pPr>
-            <a:r>
-              <a:rPr lang="be-BY" sz="1000" dirty="0">
-                <a:solidFill>
-                  <a:schemeClr val="bg1"/>
-                </a:solidFill>
-                <a:latin typeface="Courier New" pitchFamily="49" charset="0"/>
-                <a:ea typeface="Calibri" pitchFamily="34" charset="0"/>
-                <a:cs typeface="Courier New" pitchFamily="49" charset="0"/>
-              </a:rPr>
-              <a:t>        {</a:t>
-            </a:r>
-            <a:endParaRPr lang="be-BY" sz="900" dirty="0">
-              <a:solidFill>
-                <a:schemeClr val="bg1"/>
-              </a:solidFill>
-              <a:latin typeface="Arial" pitchFamily="34" charset="0"/>
-            </a:endParaRPr>
-          </a:p>
-          <a:p>
-            <a:pPr eaLnBrk="0" hangingPunct="0">
-              <a:defRPr/>
-            </a:pPr>
-            <a:r>
-              <a:rPr lang="be-BY" sz="1000" dirty="0">
-                <a:solidFill>
-                  <a:schemeClr val="bg1"/>
-                </a:solidFill>
-                <a:latin typeface="Courier New" pitchFamily="49" charset="0"/>
-                <a:ea typeface="Calibri" pitchFamily="34" charset="0"/>
-                <a:cs typeface="Courier New" pitchFamily="49" charset="0"/>
-              </a:rPr>
-              <a:t>            return new Point(-obj.x, -obj.y);</a:t>
-            </a:r>
-            <a:endParaRPr lang="be-BY" sz="900" dirty="0">
-              <a:solidFill>
-                <a:schemeClr val="bg1"/>
-              </a:solidFill>
-              <a:latin typeface="Arial" pitchFamily="34" charset="0"/>
-            </a:endParaRPr>
-          </a:p>
-          <a:p>
-            <a:pPr eaLnBrk="0" hangingPunct="0">
-              <a:defRPr/>
-            </a:pPr>
-            <a:r>
-              <a:rPr lang="be-BY" sz="1000" dirty="0">
-                <a:solidFill>
-                  <a:schemeClr val="bg1"/>
-                </a:solidFill>
-                <a:latin typeface="Courier New" pitchFamily="49" charset="0"/>
-                <a:ea typeface="Calibri" pitchFamily="34" charset="0"/>
-                <a:cs typeface="Courier New" pitchFamily="49" charset="0"/>
-              </a:rPr>
-              <a:t>        }</a:t>
-            </a:r>
-            <a:endParaRPr lang="be-BY" sz="900" dirty="0">
-              <a:solidFill>
-                <a:schemeClr val="bg1"/>
-              </a:solidFill>
-              <a:latin typeface="Arial" pitchFamily="34" charset="0"/>
-            </a:endParaRPr>
-          </a:p>
-          <a:p>
-            <a:pPr eaLnBrk="0" hangingPunct="0">
-              <a:defRPr/>
-            </a:pPr>
-            <a:r>
-              <a:rPr lang="be-BY" sz="1000" dirty="0">
-                <a:solidFill>
-                  <a:schemeClr val="bg1"/>
-                </a:solidFill>
-                <a:latin typeface="Courier New" pitchFamily="49" charset="0"/>
-                <a:ea typeface="Calibri" pitchFamily="34" charset="0"/>
-                <a:cs typeface="Courier New" pitchFamily="49" charset="0"/>
-              </a:rPr>
-              <a:t>        public static bool operator ==(Point o1, Point o2)</a:t>
-            </a:r>
-            <a:endParaRPr lang="be-BY" sz="900" dirty="0">
-              <a:solidFill>
-                <a:schemeClr val="bg1"/>
-              </a:solidFill>
-              <a:latin typeface="Arial" pitchFamily="34" charset="0"/>
-            </a:endParaRPr>
-          </a:p>
-          <a:p>
-            <a:pPr eaLnBrk="0" hangingPunct="0">
-              <a:defRPr/>
-            </a:pPr>
-            <a:r>
-              <a:rPr lang="be-BY" sz="1000" dirty="0">
-                <a:solidFill>
-                  <a:schemeClr val="bg1"/>
-                </a:solidFill>
-                <a:latin typeface="Courier New" pitchFamily="49" charset="0"/>
-                <a:ea typeface="Calibri" pitchFamily="34" charset="0"/>
-                <a:cs typeface="Courier New" pitchFamily="49" charset="0"/>
-              </a:rPr>
-              <a:t>        {</a:t>
-            </a:r>
-            <a:endParaRPr lang="be-BY" sz="900" dirty="0">
-              <a:solidFill>
-                <a:schemeClr val="bg1"/>
-              </a:solidFill>
-              <a:latin typeface="Arial" pitchFamily="34" charset="0"/>
-            </a:endParaRPr>
-          </a:p>
-          <a:p>
-            <a:pPr eaLnBrk="0" hangingPunct="0">
-              <a:defRPr/>
-            </a:pPr>
-            <a:r>
-              <a:rPr lang="be-BY" sz="1000" dirty="0">
-                <a:solidFill>
-                  <a:schemeClr val="bg1"/>
-                </a:solidFill>
-                <a:latin typeface="Courier New" pitchFamily="49" charset="0"/>
-                <a:ea typeface="Calibri" pitchFamily="34" charset="0"/>
-                <a:cs typeface="Courier New" pitchFamily="49" charset="0"/>
-              </a:rPr>
-              <a:t>            return o1.x == o2.x &amp;&amp; o1.y == o2.y;</a:t>
-            </a:r>
-            <a:endParaRPr lang="be-BY" sz="900" dirty="0">
-              <a:solidFill>
-                <a:schemeClr val="bg1"/>
-              </a:solidFill>
-              <a:latin typeface="Arial" pitchFamily="34" charset="0"/>
-            </a:endParaRPr>
-          </a:p>
-          <a:p>
-            <a:pPr eaLnBrk="0" hangingPunct="0">
-              <a:defRPr/>
-            </a:pPr>
-            <a:r>
-              <a:rPr lang="be-BY" sz="1000" dirty="0">
-                <a:solidFill>
-                  <a:schemeClr val="bg1"/>
-                </a:solidFill>
-                <a:latin typeface="Courier New" pitchFamily="49" charset="0"/>
-                <a:ea typeface="Calibri" pitchFamily="34" charset="0"/>
-                <a:cs typeface="Courier New" pitchFamily="49" charset="0"/>
-              </a:rPr>
-              <a:t>        }</a:t>
-            </a:r>
-            <a:endParaRPr lang="be-BY" sz="900" dirty="0">
-              <a:solidFill>
-                <a:schemeClr val="bg1"/>
-              </a:solidFill>
-              <a:latin typeface="Arial" pitchFamily="34" charset="0"/>
-            </a:endParaRPr>
-          </a:p>
-          <a:p>
-            <a:pPr eaLnBrk="0" hangingPunct="0">
-              <a:defRPr/>
-            </a:pPr>
-            <a:r>
-              <a:rPr lang="be-BY" sz="1000" dirty="0">
-                <a:solidFill>
-                  <a:schemeClr val="bg1"/>
-                </a:solidFill>
-                <a:latin typeface="Courier New" pitchFamily="49" charset="0"/>
-                <a:ea typeface="Calibri" pitchFamily="34" charset="0"/>
-                <a:cs typeface="Courier New" pitchFamily="49" charset="0"/>
-              </a:rPr>
-              <a:t>        public static bool operator !=(Point o1, Point o2)</a:t>
-            </a:r>
-            <a:endParaRPr lang="be-BY" sz="900" dirty="0">
-              <a:solidFill>
-                <a:schemeClr val="bg1"/>
-              </a:solidFill>
-              <a:latin typeface="Arial" pitchFamily="34" charset="0"/>
-            </a:endParaRPr>
-          </a:p>
-          <a:p>
-            <a:pPr eaLnBrk="0" hangingPunct="0">
-              <a:defRPr/>
-            </a:pPr>
-            <a:r>
-              <a:rPr lang="be-BY" sz="1000" dirty="0">
-                <a:solidFill>
-                  <a:schemeClr val="bg1"/>
-                </a:solidFill>
-                <a:latin typeface="Courier New" pitchFamily="49" charset="0"/>
-                <a:ea typeface="Calibri" pitchFamily="34" charset="0"/>
-                <a:cs typeface="Courier New" pitchFamily="49" charset="0"/>
-              </a:rPr>
-              <a:t>        {</a:t>
-            </a:r>
-            <a:endParaRPr lang="be-BY" sz="900" dirty="0">
-              <a:solidFill>
-                <a:schemeClr val="bg1"/>
-              </a:solidFill>
-              <a:latin typeface="Arial" pitchFamily="34" charset="0"/>
-            </a:endParaRPr>
-          </a:p>
-          <a:p>
-            <a:pPr eaLnBrk="0" hangingPunct="0">
-              <a:defRPr/>
-            </a:pPr>
-            <a:r>
-              <a:rPr lang="be-BY" sz="1000" dirty="0">
-                <a:solidFill>
-                  <a:schemeClr val="bg1"/>
-                </a:solidFill>
-                <a:latin typeface="Courier New" pitchFamily="49" charset="0"/>
-                <a:ea typeface="Calibri" pitchFamily="34" charset="0"/>
-                <a:cs typeface="Courier New" pitchFamily="49" charset="0"/>
-              </a:rPr>
-              <a:t>            return !(o1 == o2);</a:t>
-            </a:r>
-            <a:endParaRPr lang="be-BY" sz="900" dirty="0">
-              <a:solidFill>
-                <a:schemeClr val="bg1"/>
-              </a:solidFill>
-              <a:latin typeface="Arial" pitchFamily="34" charset="0"/>
-            </a:endParaRPr>
-          </a:p>
-          <a:p>
-            <a:pPr eaLnBrk="0" hangingPunct="0">
-              <a:defRPr/>
-            </a:pPr>
-            <a:r>
-              <a:rPr lang="be-BY" sz="1000" dirty="0">
-                <a:solidFill>
-                  <a:schemeClr val="bg1"/>
-                </a:solidFill>
-                <a:latin typeface="Courier New" pitchFamily="49" charset="0"/>
-                <a:ea typeface="Calibri" pitchFamily="34" charset="0"/>
-                <a:cs typeface="Courier New" pitchFamily="49" charset="0"/>
-              </a:rPr>
-              <a:t>        }</a:t>
-            </a:r>
-            <a:endParaRPr lang="be-BY" sz="900" dirty="0">
-              <a:solidFill>
-                <a:schemeClr val="bg1"/>
-              </a:solidFill>
-              <a:latin typeface="Arial" pitchFamily="34" charset="0"/>
-            </a:endParaRPr>
-          </a:p>
-          <a:p>
-            <a:pPr eaLnBrk="0" hangingPunct="0">
-              <a:defRPr/>
-            </a:pPr>
-            <a:r>
-              <a:rPr lang="be-BY" sz="1000" dirty="0">
-                <a:solidFill>
-                  <a:schemeClr val="bg1"/>
-                </a:solidFill>
-                <a:latin typeface="Courier New" pitchFamily="49" charset="0"/>
-                <a:ea typeface="Calibri" pitchFamily="34" charset="0"/>
-                <a:cs typeface="Courier New" pitchFamily="49" charset="0"/>
+          </a:p>
+          <a:p>
+            <a:r>
+              <a:rPr lang="en-US" sz="900" dirty="0">
+                <a:solidFill>
+                  <a:prstClr val="black"/>
+                </a:solidFill>
+                <a:latin typeface="Consolas"/>
+              </a:rPr>
+              <a:t>        </a:t>
+            </a:r>
+            <a:r>
+              <a:rPr lang="en-US" sz="900" dirty="0">
+                <a:solidFill>
+                  <a:srgbClr val="0000FF"/>
+                </a:solidFill>
+                <a:latin typeface="Consolas"/>
+              </a:rPr>
+              <a:t>return</a:t>
+            </a:r>
+            <a:r>
+              <a:rPr lang="en-US" sz="900" dirty="0">
+                <a:solidFill>
+                  <a:prstClr val="black"/>
+                </a:solidFill>
+                <a:latin typeface="Consolas"/>
+              </a:rPr>
+              <a:t> </a:t>
+            </a:r>
+            <a:r>
+              <a:rPr lang="en-US" sz="900" dirty="0">
+                <a:solidFill>
+                  <a:srgbClr val="0000FF"/>
+                </a:solidFill>
+                <a:latin typeface="Consolas"/>
+              </a:rPr>
+              <a:t>new</a:t>
+            </a:r>
+            <a:r>
+              <a:rPr lang="en-US" sz="900" dirty="0">
+                <a:solidFill>
+                  <a:prstClr val="black"/>
+                </a:solidFill>
+                <a:latin typeface="Consolas"/>
+              </a:rPr>
+              <a:t> </a:t>
+            </a:r>
+            <a:r>
+              <a:rPr lang="en-US" sz="900" dirty="0">
+                <a:solidFill>
+                  <a:srgbClr val="2B91AF"/>
+                </a:solidFill>
+                <a:latin typeface="Consolas"/>
+              </a:rPr>
+              <a:t>Point</a:t>
+            </a:r>
+            <a:r>
+              <a:rPr lang="en-US" sz="900" dirty="0">
+                <a:solidFill>
+                  <a:prstClr val="black"/>
+                </a:solidFill>
+                <a:latin typeface="Consolas"/>
+              </a:rPr>
+              <a:t>(point1.x + point2.x, point1.y + point2.y);</a:t>
+            </a:r>
+          </a:p>
+          <a:p>
+            <a:r>
+              <a:rPr lang="en-US" sz="900" dirty="0">
+                <a:solidFill>
+                  <a:prstClr val="black"/>
+                </a:solidFill>
+                <a:latin typeface="Consolas"/>
               </a:rPr>
               <a:t>    }</a:t>
             </a:r>
-            <a:endParaRPr lang="be-BY" sz="900" dirty="0">
-              <a:solidFill>
-                <a:schemeClr val="bg1"/>
-              </a:solidFill>
-              <a:latin typeface="Arial" pitchFamily="34" charset="0"/>
-            </a:endParaRPr>
-          </a:p>
-          <a:p>
-            <a:pPr eaLnBrk="0" hangingPunct="0">
-              <a:defRPr/>
-            </a:pPr>
-            <a:r>
-              <a:rPr lang="be-BY" sz="1000" dirty="0">
-                <a:solidFill>
-                  <a:schemeClr val="bg1"/>
-                </a:solidFill>
-                <a:latin typeface="Courier New" pitchFamily="49" charset="0"/>
-                <a:ea typeface="Calibri" pitchFamily="34" charset="0"/>
-                <a:cs typeface="Courier New" pitchFamily="49" charset="0"/>
-              </a:rPr>
-              <a:t>    class Program</a:t>
-            </a:r>
-            <a:endParaRPr lang="be-BY" sz="900" dirty="0">
-              <a:solidFill>
-                <a:schemeClr val="bg1"/>
-              </a:solidFill>
-              <a:latin typeface="Arial" pitchFamily="34" charset="0"/>
-            </a:endParaRPr>
-          </a:p>
-          <a:p>
-            <a:pPr eaLnBrk="0" hangingPunct="0">
-              <a:defRPr/>
-            </a:pPr>
-            <a:r>
-              <a:rPr lang="be-BY" sz="1000" dirty="0">
-                <a:solidFill>
-                  <a:schemeClr val="bg1"/>
-                </a:solidFill>
-                <a:latin typeface="Courier New" pitchFamily="49" charset="0"/>
-                <a:ea typeface="Calibri" pitchFamily="34" charset="0"/>
-                <a:cs typeface="Courier New" pitchFamily="49" charset="0"/>
+          </a:p>
+          <a:p>
+            <a:r>
+              <a:rPr lang="en-US" sz="900" dirty="0">
+                <a:solidFill>
+                  <a:prstClr val="black"/>
+                </a:solidFill>
+                <a:latin typeface="Consolas"/>
+              </a:rPr>
+              <a:t>    </a:t>
+            </a:r>
+            <a:r>
+              <a:rPr lang="en-US" sz="900" dirty="0">
+                <a:solidFill>
+                  <a:srgbClr val="0000FF"/>
+                </a:solidFill>
+                <a:latin typeface="Consolas"/>
+              </a:rPr>
+              <a:t>public</a:t>
+            </a:r>
+            <a:r>
+              <a:rPr lang="en-US" sz="900" dirty="0">
+                <a:solidFill>
+                  <a:prstClr val="black"/>
+                </a:solidFill>
+                <a:latin typeface="Consolas"/>
+              </a:rPr>
+              <a:t> </a:t>
+            </a:r>
+            <a:r>
+              <a:rPr lang="en-US" sz="900" dirty="0">
+                <a:solidFill>
+                  <a:srgbClr val="0000FF"/>
+                </a:solidFill>
+                <a:latin typeface="Consolas"/>
+              </a:rPr>
+              <a:t>static</a:t>
+            </a:r>
+            <a:r>
+              <a:rPr lang="en-US" sz="900" dirty="0">
+                <a:solidFill>
+                  <a:prstClr val="black"/>
+                </a:solidFill>
+                <a:latin typeface="Consolas"/>
+              </a:rPr>
+              <a:t> </a:t>
+            </a:r>
+            <a:r>
+              <a:rPr lang="en-US" sz="900" dirty="0">
+                <a:solidFill>
+                  <a:srgbClr val="2B91AF"/>
+                </a:solidFill>
+                <a:latin typeface="Consolas"/>
+              </a:rPr>
+              <a:t>Point</a:t>
+            </a:r>
+            <a:r>
+              <a:rPr lang="en-US" sz="900" dirty="0">
+                <a:solidFill>
+                  <a:prstClr val="black"/>
+                </a:solidFill>
+                <a:latin typeface="Consolas"/>
+              </a:rPr>
+              <a:t> </a:t>
+            </a:r>
+            <a:r>
+              <a:rPr lang="en-US" sz="900" dirty="0">
+                <a:solidFill>
+                  <a:srgbClr val="0000FF"/>
+                </a:solidFill>
+                <a:latin typeface="Consolas"/>
+              </a:rPr>
+              <a:t>operator</a:t>
+            </a:r>
+            <a:r>
+              <a:rPr lang="en-US" sz="900" dirty="0">
+                <a:solidFill>
+                  <a:prstClr val="black"/>
+                </a:solidFill>
+                <a:latin typeface="Consolas"/>
+              </a:rPr>
+              <a:t> +(</a:t>
+            </a:r>
+            <a:r>
+              <a:rPr lang="en-US" sz="900" dirty="0">
+                <a:solidFill>
+                  <a:srgbClr val="2B91AF"/>
+                </a:solidFill>
+                <a:latin typeface="Consolas"/>
+              </a:rPr>
+              <a:t>Point</a:t>
+            </a:r>
+            <a:r>
+              <a:rPr lang="en-US" sz="900" dirty="0">
+                <a:solidFill>
+                  <a:prstClr val="black"/>
+                </a:solidFill>
+                <a:latin typeface="Consolas"/>
+              </a:rPr>
+              <a:t> </a:t>
+            </a:r>
+            <a:r>
+              <a:rPr lang="en-US" sz="900" dirty="0" err="1">
+                <a:solidFill>
+                  <a:prstClr val="black"/>
+                </a:solidFill>
+                <a:latin typeface="Consolas"/>
+              </a:rPr>
+              <a:t>point</a:t>
+            </a:r>
+            <a:r>
+              <a:rPr lang="en-US" sz="900" dirty="0">
+                <a:solidFill>
+                  <a:prstClr val="black"/>
+                </a:solidFill>
+                <a:latin typeface="Consolas"/>
+              </a:rPr>
+              <a:t>, </a:t>
+            </a:r>
+            <a:r>
+              <a:rPr lang="en-US" sz="900" dirty="0" err="1">
+                <a:solidFill>
+                  <a:srgbClr val="0000FF"/>
+                </a:solidFill>
+                <a:latin typeface="Consolas"/>
+              </a:rPr>
+              <a:t>int</a:t>
+            </a:r>
+            <a:r>
+              <a:rPr lang="en-US" sz="900" dirty="0">
+                <a:solidFill>
+                  <a:prstClr val="black"/>
+                </a:solidFill>
+                <a:latin typeface="Consolas"/>
+              </a:rPr>
+              <a:t> delta)</a:t>
+            </a:r>
+          </a:p>
+          <a:p>
+            <a:r>
+              <a:rPr lang="en-US" sz="900" dirty="0">
+                <a:solidFill>
+                  <a:prstClr val="black"/>
+                </a:solidFill>
+                <a:latin typeface="Consolas"/>
               </a:rPr>
               <a:t>    {</a:t>
             </a:r>
-            <a:endParaRPr lang="be-BY" sz="900" dirty="0">
-              <a:solidFill>
-                <a:schemeClr val="bg1"/>
-              </a:solidFill>
-              <a:latin typeface="Arial" pitchFamily="34" charset="0"/>
-            </a:endParaRPr>
-          </a:p>
-          <a:p>
-            <a:pPr eaLnBrk="0" hangingPunct="0">
-              <a:defRPr/>
-            </a:pPr>
-            <a:r>
-              <a:rPr lang="be-BY" sz="1000" dirty="0">
-                <a:solidFill>
-                  <a:schemeClr val="bg1"/>
-                </a:solidFill>
-                <a:latin typeface="Courier New" pitchFamily="49" charset="0"/>
-                <a:ea typeface="Calibri" pitchFamily="34" charset="0"/>
-                <a:cs typeface="Courier New" pitchFamily="49" charset="0"/>
-              </a:rPr>
-              <a:t>        static void Main(string[] args)</a:t>
-            </a:r>
-            <a:endParaRPr lang="be-BY" sz="900" dirty="0">
-              <a:solidFill>
-                <a:schemeClr val="bg1"/>
-              </a:solidFill>
-              <a:latin typeface="Arial" pitchFamily="34" charset="0"/>
-            </a:endParaRPr>
-          </a:p>
-          <a:p>
-            <a:pPr eaLnBrk="0" hangingPunct="0">
-              <a:defRPr/>
-            </a:pPr>
-            <a:r>
-              <a:rPr lang="be-BY" sz="1000" dirty="0">
-                <a:solidFill>
-                  <a:schemeClr val="bg1"/>
-                </a:solidFill>
-                <a:latin typeface="Courier New" pitchFamily="49" charset="0"/>
-                <a:ea typeface="Calibri" pitchFamily="34" charset="0"/>
-                <a:cs typeface="Courier New" pitchFamily="49" charset="0"/>
-              </a:rPr>
-              <a:t>        {</a:t>
-            </a:r>
-            <a:endParaRPr lang="be-BY" sz="900" dirty="0">
-              <a:solidFill>
-                <a:schemeClr val="bg1"/>
-              </a:solidFill>
-              <a:latin typeface="Arial" pitchFamily="34" charset="0"/>
-            </a:endParaRPr>
-          </a:p>
-          <a:p>
-            <a:pPr eaLnBrk="0" hangingPunct="0">
-              <a:defRPr/>
-            </a:pPr>
-            <a:r>
-              <a:rPr lang="be-BY" sz="1000" dirty="0">
-                <a:solidFill>
-                  <a:schemeClr val="bg1"/>
-                </a:solidFill>
-                <a:latin typeface="Courier New" pitchFamily="49" charset="0"/>
-                <a:ea typeface="Calibri" pitchFamily="34" charset="0"/>
-                <a:cs typeface="Courier New" pitchFamily="49" charset="0"/>
-              </a:rPr>
-              <a:t>            Point p1 = new Point(1,2);</a:t>
-            </a:r>
-            <a:endParaRPr lang="be-BY" sz="900" dirty="0">
-              <a:solidFill>
-                <a:schemeClr val="bg1"/>
-              </a:solidFill>
-              <a:latin typeface="Arial" pitchFamily="34" charset="0"/>
-            </a:endParaRPr>
-          </a:p>
-          <a:p>
-            <a:pPr eaLnBrk="0" hangingPunct="0">
-              <a:defRPr/>
-            </a:pPr>
-            <a:r>
-              <a:rPr lang="be-BY" sz="1000" dirty="0">
-                <a:solidFill>
-                  <a:schemeClr val="bg1"/>
-                </a:solidFill>
-                <a:latin typeface="Courier New" pitchFamily="49" charset="0"/>
-                <a:ea typeface="Calibri" pitchFamily="34" charset="0"/>
-                <a:cs typeface="Courier New" pitchFamily="49" charset="0"/>
-              </a:rPr>
-              <a:t>            Point p2 = new Point(10,20);</a:t>
-            </a:r>
-            <a:endParaRPr lang="be-BY" sz="900" dirty="0">
-              <a:solidFill>
-                <a:schemeClr val="bg1"/>
-              </a:solidFill>
-              <a:latin typeface="Arial" pitchFamily="34" charset="0"/>
-            </a:endParaRPr>
-          </a:p>
-          <a:p>
-            <a:pPr eaLnBrk="0" hangingPunct="0">
-              <a:defRPr/>
-            </a:pPr>
-            <a:r>
-              <a:rPr lang="be-BY" sz="1000" dirty="0">
-                <a:solidFill>
-                  <a:schemeClr val="bg1"/>
-                </a:solidFill>
-                <a:latin typeface="Courier New" pitchFamily="49" charset="0"/>
-                <a:ea typeface="Calibri" pitchFamily="34" charset="0"/>
-                <a:cs typeface="Courier New" pitchFamily="49" charset="0"/>
-              </a:rPr>
-              <a:t>            Point p3 = p1 + p2 + 10;</a:t>
-            </a:r>
-            <a:endParaRPr lang="be-BY" sz="900" dirty="0">
-              <a:solidFill>
-                <a:schemeClr val="bg1"/>
-              </a:solidFill>
-              <a:latin typeface="Arial" pitchFamily="34" charset="0"/>
-            </a:endParaRPr>
-          </a:p>
-          <a:p>
-            <a:pPr eaLnBrk="0" hangingPunct="0">
-              <a:defRPr/>
-            </a:pPr>
-            <a:r>
-              <a:rPr lang="be-BY" sz="1000" dirty="0">
-                <a:solidFill>
-                  <a:schemeClr val="bg1"/>
-                </a:solidFill>
-                <a:latin typeface="Courier New" pitchFamily="49" charset="0"/>
-                <a:ea typeface="Calibri" pitchFamily="34" charset="0"/>
-                <a:cs typeface="Courier New" pitchFamily="49" charset="0"/>
-              </a:rPr>
-              <a:t>            p3.Print();</a:t>
-            </a:r>
-            <a:endParaRPr lang="be-BY" sz="900" dirty="0">
-              <a:solidFill>
-                <a:schemeClr val="bg1"/>
-              </a:solidFill>
-              <a:latin typeface="Arial" pitchFamily="34" charset="0"/>
-            </a:endParaRPr>
-          </a:p>
-          <a:p>
-            <a:pPr eaLnBrk="0" hangingPunct="0">
-              <a:defRPr/>
-            </a:pPr>
-            <a:r>
-              <a:rPr lang="be-BY" sz="1000" dirty="0">
-                <a:solidFill>
-                  <a:schemeClr val="bg1"/>
-                </a:solidFill>
-                <a:latin typeface="Courier New" pitchFamily="49" charset="0"/>
-                <a:ea typeface="Calibri" pitchFamily="34" charset="0"/>
-                <a:cs typeface="Courier New" pitchFamily="49" charset="0"/>
-              </a:rPr>
-              <a:t>            p2 += p1;</a:t>
-            </a:r>
-            <a:endParaRPr lang="be-BY" sz="900" dirty="0">
-              <a:solidFill>
-                <a:schemeClr val="bg1"/>
-              </a:solidFill>
-              <a:latin typeface="Arial" pitchFamily="34" charset="0"/>
-            </a:endParaRPr>
-          </a:p>
-          <a:p>
-            <a:pPr eaLnBrk="0" hangingPunct="0">
-              <a:defRPr/>
-            </a:pPr>
-            <a:r>
-              <a:rPr lang="be-BY" sz="1000" dirty="0">
-                <a:solidFill>
-                  <a:schemeClr val="bg1"/>
-                </a:solidFill>
-                <a:latin typeface="Courier New" pitchFamily="49" charset="0"/>
-                <a:ea typeface="Calibri" pitchFamily="34" charset="0"/>
-                <a:cs typeface="Courier New" pitchFamily="49" charset="0"/>
-              </a:rPr>
-              <a:t>            p2.Print();</a:t>
-            </a:r>
-            <a:endParaRPr lang="be-BY" sz="900" dirty="0">
-              <a:solidFill>
-                <a:schemeClr val="bg1"/>
-              </a:solidFill>
-              <a:latin typeface="Arial" pitchFamily="34" charset="0"/>
-            </a:endParaRPr>
-          </a:p>
-          <a:p>
-            <a:pPr eaLnBrk="0" hangingPunct="0">
-              <a:defRPr/>
-            </a:pPr>
-            <a:r>
-              <a:rPr lang="be-BY" sz="1000" dirty="0">
-                <a:solidFill>
-                  <a:schemeClr val="bg1"/>
-                </a:solidFill>
-                <a:latin typeface="Courier New" pitchFamily="49" charset="0"/>
-                <a:ea typeface="Calibri" pitchFamily="34" charset="0"/>
-                <a:cs typeface="Courier New" pitchFamily="49" charset="0"/>
-              </a:rPr>
-              <a:t>            if (p2 != p3)</a:t>
-            </a:r>
-            <a:endParaRPr lang="be-BY" sz="900" dirty="0">
-              <a:solidFill>
-                <a:schemeClr val="bg1"/>
-              </a:solidFill>
-              <a:latin typeface="Arial" pitchFamily="34" charset="0"/>
-            </a:endParaRPr>
-          </a:p>
-          <a:p>
-            <a:pPr eaLnBrk="0" hangingPunct="0">
-              <a:defRPr/>
-            </a:pPr>
-            <a:r>
-              <a:rPr lang="be-BY" sz="1000" dirty="0">
-                <a:solidFill>
-                  <a:schemeClr val="bg1"/>
-                </a:solidFill>
-                <a:latin typeface="Courier New" pitchFamily="49" charset="0"/>
-                <a:ea typeface="Calibri" pitchFamily="34" charset="0"/>
-                <a:cs typeface="Courier New" pitchFamily="49" charset="0"/>
-              </a:rPr>
-              <a:t>                Console.WriteLine("p2 != p3");</a:t>
-            </a:r>
-            <a:endParaRPr lang="be-BY" sz="900" dirty="0">
-              <a:solidFill>
-                <a:schemeClr val="bg1"/>
-              </a:solidFill>
-              <a:latin typeface="Arial" pitchFamily="34" charset="0"/>
-            </a:endParaRPr>
-          </a:p>
-          <a:p>
-            <a:pPr eaLnBrk="0" hangingPunct="0">
-              <a:defRPr/>
-            </a:pPr>
-            <a:r>
-              <a:rPr lang="be-BY" sz="1000" dirty="0">
-                <a:solidFill>
-                  <a:schemeClr val="bg1"/>
-                </a:solidFill>
-                <a:latin typeface="Courier New" pitchFamily="49" charset="0"/>
-                <a:ea typeface="Calibri" pitchFamily="34" charset="0"/>
-                <a:cs typeface="Courier New" pitchFamily="49" charset="0"/>
-              </a:rPr>
-              <a:t>            p1 = -p1;</a:t>
-            </a:r>
-            <a:endParaRPr lang="be-BY" sz="900" dirty="0">
-              <a:solidFill>
-                <a:schemeClr val="bg1"/>
-              </a:solidFill>
-              <a:latin typeface="Arial" pitchFamily="34" charset="0"/>
-            </a:endParaRPr>
-          </a:p>
-          <a:p>
-            <a:pPr eaLnBrk="0" hangingPunct="0">
-              <a:defRPr/>
-            </a:pPr>
-            <a:r>
-              <a:rPr lang="be-BY" sz="1000" dirty="0">
-                <a:solidFill>
-                  <a:schemeClr val="bg1"/>
-                </a:solidFill>
-                <a:latin typeface="Courier New" pitchFamily="49" charset="0"/>
-                <a:ea typeface="Calibri" pitchFamily="34" charset="0"/>
-                <a:cs typeface="Courier New" pitchFamily="49" charset="0"/>
-              </a:rPr>
-              <a:t>            p1.Print();</a:t>
-            </a:r>
-            <a:endParaRPr lang="be-BY" sz="900" dirty="0">
-              <a:solidFill>
-                <a:schemeClr val="bg1"/>
-              </a:solidFill>
-              <a:latin typeface="Arial" pitchFamily="34" charset="0"/>
-            </a:endParaRPr>
-          </a:p>
-          <a:p>
-            <a:pPr eaLnBrk="0" hangingPunct="0">
-              <a:defRPr/>
-            </a:pPr>
-            <a:r>
-              <a:rPr lang="be-BY" sz="1000" dirty="0">
-                <a:solidFill>
-                  <a:schemeClr val="bg1"/>
-                </a:solidFill>
-                <a:latin typeface="Courier New" pitchFamily="49" charset="0"/>
-                <a:ea typeface="Calibri" pitchFamily="34" charset="0"/>
-                <a:cs typeface="Courier New" pitchFamily="49" charset="0"/>
-              </a:rPr>
-              <a:t>        }</a:t>
-            </a:r>
-            <a:endParaRPr lang="be-BY" sz="900" dirty="0">
-              <a:solidFill>
-                <a:schemeClr val="bg1"/>
-              </a:solidFill>
-              <a:latin typeface="Arial" pitchFamily="34" charset="0"/>
-            </a:endParaRPr>
-          </a:p>
-          <a:p>
-            <a:pPr eaLnBrk="0" hangingPunct="0">
-              <a:defRPr/>
-            </a:pPr>
-            <a:r>
-              <a:rPr lang="be-BY" sz="1000" dirty="0">
-                <a:solidFill>
-                  <a:schemeClr val="bg1"/>
-                </a:solidFill>
-                <a:latin typeface="Courier New" pitchFamily="49" charset="0"/>
-                <a:ea typeface="Calibri" pitchFamily="34" charset="0"/>
-                <a:cs typeface="Courier New" pitchFamily="49" charset="0"/>
+          </a:p>
+          <a:p>
+            <a:r>
+              <a:rPr lang="en-US" sz="900" dirty="0">
+                <a:solidFill>
+                  <a:prstClr val="black"/>
+                </a:solidFill>
+                <a:latin typeface="Consolas"/>
+              </a:rPr>
+              <a:t>        </a:t>
+            </a:r>
+            <a:r>
+              <a:rPr lang="en-US" sz="900" dirty="0">
+                <a:solidFill>
+                  <a:srgbClr val="0000FF"/>
+                </a:solidFill>
+                <a:latin typeface="Consolas"/>
+              </a:rPr>
+              <a:t>return</a:t>
+            </a:r>
+            <a:r>
+              <a:rPr lang="en-US" sz="900" dirty="0">
+                <a:solidFill>
+                  <a:prstClr val="black"/>
+                </a:solidFill>
+                <a:latin typeface="Consolas"/>
+              </a:rPr>
+              <a:t> </a:t>
+            </a:r>
+            <a:r>
+              <a:rPr lang="en-US" sz="900" dirty="0">
+                <a:solidFill>
+                  <a:srgbClr val="0000FF"/>
+                </a:solidFill>
+                <a:latin typeface="Consolas"/>
+              </a:rPr>
+              <a:t>new</a:t>
+            </a:r>
+            <a:r>
+              <a:rPr lang="en-US" sz="900" dirty="0">
+                <a:solidFill>
+                  <a:prstClr val="black"/>
+                </a:solidFill>
+                <a:latin typeface="Consolas"/>
+              </a:rPr>
+              <a:t> </a:t>
+            </a:r>
+            <a:r>
+              <a:rPr lang="en-US" sz="900" dirty="0">
+                <a:solidFill>
+                  <a:srgbClr val="2B91AF"/>
+                </a:solidFill>
+                <a:latin typeface="Consolas"/>
+              </a:rPr>
+              <a:t>Point</a:t>
+            </a:r>
+            <a:r>
+              <a:rPr lang="en-US" sz="900" dirty="0">
+                <a:solidFill>
+                  <a:prstClr val="black"/>
+                </a:solidFill>
+                <a:latin typeface="Consolas"/>
+              </a:rPr>
+              <a:t>(</a:t>
+            </a:r>
+            <a:r>
+              <a:rPr lang="en-US" sz="900" dirty="0" err="1">
+                <a:solidFill>
+                  <a:prstClr val="black"/>
+                </a:solidFill>
+                <a:latin typeface="Consolas"/>
+              </a:rPr>
+              <a:t>point.x</a:t>
+            </a:r>
+            <a:r>
+              <a:rPr lang="en-US" sz="900" dirty="0">
+                <a:solidFill>
+                  <a:prstClr val="black"/>
+                </a:solidFill>
+                <a:latin typeface="Consolas"/>
+              </a:rPr>
+              <a:t> + delta, </a:t>
+            </a:r>
+            <a:r>
+              <a:rPr lang="en-US" sz="900" dirty="0" err="1">
+                <a:solidFill>
+                  <a:prstClr val="black"/>
+                </a:solidFill>
+                <a:latin typeface="Consolas"/>
+              </a:rPr>
+              <a:t>point.y</a:t>
+            </a:r>
+            <a:r>
+              <a:rPr lang="en-US" sz="900" dirty="0">
+                <a:solidFill>
+                  <a:prstClr val="black"/>
+                </a:solidFill>
+                <a:latin typeface="Consolas"/>
+              </a:rPr>
+              <a:t> + delta);</a:t>
+            </a:r>
+          </a:p>
+          <a:p>
+            <a:r>
+              <a:rPr lang="en-US" sz="900" dirty="0">
+                <a:solidFill>
+                  <a:prstClr val="black"/>
+                </a:solidFill>
+                <a:latin typeface="Consolas"/>
               </a:rPr>
               <a:t>    }</a:t>
+            </a:r>
+          </a:p>
+          <a:p>
+            <a:r>
+              <a:rPr lang="en-US" sz="900" dirty="0">
+                <a:solidFill>
+                  <a:prstClr val="black"/>
+                </a:solidFill>
+                <a:latin typeface="Consolas"/>
+              </a:rPr>
+              <a:t>    </a:t>
+            </a:r>
+            <a:r>
+              <a:rPr lang="en-US" sz="900" dirty="0">
+                <a:solidFill>
+                  <a:srgbClr val="0000FF"/>
+                </a:solidFill>
+                <a:latin typeface="Consolas"/>
+              </a:rPr>
+              <a:t>public</a:t>
+            </a:r>
+            <a:r>
+              <a:rPr lang="en-US" sz="900" dirty="0">
+                <a:solidFill>
+                  <a:prstClr val="black"/>
+                </a:solidFill>
+                <a:latin typeface="Consolas"/>
+              </a:rPr>
+              <a:t> </a:t>
+            </a:r>
+            <a:r>
+              <a:rPr lang="en-US" sz="900" dirty="0">
+                <a:solidFill>
+                  <a:srgbClr val="0000FF"/>
+                </a:solidFill>
+                <a:latin typeface="Consolas"/>
+              </a:rPr>
+              <a:t>static</a:t>
+            </a:r>
+            <a:r>
+              <a:rPr lang="en-US" sz="900" dirty="0">
+                <a:solidFill>
+                  <a:prstClr val="black"/>
+                </a:solidFill>
+                <a:latin typeface="Consolas"/>
+              </a:rPr>
+              <a:t> </a:t>
+            </a:r>
+            <a:r>
+              <a:rPr lang="en-US" sz="900" dirty="0">
+                <a:solidFill>
+                  <a:srgbClr val="2B91AF"/>
+                </a:solidFill>
+                <a:latin typeface="Consolas"/>
+              </a:rPr>
+              <a:t>Point</a:t>
+            </a:r>
+            <a:r>
+              <a:rPr lang="en-US" sz="900" dirty="0">
+                <a:solidFill>
+                  <a:prstClr val="black"/>
+                </a:solidFill>
+                <a:latin typeface="Consolas"/>
+              </a:rPr>
+              <a:t> </a:t>
+            </a:r>
+            <a:r>
+              <a:rPr lang="en-US" sz="900" dirty="0">
+                <a:solidFill>
+                  <a:srgbClr val="0000FF"/>
+                </a:solidFill>
+                <a:latin typeface="Consolas"/>
+              </a:rPr>
+              <a:t>operator</a:t>
+            </a:r>
+            <a:r>
+              <a:rPr lang="en-US" sz="900" dirty="0">
+                <a:solidFill>
+                  <a:prstClr val="black"/>
+                </a:solidFill>
+                <a:latin typeface="Consolas"/>
+              </a:rPr>
+              <a:t> -(</a:t>
+            </a:r>
+            <a:r>
+              <a:rPr lang="en-US" sz="900" dirty="0">
+                <a:solidFill>
+                  <a:srgbClr val="2B91AF"/>
+                </a:solidFill>
+                <a:latin typeface="Consolas"/>
+              </a:rPr>
+              <a:t>Point</a:t>
+            </a:r>
+            <a:r>
+              <a:rPr lang="en-US" sz="900" dirty="0">
+                <a:solidFill>
+                  <a:prstClr val="black"/>
+                </a:solidFill>
+                <a:latin typeface="Consolas"/>
+              </a:rPr>
+              <a:t> point)</a:t>
+            </a:r>
+          </a:p>
+          <a:p>
+            <a:r>
+              <a:rPr lang="en-US" sz="900" dirty="0">
+                <a:solidFill>
+                  <a:prstClr val="black"/>
+                </a:solidFill>
+                <a:latin typeface="Consolas"/>
+              </a:rPr>
+              <a:t>    {</a:t>
+            </a:r>
+          </a:p>
+          <a:p>
+            <a:r>
+              <a:rPr lang="en-US" sz="900" dirty="0">
+                <a:solidFill>
+                  <a:prstClr val="black"/>
+                </a:solidFill>
+                <a:latin typeface="Consolas"/>
+              </a:rPr>
+              <a:t>        </a:t>
+            </a:r>
+            <a:r>
+              <a:rPr lang="en-US" sz="900" dirty="0">
+                <a:solidFill>
+                  <a:srgbClr val="0000FF"/>
+                </a:solidFill>
+                <a:latin typeface="Consolas"/>
+              </a:rPr>
+              <a:t>return</a:t>
+            </a:r>
+            <a:r>
+              <a:rPr lang="en-US" sz="900" dirty="0">
+                <a:solidFill>
+                  <a:prstClr val="black"/>
+                </a:solidFill>
+                <a:latin typeface="Consolas"/>
+              </a:rPr>
+              <a:t> </a:t>
+            </a:r>
+            <a:r>
+              <a:rPr lang="en-US" sz="900" dirty="0">
+                <a:solidFill>
+                  <a:srgbClr val="0000FF"/>
+                </a:solidFill>
+                <a:latin typeface="Consolas"/>
+              </a:rPr>
+              <a:t>new</a:t>
+            </a:r>
+            <a:r>
+              <a:rPr lang="en-US" sz="900" dirty="0">
+                <a:solidFill>
+                  <a:prstClr val="black"/>
+                </a:solidFill>
+                <a:latin typeface="Consolas"/>
+              </a:rPr>
+              <a:t> </a:t>
+            </a:r>
+            <a:r>
+              <a:rPr lang="en-US" sz="900" dirty="0">
+                <a:solidFill>
+                  <a:srgbClr val="2B91AF"/>
+                </a:solidFill>
+                <a:latin typeface="Consolas"/>
+              </a:rPr>
+              <a:t>Point</a:t>
+            </a:r>
+            <a:r>
+              <a:rPr lang="en-US" sz="900" dirty="0">
+                <a:solidFill>
+                  <a:prstClr val="black"/>
+                </a:solidFill>
+                <a:latin typeface="Consolas"/>
+              </a:rPr>
+              <a:t>(-</a:t>
+            </a:r>
+            <a:r>
+              <a:rPr lang="en-US" sz="900" dirty="0" err="1">
+                <a:solidFill>
+                  <a:prstClr val="black"/>
+                </a:solidFill>
+                <a:latin typeface="Consolas"/>
+              </a:rPr>
+              <a:t>point.x</a:t>
+            </a:r>
+            <a:r>
+              <a:rPr lang="en-US" sz="900" dirty="0">
+                <a:solidFill>
+                  <a:prstClr val="black"/>
+                </a:solidFill>
+                <a:latin typeface="Consolas"/>
+              </a:rPr>
+              <a:t>, -</a:t>
+            </a:r>
+            <a:r>
+              <a:rPr lang="en-US" sz="900" dirty="0" err="1">
+                <a:solidFill>
+                  <a:prstClr val="black"/>
+                </a:solidFill>
+                <a:latin typeface="Consolas"/>
+              </a:rPr>
+              <a:t>point.y</a:t>
+            </a:r>
+            <a:r>
+              <a:rPr lang="en-US" sz="900" dirty="0">
+                <a:solidFill>
+                  <a:prstClr val="black"/>
+                </a:solidFill>
+                <a:latin typeface="Consolas"/>
+              </a:rPr>
+              <a:t>);</a:t>
+            </a:r>
+          </a:p>
+          <a:p>
+            <a:r>
+              <a:rPr lang="en-US" sz="900" dirty="0">
+                <a:solidFill>
+                  <a:prstClr val="black"/>
+                </a:solidFill>
+                <a:latin typeface="Consolas"/>
+              </a:rPr>
+              <a:t>    </a:t>
+            </a:r>
+            <a:r>
+              <a:rPr lang="en-US" sz="900" dirty="0" smtClean="0">
+                <a:solidFill>
+                  <a:prstClr val="black"/>
+                </a:solidFill>
+                <a:latin typeface="Consolas"/>
+              </a:rPr>
+              <a:t>}</a:t>
+            </a:r>
+          </a:p>
+          <a:p>
+            <a:r>
+              <a:rPr lang="en-US" sz="900" dirty="0" smtClean="0">
+                <a:solidFill>
+                  <a:srgbClr val="008000"/>
+                </a:solidFill>
+                <a:latin typeface="Consolas"/>
+              </a:rPr>
+              <a:t>    </a:t>
+            </a:r>
+            <a:r>
+              <a:rPr lang="ru-RU" sz="900" dirty="0" smtClean="0">
+                <a:solidFill>
+                  <a:srgbClr val="008000"/>
+                </a:solidFill>
+                <a:latin typeface="Consolas"/>
+              </a:rPr>
+              <a:t>// </a:t>
+            </a:r>
+            <a:r>
+              <a:rPr lang="ru-RU" sz="900" dirty="0">
+                <a:solidFill>
+                  <a:srgbClr val="008000"/>
+                </a:solidFill>
+                <a:latin typeface="Consolas"/>
+              </a:rPr>
+              <a:t>Операторы == и != должны перегружаться совместно с переопределением </a:t>
+            </a:r>
+            <a:r>
+              <a:rPr lang="ru-RU" sz="900" dirty="0" smtClean="0">
+                <a:solidFill>
+                  <a:srgbClr val="008000"/>
+                </a:solidFill>
+                <a:latin typeface="Consolas"/>
+              </a:rPr>
+              <a:t>Equals</a:t>
+            </a:r>
+            <a:r>
+              <a:rPr lang="en-US" sz="900" dirty="0" smtClean="0">
+                <a:solidFill>
+                  <a:srgbClr val="008000"/>
+                </a:solidFill>
+                <a:latin typeface="Consolas"/>
+              </a:rPr>
+              <a:t>()</a:t>
+            </a:r>
+            <a:r>
+              <a:rPr lang="ru-RU" sz="900" dirty="0" smtClean="0">
+                <a:solidFill>
+                  <a:srgbClr val="008000"/>
+                </a:solidFill>
+                <a:latin typeface="Consolas"/>
+              </a:rPr>
+              <a:t> </a:t>
+            </a:r>
+            <a:r>
+              <a:rPr lang="ru-RU" sz="900" dirty="0">
+                <a:solidFill>
+                  <a:srgbClr val="008000"/>
+                </a:solidFill>
+                <a:latin typeface="Consolas"/>
+              </a:rPr>
+              <a:t>чтобы сравнение всегда вело себя одинаково</a:t>
+            </a:r>
+          </a:p>
+          <a:p>
+            <a:r>
+              <a:rPr lang="en-US" sz="900" dirty="0" smtClean="0">
+                <a:solidFill>
+                  <a:srgbClr val="0000FF"/>
+                </a:solidFill>
+                <a:latin typeface="Consolas"/>
+              </a:rPr>
+              <a:t>    public</a:t>
+            </a:r>
+            <a:r>
+              <a:rPr lang="en-US" sz="900" dirty="0" smtClean="0">
+                <a:solidFill>
+                  <a:prstClr val="black"/>
+                </a:solidFill>
+                <a:latin typeface="Consolas"/>
+              </a:rPr>
+              <a:t> </a:t>
+            </a:r>
+            <a:r>
+              <a:rPr lang="en-US" sz="900" dirty="0">
+                <a:solidFill>
+                  <a:srgbClr val="0000FF"/>
+                </a:solidFill>
+                <a:latin typeface="Consolas"/>
+              </a:rPr>
+              <a:t>static</a:t>
+            </a:r>
+            <a:r>
+              <a:rPr lang="en-US" sz="900" dirty="0">
+                <a:solidFill>
+                  <a:prstClr val="black"/>
+                </a:solidFill>
+                <a:latin typeface="Consolas"/>
+              </a:rPr>
+              <a:t> </a:t>
+            </a:r>
+            <a:r>
+              <a:rPr lang="en-US" sz="900" dirty="0" err="1">
+                <a:solidFill>
+                  <a:srgbClr val="0000FF"/>
+                </a:solidFill>
+                <a:latin typeface="Consolas"/>
+              </a:rPr>
+              <a:t>bool</a:t>
+            </a:r>
+            <a:r>
+              <a:rPr lang="en-US" sz="900" dirty="0">
+                <a:solidFill>
+                  <a:prstClr val="black"/>
+                </a:solidFill>
+                <a:latin typeface="Consolas"/>
+              </a:rPr>
+              <a:t> </a:t>
+            </a:r>
+            <a:r>
+              <a:rPr lang="en-US" sz="900" dirty="0">
+                <a:solidFill>
+                  <a:srgbClr val="0000FF"/>
+                </a:solidFill>
+                <a:latin typeface="Consolas"/>
+              </a:rPr>
+              <a:t>operator</a:t>
+            </a:r>
+            <a:r>
+              <a:rPr lang="en-US" sz="900" dirty="0">
+                <a:solidFill>
+                  <a:prstClr val="black"/>
+                </a:solidFill>
+                <a:latin typeface="Consolas"/>
+              </a:rPr>
+              <a:t> ==(</a:t>
+            </a:r>
+            <a:r>
+              <a:rPr lang="en-US" sz="900" dirty="0">
+                <a:solidFill>
+                  <a:srgbClr val="2B91AF"/>
+                </a:solidFill>
+                <a:latin typeface="Consolas"/>
+              </a:rPr>
+              <a:t>Point</a:t>
+            </a:r>
+            <a:r>
+              <a:rPr lang="en-US" sz="900" dirty="0">
+                <a:solidFill>
+                  <a:prstClr val="black"/>
+                </a:solidFill>
+                <a:latin typeface="Consolas"/>
+              </a:rPr>
+              <a:t> point1, </a:t>
+            </a:r>
+            <a:r>
+              <a:rPr lang="en-US" sz="900" dirty="0">
+                <a:solidFill>
+                  <a:srgbClr val="2B91AF"/>
+                </a:solidFill>
+                <a:latin typeface="Consolas"/>
+              </a:rPr>
+              <a:t>Point</a:t>
+            </a:r>
+            <a:r>
+              <a:rPr lang="en-US" sz="900" dirty="0">
+                <a:solidFill>
+                  <a:prstClr val="black"/>
+                </a:solidFill>
+                <a:latin typeface="Consolas"/>
+              </a:rPr>
+              <a:t> point2)</a:t>
+            </a:r>
+          </a:p>
+          <a:p>
+            <a:r>
+              <a:rPr lang="en-US" sz="900" dirty="0">
+                <a:solidFill>
+                  <a:prstClr val="black"/>
+                </a:solidFill>
+                <a:latin typeface="Consolas"/>
+              </a:rPr>
+              <a:t>    {</a:t>
+            </a:r>
+          </a:p>
+          <a:p>
+            <a:r>
+              <a:rPr lang="en-US" sz="900" dirty="0">
+                <a:solidFill>
+                  <a:prstClr val="black"/>
+                </a:solidFill>
+                <a:latin typeface="Consolas"/>
+              </a:rPr>
+              <a:t>        </a:t>
+            </a:r>
+            <a:r>
+              <a:rPr lang="en-US" sz="900" dirty="0">
+                <a:solidFill>
+                  <a:srgbClr val="0000FF"/>
+                </a:solidFill>
+                <a:latin typeface="Consolas"/>
+              </a:rPr>
+              <a:t>return</a:t>
+            </a:r>
+            <a:r>
+              <a:rPr lang="en-US" sz="900" dirty="0">
+                <a:solidFill>
+                  <a:prstClr val="black"/>
+                </a:solidFill>
+                <a:latin typeface="Consolas"/>
+              </a:rPr>
+              <a:t> </a:t>
+            </a:r>
+            <a:r>
+              <a:rPr lang="en-US" sz="900" dirty="0" err="1">
+                <a:solidFill>
+                  <a:srgbClr val="0000FF"/>
+                </a:solidFill>
+                <a:latin typeface="Consolas"/>
+              </a:rPr>
+              <a:t>object</a:t>
+            </a:r>
+            <a:r>
+              <a:rPr lang="en-US" sz="900" dirty="0" err="1">
+                <a:solidFill>
+                  <a:prstClr val="black"/>
+                </a:solidFill>
+                <a:latin typeface="Consolas"/>
+              </a:rPr>
+              <a:t>.Equals</a:t>
+            </a:r>
+            <a:r>
+              <a:rPr lang="en-US" sz="900" dirty="0">
+                <a:solidFill>
+                  <a:prstClr val="black"/>
+                </a:solidFill>
+                <a:latin typeface="Consolas"/>
+              </a:rPr>
+              <a:t>(point1, point2);</a:t>
+            </a:r>
+          </a:p>
+          <a:p>
+            <a:r>
+              <a:rPr lang="en-US" sz="900" dirty="0">
+                <a:solidFill>
+                  <a:prstClr val="black"/>
+                </a:solidFill>
+                <a:latin typeface="Consolas"/>
+              </a:rPr>
+              <a:t>    }</a:t>
+            </a:r>
+          </a:p>
+          <a:p>
+            <a:r>
+              <a:rPr lang="en-US" sz="900" dirty="0">
+                <a:solidFill>
+                  <a:prstClr val="black"/>
+                </a:solidFill>
+                <a:latin typeface="Consolas"/>
+              </a:rPr>
+              <a:t>    </a:t>
+            </a:r>
+            <a:r>
+              <a:rPr lang="en-US" sz="900" dirty="0">
+                <a:solidFill>
+                  <a:srgbClr val="0000FF"/>
+                </a:solidFill>
+                <a:latin typeface="Consolas"/>
+              </a:rPr>
+              <a:t>public</a:t>
+            </a:r>
+            <a:r>
+              <a:rPr lang="en-US" sz="900" dirty="0">
+                <a:solidFill>
+                  <a:prstClr val="black"/>
+                </a:solidFill>
+                <a:latin typeface="Consolas"/>
+              </a:rPr>
+              <a:t> </a:t>
+            </a:r>
+            <a:r>
+              <a:rPr lang="en-US" sz="900" dirty="0">
+                <a:solidFill>
+                  <a:srgbClr val="0000FF"/>
+                </a:solidFill>
+                <a:latin typeface="Consolas"/>
+              </a:rPr>
+              <a:t>static</a:t>
+            </a:r>
+            <a:r>
+              <a:rPr lang="en-US" sz="900" dirty="0">
+                <a:solidFill>
+                  <a:prstClr val="black"/>
+                </a:solidFill>
+                <a:latin typeface="Consolas"/>
+              </a:rPr>
+              <a:t> </a:t>
+            </a:r>
+            <a:r>
+              <a:rPr lang="en-US" sz="900" dirty="0" err="1">
+                <a:solidFill>
+                  <a:srgbClr val="0000FF"/>
+                </a:solidFill>
+                <a:latin typeface="Consolas"/>
+              </a:rPr>
+              <a:t>bool</a:t>
+            </a:r>
+            <a:r>
+              <a:rPr lang="en-US" sz="900" dirty="0">
+                <a:solidFill>
+                  <a:prstClr val="black"/>
+                </a:solidFill>
+                <a:latin typeface="Consolas"/>
+              </a:rPr>
+              <a:t> </a:t>
+            </a:r>
+            <a:r>
+              <a:rPr lang="en-US" sz="900" dirty="0">
+                <a:solidFill>
+                  <a:srgbClr val="0000FF"/>
+                </a:solidFill>
+                <a:latin typeface="Consolas"/>
+              </a:rPr>
+              <a:t>operator</a:t>
+            </a:r>
+            <a:r>
+              <a:rPr lang="en-US" sz="900" dirty="0">
+                <a:solidFill>
+                  <a:prstClr val="black"/>
+                </a:solidFill>
+                <a:latin typeface="Consolas"/>
+              </a:rPr>
+              <a:t> !=(</a:t>
+            </a:r>
+            <a:r>
+              <a:rPr lang="en-US" sz="900" dirty="0">
+                <a:solidFill>
+                  <a:srgbClr val="2B91AF"/>
+                </a:solidFill>
+                <a:latin typeface="Consolas"/>
+              </a:rPr>
+              <a:t>Point</a:t>
+            </a:r>
+            <a:r>
+              <a:rPr lang="en-US" sz="900" dirty="0">
+                <a:solidFill>
+                  <a:prstClr val="black"/>
+                </a:solidFill>
+                <a:latin typeface="Consolas"/>
+              </a:rPr>
+              <a:t> point1, </a:t>
+            </a:r>
+            <a:r>
+              <a:rPr lang="en-US" sz="900" dirty="0">
+                <a:solidFill>
+                  <a:srgbClr val="2B91AF"/>
+                </a:solidFill>
+                <a:latin typeface="Consolas"/>
+              </a:rPr>
+              <a:t>Point</a:t>
+            </a:r>
+            <a:r>
+              <a:rPr lang="en-US" sz="900" dirty="0">
+                <a:solidFill>
+                  <a:prstClr val="black"/>
+                </a:solidFill>
+                <a:latin typeface="Consolas"/>
+              </a:rPr>
+              <a:t> point2)</a:t>
+            </a:r>
+          </a:p>
+          <a:p>
+            <a:r>
+              <a:rPr lang="en-US" sz="900" dirty="0">
+                <a:solidFill>
+                  <a:prstClr val="black"/>
+                </a:solidFill>
+                <a:latin typeface="Consolas"/>
+              </a:rPr>
+              <a:t>    {</a:t>
+            </a:r>
+          </a:p>
+          <a:p>
+            <a:r>
+              <a:rPr lang="en-US" sz="900" dirty="0">
+                <a:solidFill>
+                  <a:prstClr val="black"/>
+                </a:solidFill>
+                <a:latin typeface="Consolas"/>
+              </a:rPr>
+              <a:t>        </a:t>
+            </a:r>
+            <a:r>
+              <a:rPr lang="en-US" sz="900" dirty="0">
+                <a:solidFill>
+                  <a:srgbClr val="0000FF"/>
+                </a:solidFill>
+                <a:latin typeface="Consolas"/>
+              </a:rPr>
+              <a:t>return</a:t>
+            </a:r>
+            <a:r>
+              <a:rPr lang="en-US" sz="900" dirty="0">
+                <a:solidFill>
+                  <a:prstClr val="black"/>
+                </a:solidFill>
+                <a:latin typeface="Consolas"/>
+              </a:rPr>
+              <a:t> !</a:t>
+            </a:r>
+            <a:r>
+              <a:rPr lang="en-US" sz="900" dirty="0" err="1">
+                <a:solidFill>
+                  <a:srgbClr val="0000FF"/>
+                </a:solidFill>
+                <a:latin typeface="Consolas"/>
+              </a:rPr>
+              <a:t>object</a:t>
+            </a:r>
+            <a:r>
+              <a:rPr lang="en-US" sz="900" dirty="0" err="1">
+                <a:solidFill>
+                  <a:prstClr val="black"/>
+                </a:solidFill>
+                <a:latin typeface="Consolas"/>
+              </a:rPr>
+              <a:t>.Equals</a:t>
+            </a:r>
+            <a:r>
+              <a:rPr lang="en-US" sz="900" dirty="0">
+                <a:solidFill>
+                  <a:prstClr val="black"/>
+                </a:solidFill>
+                <a:latin typeface="Consolas"/>
+              </a:rPr>
+              <a:t>(point1, point2);</a:t>
+            </a:r>
+          </a:p>
+          <a:p>
+            <a:r>
+              <a:rPr lang="en-US" sz="900" dirty="0">
+                <a:solidFill>
+                  <a:prstClr val="black"/>
+                </a:solidFill>
+                <a:latin typeface="Consolas"/>
+              </a:rPr>
+              <a:t>    }</a:t>
+            </a:r>
+          </a:p>
+          <a:p>
+            <a:r>
+              <a:rPr lang="en-US" sz="900" dirty="0">
+                <a:solidFill>
+                  <a:prstClr val="black"/>
+                </a:solidFill>
+                <a:latin typeface="Consolas"/>
+              </a:rPr>
+              <a:t>    </a:t>
+            </a:r>
+            <a:r>
+              <a:rPr lang="en-US" sz="900" dirty="0">
+                <a:solidFill>
+                  <a:srgbClr val="0000FF"/>
+                </a:solidFill>
+                <a:latin typeface="Consolas"/>
+              </a:rPr>
+              <a:t>public</a:t>
+            </a:r>
+            <a:r>
+              <a:rPr lang="en-US" sz="900" dirty="0">
+                <a:solidFill>
+                  <a:prstClr val="black"/>
+                </a:solidFill>
+                <a:latin typeface="Consolas"/>
+              </a:rPr>
+              <a:t> </a:t>
+            </a:r>
+            <a:r>
+              <a:rPr lang="en-US" sz="900" dirty="0">
+                <a:solidFill>
+                  <a:srgbClr val="0000FF"/>
+                </a:solidFill>
+                <a:latin typeface="Consolas"/>
+              </a:rPr>
+              <a:t>override</a:t>
+            </a:r>
+            <a:r>
+              <a:rPr lang="en-US" sz="900" dirty="0">
+                <a:solidFill>
+                  <a:prstClr val="black"/>
+                </a:solidFill>
+                <a:latin typeface="Consolas"/>
+              </a:rPr>
+              <a:t> </a:t>
+            </a:r>
+            <a:r>
+              <a:rPr lang="en-US" sz="900" dirty="0" err="1">
+                <a:solidFill>
+                  <a:srgbClr val="0000FF"/>
+                </a:solidFill>
+                <a:latin typeface="Consolas"/>
+              </a:rPr>
+              <a:t>bool</a:t>
+            </a:r>
+            <a:r>
+              <a:rPr lang="en-US" sz="900" dirty="0">
+                <a:solidFill>
+                  <a:prstClr val="black"/>
+                </a:solidFill>
+                <a:latin typeface="Consolas"/>
+              </a:rPr>
+              <a:t> Equals(</a:t>
+            </a:r>
+            <a:r>
+              <a:rPr lang="en-US" sz="900" dirty="0">
+                <a:solidFill>
+                  <a:srgbClr val="0000FF"/>
+                </a:solidFill>
+                <a:latin typeface="Consolas"/>
+              </a:rPr>
+              <a:t>object</a:t>
+            </a:r>
+            <a:r>
+              <a:rPr lang="en-US" sz="900" dirty="0">
+                <a:solidFill>
+                  <a:prstClr val="black"/>
+                </a:solidFill>
+                <a:latin typeface="Consolas"/>
+              </a:rPr>
+              <a:t> </a:t>
+            </a:r>
+            <a:r>
+              <a:rPr lang="en-US" sz="900" dirty="0" err="1">
+                <a:solidFill>
+                  <a:prstClr val="black"/>
+                </a:solidFill>
+                <a:latin typeface="Consolas"/>
+              </a:rPr>
+              <a:t>obj</a:t>
+            </a:r>
+            <a:r>
+              <a:rPr lang="en-US" sz="900" dirty="0">
+                <a:solidFill>
+                  <a:prstClr val="black"/>
+                </a:solidFill>
+                <a:latin typeface="Consolas"/>
+              </a:rPr>
+              <a:t>)</a:t>
+            </a:r>
+          </a:p>
+          <a:p>
+            <a:r>
+              <a:rPr lang="en-US" sz="900" dirty="0">
+                <a:solidFill>
+                  <a:prstClr val="black"/>
+                </a:solidFill>
+                <a:latin typeface="Consolas"/>
+              </a:rPr>
+              <a:t>    {</a:t>
+            </a:r>
+          </a:p>
+          <a:p>
+            <a:r>
+              <a:rPr lang="en-US" sz="900" dirty="0">
+                <a:solidFill>
+                  <a:prstClr val="black"/>
+                </a:solidFill>
+                <a:latin typeface="Consolas"/>
+              </a:rPr>
+              <a:t>        </a:t>
+            </a:r>
+            <a:r>
+              <a:rPr lang="en-US" sz="900" dirty="0">
+                <a:solidFill>
+                  <a:srgbClr val="2B91AF"/>
+                </a:solidFill>
+                <a:latin typeface="Consolas"/>
+              </a:rPr>
+              <a:t>Point</a:t>
+            </a:r>
+            <a:r>
+              <a:rPr lang="en-US" sz="900" dirty="0">
+                <a:solidFill>
+                  <a:prstClr val="black"/>
+                </a:solidFill>
+                <a:latin typeface="Consolas"/>
+              </a:rPr>
+              <a:t> </a:t>
+            </a:r>
+            <a:r>
+              <a:rPr lang="en-US" sz="900" dirty="0" err="1">
+                <a:solidFill>
+                  <a:prstClr val="black"/>
+                </a:solidFill>
+                <a:latin typeface="Consolas"/>
+              </a:rPr>
+              <a:t>point</a:t>
+            </a:r>
+            <a:r>
+              <a:rPr lang="en-US" sz="900" dirty="0">
+                <a:solidFill>
+                  <a:prstClr val="black"/>
+                </a:solidFill>
+                <a:latin typeface="Consolas"/>
+              </a:rPr>
+              <a:t> = </a:t>
+            </a:r>
+            <a:r>
+              <a:rPr lang="en-US" sz="900" dirty="0" err="1">
+                <a:solidFill>
+                  <a:prstClr val="black"/>
+                </a:solidFill>
+                <a:latin typeface="Consolas"/>
+              </a:rPr>
+              <a:t>obj</a:t>
+            </a:r>
+            <a:r>
+              <a:rPr lang="en-US" sz="900" dirty="0">
+                <a:solidFill>
+                  <a:prstClr val="black"/>
+                </a:solidFill>
+                <a:latin typeface="Consolas"/>
+              </a:rPr>
+              <a:t> </a:t>
+            </a:r>
+            <a:r>
+              <a:rPr lang="en-US" sz="900" dirty="0">
+                <a:solidFill>
+                  <a:srgbClr val="0000FF"/>
+                </a:solidFill>
+                <a:latin typeface="Consolas"/>
+              </a:rPr>
+              <a:t>as</a:t>
+            </a:r>
+            <a:r>
+              <a:rPr lang="en-US" sz="900" dirty="0">
+                <a:solidFill>
+                  <a:prstClr val="black"/>
+                </a:solidFill>
+                <a:latin typeface="Consolas"/>
+              </a:rPr>
+              <a:t> </a:t>
+            </a:r>
+            <a:r>
+              <a:rPr lang="en-US" sz="900" dirty="0">
+                <a:solidFill>
+                  <a:srgbClr val="2B91AF"/>
+                </a:solidFill>
+                <a:latin typeface="Consolas"/>
+              </a:rPr>
+              <a:t>Point</a:t>
+            </a:r>
+            <a:r>
+              <a:rPr lang="en-US" sz="900" dirty="0">
+                <a:solidFill>
+                  <a:prstClr val="black"/>
+                </a:solidFill>
+                <a:latin typeface="Consolas"/>
+              </a:rPr>
+              <a:t>;</a:t>
+            </a:r>
+          </a:p>
+          <a:p>
+            <a:r>
+              <a:rPr lang="en-US" sz="900" dirty="0">
+                <a:solidFill>
+                  <a:prstClr val="black"/>
+                </a:solidFill>
+                <a:latin typeface="Consolas"/>
+              </a:rPr>
+              <a:t>        </a:t>
+            </a:r>
+            <a:r>
+              <a:rPr lang="en-US" sz="900" dirty="0">
+                <a:solidFill>
+                  <a:srgbClr val="0000FF"/>
+                </a:solidFill>
+                <a:latin typeface="Consolas"/>
+              </a:rPr>
+              <a:t>if</a:t>
+            </a:r>
+            <a:r>
+              <a:rPr lang="en-US" sz="900" dirty="0">
+                <a:solidFill>
+                  <a:prstClr val="black"/>
+                </a:solidFill>
+                <a:latin typeface="Consolas"/>
+              </a:rPr>
+              <a:t> ((</a:t>
+            </a:r>
+            <a:r>
+              <a:rPr lang="en-US" sz="900" dirty="0">
+                <a:solidFill>
+                  <a:srgbClr val="0000FF"/>
+                </a:solidFill>
+                <a:latin typeface="Consolas"/>
+              </a:rPr>
+              <a:t>object</a:t>
+            </a:r>
+            <a:r>
+              <a:rPr lang="en-US" sz="900" dirty="0">
+                <a:solidFill>
+                  <a:prstClr val="black"/>
+                </a:solidFill>
+                <a:latin typeface="Consolas"/>
+              </a:rPr>
+              <a:t>)point == </a:t>
+            </a:r>
+            <a:r>
+              <a:rPr lang="en-US" sz="900" dirty="0">
+                <a:solidFill>
+                  <a:srgbClr val="0000FF"/>
+                </a:solidFill>
+                <a:latin typeface="Consolas"/>
+              </a:rPr>
+              <a:t>null</a:t>
+            </a:r>
+            <a:r>
+              <a:rPr lang="en-US" sz="900" dirty="0">
+                <a:solidFill>
+                  <a:prstClr val="black"/>
+                </a:solidFill>
+                <a:latin typeface="Consolas"/>
+              </a:rPr>
+              <a:t>) </a:t>
+            </a:r>
+            <a:r>
+              <a:rPr lang="en-US" sz="900" dirty="0">
+                <a:solidFill>
+                  <a:srgbClr val="0000FF"/>
+                </a:solidFill>
+                <a:latin typeface="Consolas"/>
+              </a:rPr>
+              <a:t>return</a:t>
+            </a:r>
+            <a:r>
+              <a:rPr lang="en-US" sz="900" dirty="0">
+                <a:solidFill>
+                  <a:prstClr val="black"/>
+                </a:solidFill>
+                <a:latin typeface="Consolas"/>
+              </a:rPr>
+              <a:t> </a:t>
+            </a:r>
+            <a:r>
+              <a:rPr lang="en-US" sz="900" dirty="0">
+                <a:solidFill>
+                  <a:srgbClr val="0000FF"/>
+                </a:solidFill>
+                <a:latin typeface="Consolas"/>
+              </a:rPr>
+              <a:t>false</a:t>
+            </a:r>
+            <a:r>
+              <a:rPr lang="en-US" sz="900" dirty="0">
+                <a:solidFill>
+                  <a:prstClr val="black"/>
+                </a:solidFill>
+                <a:latin typeface="Consolas"/>
+              </a:rPr>
+              <a:t>;</a:t>
+            </a:r>
+          </a:p>
+          <a:p>
+            <a:r>
+              <a:rPr lang="en-US" sz="900" dirty="0">
+                <a:solidFill>
+                  <a:prstClr val="black"/>
+                </a:solidFill>
+                <a:latin typeface="Consolas"/>
+              </a:rPr>
+              <a:t>        </a:t>
+            </a:r>
+            <a:r>
+              <a:rPr lang="en-US" sz="900" dirty="0">
+                <a:solidFill>
+                  <a:srgbClr val="0000FF"/>
+                </a:solidFill>
+                <a:latin typeface="Consolas"/>
+              </a:rPr>
+              <a:t>return</a:t>
+            </a:r>
+            <a:r>
+              <a:rPr lang="en-US" sz="900" dirty="0">
+                <a:solidFill>
+                  <a:prstClr val="black"/>
+                </a:solidFill>
+                <a:latin typeface="Consolas"/>
+              </a:rPr>
+              <a:t> (x == </a:t>
+            </a:r>
+            <a:r>
+              <a:rPr lang="en-US" sz="900" dirty="0" err="1">
+                <a:solidFill>
+                  <a:prstClr val="black"/>
+                </a:solidFill>
+                <a:latin typeface="Consolas"/>
+              </a:rPr>
+              <a:t>point.x</a:t>
+            </a:r>
+            <a:r>
+              <a:rPr lang="en-US" sz="900" dirty="0">
+                <a:solidFill>
+                  <a:prstClr val="black"/>
+                </a:solidFill>
+                <a:latin typeface="Consolas"/>
+              </a:rPr>
+              <a:t> &amp;&amp; y == </a:t>
+            </a:r>
+            <a:r>
+              <a:rPr lang="en-US" sz="900" dirty="0" err="1">
+                <a:solidFill>
+                  <a:prstClr val="black"/>
+                </a:solidFill>
+                <a:latin typeface="Consolas"/>
+              </a:rPr>
+              <a:t>point.y</a:t>
+            </a:r>
+            <a:r>
+              <a:rPr lang="en-US" sz="900" dirty="0">
+                <a:solidFill>
+                  <a:prstClr val="black"/>
+                </a:solidFill>
+                <a:latin typeface="Consolas"/>
+              </a:rPr>
+              <a:t>);</a:t>
+            </a:r>
+          </a:p>
+          <a:p>
+            <a:r>
+              <a:rPr lang="en-US" sz="900" dirty="0">
+                <a:solidFill>
+                  <a:prstClr val="black"/>
+                </a:solidFill>
+                <a:latin typeface="Consolas"/>
+              </a:rPr>
+              <a:t>    }</a:t>
+            </a:r>
+          </a:p>
+          <a:p>
+            <a:r>
+              <a:rPr lang="en-US" sz="900" dirty="0" smtClean="0">
+                <a:solidFill>
+                  <a:prstClr val="black"/>
+                </a:solidFill>
+                <a:latin typeface="Consolas"/>
+              </a:rPr>
+              <a:t>}</a:t>
+            </a:r>
+            <a:endParaRPr lang="en-US" sz="900" dirty="0">
+              <a:solidFill>
+                <a:prstClr val="black"/>
+              </a:solidFill>
+              <a:latin typeface="Consolas"/>
+            </a:endParaRPr>
+          </a:p>
+          <a:p>
+            <a:r>
+              <a:rPr lang="en-US" sz="900" dirty="0" smtClean="0">
+                <a:solidFill>
+                  <a:prstClr val="black"/>
+                </a:solidFill>
+                <a:latin typeface="Consolas"/>
+              </a:rPr>
+              <a:t>...</a:t>
+            </a:r>
+          </a:p>
+          <a:p>
+            <a:r>
+              <a:rPr lang="en-US" sz="900" dirty="0">
+                <a:solidFill>
+                  <a:srgbClr val="0000FF"/>
+                </a:solidFill>
+                <a:latin typeface="Consolas"/>
+              </a:rPr>
+              <a:t>private</a:t>
+            </a:r>
+            <a:r>
+              <a:rPr lang="en-US" sz="900" dirty="0">
+                <a:solidFill>
+                  <a:prstClr val="black"/>
+                </a:solidFill>
+                <a:latin typeface="Consolas"/>
+              </a:rPr>
+              <a:t> </a:t>
+            </a:r>
+            <a:r>
+              <a:rPr lang="en-US" sz="900" dirty="0">
+                <a:solidFill>
+                  <a:srgbClr val="0000FF"/>
+                </a:solidFill>
+                <a:latin typeface="Consolas"/>
+              </a:rPr>
+              <a:t>static</a:t>
+            </a:r>
+            <a:r>
+              <a:rPr lang="en-US" sz="900" dirty="0">
+                <a:solidFill>
+                  <a:prstClr val="black"/>
+                </a:solidFill>
+                <a:latin typeface="Consolas"/>
+              </a:rPr>
+              <a:t> </a:t>
+            </a:r>
+            <a:r>
+              <a:rPr lang="en-US" sz="900" dirty="0">
+                <a:solidFill>
+                  <a:srgbClr val="0000FF"/>
+                </a:solidFill>
+                <a:latin typeface="Consolas"/>
+              </a:rPr>
+              <a:t>void</a:t>
+            </a:r>
+            <a:r>
+              <a:rPr lang="en-US" sz="900" dirty="0">
+                <a:solidFill>
+                  <a:prstClr val="black"/>
+                </a:solidFill>
+                <a:latin typeface="Consolas"/>
+              </a:rPr>
+              <a:t> Main()</a:t>
+            </a:r>
+          </a:p>
+          <a:p>
+            <a:r>
+              <a:rPr lang="en-US" sz="900" dirty="0">
+                <a:solidFill>
+                  <a:prstClr val="black"/>
+                </a:solidFill>
+                <a:latin typeface="Consolas"/>
+              </a:rPr>
+              <a:t>{</a:t>
+            </a:r>
+          </a:p>
+          <a:p>
+            <a:r>
+              <a:rPr lang="en-US" sz="900" dirty="0">
+                <a:solidFill>
+                  <a:prstClr val="black"/>
+                </a:solidFill>
+                <a:latin typeface="Consolas"/>
+              </a:rPr>
+              <a:t>    </a:t>
+            </a:r>
+            <a:r>
+              <a:rPr lang="en-US" sz="900" dirty="0">
+                <a:solidFill>
+                  <a:srgbClr val="2B91AF"/>
+                </a:solidFill>
+                <a:latin typeface="Consolas"/>
+              </a:rPr>
+              <a:t>Point</a:t>
+            </a:r>
+            <a:r>
+              <a:rPr lang="en-US" sz="900" dirty="0">
+                <a:solidFill>
+                  <a:prstClr val="black"/>
+                </a:solidFill>
+                <a:latin typeface="Consolas"/>
+              </a:rPr>
+              <a:t> p1 = </a:t>
+            </a:r>
+            <a:r>
+              <a:rPr lang="en-US" sz="900" dirty="0">
+                <a:solidFill>
+                  <a:srgbClr val="0000FF"/>
+                </a:solidFill>
+                <a:latin typeface="Consolas"/>
+              </a:rPr>
+              <a:t>new</a:t>
+            </a:r>
+            <a:r>
+              <a:rPr lang="en-US" sz="900" dirty="0">
+                <a:solidFill>
+                  <a:prstClr val="black"/>
+                </a:solidFill>
+                <a:latin typeface="Consolas"/>
+              </a:rPr>
+              <a:t> </a:t>
+            </a:r>
+            <a:r>
+              <a:rPr lang="en-US" sz="900" dirty="0">
+                <a:solidFill>
+                  <a:srgbClr val="2B91AF"/>
+                </a:solidFill>
+                <a:latin typeface="Consolas"/>
+              </a:rPr>
+              <a:t>Point</a:t>
+            </a:r>
+            <a:r>
+              <a:rPr lang="en-US" sz="900" dirty="0">
+                <a:solidFill>
+                  <a:prstClr val="black"/>
+                </a:solidFill>
+                <a:latin typeface="Consolas"/>
+              </a:rPr>
+              <a:t>(1, 2);</a:t>
+            </a:r>
+          </a:p>
+          <a:p>
+            <a:r>
+              <a:rPr lang="en-US" sz="900" dirty="0">
+                <a:solidFill>
+                  <a:prstClr val="black"/>
+                </a:solidFill>
+                <a:latin typeface="Consolas"/>
+              </a:rPr>
+              <a:t>    </a:t>
+            </a:r>
+            <a:r>
+              <a:rPr lang="en-US" sz="900" dirty="0">
+                <a:solidFill>
+                  <a:srgbClr val="2B91AF"/>
+                </a:solidFill>
+                <a:latin typeface="Consolas"/>
+              </a:rPr>
+              <a:t>Point</a:t>
+            </a:r>
+            <a:r>
+              <a:rPr lang="en-US" sz="900" dirty="0">
+                <a:solidFill>
+                  <a:prstClr val="black"/>
+                </a:solidFill>
+                <a:latin typeface="Consolas"/>
+              </a:rPr>
+              <a:t> p2 = </a:t>
+            </a:r>
+            <a:r>
+              <a:rPr lang="en-US" sz="900" dirty="0">
+                <a:solidFill>
+                  <a:srgbClr val="0000FF"/>
+                </a:solidFill>
+                <a:latin typeface="Consolas"/>
+              </a:rPr>
+              <a:t>new</a:t>
+            </a:r>
+            <a:r>
+              <a:rPr lang="en-US" sz="900" dirty="0">
+                <a:solidFill>
+                  <a:prstClr val="black"/>
+                </a:solidFill>
+                <a:latin typeface="Consolas"/>
+              </a:rPr>
+              <a:t> </a:t>
+            </a:r>
+            <a:r>
+              <a:rPr lang="en-US" sz="900" dirty="0">
+                <a:solidFill>
+                  <a:srgbClr val="2B91AF"/>
+                </a:solidFill>
+                <a:latin typeface="Consolas"/>
+              </a:rPr>
+              <a:t>Point</a:t>
+            </a:r>
+            <a:r>
+              <a:rPr lang="en-US" sz="900" dirty="0">
+                <a:solidFill>
+                  <a:prstClr val="black"/>
+                </a:solidFill>
+                <a:latin typeface="Consolas"/>
+              </a:rPr>
+              <a:t>(10, 20);</a:t>
+            </a:r>
+          </a:p>
+          <a:p>
+            <a:r>
+              <a:rPr lang="fr-FR" sz="900" dirty="0">
+                <a:solidFill>
+                  <a:prstClr val="black"/>
+                </a:solidFill>
+                <a:latin typeface="Consolas"/>
+              </a:rPr>
+              <a:t>    </a:t>
+            </a:r>
+            <a:r>
+              <a:rPr lang="fr-FR" sz="900" dirty="0">
+                <a:solidFill>
+                  <a:srgbClr val="2B91AF"/>
+                </a:solidFill>
+                <a:latin typeface="Consolas"/>
+              </a:rPr>
+              <a:t>Point</a:t>
+            </a:r>
+            <a:r>
+              <a:rPr lang="fr-FR" sz="900" dirty="0">
+                <a:solidFill>
+                  <a:prstClr val="black"/>
+                </a:solidFill>
+                <a:latin typeface="Consolas"/>
+              </a:rPr>
+              <a:t> p3 = p1 + p2 + 10;</a:t>
+            </a:r>
+          </a:p>
+          <a:p>
+            <a:r>
+              <a:rPr lang="en-US" sz="900" dirty="0">
+                <a:solidFill>
+                  <a:prstClr val="black"/>
+                </a:solidFill>
+                <a:latin typeface="Consolas"/>
+              </a:rPr>
+              <a:t>    p3.Print();</a:t>
+            </a:r>
+          </a:p>
+          <a:p>
+            <a:r>
+              <a:rPr lang="en-US" sz="900" dirty="0">
+                <a:solidFill>
+                  <a:prstClr val="black"/>
+                </a:solidFill>
+                <a:latin typeface="Consolas"/>
+              </a:rPr>
+              <a:t>    p2 += p1;</a:t>
+            </a:r>
+          </a:p>
+          <a:p>
+            <a:r>
+              <a:rPr lang="en-US" sz="900" dirty="0">
+                <a:solidFill>
+                  <a:prstClr val="black"/>
+                </a:solidFill>
+                <a:latin typeface="Consolas"/>
+              </a:rPr>
+              <a:t>    p2.Print();</a:t>
+            </a:r>
+          </a:p>
+          <a:p>
+            <a:r>
+              <a:rPr lang="en-US" sz="900" dirty="0">
+                <a:solidFill>
+                  <a:prstClr val="black"/>
+                </a:solidFill>
+                <a:latin typeface="Consolas"/>
+              </a:rPr>
+              <a:t>    </a:t>
+            </a:r>
+            <a:r>
+              <a:rPr lang="en-US" sz="900" dirty="0">
+                <a:solidFill>
+                  <a:srgbClr val="0000FF"/>
+                </a:solidFill>
+                <a:latin typeface="Consolas"/>
+              </a:rPr>
+              <a:t>if</a:t>
+            </a:r>
+            <a:r>
+              <a:rPr lang="en-US" sz="900" dirty="0">
+                <a:solidFill>
+                  <a:prstClr val="black"/>
+                </a:solidFill>
+                <a:latin typeface="Consolas"/>
+              </a:rPr>
+              <a:t> (p2 != p3) </a:t>
+            </a:r>
+            <a:r>
+              <a:rPr lang="en-US" sz="900" dirty="0" err="1">
+                <a:solidFill>
+                  <a:srgbClr val="2B91AF"/>
+                </a:solidFill>
+                <a:latin typeface="Consolas"/>
+              </a:rPr>
+              <a:t>Console</a:t>
+            </a:r>
+            <a:r>
+              <a:rPr lang="en-US" sz="900" dirty="0" err="1">
+                <a:solidFill>
+                  <a:prstClr val="black"/>
+                </a:solidFill>
+                <a:latin typeface="Consolas"/>
+              </a:rPr>
+              <a:t>.WriteLine</a:t>
+            </a:r>
+            <a:r>
+              <a:rPr lang="en-US" sz="900" dirty="0">
+                <a:solidFill>
+                  <a:prstClr val="black"/>
+                </a:solidFill>
+                <a:latin typeface="Consolas"/>
+              </a:rPr>
+              <a:t>(</a:t>
+            </a:r>
+            <a:r>
+              <a:rPr lang="en-US" sz="900" dirty="0">
+                <a:solidFill>
+                  <a:srgbClr val="A31515"/>
+                </a:solidFill>
+                <a:latin typeface="Consolas"/>
+              </a:rPr>
+              <a:t>"p2 != p3"</a:t>
+            </a:r>
+            <a:r>
+              <a:rPr lang="en-US" sz="900" dirty="0">
+                <a:solidFill>
+                  <a:prstClr val="black"/>
+                </a:solidFill>
+                <a:latin typeface="Consolas"/>
+              </a:rPr>
+              <a:t>);</a:t>
+            </a:r>
+          </a:p>
+          <a:p>
+            <a:r>
+              <a:rPr lang="en-US" sz="900" dirty="0">
+                <a:solidFill>
+                  <a:prstClr val="black"/>
+                </a:solidFill>
+                <a:latin typeface="Consolas"/>
+              </a:rPr>
+              <a:t>    </a:t>
+            </a:r>
+            <a:r>
+              <a:rPr lang="en-US" sz="900" dirty="0">
+                <a:solidFill>
+                  <a:srgbClr val="0000FF"/>
+                </a:solidFill>
+                <a:latin typeface="Consolas"/>
+              </a:rPr>
+              <a:t>if</a:t>
+            </a:r>
+            <a:r>
+              <a:rPr lang="en-US" sz="900" dirty="0">
+                <a:solidFill>
+                  <a:prstClr val="black"/>
+                </a:solidFill>
+                <a:latin typeface="Consolas"/>
+              </a:rPr>
+              <a:t> (p2 != </a:t>
+            </a:r>
+            <a:r>
+              <a:rPr lang="en-US" sz="900" dirty="0">
+                <a:solidFill>
+                  <a:srgbClr val="0000FF"/>
+                </a:solidFill>
+                <a:latin typeface="Consolas"/>
+              </a:rPr>
+              <a:t>null</a:t>
+            </a:r>
+            <a:r>
+              <a:rPr lang="en-US" sz="900" dirty="0">
+                <a:solidFill>
+                  <a:prstClr val="black"/>
+                </a:solidFill>
+                <a:latin typeface="Consolas"/>
+              </a:rPr>
+              <a:t>) </a:t>
+            </a:r>
+            <a:r>
+              <a:rPr lang="en-US" sz="900" dirty="0" err="1">
+                <a:solidFill>
+                  <a:srgbClr val="2B91AF"/>
+                </a:solidFill>
+                <a:latin typeface="Consolas"/>
+              </a:rPr>
+              <a:t>Console</a:t>
+            </a:r>
+            <a:r>
+              <a:rPr lang="en-US" sz="900" dirty="0" err="1">
+                <a:solidFill>
+                  <a:prstClr val="black"/>
+                </a:solidFill>
+                <a:latin typeface="Consolas"/>
+              </a:rPr>
+              <a:t>.WriteLine</a:t>
+            </a:r>
+            <a:r>
+              <a:rPr lang="en-US" sz="900" dirty="0">
+                <a:solidFill>
+                  <a:prstClr val="black"/>
+                </a:solidFill>
+                <a:latin typeface="Consolas"/>
+              </a:rPr>
+              <a:t>(</a:t>
+            </a:r>
+            <a:r>
+              <a:rPr lang="en-US" sz="900" dirty="0">
+                <a:solidFill>
+                  <a:srgbClr val="A31515"/>
+                </a:solidFill>
+                <a:latin typeface="Consolas"/>
+              </a:rPr>
+              <a:t>"p2 != null"</a:t>
+            </a:r>
+            <a:r>
+              <a:rPr lang="en-US" sz="900" dirty="0">
+                <a:solidFill>
+                  <a:prstClr val="black"/>
+                </a:solidFill>
+                <a:latin typeface="Consolas"/>
+              </a:rPr>
+              <a:t>);</a:t>
+            </a:r>
+          </a:p>
+          <a:p>
+            <a:r>
+              <a:rPr lang="en-US" sz="900" dirty="0">
+                <a:solidFill>
+                  <a:prstClr val="black"/>
+                </a:solidFill>
+                <a:latin typeface="Consolas"/>
+              </a:rPr>
+              <a:t>    p1 = -p1;</a:t>
+            </a:r>
+          </a:p>
+          <a:p>
+            <a:r>
+              <a:rPr lang="en-US" sz="900" dirty="0">
+                <a:solidFill>
+                  <a:prstClr val="black"/>
+                </a:solidFill>
+                <a:latin typeface="Consolas"/>
+              </a:rPr>
+              <a:t>    p1.Print();</a:t>
+            </a:r>
+          </a:p>
+          <a:p>
+            <a:r>
+              <a:rPr lang="en-US" sz="900" dirty="0" smtClean="0">
+                <a:solidFill>
+                  <a:prstClr val="black"/>
+                </a:solidFill>
+                <a:latin typeface="Consolas"/>
+              </a:rPr>
+              <a:t>}</a:t>
             </a:r>
             <a:endParaRPr lang="be-BY" sz="900" dirty="0">
               <a:solidFill>

</xml_diff>

<commit_message>
Updated info on how to implement equality
</commit_message>
<xml_diff>
--- a/Presentation/lesson-02-oop.pptx
+++ b/Presentation/lesson-02-oop.pptx
@@ -15623,7 +15623,7 @@
         <p:spPr bwMode="auto">
           <a:xfrm>
             <a:off x="152400" y="533400"/>
-            <a:ext cx="8839200" cy="2308324"/>
+            <a:ext cx="8839200" cy="2862322"/>
           </a:xfrm>
           <a:prstGeom prst="rect">
             <a:avLst/>
@@ -15683,7 +15683,25 @@
                 </a:solidFill>
                 <a:cs typeface="Courier New" pitchFamily="49" charset="0"/>
               </a:rPr>
-              <a:t>это механизм обеспечения поддержки операций со своим типом с помощью встроенных операторов. При реализации каждого оператора важно не нарушать их семантику. Так, например, операция сложения должна быть коммутативной (от перемены мест слагаемых сумма не меняется). Наша реализация сложения также должна быть коммутативна. Иначе в поведение программы может стать плохо предсказуемым.</a:t>
+              <a:t>это механизм обеспечения поддержки операций со своим типом с помощью встроенных операторов. При реализации каждого оператора важно не нарушать их семантику. Так, например, операция сложения должна быть коммутативной (от перемены мест слагаемых сумма не меняется). Наша реализация сложения также должна быть коммутативна. Иначе </a:t>
+            </a:r>
+            <a:r>
+              <a:rPr lang="ru-RU" b="1" dirty="0" smtClean="0">
+                <a:solidFill>
+                  <a:schemeClr val="bg1"/>
+                </a:solidFill>
+                <a:cs typeface="Courier New" pitchFamily="49" charset="0"/>
+              </a:rPr>
+              <a:t> </a:t>
+            </a:r>
+            <a:r>
+              <a:rPr lang="ru-RU" b="1" dirty="0" smtClean="0">
+                <a:solidFill>
+                  <a:schemeClr val="bg1"/>
+                </a:solidFill>
+                <a:cs typeface="Courier New" pitchFamily="49" charset="0"/>
+              </a:rPr>
+              <a:t>поведение программы может стать плохо предсказуемым.</a:t>
             </a:r>
             <a:endParaRPr lang="en-US" b="1" dirty="0" smtClean="0">
               <a:solidFill>
@@ -15708,7 +15726,115 @@
                 </a:solidFill>
                 <a:cs typeface="Courier New" pitchFamily="49" charset="0"/>
               </a:rPr>
-              <a:t>Если вы реализуете операторы равно (==) и неравно (!=) обязаны определяться</a:t>
+              <a:t>Если вы </a:t>
+            </a:r>
+            <a:r>
+              <a:rPr lang="ru-RU" b="1" dirty="0" smtClean="0">
+                <a:solidFill>
+                  <a:schemeClr val="bg1"/>
+                </a:solidFill>
+                <a:cs typeface="Courier New" pitchFamily="49" charset="0"/>
+              </a:rPr>
+              <a:t>перегружаете </a:t>
+            </a:r>
+            <a:r>
+              <a:rPr lang="ru-RU" b="1" dirty="0" smtClean="0">
+                <a:solidFill>
+                  <a:schemeClr val="bg1"/>
+                </a:solidFill>
+                <a:cs typeface="Courier New" pitchFamily="49" charset="0"/>
+              </a:rPr>
+              <a:t>операторы равно (==) и неравно </a:t>
+            </a:r>
+            <a:r>
+              <a:rPr lang="ru-RU" b="1" dirty="0" smtClean="0">
+                <a:solidFill>
+                  <a:schemeClr val="bg1"/>
+                </a:solidFill>
+                <a:cs typeface="Courier New" pitchFamily="49" charset="0"/>
+              </a:rPr>
+              <a:t>(!=)</a:t>
+            </a:r>
+            <a:r>
+              <a:rPr lang="en-US" b="1" dirty="0" smtClean="0">
+                <a:solidFill>
+                  <a:schemeClr val="bg1"/>
+                </a:solidFill>
+                <a:cs typeface="Courier New" pitchFamily="49" charset="0"/>
+              </a:rPr>
+              <a:t>, </a:t>
+            </a:r>
+            <a:r>
+              <a:rPr lang="ru-RU" b="1" dirty="0" smtClean="0">
+                <a:solidFill>
+                  <a:schemeClr val="bg1"/>
+                </a:solidFill>
+                <a:cs typeface="Courier New" pitchFamily="49" charset="0"/>
+              </a:rPr>
+              <a:t>то рекомендуется также перегрузить метод </a:t>
+            </a:r>
+            <a:r>
+              <a:rPr lang="en-US" b="1" dirty="0" err="1" smtClean="0">
+                <a:solidFill>
+                  <a:schemeClr val="bg1"/>
+                </a:solidFill>
+                <a:cs typeface="Courier New" pitchFamily="49" charset="0"/>
+              </a:rPr>
+              <a:t>bool</a:t>
+            </a:r>
+            <a:r>
+              <a:rPr lang="en-US" b="1" dirty="0" smtClean="0">
+                <a:solidFill>
+                  <a:schemeClr val="bg1"/>
+                </a:solidFill>
+                <a:cs typeface="Courier New" pitchFamily="49" charset="0"/>
+              </a:rPr>
+              <a:t> Equals(object </a:t>
+            </a:r>
+            <a:r>
+              <a:rPr lang="en-US" b="1" dirty="0" err="1" smtClean="0">
+                <a:solidFill>
+                  <a:schemeClr val="bg1"/>
+                </a:solidFill>
+                <a:cs typeface="Courier New" pitchFamily="49" charset="0"/>
+              </a:rPr>
+              <a:t>obj</a:t>
+            </a:r>
+            <a:r>
+              <a:rPr lang="en-US" b="1" dirty="0" smtClean="0">
+                <a:solidFill>
+                  <a:schemeClr val="bg1"/>
+                </a:solidFill>
+                <a:cs typeface="Courier New" pitchFamily="49" charset="0"/>
+              </a:rPr>
+              <a:t>). </a:t>
+            </a:r>
+            <a:r>
+              <a:rPr lang="ru-RU" b="1" dirty="0" smtClean="0">
+                <a:solidFill>
+                  <a:schemeClr val="bg1"/>
+                </a:solidFill>
+                <a:cs typeface="Courier New" pitchFamily="49" charset="0"/>
+              </a:rPr>
+              <a:t>Не забудьте убедиться что ваши методы позволяют выполнять сравнение с </a:t>
+            </a:r>
+            <a:r>
+              <a:rPr lang="en-US" b="1" dirty="0" smtClean="0">
+                <a:solidFill>
+                  <a:schemeClr val="bg1"/>
+                </a:solidFill>
+                <a:cs typeface="Courier New" pitchFamily="49" charset="0"/>
+              </a:rPr>
+              <a:t>null </a:t>
+            </a:r>
+            <a:r>
+              <a:rPr lang="ru-RU" b="1" dirty="0" smtClean="0">
+                <a:solidFill>
+                  <a:schemeClr val="bg1"/>
+                </a:solidFill>
+                <a:cs typeface="Courier New" pitchFamily="49" charset="0"/>
+              </a:rPr>
+              <a:t>значениями.</a:t>
             </a:r>
             <a:endParaRPr lang="ru-RU" b="1" dirty="0">
               <a:solidFill>

</xml_diff>

<commit_message>
Interfaces vs Abstract classes
</commit_message>
<xml_diff>
--- a/Presentation/lesson-02-oop.pptx
+++ b/Presentation/lesson-02-oop.pptx
@@ -34,17 +34,18 @@
     <p:sldId id="271" r:id="rId28"/>
     <p:sldId id="272" r:id="rId29"/>
     <p:sldId id="298" r:id="rId30"/>
-    <p:sldId id="273" r:id="rId31"/>
-    <p:sldId id="274" r:id="rId32"/>
-    <p:sldId id="276" r:id="rId33"/>
-    <p:sldId id="286" r:id="rId34"/>
-    <p:sldId id="277" r:id="rId35"/>
-    <p:sldId id="287" r:id="rId36"/>
-    <p:sldId id="278" r:id="rId37"/>
-    <p:sldId id="282" r:id="rId38"/>
-    <p:sldId id="285" r:id="rId39"/>
-    <p:sldId id="281" r:id="rId40"/>
-    <p:sldId id="279" r:id="rId41"/>
+    <p:sldId id="299" r:id="rId31"/>
+    <p:sldId id="273" r:id="rId32"/>
+    <p:sldId id="274" r:id="rId33"/>
+    <p:sldId id="276" r:id="rId34"/>
+    <p:sldId id="286" r:id="rId35"/>
+    <p:sldId id="277" r:id="rId36"/>
+    <p:sldId id="287" r:id="rId37"/>
+    <p:sldId id="278" r:id="rId38"/>
+    <p:sldId id="282" r:id="rId39"/>
+    <p:sldId id="285" r:id="rId40"/>
+    <p:sldId id="281" r:id="rId41"/>
+    <p:sldId id="279" r:id="rId42"/>
   </p:sldIdLst>
   <p:sldSz cx="9144000" cy="6858000" type="screen4x3"/>
   <p:notesSz cx="6858000" cy="9144000"/>
@@ -328,7 +329,7 @@
             <a:fld id="{8E6E6A2A-E9D3-4A0D-B04A-ABDD367A1E08}" type="datetimeFigureOut">
               <a:rPr lang="ru-RU" smtClean="0"/>
               <a:pPr/>
-              <a:t>22.04.2014</a:t>
+              <a:t>20.05.2014</a:t>
             </a:fld>
             <a:endParaRPr lang="ru-RU" dirty="0"/>
           </a:p>
@@ -500,7 +501,7 @@
             <a:fld id="{8E6E6A2A-E9D3-4A0D-B04A-ABDD367A1E08}" type="datetimeFigureOut">
               <a:rPr lang="ru-RU" smtClean="0"/>
               <a:pPr/>
-              <a:t>22.04.2014</a:t>
+              <a:t>20.05.2014</a:t>
             </a:fld>
             <a:endParaRPr lang="ru-RU" dirty="0"/>
           </a:p>
@@ -682,7 +683,7 @@
             <a:fld id="{8E6E6A2A-E9D3-4A0D-B04A-ABDD367A1E08}" type="datetimeFigureOut">
               <a:rPr lang="ru-RU" smtClean="0"/>
               <a:pPr/>
-              <a:t>22.04.2014</a:t>
+              <a:t>20.05.2014</a:t>
             </a:fld>
             <a:endParaRPr lang="ru-RU" dirty="0"/>
           </a:p>
@@ -932,7 +933,7 @@
                 </a:solidFill>
               </a:rPr>
               <a:pPr/>
-              <a:t>22.04.2014</a:t>
+              <a:t>20.05.2014</a:t>
             </a:fld>
             <a:endParaRPr lang="ru-RU" dirty="0">
               <a:solidFill>
@@ -1134,7 +1135,7 @@
                 </a:solidFill>
               </a:rPr>
               <a:pPr/>
-              <a:t>22.04.2014</a:t>
+              <a:t>20.05.2014</a:t>
             </a:fld>
             <a:endParaRPr lang="ru-RU" dirty="0">
               <a:solidFill>
@@ -1412,7 +1413,7 @@
                 </a:solidFill>
               </a:rPr>
               <a:pPr/>
-              <a:t>22.04.2014</a:t>
+              <a:t>20.05.2014</a:t>
             </a:fld>
             <a:endParaRPr lang="ru-RU" dirty="0">
               <a:solidFill>
@@ -1732,7 +1733,7 @@
                 </a:solidFill>
               </a:rPr>
               <a:pPr/>
-              <a:t>22.04.2014</a:t>
+              <a:t>20.05.2014</a:t>
             </a:fld>
             <a:endParaRPr lang="ru-RU" dirty="0">
               <a:solidFill>
@@ -2186,7 +2187,7 @@
                 </a:solidFill>
               </a:rPr>
               <a:pPr/>
-              <a:t>22.04.2014</a:t>
+              <a:t>20.05.2014</a:t>
             </a:fld>
             <a:endParaRPr lang="ru-RU" dirty="0">
               <a:solidFill>
@@ -2336,7 +2337,7 @@
                 </a:solidFill>
               </a:rPr>
               <a:pPr/>
-              <a:t>22.04.2014</a:t>
+              <a:t>20.05.2014</a:t>
             </a:fld>
             <a:endParaRPr lang="ru-RU" dirty="0">
               <a:solidFill>
@@ -2463,7 +2464,7 @@
                 </a:solidFill>
               </a:rPr>
               <a:pPr/>
-              <a:t>22.04.2014</a:t>
+              <a:t>20.05.2014</a:t>
             </a:fld>
             <a:endParaRPr lang="ru-RU" dirty="0">
               <a:solidFill>
@@ -2772,7 +2773,7 @@
                 </a:solidFill>
               </a:rPr>
               <a:pPr/>
-              <a:t>22.04.2014</a:t>
+              <a:t>20.05.2014</a:t>
             </a:fld>
             <a:endParaRPr lang="ru-RU" dirty="0">
               <a:solidFill>
@@ -2968,7 +2969,7 @@
             <a:fld id="{8E6E6A2A-E9D3-4A0D-B04A-ABDD367A1E08}" type="datetimeFigureOut">
               <a:rPr lang="ru-RU" smtClean="0"/>
               <a:pPr/>
-              <a:t>22.04.2014</a:t>
+              <a:t>20.05.2014</a:t>
             </a:fld>
             <a:endParaRPr lang="ru-RU" dirty="0"/>
           </a:p>
@@ -3229,7 +3230,7 @@
                 </a:solidFill>
               </a:rPr>
               <a:pPr/>
-              <a:t>22.04.2014</a:t>
+              <a:t>20.05.2014</a:t>
             </a:fld>
             <a:endParaRPr lang="ru-RU" dirty="0">
               <a:solidFill>
@@ -3431,7 +3432,7 @@
                 </a:solidFill>
               </a:rPr>
               <a:pPr/>
-              <a:t>22.04.2014</a:t>
+              <a:t>20.05.2014</a:t>
             </a:fld>
             <a:endParaRPr lang="ru-RU" dirty="0">
               <a:solidFill>
@@ -3643,7 +3644,7 @@
                 </a:solidFill>
               </a:rPr>
               <a:pPr/>
-              <a:t>22.04.2014</a:t>
+              <a:t>20.05.2014</a:t>
             </a:fld>
             <a:endParaRPr lang="ru-RU" dirty="0">
               <a:solidFill>
@@ -5100,7 +5101,7 @@
             <a:fld id="{8E6E6A2A-E9D3-4A0D-B04A-ABDD367A1E08}" type="datetimeFigureOut">
               <a:rPr lang="ru-RU" smtClean="0"/>
               <a:pPr/>
-              <a:t>22.04.2014</a:t>
+              <a:t>20.05.2014</a:t>
             </a:fld>
             <a:endParaRPr lang="ru-RU" dirty="0"/>
           </a:p>
@@ -6004,7 +6005,7 @@
                 </a:solidFill>
               </a:rPr>
               <a:pPr/>
-              <a:t>22.04.2014</a:t>
+              <a:t>20.05.2014</a:t>
             </a:fld>
             <a:endParaRPr lang="ru-RU" dirty="0">
               <a:solidFill>
@@ -6278,7 +6279,7 @@
                 </a:solidFill>
               </a:rPr>
               <a:pPr/>
-              <a:t>22.04.2014</a:t>
+              <a:t>20.05.2014</a:t>
             </a:fld>
             <a:endParaRPr lang="ru-RU" dirty="0">
               <a:solidFill>
@@ -6480,7 +6481,7 @@
                 </a:solidFill>
               </a:rPr>
               <a:pPr/>
-              <a:t>22.04.2014</a:t>
+              <a:t>20.05.2014</a:t>
             </a:fld>
             <a:endParaRPr lang="ru-RU" dirty="0">
               <a:solidFill>
@@ -6758,7 +6759,7 @@
                 </a:solidFill>
               </a:rPr>
               <a:pPr/>
-              <a:t>22.04.2014</a:t>
+              <a:t>20.05.2014</a:t>
             </a:fld>
             <a:endParaRPr lang="ru-RU" dirty="0">
               <a:solidFill>
@@ -7078,7 +7079,7 @@
                 </a:solidFill>
               </a:rPr>
               <a:pPr/>
-              <a:t>22.04.2014</a:t>
+              <a:t>20.05.2014</a:t>
             </a:fld>
             <a:endParaRPr lang="ru-RU" dirty="0">
               <a:solidFill>
@@ -7392,7 +7393,7 @@
             <a:fld id="{8E6E6A2A-E9D3-4A0D-B04A-ABDD367A1E08}" type="datetimeFigureOut">
               <a:rPr lang="ru-RU" smtClean="0"/>
               <a:pPr/>
-              <a:t>22.04.2014</a:t>
+              <a:t>20.05.2014</a:t>
             </a:fld>
             <a:endParaRPr lang="ru-RU" dirty="0"/>
           </a:p>
@@ -7822,7 +7823,7 @@
                 </a:solidFill>
               </a:rPr>
               <a:pPr/>
-              <a:t>22.04.2014</a:t>
+              <a:t>20.05.2014</a:t>
             </a:fld>
             <a:endParaRPr lang="ru-RU" dirty="0">
               <a:solidFill>
@@ -7972,7 +7973,7 @@
                 </a:solidFill>
               </a:rPr>
               <a:pPr/>
-              <a:t>22.04.2014</a:t>
+              <a:t>20.05.2014</a:t>
             </a:fld>
             <a:endParaRPr lang="ru-RU" dirty="0">
               <a:solidFill>
@@ -8099,7 +8100,7 @@
                 </a:solidFill>
               </a:rPr>
               <a:pPr/>
-              <a:t>22.04.2014</a:t>
+              <a:t>20.05.2014</a:t>
             </a:fld>
             <a:endParaRPr lang="ru-RU" dirty="0">
               <a:solidFill>
@@ -8408,7 +8409,7 @@
                 </a:solidFill>
               </a:rPr>
               <a:pPr/>
-              <a:t>22.04.2014</a:t>
+              <a:t>20.05.2014</a:t>
             </a:fld>
             <a:endParaRPr lang="ru-RU" dirty="0">
               <a:solidFill>
@@ -8693,7 +8694,7 @@
                 </a:solidFill>
               </a:rPr>
               <a:pPr/>
-              <a:t>22.04.2014</a:t>
+              <a:t>20.05.2014</a:t>
             </a:fld>
             <a:endParaRPr lang="ru-RU" dirty="0">
               <a:solidFill>
@@ -8895,7 +8896,7 @@
                 </a:solidFill>
               </a:rPr>
               <a:pPr/>
-              <a:t>22.04.2014</a:t>
+              <a:t>20.05.2014</a:t>
             </a:fld>
             <a:endParaRPr lang="ru-RU" dirty="0">
               <a:solidFill>
@@ -9107,7 +9108,7 @@
                 </a:solidFill>
               </a:rPr>
               <a:pPr/>
-              <a:t>22.04.2014</a:t>
+              <a:t>20.05.2014</a:t>
             </a:fld>
             <a:endParaRPr lang="ru-RU" dirty="0">
               <a:solidFill>
@@ -9555,7 +9556,7 @@
             <a:fld id="{8E6E6A2A-E9D3-4A0D-B04A-ABDD367A1E08}" type="datetimeFigureOut">
               <a:rPr lang="ru-RU" smtClean="0"/>
               <a:pPr/>
-              <a:t>22.04.2014</a:t>
+              <a:t>20.05.2014</a:t>
             </a:fld>
             <a:endParaRPr lang="ru-RU" dirty="0"/>
           </a:p>
@@ -9675,7 +9676,7 @@
             <a:fld id="{8E6E6A2A-E9D3-4A0D-B04A-ABDD367A1E08}" type="datetimeFigureOut">
               <a:rPr lang="ru-RU" smtClean="0"/>
               <a:pPr/>
-              <a:t>22.04.2014</a:t>
+              <a:t>20.05.2014</a:t>
             </a:fld>
             <a:endParaRPr lang="ru-RU" dirty="0"/>
           </a:p>
@@ -9772,7 +9773,7 @@
             <a:fld id="{8E6E6A2A-E9D3-4A0D-B04A-ABDD367A1E08}" type="datetimeFigureOut">
               <a:rPr lang="ru-RU" smtClean="0"/>
               <a:pPr/>
-              <a:t>22.04.2014</a:t>
+              <a:t>20.05.2014</a:t>
             </a:fld>
             <a:endParaRPr lang="ru-RU" dirty="0"/>
           </a:p>
@@ -10051,7 +10052,7 @@
             <a:fld id="{8E6E6A2A-E9D3-4A0D-B04A-ABDD367A1E08}" type="datetimeFigureOut">
               <a:rPr lang="ru-RU" smtClean="0"/>
               <a:pPr/>
-              <a:t>22.04.2014</a:t>
+              <a:t>20.05.2014</a:t>
             </a:fld>
             <a:endParaRPr lang="ru-RU" dirty="0"/>
           </a:p>
@@ -10306,7 +10307,7 @@
             <a:fld id="{8E6E6A2A-E9D3-4A0D-B04A-ABDD367A1E08}" type="datetimeFigureOut">
               <a:rPr lang="ru-RU" smtClean="0"/>
               <a:pPr/>
-              <a:t>22.04.2014</a:t>
+              <a:t>20.05.2014</a:t>
             </a:fld>
             <a:endParaRPr lang="ru-RU" dirty="0"/>
           </a:p>
@@ -10521,7 +10522,7 @@
             <a:fld id="{8E6E6A2A-E9D3-4A0D-B04A-ABDD367A1E08}" type="datetimeFigureOut">
               <a:rPr lang="ru-RU" smtClean="0"/>
               <a:pPr/>
-              <a:t>22.04.2014</a:t>
+              <a:t>20.05.2014</a:t>
             </a:fld>
             <a:endParaRPr lang="ru-RU" dirty="0"/>
           </a:p>
@@ -11039,7 +11040,7 @@
                 </a:solidFill>
               </a:rPr>
               <a:pPr/>
-              <a:t>22.04.2014</a:t>
+              <a:t>20.05.2014</a:t>
             </a:fld>
             <a:endParaRPr lang="ru-RU" dirty="0">
               <a:solidFill>
@@ -11590,7 +11591,7 @@
                 </a:solidFill>
               </a:rPr>
               <a:pPr/>
-              <a:t>22.04.2014</a:t>
+              <a:t>20.05.2014</a:t>
             </a:fld>
             <a:endParaRPr lang="ru-RU" dirty="0">
               <a:solidFill>
@@ -12134,7 +12135,7 @@
                 </a:solidFill>
               </a:rPr>
               <a:pPr/>
-              <a:t>22.04.2014</a:t>
+              <a:t>20.05.2014</a:t>
             </a:fld>
             <a:endParaRPr lang="ru-RU" dirty="0">
               <a:solidFill>
@@ -26151,8 +26152,8 @@
         </p:nvSpPr>
         <p:spPr bwMode="auto">
           <a:xfrm>
-            <a:off x="1905000" y="1295400"/>
-            <a:ext cx="4953000" cy="1816100"/>
+            <a:off x="1905000" y="1403231"/>
+            <a:ext cx="4953000" cy="1600438"/>
           </a:xfrm>
           <a:prstGeom prst="rect">
             <a:avLst/>
@@ -26244,53 +26245,6 @@
               <a:ea typeface="Times New Roman" pitchFamily="18" charset="0"/>
               <a:cs typeface="Consolas" pitchFamily="49" charset="0"/>
             </a:endParaRPr>
-          </a:p>
-          <a:p>
-            <a:pPr algn="just" eaLnBrk="0" hangingPunct="0"/>
-            <a:r>
-              <a:rPr lang="ru-RU" sz="1400" dirty="0">
-                <a:solidFill>
-                  <a:schemeClr val="bg1"/>
-                </a:solidFill>
-                <a:latin typeface="Consolas" pitchFamily="49" charset="0"/>
-                <a:ea typeface="Times New Roman" pitchFamily="18" charset="0"/>
-                <a:cs typeface="Consolas" pitchFamily="49" charset="0"/>
-              </a:rPr>
-              <a:t>    </a:t>
-            </a:r>
-            <a:r>
-              <a:rPr lang="en-US" sz="1400" dirty="0">
-                <a:solidFill>
-                  <a:schemeClr val="bg1"/>
-                </a:solidFill>
-                <a:latin typeface="Consolas" pitchFamily="49" charset="0"/>
-                <a:ea typeface="Times New Roman" pitchFamily="18" charset="0"/>
-                <a:cs typeface="Consolas" pitchFamily="49" charset="0"/>
-              </a:rPr>
-              <a:t>&lt;</a:t>
-            </a:r>
-            <a:r>
-              <a:rPr lang="ru-RU" sz="1400" dirty="0">
-                <a:solidFill>
-                  <a:schemeClr val="bg1"/>
-                </a:solidFill>
-                <a:latin typeface="Consolas" pitchFamily="49" charset="0"/>
-                <a:ea typeface="Times New Roman" pitchFamily="18" charset="0"/>
-                <a:cs typeface="Consolas" pitchFamily="49" charset="0"/>
-              </a:rPr>
-              <a:t>Функционал интерфейса</a:t>
-            </a:r>
-            <a:r>
-              <a:rPr lang="en-US" sz="1400" dirty="0">
-                <a:solidFill>
-                  <a:schemeClr val="bg1"/>
-                </a:solidFill>
-                <a:latin typeface="Consolas" pitchFamily="49" charset="0"/>
-                <a:ea typeface="Times New Roman" pitchFamily="18" charset="0"/>
-                <a:cs typeface="Consolas" pitchFamily="49" charset="0"/>
-              </a:rPr>
-              <a:t>:&gt;</a:t>
-            </a:r>
           </a:p>
           <a:p>
             <a:pPr algn="just" eaLnBrk="0" hangingPunct="0"/>
@@ -27751,7 +27705,7 @@
           <p:nvPr>
             <p:extLst>
               <p:ext uri="{D42A27DB-BD31-4B8C-83A1-F6EECF244321}">
-                <p14:modId xmlns:p14="http://schemas.microsoft.com/office/powerpoint/2010/main" val="1364860172"/>
+                <p14:modId xmlns:p14="http://schemas.microsoft.com/office/powerpoint/2010/main" val="1725291825"/>
               </p:ext>
             </p:extLst>
           </p:nvPr>
@@ -27857,7 +27811,7 @@
                     <a:p>
                       <a:pPr algn="l"/>
                       <a:r>
-                        <a:rPr lang="ru-RU" sz="1600" dirty="0" smtClean="0">
+                        <a:rPr lang="ru-RU" sz="1600" b="1" dirty="0" smtClean="0">
                           <a:solidFill>
                             <a:schemeClr val="accent1">
                               <a:lumMod val="75000"/>
@@ -27866,7 +27820,7 @@
                         </a:rPr>
                         <a:t>Название</a:t>
                       </a:r>
-                      <a:endParaRPr lang="en-US" sz="1600" dirty="0">
+                      <a:endParaRPr lang="en-US" sz="1600" b="1" dirty="0">
                         <a:solidFill>
                           <a:schemeClr val="accent1">
                             <a:lumMod val="75000"/>
@@ -27930,7 +27884,7 @@
                     <a:p>
                       <a:pPr algn="l"/>
                       <a:r>
-                        <a:rPr lang="ru-RU" sz="1600" dirty="0" smtClean="0">
+                        <a:rPr lang="ru-RU" sz="1600" b="1" dirty="0" smtClean="0">
                           <a:solidFill>
                             <a:schemeClr val="accent1">
                               <a:lumMod val="75000"/>
@@ -27939,7 +27893,7 @@
                         </a:rPr>
                         <a:t>Назначение</a:t>
                       </a:r>
-                      <a:endParaRPr lang="en-US" sz="1600" dirty="0">
+                      <a:endParaRPr lang="en-US" sz="1600" b="1" dirty="0">
                         <a:solidFill>
                           <a:schemeClr val="accent1">
                             <a:lumMod val="75000"/>
@@ -29773,6 +29727,1131 @@
     <p:bg>
       <p:bgPr>
         <a:blipFill dpi="0" rotWithShape="1">
+          <a:blip r:embed="rId2">
+            <a:lum/>
+          </a:blip>
+          <a:srcRect/>
+          <a:stretch>
+            <a:fillRect/>
+          </a:stretch>
+        </a:blipFill>
+        <a:effectLst/>
+      </p:bgPr>
+    </p:bg>
+    <p:spTree>
+      <p:nvGrpSpPr>
+        <p:cNvPr id="1" name=""/>
+        <p:cNvGrpSpPr/>
+        <p:nvPr/>
+      </p:nvGrpSpPr>
+      <p:grpSpPr>
+        <a:xfrm>
+          <a:off x="0" y="0"/>
+          <a:ext cx="0" cy="0"/>
+          <a:chOff x="0" y="0"/>
+          <a:chExt cx="0" cy="0"/>
+        </a:xfrm>
+      </p:grpSpPr>
+      <p:sp>
+        <p:nvSpPr>
+          <p:cNvPr id="2" name="Title 1"/>
+          <p:cNvSpPr>
+            <a:spLocks noGrp="1"/>
+          </p:cNvSpPr>
+          <p:nvPr>
+            <p:ph type="title"/>
+          </p:nvPr>
+        </p:nvSpPr>
+        <p:spPr>
+          <a:xfrm>
+            <a:off x="457200" y="274638"/>
+            <a:ext cx="8229600" cy="1143000"/>
+          </a:xfrm>
+        </p:spPr>
+        <p:txBody>
+          <a:bodyPr>
+            <a:normAutofit fontScale="90000"/>
+          </a:bodyPr>
+          <a:lstStyle/>
+          <a:p>
+            <a:r>
+              <a:rPr lang="ru-RU" dirty="0" smtClean="0">
+                <a:solidFill>
+                  <a:schemeClr val="bg1"/>
+                </a:solidFill>
+              </a:rPr>
+              <a:t>Интерфейсы </a:t>
+            </a:r>
+            <a:r>
+              <a:rPr lang="en-US" dirty="0" smtClean="0">
+                <a:solidFill>
+                  <a:schemeClr val="bg1"/>
+                </a:solidFill>
+              </a:rPr>
+              <a:t>vs </a:t>
+            </a:r>
+            <a:r>
+              <a:rPr lang="ru-RU" dirty="0" smtClean="0">
+                <a:solidFill>
+                  <a:schemeClr val="bg1"/>
+                </a:solidFill>
+              </a:rPr>
+              <a:t>Абстрактные классы</a:t>
+            </a:r>
+            <a:endParaRPr lang="ru-RU" dirty="0">
+              <a:solidFill>
+                <a:schemeClr val="bg1"/>
+              </a:solidFill>
+            </a:endParaRPr>
+          </a:p>
+        </p:txBody>
+      </p:sp>
+      <p:graphicFrame>
+        <p:nvGraphicFramePr>
+          <p:cNvPr id="4" name="Table 3"/>
+          <p:cNvGraphicFramePr>
+            <a:graphicFrameLocks noGrp="1"/>
+          </p:cNvGraphicFramePr>
+          <p:nvPr>
+            <p:extLst>
+              <p:ext uri="{D42A27DB-BD31-4B8C-83A1-F6EECF244321}">
+                <p14:modId xmlns:p14="http://schemas.microsoft.com/office/powerpoint/2010/main" val="2124991797"/>
+              </p:ext>
+            </p:extLst>
+          </p:nvPr>
+        </p:nvGraphicFramePr>
+        <p:xfrm>
+          <a:off x="572970" y="1472018"/>
+          <a:ext cx="7700910" cy="4404322"/>
+        </p:xfrm>
+        <a:graphic>
+          <a:graphicData uri="http://schemas.openxmlformats.org/drawingml/2006/table">
+            <a:tbl>
+              <a:tblPr/>
+              <a:tblGrid>
+                <a:gridCol w="2630878"/>
+                <a:gridCol w="1584176"/>
+                <a:gridCol w="3485856"/>
+              </a:tblGrid>
+              <a:tr h="320018">
+                <a:tc>
+                  <a:txBody>
+                    <a:bodyPr/>
+                    <a:lstStyle/>
+                    <a:p>
+                      <a:pPr algn="l"/>
+                      <a:endParaRPr lang="en-US" sz="1600" b="1" dirty="0">
+                        <a:solidFill>
+                          <a:schemeClr val="accent1">
+                            <a:lumMod val="75000"/>
+                          </a:schemeClr>
+                        </a:solidFill>
+                      </a:endParaRPr>
+                    </a:p>
+                  </a:txBody>
+                  <a:tcPr marL="45717" marR="45717" marT="22858" marB="22858" anchor="ctr">
+                    <a:lnL w="12700" cap="flat" cmpd="sng" algn="ctr">
+                      <a:solidFill>
+                        <a:schemeClr val="bg1"/>
+                      </a:solidFill>
+                      <a:prstDash val="solid"/>
+                      <a:round/>
+                      <a:headEnd type="none" w="med" len="med"/>
+                      <a:tailEnd type="none" w="med" len="med"/>
+                    </a:lnL>
+                    <a:lnR w="12700" cap="flat" cmpd="sng" algn="ctr">
+                      <a:solidFill>
+                        <a:schemeClr val="accent1">
+                          <a:lumMod val="60000"/>
+                          <a:lumOff val="40000"/>
+                        </a:schemeClr>
+                      </a:solidFill>
+                      <a:prstDash val="solid"/>
+                      <a:round/>
+                      <a:headEnd type="none" w="med" len="med"/>
+                      <a:tailEnd type="none" w="med" len="med"/>
+                    </a:lnR>
+                    <a:lnT w="12700" cap="flat" cmpd="sng" algn="ctr">
+                      <a:solidFill>
+                        <a:schemeClr val="bg1"/>
+                      </a:solidFill>
+                      <a:prstDash val="solid"/>
+                      <a:round/>
+                      <a:headEnd type="none" w="med" len="med"/>
+                      <a:tailEnd type="none" w="med" len="med"/>
+                    </a:lnT>
+                    <a:lnB w="12700" cap="flat" cmpd="sng" algn="ctr">
+                      <a:solidFill>
+                        <a:schemeClr val="bg1"/>
+                      </a:solidFill>
+                      <a:prstDash val="solid"/>
+                      <a:round/>
+                      <a:headEnd type="none" w="med" len="med"/>
+                      <a:tailEnd type="none" w="med" len="med"/>
+                    </a:lnB>
+                    <a:solidFill>
+                      <a:schemeClr val="bg1"/>
+                    </a:solidFill>
+                  </a:tcPr>
+                </a:tc>
+                <a:tc>
+                  <a:txBody>
+                    <a:bodyPr/>
+                    <a:lstStyle/>
+                    <a:p>
+                      <a:pPr algn="l"/>
+                      <a:r>
+                        <a:rPr lang="ru-RU" sz="1600" dirty="0" smtClean="0">
+                          <a:solidFill>
+                            <a:schemeClr val="accent1">
+                              <a:lumMod val="75000"/>
+                            </a:schemeClr>
+                          </a:solidFill>
+                        </a:rPr>
+                        <a:t>Интерфейсы</a:t>
+                      </a:r>
+                      <a:endParaRPr lang="en-US" sz="1600" dirty="0">
+                        <a:solidFill>
+                          <a:schemeClr val="accent1">
+                            <a:lumMod val="75000"/>
+                          </a:schemeClr>
+                        </a:solidFill>
+                      </a:endParaRPr>
+                    </a:p>
+                  </a:txBody>
+                  <a:tcPr marL="45717" marR="45717" marT="22858" marB="22858" anchor="ctr">
+                    <a:lnL w="12700" cap="flat" cmpd="sng" algn="ctr">
+                      <a:solidFill>
+                        <a:schemeClr val="accent1">
+                          <a:lumMod val="60000"/>
+                          <a:lumOff val="40000"/>
+                        </a:schemeClr>
+                      </a:solidFill>
+                      <a:prstDash val="solid"/>
+                      <a:round/>
+                      <a:headEnd type="none" w="med" len="med"/>
+                      <a:tailEnd type="none" w="med" len="med"/>
+                    </a:lnL>
+                    <a:lnR w="12700" cap="flat" cmpd="sng" algn="ctr">
+                      <a:solidFill>
+                        <a:schemeClr val="accent1">
+                          <a:lumMod val="60000"/>
+                          <a:lumOff val="40000"/>
+                        </a:schemeClr>
+                      </a:solidFill>
+                      <a:prstDash val="solid"/>
+                      <a:round/>
+                      <a:headEnd type="none" w="med" len="med"/>
+                      <a:tailEnd type="none" w="med" len="med"/>
+                    </a:lnR>
+                    <a:lnT w="12700" cap="flat" cmpd="sng" algn="ctr">
+                      <a:solidFill>
+                        <a:schemeClr val="bg1"/>
+                      </a:solidFill>
+                      <a:prstDash val="solid"/>
+                      <a:round/>
+                      <a:headEnd type="none" w="med" len="med"/>
+                      <a:tailEnd type="none" w="med" len="med"/>
+                    </a:lnT>
+                    <a:lnB w="12700" cap="flat" cmpd="sng" algn="ctr">
+                      <a:solidFill>
+                        <a:schemeClr val="bg1"/>
+                      </a:solidFill>
+                      <a:prstDash val="solid"/>
+                      <a:round/>
+                      <a:headEnd type="none" w="med" len="med"/>
+                      <a:tailEnd type="none" w="med" len="med"/>
+                    </a:lnB>
+                    <a:solidFill>
+                      <a:schemeClr val="bg1"/>
+                    </a:solidFill>
+                  </a:tcPr>
+                </a:tc>
+                <a:tc>
+                  <a:txBody>
+                    <a:bodyPr/>
+                    <a:lstStyle/>
+                    <a:p>
+                      <a:pPr algn="l"/>
+                      <a:r>
+                        <a:rPr lang="ru-RU" sz="1600" dirty="0" smtClean="0">
+                          <a:solidFill>
+                            <a:schemeClr val="accent1">
+                              <a:lumMod val="75000"/>
+                            </a:schemeClr>
+                          </a:solidFill>
+                        </a:rPr>
+                        <a:t>Абстрактные классы</a:t>
+                      </a:r>
+                      <a:endParaRPr lang="en-US" sz="1600" dirty="0">
+                        <a:solidFill>
+                          <a:schemeClr val="accent1">
+                            <a:lumMod val="75000"/>
+                          </a:schemeClr>
+                        </a:solidFill>
+                      </a:endParaRPr>
+                    </a:p>
+                  </a:txBody>
+                  <a:tcPr marL="45717" marR="45717" marT="22858" marB="22858" anchor="ctr">
+                    <a:lnL w="12700" cap="flat" cmpd="sng" algn="ctr">
+                      <a:solidFill>
+                        <a:schemeClr val="accent1">
+                          <a:lumMod val="60000"/>
+                          <a:lumOff val="40000"/>
+                        </a:schemeClr>
+                      </a:solidFill>
+                      <a:prstDash val="solid"/>
+                      <a:round/>
+                      <a:headEnd type="none" w="med" len="med"/>
+                      <a:tailEnd type="none" w="med" len="med"/>
+                    </a:lnL>
+                    <a:lnR w="12700" cap="flat" cmpd="sng" algn="ctr">
+                      <a:solidFill>
+                        <a:schemeClr val="bg1"/>
+                      </a:solidFill>
+                      <a:prstDash val="solid"/>
+                      <a:round/>
+                      <a:headEnd type="none" w="med" len="med"/>
+                      <a:tailEnd type="none" w="med" len="med"/>
+                    </a:lnR>
+                    <a:lnT w="12700" cap="flat" cmpd="sng" algn="ctr">
+                      <a:solidFill>
+                        <a:schemeClr val="bg1"/>
+                      </a:solidFill>
+                      <a:prstDash val="solid"/>
+                      <a:round/>
+                      <a:headEnd type="none" w="med" len="med"/>
+                      <a:tailEnd type="none" w="med" len="med"/>
+                    </a:lnT>
+                    <a:lnB w="12700" cap="flat" cmpd="sng" algn="ctr">
+                      <a:solidFill>
+                        <a:schemeClr val="bg1"/>
+                      </a:solidFill>
+                      <a:prstDash val="solid"/>
+                      <a:round/>
+                      <a:headEnd type="none" w="med" len="med"/>
+                      <a:tailEnd type="none" w="med" len="med"/>
+                    </a:lnB>
+                    <a:solidFill>
+                      <a:schemeClr val="bg1"/>
+                    </a:solidFill>
+                  </a:tcPr>
+                </a:tc>
+              </a:tr>
+              <a:tr h="320018">
+                <a:tc>
+                  <a:txBody>
+                    <a:bodyPr/>
+                    <a:lstStyle/>
+                    <a:p>
+                      <a:pPr algn="l"/>
+                      <a:r>
+                        <a:rPr lang="ru-RU" sz="1600" b="0" dirty="0" smtClean="0">
+                          <a:solidFill>
+                            <a:schemeClr val="bg1"/>
+                          </a:solidFill>
+                        </a:rPr>
+                        <a:t>Допустимые члены</a:t>
+                      </a:r>
+                      <a:endParaRPr lang="en-US" sz="1600" b="0" dirty="0">
+                        <a:solidFill>
+                          <a:schemeClr val="bg1"/>
+                        </a:solidFill>
+                      </a:endParaRPr>
+                    </a:p>
+                  </a:txBody>
+                  <a:tcPr marL="45717" marR="45717" marT="22858" marB="22858" anchor="ctr">
+                    <a:lnL w="12700" cap="flat" cmpd="sng" algn="ctr">
+                      <a:solidFill>
+                        <a:schemeClr val="bg1"/>
+                      </a:solidFill>
+                      <a:prstDash val="solid"/>
+                      <a:round/>
+                      <a:headEnd type="none" w="med" len="med"/>
+                      <a:tailEnd type="none" w="med" len="med"/>
+                    </a:lnL>
+                    <a:lnR w="12700" cap="flat" cmpd="sng" algn="ctr">
+                      <a:solidFill>
+                        <a:schemeClr val="bg1"/>
+                      </a:solidFill>
+                      <a:prstDash val="solid"/>
+                      <a:round/>
+                      <a:headEnd type="none" w="med" len="med"/>
+                      <a:tailEnd type="none" w="med" len="med"/>
+                    </a:lnR>
+                    <a:lnT w="12700" cap="flat" cmpd="sng" algn="ctr">
+                      <a:solidFill>
+                        <a:schemeClr val="bg1"/>
+                      </a:solidFill>
+                      <a:prstDash val="solid"/>
+                      <a:round/>
+                      <a:headEnd type="none" w="med" len="med"/>
+                      <a:tailEnd type="none" w="med" len="med"/>
+                    </a:lnT>
+                    <a:lnB w="12700" cap="flat" cmpd="sng" algn="ctr">
+                      <a:solidFill>
+                        <a:schemeClr val="bg1"/>
+                      </a:solidFill>
+                      <a:prstDash val="solid"/>
+                      <a:round/>
+                      <a:headEnd type="none" w="med" len="med"/>
+                      <a:tailEnd type="none" w="med" len="med"/>
+                    </a:lnB>
+                  </a:tcPr>
+                </a:tc>
+                <a:tc>
+                  <a:txBody>
+                    <a:bodyPr/>
+                    <a:lstStyle/>
+                    <a:p>
+                      <a:pPr algn="l"/>
+                      <a:r>
+                        <a:rPr lang="ru-RU" sz="1600" b="0" dirty="0" smtClean="0">
+                          <a:solidFill>
+                            <a:schemeClr val="bg1"/>
+                          </a:solidFill>
+                        </a:rPr>
+                        <a:t>Только методы,</a:t>
+                      </a:r>
+                      <a:r>
+                        <a:rPr lang="ru-RU" sz="1600" b="0" baseline="0" dirty="0" smtClean="0">
+                          <a:solidFill>
+                            <a:schemeClr val="bg1"/>
+                          </a:solidFill>
+                        </a:rPr>
+                        <a:t> свойства, индексаторы, события.</a:t>
+                      </a:r>
+                      <a:endParaRPr lang="en-US" sz="1600" b="0" dirty="0">
+                        <a:solidFill>
+                          <a:schemeClr val="bg1"/>
+                        </a:solidFill>
+                      </a:endParaRPr>
+                    </a:p>
+                  </a:txBody>
+                  <a:tcPr marL="45717" marR="45717" marT="22858" marB="22858" anchor="ctr">
+                    <a:lnL w="12700" cap="flat" cmpd="sng" algn="ctr">
+                      <a:solidFill>
+                        <a:schemeClr val="bg1"/>
+                      </a:solidFill>
+                      <a:prstDash val="solid"/>
+                      <a:round/>
+                      <a:headEnd type="none" w="med" len="med"/>
+                      <a:tailEnd type="none" w="med" len="med"/>
+                    </a:lnL>
+                    <a:lnR w="12700" cap="flat" cmpd="sng" algn="ctr">
+                      <a:solidFill>
+                        <a:schemeClr val="bg1"/>
+                      </a:solidFill>
+                      <a:prstDash val="solid"/>
+                      <a:round/>
+                      <a:headEnd type="none" w="med" len="med"/>
+                      <a:tailEnd type="none" w="med" len="med"/>
+                    </a:lnR>
+                    <a:lnT w="12700" cap="flat" cmpd="sng" algn="ctr">
+                      <a:solidFill>
+                        <a:schemeClr val="bg1"/>
+                      </a:solidFill>
+                      <a:prstDash val="solid"/>
+                      <a:round/>
+                      <a:headEnd type="none" w="med" len="med"/>
+                      <a:tailEnd type="none" w="med" len="med"/>
+                    </a:lnT>
+                    <a:lnB w="12700" cap="flat" cmpd="sng" algn="ctr">
+                      <a:solidFill>
+                        <a:schemeClr val="bg1"/>
+                      </a:solidFill>
+                      <a:prstDash val="solid"/>
+                      <a:round/>
+                      <a:headEnd type="none" w="med" len="med"/>
+                      <a:tailEnd type="none" w="med" len="med"/>
+                    </a:lnB>
+                  </a:tcPr>
+                </a:tc>
+                <a:tc>
+                  <a:txBody>
+                    <a:bodyPr/>
+                    <a:lstStyle/>
+                    <a:p>
+                      <a:pPr algn="l"/>
+                      <a:r>
+                        <a:rPr lang="ru-RU" sz="1600" b="0" dirty="0" smtClean="0">
+                          <a:solidFill>
+                            <a:schemeClr val="bg1"/>
+                          </a:solidFill>
+                        </a:rPr>
+                        <a:t>Все.</a:t>
+                      </a:r>
+                      <a:endParaRPr lang="en-US" sz="1600" b="0" dirty="0">
+                        <a:solidFill>
+                          <a:schemeClr val="bg1"/>
+                        </a:solidFill>
+                      </a:endParaRPr>
+                    </a:p>
+                  </a:txBody>
+                  <a:tcPr marL="45717" marR="45717" marT="22858" marB="22858" anchor="ctr">
+                    <a:lnL w="12700" cap="flat" cmpd="sng" algn="ctr">
+                      <a:solidFill>
+                        <a:schemeClr val="bg1"/>
+                      </a:solidFill>
+                      <a:prstDash val="solid"/>
+                      <a:round/>
+                      <a:headEnd type="none" w="med" len="med"/>
+                      <a:tailEnd type="none" w="med" len="med"/>
+                    </a:lnL>
+                    <a:lnR w="12700" cap="flat" cmpd="sng" algn="ctr">
+                      <a:solidFill>
+                        <a:schemeClr val="bg1"/>
+                      </a:solidFill>
+                      <a:prstDash val="solid"/>
+                      <a:round/>
+                      <a:headEnd type="none" w="med" len="med"/>
+                      <a:tailEnd type="none" w="med" len="med"/>
+                    </a:lnR>
+                    <a:lnT w="12700" cap="flat" cmpd="sng" algn="ctr">
+                      <a:solidFill>
+                        <a:schemeClr val="bg1"/>
+                      </a:solidFill>
+                      <a:prstDash val="solid"/>
+                      <a:round/>
+                      <a:headEnd type="none" w="med" len="med"/>
+                      <a:tailEnd type="none" w="med" len="med"/>
+                    </a:lnT>
+                    <a:lnB w="12700" cap="flat" cmpd="sng" algn="ctr">
+                      <a:solidFill>
+                        <a:schemeClr val="bg1"/>
+                      </a:solidFill>
+                      <a:prstDash val="solid"/>
+                      <a:round/>
+                      <a:headEnd type="none" w="med" len="med"/>
+                      <a:tailEnd type="none" w="med" len="med"/>
+                    </a:lnB>
+                  </a:tcPr>
+                </a:tc>
+              </a:tr>
+              <a:tr h="320018">
+                <a:tc>
+                  <a:txBody>
+                    <a:bodyPr/>
+                    <a:lstStyle/>
+                    <a:p>
+                      <a:pPr algn="l"/>
+                      <a:r>
+                        <a:rPr lang="ru-RU" sz="1600" b="0" dirty="0" smtClean="0">
+                          <a:solidFill>
+                            <a:schemeClr val="bg1"/>
+                          </a:solidFill>
+                        </a:rPr>
+                        <a:t>Частичная реализация</a:t>
+                      </a:r>
+                      <a:endParaRPr lang="en-US" sz="1600" b="0" dirty="0">
+                        <a:solidFill>
+                          <a:schemeClr val="bg1"/>
+                        </a:solidFill>
+                      </a:endParaRPr>
+                    </a:p>
+                  </a:txBody>
+                  <a:tcPr marL="45717" marR="45717" marT="22858" marB="22858" anchor="ctr">
+                    <a:lnL w="12700" cap="flat" cmpd="sng" algn="ctr">
+                      <a:solidFill>
+                        <a:schemeClr val="bg1"/>
+                      </a:solidFill>
+                      <a:prstDash val="solid"/>
+                      <a:round/>
+                      <a:headEnd type="none" w="med" len="med"/>
+                      <a:tailEnd type="none" w="med" len="med"/>
+                    </a:lnL>
+                    <a:lnR w="12700" cap="flat" cmpd="sng" algn="ctr">
+                      <a:solidFill>
+                        <a:schemeClr val="bg1"/>
+                      </a:solidFill>
+                      <a:prstDash val="solid"/>
+                      <a:round/>
+                      <a:headEnd type="none" w="med" len="med"/>
+                      <a:tailEnd type="none" w="med" len="med"/>
+                    </a:lnR>
+                    <a:lnT w="12700" cap="flat" cmpd="sng" algn="ctr">
+                      <a:solidFill>
+                        <a:schemeClr val="bg1"/>
+                      </a:solidFill>
+                      <a:prstDash val="solid"/>
+                      <a:round/>
+                      <a:headEnd type="none" w="med" len="med"/>
+                      <a:tailEnd type="none" w="med" len="med"/>
+                    </a:lnT>
+                    <a:lnB w="12700" cap="flat" cmpd="sng" algn="ctr">
+                      <a:solidFill>
+                        <a:schemeClr val="bg1"/>
+                      </a:solidFill>
+                      <a:prstDash val="solid"/>
+                      <a:round/>
+                      <a:headEnd type="none" w="med" len="med"/>
+                      <a:tailEnd type="none" w="med" len="med"/>
+                    </a:lnB>
+                  </a:tcPr>
+                </a:tc>
+                <a:tc>
+                  <a:txBody>
+                    <a:bodyPr/>
+                    <a:lstStyle/>
+                    <a:p>
+                      <a:pPr algn="l"/>
+                      <a:r>
+                        <a:rPr lang="ru-RU" sz="1600" b="0" dirty="0" smtClean="0">
+                          <a:solidFill>
+                            <a:schemeClr val="bg1"/>
+                          </a:solidFill>
+                        </a:rPr>
+                        <a:t>Нет.</a:t>
+                      </a:r>
+                      <a:endParaRPr lang="en-US" sz="1600" b="0" dirty="0">
+                        <a:solidFill>
+                          <a:schemeClr val="bg1"/>
+                        </a:solidFill>
+                      </a:endParaRPr>
+                    </a:p>
+                  </a:txBody>
+                  <a:tcPr marL="45717" marR="45717" marT="22858" marB="22858" anchor="ctr">
+                    <a:lnL w="12700" cap="flat" cmpd="sng" algn="ctr">
+                      <a:solidFill>
+                        <a:schemeClr val="bg1"/>
+                      </a:solidFill>
+                      <a:prstDash val="solid"/>
+                      <a:round/>
+                      <a:headEnd type="none" w="med" len="med"/>
+                      <a:tailEnd type="none" w="med" len="med"/>
+                    </a:lnL>
+                    <a:lnR w="12700" cap="flat" cmpd="sng" algn="ctr">
+                      <a:solidFill>
+                        <a:schemeClr val="bg1"/>
+                      </a:solidFill>
+                      <a:prstDash val="solid"/>
+                      <a:round/>
+                      <a:headEnd type="none" w="med" len="med"/>
+                      <a:tailEnd type="none" w="med" len="med"/>
+                    </a:lnR>
+                    <a:lnT w="12700" cap="flat" cmpd="sng" algn="ctr">
+                      <a:solidFill>
+                        <a:schemeClr val="bg1"/>
+                      </a:solidFill>
+                      <a:prstDash val="solid"/>
+                      <a:round/>
+                      <a:headEnd type="none" w="med" len="med"/>
+                      <a:tailEnd type="none" w="med" len="med"/>
+                    </a:lnT>
+                    <a:lnB w="12700" cap="flat" cmpd="sng" algn="ctr">
+                      <a:solidFill>
+                        <a:schemeClr val="bg1"/>
+                      </a:solidFill>
+                      <a:prstDash val="solid"/>
+                      <a:round/>
+                      <a:headEnd type="none" w="med" len="med"/>
+                      <a:tailEnd type="none" w="med" len="med"/>
+                    </a:lnB>
+                  </a:tcPr>
+                </a:tc>
+                <a:tc>
+                  <a:txBody>
+                    <a:bodyPr/>
+                    <a:lstStyle/>
+                    <a:p>
+                      <a:pPr algn="l"/>
+                      <a:r>
+                        <a:rPr lang="ru-RU" sz="1600" b="0" dirty="0" smtClean="0">
+                          <a:solidFill>
+                            <a:schemeClr val="bg1"/>
+                          </a:solidFill>
+                        </a:rPr>
+                        <a:t>Да. Абстрактный</a:t>
+                      </a:r>
+                      <a:r>
+                        <a:rPr lang="ru-RU" sz="1600" b="0" baseline="0" dirty="0" smtClean="0">
+                          <a:solidFill>
+                            <a:schemeClr val="bg1"/>
+                          </a:solidFill>
+                        </a:rPr>
+                        <a:t> класс может одновременно содержать абстрактные и конкретные члены.</a:t>
+                      </a:r>
+                      <a:endParaRPr lang="en-US" sz="1600" b="0" dirty="0">
+                        <a:solidFill>
+                          <a:schemeClr val="bg1"/>
+                        </a:solidFill>
+                      </a:endParaRPr>
+                    </a:p>
+                  </a:txBody>
+                  <a:tcPr marL="45717" marR="45717" marT="22858" marB="22858" anchor="ctr">
+                    <a:lnL w="12700" cap="flat" cmpd="sng" algn="ctr">
+                      <a:solidFill>
+                        <a:schemeClr val="bg1"/>
+                      </a:solidFill>
+                      <a:prstDash val="solid"/>
+                      <a:round/>
+                      <a:headEnd type="none" w="med" len="med"/>
+                      <a:tailEnd type="none" w="med" len="med"/>
+                    </a:lnL>
+                    <a:lnR w="12700" cap="flat" cmpd="sng" algn="ctr">
+                      <a:solidFill>
+                        <a:schemeClr val="bg1"/>
+                      </a:solidFill>
+                      <a:prstDash val="solid"/>
+                      <a:round/>
+                      <a:headEnd type="none" w="med" len="med"/>
+                      <a:tailEnd type="none" w="med" len="med"/>
+                    </a:lnR>
+                    <a:lnT w="12700" cap="flat" cmpd="sng" algn="ctr">
+                      <a:solidFill>
+                        <a:schemeClr val="bg1"/>
+                      </a:solidFill>
+                      <a:prstDash val="solid"/>
+                      <a:round/>
+                      <a:headEnd type="none" w="med" len="med"/>
+                      <a:tailEnd type="none" w="med" len="med"/>
+                    </a:lnT>
+                    <a:lnB w="12700" cap="flat" cmpd="sng" algn="ctr">
+                      <a:solidFill>
+                        <a:schemeClr val="bg1"/>
+                      </a:solidFill>
+                      <a:prstDash val="solid"/>
+                      <a:round/>
+                      <a:headEnd type="none" w="med" len="med"/>
+                      <a:tailEnd type="none" w="med" len="med"/>
+                    </a:lnB>
+                  </a:tcPr>
+                </a:tc>
+              </a:tr>
+              <a:tr h="320018">
+                <a:tc>
+                  <a:txBody>
+                    <a:bodyPr/>
+                    <a:lstStyle/>
+                    <a:p>
+                      <a:pPr algn="l"/>
+                      <a:r>
+                        <a:rPr lang="ru-RU" sz="1600" b="0" dirty="0" smtClean="0">
+                          <a:solidFill>
+                            <a:schemeClr val="bg1"/>
+                          </a:solidFill>
+                        </a:rPr>
+                        <a:t>Множественное</a:t>
+                      </a:r>
+                      <a:r>
+                        <a:rPr lang="ru-RU" sz="1600" b="0" baseline="0" dirty="0" smtClean="0">
+                          <a:solidFill>
+                            <a:schemeClr val="bg1"/>
+                          </a:solidFill>
+                        </a:rPr>
+                        <a:t> «наследование»</a:t>
+                      </a:r>
+                      <a:endParaRPr lang="en-US" sz="1600" b="0" dirty="0">
+                        <a:solidFill>
+                          <a:schemeClr val="bg1"/>
+                        </a:solidFill>
+                      </a:endParaRPr>
+                    </a:p>
+                  </a:txBody>
+                  <a:tcPr marL="45717" marR="45717" marT="22858" marB="22858" anchor="ctr">
+                    <a:lnL w="12700" cap="flat" cmpd="sng" algn="ctr">
+                      <a:solidFill>
+                        <a:schemeClr val="bg1"/>
+                      </a:solidFill>
+                      <a:prstDash val="solid"/>
+                      <a:round/>
+                      <a:headEnd type="none" w="med" len="med"/>
+                      <a:tailEnd type="none" w="med" len="med"/>
+                    </a:lnL>
+                    <a:lnR w="12700" cap="flat" cmpd="sng" algn="ctr">
+                      <a:solidFill>
+                        <a:schemeClr val="bg1"/>
+                      </a:solidFill>
+                      <a:prstDash val="solid"/>
+                      <a:round/>
+                      <a:headEnd type="none" w="med" len="med"/>
+                      <a:tailEnd type="none" w="med" len="med"/>
+                    </a:lnR>
+                    <a:lnT w="12700" cap="flat" cmpd="sng" algn="ctr">
+                      <a:solidFill>
+                        <a:schemeClr val="bg1"/>
+                      </a:solidFill>
+                      <a:prstDash val="solid"/>
+                      <a:round/>
+                      <a:headEnd type="none" w="med" len="med"/>
+                      <a:tailEnd type="none" w="med" len="med"/>
+                    </a:lnT>
+                    <a:lnB w="12700" cap="flat" cmpd="sng" algn="ctr">
+                      <a:solidFill>
+                        <a:schemeClr val="bg1"/>
+                      </a:solidFill>
+                      <a:prstDash val="solid"/>
+                      <a:round/>
+                      <a:headEnd type="none" w="med" len="med"/>
+                      <a:tailEnd type="none" w="med" len="med"/>
+                    </a:lnB>
+                  </a:tcPr>
+                </a:tc>
+                <a:tc>
+                  <a:txBody>
+                    <a:bodyPr/>
+                    <a:lstStyle/>
+                    <a:p>
+                      <a:pPr algn="l"/>
+                      <a:r>
+                        <a:rPr lang="ru-RU" sz="1600" b="0" dirty="0" smtClean="0">
+                          <a:solidFill>
+                            <a:schemeClr val="bg1"/>
+                          </a:solidFill>
+                        </a:rPr>
+                        <a:t>Да. Тип может</a:t>
+                      </a:r>
+                      <a:r>
+                        <a:rPr lang="ru-RU" sz="1600" b="0" baseline="0" dirty="0" smtClean="0">
+                          <a:solidFill>
+                            <a:schemeClr val="bg1"/>
+                          </a:solidFill>
+                        </a:rPr>
+                        <a:t> реализовывать неограниченное кол-во интерфейсов.</a:t>
+                      </a:r>
+                      <a:endParaRPr lang="en-US" sz="1600" b="0" dirty="0">
+                        <a:solidFill>
+                          <a:schemeClr val="bg1"/>
+                        </a:solidFill>
+                      </a:endParaRPr>
+                    </a:p>
+                  </a:txBody>
+                  <a:tcPr marL="45717" marR="45717" marT="22858" marB="22858" anchor="ctr">
+                    <a:lnL w="12700" cap="flat" cmpd="sng" algn="ctr">
+                      <a:solidFill>
+                        <a:schemeClr val="bg1"/>
+                      </a:solidFill>
+                      <a:prstDash val="solid"/>
+                      <a:round/>
+                      <a:headEnd type="none" w="med" len="med"/>
+                      <a:tailEnd type="none" w="med" len="med"/>
+                    </a:lnL>
+                    <a:lnR w="12700" cap="flat" cmpd="sng" algn="ctr">
+                      <a:solidFill>
+                        <a:schemeClr val="bg1"/>
+                      </a:solidFill>
+                      <a:prstDash val="solid"/>
+                      <a:round/>
+                      <a:headEnd type="none" w="med" len="med"/>
+                      <a:tailEnd type="none" w="med" len="med"/>
+                    </a:lnR>
+                    <a:lnT w="12700" cap="flat" cmpd="sng" algn="ctr">
+                      <a:solidFill>
+                        <a:schemeClr val="bg1"/>
+                      </a:solidFill>
+                      <a:prstDash val="solid"/>
+                      <a:round/>
+                      <a:headEnd type="none" w="med" len="med"/>
+                      <a:tailEnd type="none" w="med" len="med"/>
+                    </a:lnT>
+                    <a:lnB w="12700" cap="flat" cmpd="sng" algn="ctr">
+                      <a:solidFill>
+                        <a:schemeClr val="bg1"/>
+                      </a:solidFill>
+                      <a:prstDash val="solid"/>
+                      <a:round/>
+                      <a:headEnd type="none" w="med" len="med"/>
+                      <a:tailEnd type="none" w="med" len="med"/>
+                    </a:lnB>
+                  </a:tcPr>
+                </a:tc>
+                <a:tc>
+                  <a:txBody>
+                    <a:bodyPr/>
+                    <a:lstStyle/>
+                    <a:p>
+                      <a:pPr algn="l"/>
+                      <a:r>
+                        <a:rPr lang="ru-RU" sz="1600" b="0" dirty="0" smtClean="0">
+                          <a:solidFill>
+                            <a:schemeClr val="bg1"/>
+                          </a:solidFill>
+                        </a:rPr>
+                        <a:t>Нет. Класс</a:t>
+                      </a:r>
+                      <a:r>
+                        <a:rPr lang="ru-RU" sz="1600" b="0" baseline="0" dirty="0" smtClean="0">
+                          <a:solidFill>
+                            <a:schemeClr val="bg1"/>
+                          </a:solidFill>
+                        </a:rPr>
+                        <a:t> может наследовать только один класс.</a:t>
+                      </a:r>
+                      <a:endParaRPr lang="en-US" sz="1600" b="0" dirty="0">
+                        <a:solidFill>
+                          <a:schemeClr val="bg1"/>
+                        </a:solidFill>
+                      </a:endParaRPr>
+                    </a:p>
+                  </a:txBody>
+                  <a:tcPr marL="45717" marR="45717" marT="22858" marB="22858" anchor="ctr">
+                    <a:lnL w="12700" cap="flat" cmpd="sng" algn="ctr">
+                      <a:solidFill>
+                        <a:schemeClr val="bg1"/>
+                      </a:solidFill>
+                      <a:prstDash val="solid"/>
+                      <a:round/>
+                      <a:headEnd type="none" w="med" len="med"/>
+                      <a:tailEnd type="none" w="med" len="med"/>
+                    </a:lnL>
+                    <a:lnR w="12700" cap="flat" cmpd="sng" algn="ctr">
+                      <a:solidFill>
+                        <a:schemeClr val="bg1"/>
+                      </a:solidFill>
+                      <a:prstDash val="solid"/>
+                      <a:round/>
+                      <a:headEnd type="none" w="med" len="med"/>
+                      <a:tailEnd type="none" w="med" len="med"/>
+                    </a:lnR>
+                    <a:lnT w="12700" cap="flat" cmpd="sng" algn="ctr">
+                      <a:solidFill>
+                        <a:schemeClr val="bg1"/>
+                      </a:solidFill>
+                      <a:prstDash val="solid"/>
+                      <a:round/>
+                      <a:headEnd type="none" w="med" len="med"/>
+                      <a:tailEnd type="none" w="med" len="med"/>
+                    </a:lnT>
+                    <a:lnB w="12700" cap="flat" cmpd="sng" algn="ctr">
+                      <a:solidFill>
+                        <a:schemeClr val="bg1"/>
+                      </a:solidFill>
+                      <a:prstDash val="solid"/>
+                      <a:round/>
+                      <a:headEnd type="none" w="med" len="med"/>
+                      <a:tailEnd type="none" w="med" len="med"/>
+                    </a:lnB>
+                  </a:tcPr>
+                </a:tc>
+              </a:tr>
+              <a:tr h="320018">
+                <a:tc>
+                  <a:txBody>
+                    <a:bodyPr/>
+                    <a:lstStyle/>
+                    <a:p>
+                      <a:pPr algn="l"/>
+                      <a:r>
+                        <a:rPr lang="ru-RU" sz="1600" b="0" dirty="0" smtClean="0">
+                          <a:solidFill>
+                            <a:schemeClr val="bg1"/>
+                          </a:solidFill>
+                        </a:rPr>
+                        <a:t>Наследование реализации</a:t>
+                      </a:r>
+                      <a:endParaRPr lang="en-US" sz="1600" b="0" dirty="0">
+                        <a:solidFill>
+                          <a:schemeClr val="bg1"/>
+                        </a:solidFill>
+                      </a:endParaRPr>
+                    </a:p>
+                  </a:txBody>
+                  <a:tcPr marL="45717" marR="45717" marT="22858" marB="22858" anchor="ctr">
+                    <a:lnL w="12700" cap="flat" cmpd="sng" algn="ctr">
+                      <a:solidFill>
+                        <a:schemeClr val="bg1"/>
+                      </a:solidFill>
+                      <a:prstDash val="solid"/>
+                      <a:round/>
+                      <a:headEnd type="none" w="med" len="med"/>
+                      <a:tailEnd type="none" w="med" len="med"/>
+                    </a:lnL>
+                    <a:lnR w="12700" cap="flat" cmpd="sng" algn="ctr">
+                      <a:solidFill>
+                        <a:schemeClr val="bg1"/>
+                      </a:solidFill>
+                      <a:prstDash val="solid"/>
+                      <a:round/>
+                      <a:headEnd type="none" w="med" len="med"/>
+                      <a:tailEnd type="none" w="med" len="med"/>
+                    </a:lnR>
+                    <a:lnT w="12700" cap="flat" cmpd="sng" algn="ctr">
+                      <a:solidFill>
+                        <a:schemeClr val="bg1"/>
+                      </a:solidFill>
+                      <a:prstDash val="solid"/>
+                      <a:round/>
+                      <a:headEnd type="none" w="med" len="med"/>
+                      <a:tailEnd type="none" w="med" len="med"/>
+                    </a:lnT>
+                    <a:lnB w="12700" cap="flat" cmpd="sng" algn="ctr">
+                      <a:solidFill>
+                        <a:schemeClr val="bg1"/>
+                      </a:solidFill>
+                      <a:prstDash val="solid"/>
+                      <a:round/>
+                      <a:headEnd type="none" w="med" len="med"/>
+                      <a:tailEnd type="none" w="med" len="med"/>
+                    </a:lnB>
+                  </a:tcPr>
+                </a:tc>
+                <a:tc>
+                  <a:txBody>
+                    <a:bodyPr/>
+                    <a:lstStyle/>
+                    <a:p>
+                      <a:pPr algn="l"/>
+                      <a:r>
+                        <a:rPr lang="ru-RU" sz="1600" b="0" dirty="0" smtClean="0">
+                          <a:solidFill>
+                            <a:schemeClr val="bg1"/>
+                          </a:solidFill>
+                        </a:rPr>
+                        <a:t>Нет т.к. интерфейсы</a:t>
+                      </a:r>
+                      <a:r>
+                        <a:rPr lang="ru-RU" sz="1600" b="0" baseline="0" dirty="0" smtClean="0">
+                          <a:solidFill>
+                            <a:schemeClr val="bg1"/>
+                          </a:solidFill>
+                        </a:rPr>
+                        <a:t> не содержат реализации.</a:t>
+                      </a:r>
+                      <a:endParaRPr lang="en-US" sz="1600" b="0" dirty="0">
+                        <a:solidFill>
+                          <a:schemeClr val="bg1"/>
+                        </a:solidFill>
+                      </a:endParaRPr>
+                    </a:p>
+                  </a:txBody>
+                  <a:tcPr marL="45717" marR="45717" marT="22858" marB="22858" anchor="ctr">
+                    <a:lnL w="12700" cap="flat" cmpd="sng" algn="ctr">
+                      <a:solidFill>
+                        <a:schemeClr val="bg1"/>
+                      </a:solidFill>
+                      <a:prstDash val="solid"/>
+                      <a:round/>
+                      <a:headEnd type="none" w="med" len="med"/>
+                      <a:tailEnd type="none" w="med" len="med"/>
+                    </a:lnL>
+                    <a:lnR w="12700" cap="flat" cmpd="sng" algn="ctr">
+                      <a:solidFill>
+                        <a:schemeClr val="bg1"/>
+                      </a:solidFill>
+                      <a:prstDash val="solid"/>
+                      <a:round/>
+                      <a:headEnd type="none" w="med" len="med"/>
+                      <a:tailEnd type="none" w="med" len="med"/>
+                    </a:lnR>
+                    <a:lnT w="12700" cap="flat" cmpd="sng" algn="ctr">
+                      <a:solidFill>
+                        <a:schemeClr val="bg1"/>
+                      </a:solidFill>
+                      <a:prstDash val="solid"/>
+                      <a:round/>
+                      <a:headEnd type="none" w="med" len="med"/>
+                      <a:tailEnd type="none" w="med" len="med"/>
+                    </a:lnT>
+                    <a:lnB w="12700" cap="flat" cmpd="sng" algn="ctr">
+                      <a:solidFill>
+                        <a:schemeClr val="bg1"/>
+                      </a:solidFill>
+                      <a:prstDash val="solid"/>
+                      <a:round/>
+                      <a:headEnd type="none" w="med" len="med"/>
+                      <a:tailEnd type="none" w="med" len="med"/>
+                    </a:lnB>
+                  </a:tcPr>
+                </a:tc>
+                <a:tc>
+                  <a:txBody>
+                    <a:bodyPr/>
+                    <a:lstStyle/>
+                    <a:p>
+                      <a:pPr algn="l"/>
+                      <a:r>
+                        <a:rPr lang="ru-RU" sz="1600" b="0" dirty="0" smtClean="0">
+                          <a:solidFill>
+                            <a:schemeClr val="bg1"/>
+                          </a:solidFill>
+                        </a:rPr>
+                        <a:t>Да. Как в</a:t>
+                      </a:r>
+                      <a:r>
+                        <a:rPr lang="ru-RU" sz="1600" b="0" baseline="0" dirty="0" smtClean="0">
+                          <a:solidFill>
+                            <a:schemeClr val="bg1"/>
+                          </a:solidFill>
+                        </a:rPr>
+                        <a:t> обычном классе.</a:t>
+                      </a:r>
+                      <a:endParaRPr lang="en-US" sz="1600" b="0" dirty="0">
+                        <a:solidFill>
+                          <a:schemeClr val="bg1"/>
+                        </a:solidFill>
+                      </a:endParaRPr>
+                    </a:p>
+                  </a:txBody>
+                  <a:tcPr marL="45717" marR="45717" marT="22858" marB="22858" anchor="ctr">
+                    <a:lnL w="12700" cap="flat" cmpd="sng" algn="ctr">
+                      <a:solidFill>
+                        <a:schemeClr val="bg1"/>
+                      </a:solidFill>
+                      <a:prstDash val="solid"/>
+                      <a:round/>
+                      <a:headEnd type="none" w="med" len="med"/>
+                      <a:tailEnd type="none" w="med" len="med"/>
+                    </a:lnL>
+                    <a:lnR w="12700" cap="flat" cmpd="sng" algn="ctr">
+                      <a:solidFill>
+                        <a:schemeClr val="bg1"/>
+                      </a:solidFill>
+                      <a:prstDash val="solid"/>
+                      <a:round/>
+                      <a:headEnd type="none" w="med" len="med"/>
+                      <a:tailEnd type="none" w="med" len="med"/>
+                    </a:lnR>
+                    <a:lnT w="12700" cap="flat" cmpd="sng" algn="ctr">
+                      <a:solidFill>
+                        <a:schemeClr val="bg1"/>
+                      </a:solidFill>
+                      <a:prstDash val="solid"/>
+                      <a:round/>
+                      <a:headEnd type="none" w="med" len="med"/>
+                      <a:tailEnd type="none" w="med" len="med"/>
+                    </a:lnT>
+                    <a:lnB w="12700" cap="flat" cmpd="sng" algn="ctr">
+                      <a:solidFill>
+                        <a:schemeClr val="bg1"/>
+                      </a:solidFill>
+                      <a:prstDash val="solid"/>
+                      <a:round/>
+                      <a:headEnd type="none" w="med" len="med"/>
+                      <a:tailEnd type="none" w="med" len="med"/>
+                    </a:lnB>
+                  </a:tcPr>
+                </a:tc>
+              </a:tr>
+            </a:tbl>
+          </a:graphicData>
+        </a:graphic>
+      </p:graphicFrame>
+    </p:spTree>
+    <p:extLst>
+      <p:ext uri="{BB962C8B-B14F-4D97-AF65-F5344CB8AC3E}">
+        <p14:creationId xmlns:p14="http://schemas.microsoft.com/office/powerpoint/2010/main" val="1754497434"/>
+      </p:ext>
+    </p:extLst>
+  </p:cSld>
+  <p:clrMapOvr>
+    <a:masterClrMapping/>
+  </p:clrMapOvr>
+  <p:timing>
+    <p:tnLst>
+      <p:par>
+        <p:cTn id="1" dur="indefinite" restart="never" nodeType="tmRoot"/>
+      </p:par>
+    </p:tnLst>
+  </p:timing>
+</p:sld>
+</file>
+
+<file path=ppt/slides/slide28.xml><?xml version="1.0" encoding="utf-8"?>
+<p:sld xmlns:a="http://schemas.openxmlformats.org/drawingml/2006/main" xmlns:r="http://schemas.openxmlformats.org/officeDocument/2006/relationships" xmlns:p="http://schemas.openxmlformats.org/presentationml/2006/main">
+  <p:cSld>
+    <p:bg>
+      <p:bgPr>
+        <a:blipFill dpi="0" rotWithShape="1">
           <a:blip r:embed="rId2" cstate="print">
             <a:lum/>
           </a:blip>
@@ -31206,7 +32285,7 @@
 </p:sld>
 </file>
 
-<file path=ppt/slides/slide28.xml><?xml version="1.0" encoding="utf-8"?>
+<file path=ppt/slides/slide29.xml><?xml version="1.0" encoding="utf-8"?>
 <p:sld xmlns:a="http://schemas.openxmlformats.org/drawingml/2006/main" xmlns:r="http://schemas.openxmlformats.org/officeDocument/2006/relationships" xmlns:p="http://schemas.openxmlformats.org/presentationml/2006/main">
   <p:cSld>
     <p:bg>
@@ -32509,287 +33588,6 @@
     <p:extLst>
       <p:ext uri="{BB962C8B-B14F-4D97-AF65-F5344CB8AC3E}">
         <p14:creationId xmlns:p14="http://schemas.microsoft.com/office/powerpoint/2010/main" val="3537645717"/>
-      </p:ext>
-    </p:extLst>
-  </p:cSld>
-  <p:clrMapOvr>
-    <a:masterClrMapping/>
-  </p:clrMapOvr>
-  <p:timing>
-    <p:tnLst>
-      <p:par>
-        <p:cTn id="1" dur="indefinite" restart="never" nodeType="tmRoot"/>
-      </p:par>
-    </p:tnLst>
-  </p:timing>
-</p:sld>
-</file>
-
-<file path=ppt/slides/slide29.xml><?xml version="1.0" encoding="utf-8"?>
-<p:sld xmlns:a="http://schemas.openxmlformats.org/drawingml/2006/main" xmlns:r="http://schemas.openxmlformats.org/officeDocument/2006/relationships" xmlns:p="http://schemas.openxmlformats.org/presentationml/2006/main">
-  <p:cSld>
-    <p:bg>
-      <p:bgPr>
-        <a:blipFill dpi="0" rotWithShape="1">
-          <a:blip r:embed="rId2" cstate="print">
-            <a:lum/>
-          </a:blip>
-          <a:srcRect/>
-          <a:stretch>
-            <a:fillRect/>
-          </a:stretch>
-        </a:blipFill>
-        <a:effectLst/>
-      </p:bgPr>
-    </p:bg>
-    <p:spTree>
-      <p:nvGrpSpPr>
-        <p:cNvPr id="1" name=""/>
-        <p:cNvGrpSpPr/>
-        <p:nvPr/>
-      </p:nvGrpSpPr>
-      <p:grpSpPr>
-        <a:xfrm>
-          <a:off x="0" y="0"/>
-          <a:ext cx="0" cy="0"/>
-          <a:chOff x="0" y="0"/>
-          <a:chExt cx="0" cy="0"/>
-        </a:xfrm>
-      </p:grpSpPr>
-      <p:sp>
-        <p:nvSpPr>
-          <p:cNvPr id="20482" name="Rectangle 1"/>
-          <p:cNvSpPr>
-            <a:spLocks noChangeArrowheads="1"/>
-          </p:cNvSpPr>
-          <p:nvPr/>
-        </p:nvSpPr>
-        <p:spPr bwMode="auto">
-          <a:xfrm>
-            <a:off x="381000" y="-4763"/>
-            <a:ext cx="8305800" cy="461963"/>
-          </a:xfrm>
-          <a:prstGeom prst="rect">
-            <a:avLst/>
-          </a:prstGeom>
-          <a:noFill/>
-          <a:ln>
-            <a:noFill/>
-          </a:ln>
-          <a:extLst>
-            <a:ext uri="{909E8E84-426E-40DD-AFC4-6F175D3DCCD1}">
-              <a14:hiddenFill xmlns:a14="http://schemas.microsoft.com/office/drawing/2010/main">
-                <a:solidFill>
-                  <a:srgbClr val="FFFFFF"/>
-                </a:solidFill>
-              </a14:hiddenFill>
-            </a:ext>
-            <a:ext uri="{91240B29-F687-4F45-9708-019B960494DF}">
-              <a14:hiddenLine xmlns:a14="http://schemas.microsoft.com/office/drawing/2010/main" w="9525">
-                <a:solidFill>
-                  <a:srgbClr val="000000"/>
-                </a:solidFill>
-                <a:miter lim="800000"/>
-                <a:headEnd/>
-                <a:tailEnd/>
-              </a14:hiddenLine>
-            </a:ext>
-          </a:extLst>
-        </p:spPr>
-        <p:txBody>
-          <a:bodyPr anchor="ctr">
-            <a:spAutoFit/>
-          </a:bodyPr>
-          <a:lstStyle/>
-          <a:p>
-            <a:pPr algn="ctr">
-              <a:tabLst>
-                <a:tab pos="457200" algn="l"/>
-              </a:tabLst>
-            </a:pPr>
-            <a:r>
-              <a:rPr lang="ru-RU" sz="2400" b="1" dirty="0">
-                <a:solidFill>
-                  <a:schemeClr val="bg1"/>
-                </a:solidFill>
-                <a:cs typeface="Times New Roman" pitchFamily="18" charset="0"/>
-              </a:rPr>
-              <a:t>Перегрузка операторов</a:t>
-            </a:r>
-            <a:endParaRPr lang="en-US" sz="2400" b="1" dirty="0">
-              <a:solidFill>
-                <a:schemeClr val="bg1"/>
-              </a:solidFill>
-              <a:cs typeface="Times New Roman" pitchFamily="18" charset="0"/>
-            </a:endParaRPr>
-          </a:p>
-        </p:txBody>
-      </p:sp>
-      <p:sp>
-        <p:nvSpPr>
-          <p:cNvPr id="20483" name="Прямоугольник 3"/>
-          <p:cNvSpPr>
-            <a:spLocks noChangeArrowheads="1"/>
-          </p:cNvSpPr>
-          <p:nvPr/>
-        </p:nvSpPr>
-        <p:spPr bwMode="auto">
-          <a:xfrm>
-            <a:off x="152400" y="533400"/>
-            <a:ext cx="8839200" cy="2862322"/>
-          </a:xfrm>
-          <a:prstGeom prst="rect">
-            <a:avLst/>
-          </a:prstGeom>
-          <a:noFill/>
-          <a:ln>
-            <a:noFill/>
-          </a:ln>
-          <a:extLst>
-            <a:ext uri="{909E8E84-426E-40DD-AFC4-6F175D3DCCD1}">
-              <a14:hiddenFill xmlns:a14="http://schemas.microsoft.com/office/drawing/2010/main">
-                <a:solidFill>
-                  <a:srgbClr val="FFFFFF"/>
-                </a:solidFill>
-              </a14:hiddenFill>
-            </a:ext>
-            <a:ext uri="{91240B29-F687-4F45-9708-019B960494DF}">
-              <a14:hiddenLine xmlns:a14="http://schemas.microsoft.com/office/drawing/2010/main" w="9525">
-                <a:solidFill>
-                  <a:srgbClr val="000000"/>
-                </a:solidFill>
-                <a:miter lim="800000"/>
-                <a:headEnd/>
-                <a:tailEnd/>
-              </a14:hiddenLine>
-            </a:ext>
-          </a:extLst>
-        </p:spPr>
-        <p:txBody>
-          <a:bodyPr>
-            <a:spAutoFit/>
-          </a:bodyPr>
-          <a:lstStyle/>
-          <a:p>
-            <a:r>
-              <a:rPr lang="ru-RU" b="1" dirty="0" smtClean="0">
-                <a:solidFill>
-                  <a:schemeClr val="bg1"/>
-                </a:solidFill>
-                <a:cs typeface="Courier New" pitchFamily="49" charset="0"/>
-              </a:rPr>
-              <a:t>Перегрузка операторов </a:t>
-            </a:r>
-            <a:r>
-              <a:rPr lang="en-US" b="1" dirty="0" smtClean="0">
-                <a:solidFill>
-                  <a:schemeClr val="bg1"/>
-                </a:solidFill>
-                <a:cs typeface="Courier New" pitchFamily="49" charset="0"/>
-              </a:rPr>
-              <a:t>(operator overload) </a:t>
-            </a:r>
-            <a:r>
-              <a:rPr lang="ru-RU" b="1" dirty="0" smtClean="0">
-                <a:solidFill>
-                  <a:schemeClr val="bg1"/>
-                </a:solidFill>
-                <a:cs typeface="Courier New" pitchFamily="49" charset="0"/>
-              </a:rPr>
-              <a:t>это механизм обеспечения поддержки операций со своим типом с помощью встроенных операторов. При реализации каждого оператора важно не нарушать их семантику. Так, например, операция сложения должна быть коммутативной (от перемены мест слагаемых сумма не меняется). Наша реализация сложения также должна быть коммутативна. Иначе  поведение программы может стать плохо предсказуемым.</a:t>
-            </a:r>
-            <a:endParaRPr lang="en-US" b="1" dirty="0" smtClean="0">
-              <a:solidFill>
-                <a:schemeClr val="bg1"/>
-              </a:solidFill>
-              <a:cs typeface="Courier New" pitchFamily="49" charset="0"/>
-            </a:endParaRPr>
-          </a:p>
-          <a:p>
-            <a:endParaRPr lang="en-US" b="1" dirty="0" smtClean="0">
-              <a:solidFill>
-                <a:schemeClr val="bg1"/>
-              </a:solidFill>
-              <a:cs typeface="Courier New" pitchFamily="49" charset="0"/>
-            </a:endParaRPr>
-          </a:p>
-          <a:p>
-            <a:r>
-              <a:rPr lang="ru-RU" b="1" dirty="0" smtClean="0">
-                <a:solidFill>
-                  <a:schemeClr val="bg1"/>
-                </a:solidFill>
-                <a:cs typeface="Courier New" pitchFamily="49" charset="0"/>
-              </a:rPr>
-              <a:t>Если вы перегружаете операторы равно (==) и неравно (!=)</a:t>
-            </a:r>
-            <a:r>
-              <a:rPr lang="en-US" b="1" dirty="0" smtClean="0">
-                <a:solidFill>
-                  <a:schemeClr val="bg1"/>
-                </a:solidFill>
-                <a:cs typeface="Courier New" pitchFamily="49" charset="0"/>
-              </a:rPr>
-              <a:t>, </a:t>
-            </a:r>
-            <a:r>
-              <a:rPr lang="ru-RU" b="1" dirty="0" smtClean="0">
-                <a:solidFill>
-                  <a:schemeClr val="bg1"/>
-                </a:solidFill>
-                <a:cs typeface="Courier New" pitchFamily="49" charset="0"/>
-              </a:rPr>
-              <a:t>то рекомендуется также перегрузить метод </a:t>
-            </a:r>
-            <a:r>
-              <a:rPr lang="en-US" b="1" dirty="0" smtClean="0">
-                <a:solidFill>
-                  <a:schemeClr val="bg1"/>
-                </a:solidFill>
-                <a:cs typeface="Courier New" pitchFamily="49" charset="0"/>
-              </a:rPr>
-              <a:t>bool Equals(object obj). </a:t>
-            </a:r>
-            <a:r>
-              <a:rPr lang="ru-RU" b="1" dirty="0" smtClean="0">
-                <a:solidFill>
-                  <a:schemeClr val="bg1"/>
-                </a:solidFill>
-                <a:cs typeface="Courier New" pitchFamily="49" charset="0"/>
-              </a:rPr>
-              <a:t>Не забудьте убедиться что ваши методы позволяют выполнять сравнение с </a:t>
-            </a:r>
-            <a:r>
-              <a:rPr lang="en-US" b="1" dirty="0" smtClean="0">
-                <a:solidFill>
-                  <a:schemeClr val="bg1"/>
-                </a:solidFill>
-                <a:cs typeface="Courier New" pitchFamily="49" charset="0"/>
-              </a:rPr>
-              <a:t>null </a:t>
-            </a:r>
-            <a:r>
-              <a:rPr lang="ru-RU" b="1" dirty="0" smtClean="0">
-                <a:solidFill>
-                  <a:schemeClr val="bg1"/>
-                </a:solidFill>
-                <a:cs typeface="Courier New" pitchFamily="49" charset="0"/>
-              </a:rPr>
-              <a:t>значениями.</a:t>
-            </a:r>
-            <a:endParaRPr lang="ru-RU" b="1" dirty="0">
-              <a:solidFill>
-                <a:schemeClr val="bg1"/>
-              </a:solidFill>
-              <a:cs typeface="Courier New" pitchFamily="49" charset="0"/>
-            </a:endParaRPr>
-          </a:p>
-        </p:txBody>
-      </p:sp>
-    </p:spTree>
-    <p:extLst>
-      <p:ext uri="{BB962C8B-B14F-4D97-AF65-F5344CB8AC3E}">
-        <p14:creationId xmlns:p14="http://schemas.microsoft.com/office/powerpoint/2010/main" val="822124034"/>
       </p:ext>
     </p:extLst>
   </p:cSld>
@@ -33116,6 +33914,287 @@
         <p:spPr bwMode="auto">
           <a:xfrm>
             <a:off x="152400" y="533400"/>
+            <a:ext cx="8839200" cy="2862322"/>
+          </a:xfrm>
+          <a:prstGeom prst="rect">
+            <a:avLst/>
+          </a:prstGeom>
+          <a:noFill/>
+          <a:ln>
+            <a:noFill/>
+          </a:ln>
+          <a:extLst>
+            <a:ext uri="{909E8E84-426E-40DD-AFC4-6F175D3DCCD1}">
+              <a14:hiddenFill xmlns:a14="http://schemas.microsoft.com/office/drawing/2010/main">
+                <a:solidFill>
+                  <a:srgbClr val="FFFFFF"/>
+                </a:solidFill>
+              </a14:hiddenFill>
+            </a:ext>
+            <a:ext uri="{91240B29-F687-4F45-9708-019B960494DF}">
+              <a14:hiddenLine xmlns:a14="http://schemas.microsoft.com/office/drawing/2010/main" w="9525">
+                <a:solidFill>
+                  <a:srgbClr val="000000"/>
+                </a:solidFill>
+                <a:miter lim="800000"/>
+                <a:headEnd/>
+                <a:tailEnd/>
+              </a14:hiddenLine>
+            </a:ext>
+          </a:extLst>
+        </p:spPr>
+        <p:txBody>
+          <a:bodyPr>
+            <a:spAutoFit/>
+          </a:bodyPr>
+          <a:lstStyle/>
+          <a:p>
+            <a:r>
+              <a:rPr lang="ru-RU" b="1" dirty="0" smtClean="0">
+                <a:solidFill>
+                  <a:schemeClr val="bg1"/>
+                </a:solidFill>
+                <a:cs typeface="Courier New" pitchFamily="49" charset="0"/>
+              </a:rPr>
+              <a:t>Перегрузка операторов </a:t>
+            </a:r>
+            <a:r>
+              <a:rPr lang="en-US" b="1" dirty="0" smtClean="0">
+                <a:solidFill>
+                  <a:schemeClr val="bg1"/>
+                </a:solidFill>
+                <a:cs typeface="Courier New" pitchFamily="49" charset="0"/>
+              </a:rPr>
+              <a:t>(operator overload) </a:t>
+            </a:r>
+            <a:r>
+              <a:rPr lang="ru-RU" b="1" dirty="0" smtClean="0">
+                <a:solidFill>
+                  <a:schemeClr val="bg1"/>
+                </a:solidFill>
+                <a:cs typeface="Courier New" pitchFamily="49" charset="0"/>
+              </a:rPr>
+              <a:t>это механизм обеспечения поддержки операций со своим типом с помощью встроенных операторов. При реализации каждого оператора важно не нарушать их семантику. Так, например, операция сложения должна быть коммутативной (от перемены мест слагаемых сумма не меняется). Наша реализация сложения также должна быть коммутативна. Иначе  поведение программы может стать плохо предсказуемым.</a:t>
+            </a:r>
+            <a:endParaRPr lang="en-US" b="1" dirty="0" smtClean="0">
+              <a:solidFill>
+                <a:schemeClr val="bg1"/>
+              </a:solidFill>
+              <a:cs typeface="Courier New" pitchFamily="49" charset="0"/>
+            </a:endParaRPr>
+          </a:p>
+          <a:p>
+            <a:endParaRPr lang="en-US" b="1" dirty="0" smtClean="0">
+              <a:solidFill>
+                <a:schemeClr val="bg1"/>
+              </a:solidFill>
+              <a:cs typeface="Courier New" pitchFamily="49" charset="0"/>
+            </a:endParaRPr>
+          </a:p>
+          <a:p>
+            <a:r>
+              <a:rPr lang="ru-RU" b="1" dirty="0" smtClean="0">
+                <a:solidFill>
+                  <a:schemeClr val="bg1"/>
+                </a:solidFill>
+                <a:cs typeface="Courier New" pitchFamily="49" charset="0"/>
+              </a:rPr>
+              <a:t>Если вы перегружаете операторы равно (==) и неравно (!=)</a:t>
+            </a:r>
+            <a:r>
+              <a:rPr lang="en-US" b="1" dirty="0" smtClean="0">
+                <a:solidFill>
+                  <a:schemeClr val="bg1"/>
+                </a:solidFill>
+                <a:cs typeface="Courier New" pitchFamily="49" charset="0"/>
+              </a:rPr>
+              <a:t>, </a:t>
+            </a:r>
+            <a:r>
+              <a:rPr lang="ru-RU" b="1" dirty="0" smtClean="0">
+                <a:solidFill>
+                  <a:schemeClr val="bg1"/>
+                </a:solidFill>
+                <a:cs typeface="Courier New" pitchFamily="49" charset="0"/>
+              </a:rPr>
+              <a:t>то рекомендуется также перегрузить метод </a:t>
+            </a:r>
+            <a:r>
+              <a:rPr lang="en-US" b="1" dirty="0" smtClean="0">
+                <a:solidFill>
+                  <a:schemeClr val="bg1"/>
+                </a:solidFill>
+                <a:cs typeface="Courier New" pitchFamily="49" charset="0"/>
+              </a:rPr>
+              <a:t>bool Equals(object obj). </a:t>
+            </a:r>
+            <a:r>
+              <a:rPr lang="ru-RU" b="1" dirty="0" smtClean="0">
+                <a:solidFill>
+                  <a:schemeClr val="bg1"/>
+                </a:solidFill>
+                <a:cs typeface="Courier New" pitchFamily="49" charset="0"/>
+              </a:rPr>
+              <a:t>Не забудьте убедиться что ваши методы позволяют выполнять сравнение с </a:t>
+            </a:r>
+            <a:r>
+              <a:rPr lang="en-US" b="1" dirty="0" smtClean="0">
+                <a:solidFill>
+                  <a:schemeClr val="bg1"/>
+                </a:solidFill>
+                <a:cs typeface="Courier New" pitchFamily="49" charset="0"/>
+              </a:rPr>
+              <a:t>null </a:t>
+            </a:r>
+            <a:r>
+              <a:rPr lang="ru-RU" b="1" dirty="0" smtClean="0">
+                <a:solidFill>
+                  <a:schemeClr val="bg1"/>
+                </a:solidFill>
+                <a:cs typeface="Courier New" pitchFamily="49" charset="0"/>
+              </a:rPr>
+              <a:t>значениями.</a:t>
+            </a:r>
+            <a:endParaRPr lang="ru-RU" b="1" dirty="0">
+              <a:solidFill>
+                <a:schemeClr val="bg1"/>
+              </a:solidFill>
+              <a:cs typeface="Courier New" pitchFamily="49" charset="0"/>
+            </a:endParaRPr>
+          </a:p>
+        </p:txBody>
+      </p:sp>
+    </p:spTree>
+    <p:extLst>
+      <p:ext uri="{BB962C8B-B14F-4D97-AF65-F5344CB8AC3E}">
+        <p14:creationId xmlns:p14="http://schemas.microsoft.com/office/powerpoint/2010/main" val="822124034"/>
+      </p:ext>
+    </p:extLst>
+  </p:cSld>
+  <p:clrMapOvr>
+    <a:masterClrMapping/>
+  </p:clrMapOvr>
+  <p:timing>
+    <p:tnLst>
+      <p:par>
+        <p:cTn id="1" dur="indefinite" restart="never" nodeType="tmRoot"/>
+      </p:par>
+    </p:tnLst>
+  </p:timing>
+</p:sld>
+</file>
+
+<file path=ppt/slides/slide31.xml><?xml version="1.0" encoding="utf-8"?>
+<p:sld xmlns:a="http://schemas.openxmlformats.org/drawingml/2006/main" xmlns:r="http://schemas.openxmlformats.org/officeDocument/2006/relationships" xmlns:p="http://schemas.openxmlformats.org/presentationml/2006/main">
+  <p:cSld>
+    <p:bg>
+      <p:bgPr>
+        <a:blipFill dpi="0" rotWithShape="1">
+          <a:blip r:embed="rId2" cstate="print">
+            <a:lum/>
+          </a:blip>
+          <a:srcRect/>
+          <a:stretch>
+            <a:fillRect/>
+          </a:stretch>
+        </a:blipFill>
+        <a:effectLst/>
+      </p:bgPr>
+    </p:bg>
+    <p:spTree>
+      <p:nvGrpSpPr>
+        <p:cNvPr id="1" name=""/>
+        <p:cNvGrpSpPr/>
+        <p:nvPr/>
+      </p:nvGrpSpPr>
+      <p:grpSpPr>
+        <a:xfrm>
+          <a:off x="0" y="0"/>
+          <a:ext cx="0" cy="0"/>
+          <a:chOff x="0" y="0"/>
+          <a:chExt cx="0" cy="0"/>
+        </a:xfrm>
+      </p:grpSpPr>
+      <p:sp>
+        <p:nvSpPr>
+          <p:cNvPr id="20482" name="Rectangle 1"/>
+          <p:cNvSpPr>
+            <a:spLocks noChangeArrowheads="1"/>
+          </p:cNvSpPr>
+          <p:nvPr/>
+        </p:nvSpPr>
+        <p:spPr bwMode="auto">
+          <a:xfrm>
+            <a:off x="381000" y="-4763"/>
+            <a:ext cx="8305800" cy="461963"/>
+          </a:xfrm>
+          <a:prstGeom prst="rect">
+            <a:avLst/>
+          </a:prstGeom>
+          <a:noFill/>
+          <a:ln>
+            <a:noFill/>
+          </a:ln>
+          <a:extLst>
+            <a:ext uri="{909E8E84-426E-40DD-AFC4-6F175D3DCCD1}">
+              <a14:hiddenFill xmlns:a14="http://schemas.microsoft.com/office/drawing/2010/main">
+                <a:solidFill>
+                  <a:srgbClr val="FFFFFF"/>
+                </a:solidFill>
+              </a14:hiddenFill>
+            </a:ext>
+            <a:ext uri="{91240B29-F687-4F45-9708-019B960494DF}">
+              <a14:hiddenLine xmlns:a14="http://schemas.microsoft.com/office/drawing/2010/main" w="9525">
+                <a:solidFill>
+                  <a:srgbClr val="000000"/>
+                </a:solidFill>
+                <a:miter lim="800000"/>
+                <a:headEnd/>
+                <a:tailEnd/>
+              </a14:hiddenLine>
+            </a:ext>
+          </a:extLst>
+        </p:spPr>
+        <p:txBody>
+          <a:bodyPr anchor="ctr">
+            <a:spAutoFit/>
+          </a:bodyPr>
+          <a:lstStyle/>
+          <a:p>
+            <a:pPr algn="ctr">
+              <a:tabLst>
+                <a:tab pos="457200" algn="l"/>
+              </a:tabLst>
+            </a:pPr>
+            <a:r>
+              <a:rPr lang="ru-RU" sz="2400" b="1" dirty="0">
+                <a:solidFill>
+                  <a:schemeClr val="bg1"/>
+                </a:solidFill>
+                <a:cs typeface="Times New Roman" pitchFamily="18" charset="0"/>
+              </a:rPr>
+              <a:t>Перегрузка операторов</a:t>
+            </a:r>
+            <a:endParaRPr lang="en-US" sz="2400" b="1" dirty="0">
+              <a:solidFill>
+                <a:schemeClr val="bg1"/>
+              </a:solidFill>
+              <a:cs typeface="Times New Roman" pitchFamily="18" charset="0"/>
+            </a:endParaRPr>
+          </a:p>
+        </p:txBody>
+      </p:sp>
+      <p:sp>
+        <p:nvSpPr>
+          <p:cNvPr id="20483" name="Прямоугольник 3"/>
+          <p:cNvSpPr>
+            <a:spLocks noChangeArrowheads="1"/>
+          </p:cNvSpPr>
+          <p:nvPr/>
+        </p:nvSpPr>
+        <p:spPr bwMode="auto">
+          <a:xfrm>
+            <a:off x="152400" y="533400"/>
             <a:ext cx="8839200" cy="5632311"/>
           </a:xfrm>
           <a:prstGeom prst="rect">
@@ -33496,7 +34575,7 @@
 </p:sld>
 </file>
 
-<file path=ppt/slides/slide31.xml><?xml version="1.0" encoding="utf-8"?>
+<file path=ppt/slides/slide32.xml><?xml version="1.0" encoding="utf-8"?>
 <p:sld xmlns:a="http://schemas.openxmlformats.org/drawingml/2006/main" xmlns:r="http://schemas.openxmlformats.org/officeDocument/2006/relationships" xmlns:p="http://schemas.openxmlformats.org/presentationml/2006/main">
   <p:cSld>
     <p:bg>
@@ -35506,7 +36585,7 @@
 </p:sld>
 </file>
 
-<file path=ppt/slides/slide32.xml><?xml version="1.0" encoding="utf-8"?>
+<file path=ppt/slides/slide33.xml><?xml version="1.0" encoding="utf-8"?>
 <p:sld xmlns:a="http://schemas.openxmlformats.org/drawingml/2006/main" xmlns:r="http://schemas.openxmlformats.org/officeDocument/2006/relationships" xmlns:p="http://schemas.openxmlformats.org/presentationml/2006/main">
   <p:cSld>
     <p:bg>
@@ -35704,7 +36783,7 @@
 </p:sld>
 </file>
 
-<file path=ppt/slides/slide33.xml><?xml version="1.0" encoding="utf-8"?>
+<file path=ppt/slides/slide34.xml><?xml version="1.0" encoding="utf-8"?>
 <p:sld xmlns:a="http://schemas.openxmlformats.org/drawingml/2006/main" xmlns:r="http://schemas.openxmlformats.org/officeDocument/2006/relationships" xmlns:p="http://schemas.openxmlformats.org/presentationml/2006/main">
   <p:cSld>
     <p:bg>
@@ -36245,7 +37324,7 @@
 </p:sld>
 </file>
 
-<file path=ppt/slides/slide34.xml><?xml version="1.0" encoding="utf-8"?>
+<file path=ppt/slides/slide35.xml><?xml version="1.0" encoding="utf-8"?>
 <p:sld xmlns:a="http://schemas.openxmlformats.org/drawingml/2006/main" xmlns:r="http://schemas.openxmlformats.org/officeDocument/2006/relationships" xmlns:p="http://schemas.openxmlformats.org/presentationml/2006/main">
   <p:cSld>
     <p:bg>
@@ -37514,357 +38593,6 @@
     <p:extLst>
       <p:ext uri="{BB962C8B-B14F-4D97-AF65-F5344CB8AC3E}">
         <p14:creationId xmlns:p14="http://schemas.microsoft.com/office/powerpoint/2010/main" val="2364817515"/>
-      </p:ext>
-    </p:extLst>
-  </p:cSld>
-  <p:clrMapOvr>
-    <a:masterClrMapping/>
-  </p:clrMapOvr>
-  <p:timing>
-    <p:tnLst>
-      <p:par>
-        <p:cTn id="1" dur="indefinite" restart="never" nodeType="tmRoot"/>
-      </p:par>
-    </p:tnLst>
-  </p:timing>
-</p:sld>
-</file>
-
-<file path=ppt/slides/slide35.xml><?xml version="1.0" encoding="utf-8"?>
-<p:sld xmlns:a="http://schemas.openxmlformats.org/drawingml/2006/main" xmlns:r="http://schemas.openxmlformats.org/officeDocument/2006/relationships" xmlns:p="http://schemas.openxmlformats.org/presentationml/2006/main">
-  <p:cSld>
-    <p:bg>
-      <p:bgPr>
-        <a:blipFill dpi="0" rotWithShape="1">
-          <a:blip r:embed="rId2" cstate="print">
-            <a:lum/>
-          </a:blip>
-          <a:srcRect/>
-          <a:stretch>
-            <a:fillRect/>
-          </a:stretch>
-        </a:blipFill>
-        <a:effectLst/>
-      </p:bgPr>
-    </p:bg>
-    <p:spTree>
-      <p:nvGrpSpPr>
-        <p:cNvPr id="1" name=""/>
-        <p:cNvGrpSpPr/>
-        <p:nvPr/>
-      </p:nvGrpSpPr>
-      <p:grpSpPr>
-        <a:xfrm>
-          <a:off x="0" y="0"/>
-          <a:ext cx="0" cy="0"/>
-          <a:chOff x="0" y="0"/>
-          <a:chExt cx="0" cy="0"/>
-        </a:xfrm>
-      </p:grpSpPr>
-      <p:sp>
-        <p:nvSpPr>
-          <p:cNvPr id="22530" name="Rectangle 1"/>
-          <p:cNvSpPr>
-            <a:spLocks noChangeArrowheads="1"/>
-          </p:cNvSpPr>
-          <p:nvPr/>
-        </p:nvSpPr>
-        <p:spPr bwMode="auto">
-          <a:xfrm>
-            <a:off x="370656" y="293747"/>
-            <a:ext cx="8305800" cy="830997"/>
-          </a:xfrm>
-          <a:prstGeom prst="rect">
-            <a:avLst/>
-          </a:prstGeom>
-          <a:noFill/>
-          <a:ln>
-            <a:noFill/>
-          </a:ln>
-          <a:extLst>
-            <a:ext uri="{909E8E84-426E-40DD-AFC4-6F175D3DCCD1}">
-              <a14:hiddenFill xmlns:a14="http://schemas.microsoft.com/office/drawing/2010/main">
-                <a:solidFill>
-                  <a:srgbClr val="FFFFFF"/>
-                </a:solidFill>
-              </a14:hiddenFill>
-            </a:ext>
-            <a:ext uri="{91240B29-F687-4F45-9708-019B960494DF}">
-              <a14:hiddenLine xmlns:a14="http://schemas.microsoft.com/office/drawing/2010/main" w="9525">
-                <a:solidFill>
-                  <a:srgbClr val="000000"/>
-                </a:solidFill>
-                <a:miter lim="800000"/>
-                <a:headEnd/>
-                <a:tailEnd/>
-              </a14:hiddenLine>
-            </a:ext>
-          </a:extLst>
-        </p:spPr>
-        <p:txBody>
-          <a:bodyPr anchor="ctr">
-            <a:spAutoFit/>
-          </a:bodyPr>
-          <a:lstStyle/>
-          <a:p>
-            <a:pPr algn="ctr">
-              <a:tabLst>
-                <a:tab pos="457200" algn="l"/>
-              </a:tabLst>
-            </a:pPr>
-            <a:r>
-              <a:rPr lang="ru-RU" sz="2400" b="1" dirty="0" smtClean="0">
-                <a:solidFill>
-                  <a:schemeClr val="bg1"/>
-                </a:solidFill>
-                <a:cs typeface="Times New Roman" pitchFamily="18" charset="0"/>
-              </a:rPr>
-              <a:t>Дополнительные </a:t>
-            </a:r>
-            <a:r>
-              <a:rPr lang="ru-RU" sz="2400" b="1" dirty="0">
-                <a:solidFill>
-                  <a:schemeClr val="bg1"/>
-                </a:solidFill>
-                <a:cs typeface="Times New Roman" pitchFamily="18" charset="0"/>
-              </a:rPr>
-              <a:t>к</a:t>
-            </a:r>
-            <a:r>
-              <a:rPr lang="ru-RU" sz="2400" b="1" dirty="0" smtClean="0">
-                <a:solidFill>
-                  <a:schemeClr val="bg1"/>
-                </a:solidFill>
-                <a:cs typeface="Times New Roman" pitchFamily="18" charset="0"/>
-              </a:rPr>
-              <a:t>оллекции</a:t>
-            </a:r>
-            <a:r>
-              <a:rPr lang="en-US" sz="2400" b="1" dirty="0" smtClean="0">
-                <a:solidFill>
-                  <a:schemeClr val="bg1"/>
-                </a:solidFill>
-                <a:cs typeface="Times New Roman" pitchFamily="18" charset="0"/>
-              </a:rPr>
-              <a:t> </a:t>
-            </a:r>
-            <a:r>
-              <a:rPr lang="ru-RU" sz="2400" b="1" dirty="0" smtClean="0">
-                <a:solidFill>
-                  <a:schemeClr val="bg1"/>
-                </a:solidFill>
-                <a:cs typeface="Times New Roman" pitchFamily="18" charset="0"/>
-              </a:rPr>
-              <a:t>— </a:t>
-            </a:r>
-            <a:br>
-              <a:rPr lang="ru-RU" sz="2400" b="1" dirty="0" smtClean="0">
-                <a:solidFill>
-                  <a:schemeClr val="bg1"/>
-                </a:solidFill>
-                <a:cs typeface="Times New Roman" pitchFamily="18" charset="0"/>
-              </a:rPr>
-            </a:br>
-            <a:r>
-              <a:rPr lang="en-US" sz="2400" b="1" dirty="0" smtClean="0">
-                <a:solidFill>
-                  <a:schemeClr val="bg1"/>
-                </a:solidFill>
-                <a:cs typeface="Times New Roman" pitchFamily="18" charset="0"/>
-              </a:rPr>
-              <a:t>The </a:t>
-            </a:r>
-            <a:r>
-              <a:rPr lang="en-US" sz="2400" b="1" dirty="0">
-                <a:solidFill>
-                  <a:schemeClr val="bg1"/>
-                </a:solidFill>
-                <a:cs typeface="Times New Roman" pitchFamily="18" charset="0"/>
-              </a:rPr>
-              <a:t>C5 Generic Collection Library</a:t>
-            </a:r>
-            <a:endParaRPr lang="en-US" sz="1200" dirty="0">
-              <a:solidFill>
-                <a:schemeClr val="bg1"/>
-              </a:solidFill>
-              <a:cs typeface="Times New Roman" pitchFamily="18" charset="0"/>
-            </a:endParaRPr>
-          </a:p>
-        </p:txBody>
-      </p:sp>
-      <p:sp>
-        <p:nvSpPr>
-          <p:cNvPr id="5" name="Rectangle 1"/>
-          <p:cNvSpPr>
-            <a:spLocks noChangeArrowheads="1"/>
-          </p:cNvSpPr>
-          <p:nvPr/>
-        </p:nvSpPr>
-        <p:spPr bwMode="auto">
-          <a:xfrm>
-            <a:off x="370656" y="1412776"/>
-            <a:ext cx="8305800" cy="1477328"/>
-          </a:xfrm>
-          <a:prstGeom prst="rect">
-            <a:avLst/>
-          </a:prstGeom>
-          <a:noFill/>
-          <a:ln>
-            <a:noFill/>
-          </a:ln>
-          <a:extLst>
-            <a:ext uri="{909E8E84-426E-40DD-AFC4-6F175D3DCCD1}">
-              <a14:hiddenFill xmlns:a14="http://schemas.microsoft.com/office/drawing/2010/main">
-                <a:solidFill>
-                  <a:srgbClr val="FFFFFF"/>
-                </a:solidFill>
-              </a14:hiddenFill>
-            </a:ext>
-            <a:ext uri="{91240B29-F687-4F45-9708-019B960494DF}">
-              <a14:hiddenLine xmlns:a14="http://schemas.microsoft.com/office/drawing/2010/main" w="9525">
-                <a:solidFill>
-                  <a:srgbClr val="000000"/>
-                </a:solidFill>
-                <a:miter lim="800000"/>
-                <a:headEnd/>
-                <a:tailEnd/>
-              </a14:hiddenLine>
-            </a:ext>
-          </a:extLst>
-        </p:spPr>
-        <p:txBody>
-          <a:bodyPr anchor="ctr">
-            <a:spAutoFit/>
-          </a:bodyPr>
-          <a:lstStyle/>
-          <a:p>
-            <a:pPr>
-              <a:tabLst>
-                <a:tab pos="457200" algn="l"/>
-              </a:tabLst>
-            </a:pPr>
-            <a:r>
-              <a:rPr lang="ru-RU" dirty="0" smtClean="0">
-                <a:solidFill>
-                  <a:schemeClr val="bg1"/>
-                </a:solidFill>
-                <a:cs typeface="Times New Roman" pitchFamily="18" charset="0"/>
-              </a:rPr>
-              <a:t>Если вам не хватает стандартных коллекций, то можно использовать библиотеку </a:t>
-            </a:r>
-            <a:r>
-              <a:rPr lang="en-US" dirty="0">
-                <a:solidFill>
-                  <a:schemeClr val="bg1"/>
-                </a:solidFill>
-                <a:cs typeface="Times New Roman" pitchFamily="18" charset="0"/>
-              </a:rPr>
-              <a:t>C5 — </a:t>
-            </a:r>
-            <a:r>
-              <a:rPr lang="en-US" dirty="0">
-                <a:solidFill>
-                  <a:schemeClr val="bg1"/>
-                </a:solidFill>
-                <a:cs typeface="Times New Roman" pitchFamily="18" charset="0"/>
-                <a:hlinkClick r:id="rId3"/>
-              </a:rPr>
-              <a:t>http://www.itu.dk/research/c5</a:t>
-            </a:r>
-            <a:r>
-              <a:rPr lang="en-US" dirty="0" smtClean="0">
-                <a:solidFill>
-                  <a:schemeClr val="bg1"/>
-                </a:solidFill>
-                <a:cs typeface="Times New Roman" pitchFamily="18" charset="0"/>
-                <a:hlinkClick r:id="rId3"/>
-              </a:rPr>
-              <a:t>/</a:t>
-            </a:r>
-            <a:endParaRPr lang="en-US" dirty="0" smtClean="0">
-              <a:solidFill>
-                <a:schemeClr val="bg1"/>
-              </a:solidFill>
-              <a:cs typeface="Times New Roman" pitchFamily="18" charset="0"/>
-            </a:endParaRPr>
-          </a:p>
-          <a:p>
-            <a:pPr>
-              <a:tabLst>
-                <a:tab pos="457200" algn="l"/>
-              </a:tabLst>
-            </a:pPr>
-            <a:endParaRPr lang="en-US" dirty="0">
-              <a:solidFill>
-                <a:schemeClr val="bg1"/>
-              </a:solidFill>
-              <a:cs typeface="Times New Roman" pitchFamily="18" charset="0"/>
-            </a:endParaRPr>
-          </a:p>
-          <a:p>
-            <a:pPr>
-              <a:tabLst>
-                <a:tab pos="457200" algn="l"/>
-              </a:tabLst>
-            </a:pPr>
-            <a:r>
-              <a:rPr lang="ru-RU" dirty="0" smtClean="0">
-                <a:solidFill>
-                  <a:schemeClr val="bg1"/>
-                </a:solidFill>
-                <a:cs typeface="Times New Roman" pitchFamily="18" charset="0"/>
-              </a:rPr>
-              <a:t>Подключить библиотеку к проекту можно также через </a:t>
-            </a:r>
-            <a:r>
-              <a:rPr lang="en-US" dirty="0" smtClean="0">
-                <a:solidFill>
-                  <a:schemeClr val="bg1"/>
-                </a:solidFill>
-                <a:cs typeface="Times New Roman" pitchFamily="18" charset="0"/>
-              </a:rPr>
-              <a:t>NuGet</a:t>
-            </a:r>
-          </a:p>
-          <a:p>
-            <a:pPr>
-              <a:tabLst>
-                <a:tab pos="457200" algn="l"/>
-              </a:tabLst>
-            </a:pPr>
-            <a:r>
-              <a:rPr lang="en-US" dirty="0">
-                <a:solidFill>
-                  <a:schemeClr val="bg1"/>
-                </a:solidFill>
-                <a:cs typeface="Times New Roman" pitchFamily="18" charset="0"/>
-                <a:hlinkClick r:id="rId4"/>
-              </a:rPr>
-              <a:t>http://www.nuget.org/packages/C5</a:t>
-            </a:r>
-            <a:r>
-              <a:rPr lang="en-US" dirty="0" smtClean="0">
-                <a:solidFill>
-                  <a:schemeClr val="bg1"/>
-                </a:solidFill>
-                <a:cs typeface="Times New Roman" pitchFamily="18" charset="0"/>
-                <a:hlinkClick r:id="rId4"/>
-              </a:rPr>
-              <a:t>/</a:t>
-            </a:r>
-            <a:endParaRPr lang="en-US" dirty="0">
-              <a:solidFill>
-                <a:schemeClr val="bg1"/>
-              </a:solidFill>
-              <a:cs typeface="Times New Roman" pitchFamily="18" charset="0"/>
-            </a:endParaRPr>
-          </a:p>
-        </p:txBody>
-      </p:sp>
-    </p:spTree>
-    <p:extLst>
-      <p:ext uri="{BB962C8B-B14F-4D97-AF65-F5344CB8AC3E}">
-        <p14:creationId xmlns:p14="http://schemas.microsoft.com/office/powerpoint/2010/main" val="2769392668"/>
       </p:ext>
     </p:extLst>
   </p:cSld>
@@ -37922,6 +38650,357 @@
         </p:nvSpPr>
         <p:spPr bwMode="auto">
           <a:xfrm>
+            <a:off x="370656" y="293747"/>
+            <a:ext cx="8305800" cy="830997"/>
+          </a:xfrm>
+          <a:prstGeom prst="rect">
+            <a:avLst/>
+          </a:prstGeom>
+          <a:noFill/>
+          <a:ln>
+            <a:noFill/>
+          </a:ln>
+          <a:extLst>
+            <a:ext uri="{909E8E84-426E-40DD-AFC4-6F175D3DCCD1}">
+              <a14:hiddenFill xmlns:a14="http://schemas.microsoft.com/office/drawing/2010/main">
+                <a:solidFill>
+                  <a:srgbClr val="FFFFFF"/>
+                </a:solidFill>
+              </a14:hiddenFill>
+            </a:ext>
+            <a:ext uri="{91240B29-F687-4F45-9708-019B960494DF}">
+              <a14:hiddenLine xmlns:a14="http://schemas.microsoft.com/office/drawing/2010/main" w="9525">
+                <a:solidFill>
+                  <a:srgbClr val="000000"/>
+                </a:solidFill>
+                <a:miter lim="800000"/>
+                <a:headEnd/>
+                <a:tailEnd/>
+              </a14:hiddenLine>
+            </a:ext>
+          </a:extLst>
+        </p:spPr>
+        <p:txBody>
+          <a:bodyPr anchor="ctr">
+            <a:spAutoFit/>
+          </a:bodyPr>
+          <a:lstStyle/>
+          <a:p>
+            <a:pPr algn="ctr">
+              <a:tabLst>
+                <a:tab pos="457200" algn="l"/>
+              </a:tabLst>
+            </a:pPr>
+            <a:r>
+              <a:rPr lang="ru-RU" sz="2400" b="1" dirty="0" smtClean="0">
+                <a:solidFill>
+                  <a:schemeClr val="bg1"/>
+                </a:solidFill>
+                <a:cs typeface="Times New Roman" pitchFamily="18" charset="0"/>
+              </a:rPr>
+              <a:t>Дополнительные </a:t>
+            </a:r>
+            <a:r>
+              <a:rPr lang="ru-RU" sz="2400" b="1" dirty="0">
+                <a:solidFill>
+                  <a:schemeClr val="bg1"/>
+                </a:solidFill>
+                <a:cs typeface="Times New Roman" pitchFamily="18" charset="0"/>
+              </a:rPr>
+              <a:t>к</a:t>
+            </a:r>
+            <a:r>
+              <a:rPr lang="ru-RU" sz="2400" b="1" dirty="0" smtClean="0">
+                <a:solidFill>
+                  <a:schemeClr val="bg1"/>
+                </a:solidFill>
+                <a:cs typeface="Times New Roman" pitchFamily="18" charset="0"/>
+              </a:rPr>
+              <a:t>оллекции</a:t>
+            </a:r>
+            <a:r>
+              <a:rPr lang="en-US" sz="2400" b="1" dirty="0" smtClean="0">
+                <a:solidFill>
+                  <a:schemeClr val="bg1"/>
+                </a:solidFill>
+                <a:cs typeface="Times New Roman" pitchFamily="18" charset="0"/>
+              </a:rPr>
+              <a:t> </a:t>
+            </a:r>
+            <a:r>
+              <a:rPr lang="ru-RU" sz="2400" b="1" dirty="0" smtClean="0">
+                <a:solidFill>
+                  <a:schemeClr val="bg1"/>
+                </a:solidFill>
+                <a:cs typeface="Times New Roman" pitchFamily="18" charset="0"/>
+              </a:rPr>
+              <a:t>— </a:t>
+            </a:r>
+            <a:br>
+              <a:rPr lang="ru-RU" sz="2400" b="1" dirty="0" smtClean="0">
+                <a:solidFill>
+                  <a:schemeClr val="bg1"/>
+                </a:solidFill>
+                <a:cs typeface="Times New Roman" pitchFamily="18" charset="0"/>
+              </a:rPr>
+            </a:br>
+            <a:r>
+              <a:rPr lang="en-US" sz="2400" b="1" dirty="0" smtClean="0">
+                <a:solidFill>
+                  <a:schemeClr val="bg1"/>
+                </a:solidFill>
+                <a:cs typeface="Times New Roman" pitchFamily="18" charset="0"/>
+              </a:rPr>
+              <a:t>The </a:t>
+            </a:r>
+            <a:r>
+              <a:rPr lang="en-US" sz="2400" b="1" dirty="0">
+                <a:solidFill>
+                  <a:schemeClr val="bg1"/>
+                </a:solidFill>
+                <a:cs typeface="Times New Roman" pitchFamily="18" charset="0"/>
+              </a:rPr>
+              <a:t>C5 Generic Collection Library</a:t>
+            </a:r>
+            <a:endParaRPr lang="en-US" sz="1200" dirty="0">
+              <a:solidFill>
+                <a:schemeClr val="bg1"/>
+              </a:solidFill>
+              <a:cs typeface="Times New Roman" pitchFamily="18" charset="0"/>
+            </a:endParaRPr>
+          </a:p>
+        </p:txBody>
+      </p:sp>
+      <p:sp>
+        <p:nvSpPr>
+          <p:cNvPr id="5" name="Rectangle 1"/>
+          <p:cNvSpPr>
+            <a:spLocks noChangeArrowheads="1"/>
+          </p:cNvSpPr>
+          <p:nvPr/>
+        </p:nvSpPr>
+        <p:spPr bwMode="auto">
+          <a:xfrm>
+            <a:off x="370656" y="1412776"/>
+            <a:ext cx="8305800" cy="1477328"/>
+          </a:xfrm>
+          <a:prstGeom prst="rect">
+            <a:avLst/>
+          </a:prstGeom>
+          <a:noFill/>
+          <a:ln>
+            <a:noFill/>
+          </a:ln>
+          <a:extLst>
+            <a:ext uri="{909E8E84-426E-40DD-AFC4-6F175D3DCCD1}">
+              <a14:hiddenFill xmlns:a14="http://schemas.microsoft.com/office/drawing/2010/main">
+                <a:solidFill>
+                  <a:srgbClr val="FFFFFF"/>
+                </a:solidFill>
+              </a14:hiddenFill>
+            </a:ext>
+            <a:ext uri="{91240B29-F687-4F45-9708-019B960494DF}">
+              <a14:hiddenLine xmlns:a14="http://schemas.microsoft.com/office/drawing/2010/main" w="9525">
+                <a:solidFill>
+                  <a:srgbClr val="000000"/>
+                </a:solidFill>
+                <a:miter lim="800000"/>
+                <a:headEnd/>
+                <a:tailEnd/>
+              </a14:hiddenLine>
+            </a:ext>
+          </a:extLst>
+        </p:spPr>
+        <p:txBody>
+          <a:bodyPr anchor="ctr">
+            <a:spAutoFit/>
+          </a:bodyPr>
+          <a:lstStyle/>
+          <a:p>
+            <a:pPr>
+              <a:tabLst>
+                <a:tab pos="457200" algn="l"/>
+              </a:tabLst>
+            </a:pPr>
+            <a:r>
+              <a:rPr lang="ru-RU" dirty="0" smtClean="0">
+                <a:solidFill>
+                  <a:schemeClr val="bg1"/>
+                </a:solidFill>
+                <a:cs typeface="Times New Roman" pitchFamily="18" charset="0"/>
+              </a:rPr>
+              <a:t>Если вам не хватает стандартных коллекций, то можно использовать библиотеку </a:t>
+            </a:r>
+            <a:r>
+              <a:rPr lang="en-US" dirty="0">
+                <a:solidFill>
+                  <a:schemeClr val="bg1"/>
+                </a:solidFill>
+                <a:cs typeface="Times New Roman" pitchFamily="18" charset="0"/>
+              </a:rPr>
+              <a:t>C5 — </a:t>
+            </a:r>
+            <a:r>
+              <a:rPr lang="en-US" dirty="0">
+                <a:solidFill>
+                  <a:schemeClr val="bg1"/>
+                </a:solidFill>
+                <a:cs typeface="Times New Roman" pitchFamily="18" charset="0"/>
+                <a:hlinkClick r:id="rId3"/>
+              </a:rPr>
+              <a:t>http://www.itu.dk/research/c5</a:t>
+            </a:r>
+            <a:r>
+              <a:rPr lang="en-US" dirty="0" smtClean="0">
+                <a:solidFill>
+                  <a:schemeClr val="bg1"/>
+                </a:solidFill>
+                <a:cs typeface="Times New Roman" pitchFamily="18" charset="0"/>
+                <a:hlinkClick r:id="rId3"/>
+              </a:rPr>
+              <a:t>/</a:t>
+            </a:r>
+            <a:endParaRPr lang="en-US" dirty="0" smtClean="0">
+              <a:solidFill>
+                <a:schemeClr val="bg1"/>
+              </a:solidFill>
+              <a:cs typeface="Times New Roman" pitchFamily="18" charset="0"/>
+            </a:endParaRPr>
+          </a:p>
+          <a:p>
+            <a:pPr>
+              <a:tabLst>
+                <a:tab pos="457200" algn="l"/>
+              </a:tabLst>
+            </a:pPr>
+            <a:endParaRPr lang="en-US" dirty="0">
+              <a:solidFill>
+                <a:schemeClr val="bg1"/>
+              </a:solidFill>
+              <a:cs typeface="Times New Roman" pitchFamily="18" charset="0"/>
+            </a:endParaRPr>
+          </a:p>
+          <a:p>
+            <a:pPr>
+              <a:tabLst>
+                <a:tab pos="457200" algn="l"/>
+              </a:tabLst>
+            </a:pPr>
+            <a:r>
+              <a:rPr lang="ru-RU" dirty="0" smtClean="0">
+                <a:solidFill>
+                  <a:schemeClr val="bg1"/>
+                </a:solidFill>
+                <a:cs typeface="Times New Roman" pitchFamily="18" charset="0"/>
+              </a:rPr>
+              <a:t>Подключить библиотеку к проекту можно также через </a:t>
+            </a:r>
+            <a:r>
+              <a:rPr lang="en-US" dirty="0" smtClean="0">
+                <a:solidFill>
+                  <a:schemeClr val="bg1"/>
+                </a:solidFill>
+                <a:cs typeface="Times New Roman" pitchFamily="18" charset="0"/>
+              </a:rPr>
+              <a:t>NuGet</a:t>
+            </a:r>
+          </a:p>
+          <a:p>
+            <a:pPr>
+              <a:tabLst>
+                <a:tab pos="457200" algn="l"/>
+              </a:tabLst>
+            </a:pPr>
+            <a:r>
+              <a:rPr lang="en-US" dirty="0">
+                <a:solidFill>
+                  <a:schemeClr val="bg1"/>
+                </a:solidFill>
+                <a:cs typeface="Times New Roman" pitchFamily="18" charset="0"/>
+                <a:hlinkClick r:id="rId4"/>
+              </a:rPr>
+              <a:t>http://www.nuget.org/packages/C5</a:t>
+            </a:r>
+            <a:r>
+              <a:rPr lang="en-US" dirty="0" smtClean="0">
+                <a:solidFill>
+                  <a:schemeClr val="bg1"/>
+                </a:solidFill>
+                <a:cs typeface="Times New Roman" pitchFamily="18" charset="0"/>
+                <a:hlinkClick r:id="rId4"/>
+              </a:rPr>
+              <a:t>/</a:t>
+            </a:r>
+            <a:endParaRPr lang="en-US" dirty="0">
+              <a:solidFill>
+                <a:schemeClr val="bg1"/>
+              </a:solidFill>
+              <a:cs typeface="Times New Roman" pitchFamily="18" charset="0"/>
+            </a:endParaRPr>
+          </a:p>
+        </p:txBody>
+      </p:sp>
+    </p:spTree>
+    <p:extLst>
+      <p:ext uri="{BB962C8B-B14F-4D97-AF65-F5344CB8AC3E}">
+        <p14:creationId xmlns:p14="http://schemas.microsoft.com/office/powerpoint/2010/main" val="2769392668"/>
+      </p:ext>
+    </p:extLst>
+  </p:cSld>
+  <p:clrMapOvr>
+    <a:masterClrMapping/>
+  </p:clrMapOvr>
+  <p:timing>
+    <p:tnLst>
+      <p:par>
+        <p:cTn id="1" dur="indefinite" restart="never" nodeType="tmRoot"/>
+      </p:par>
+    </p:tnLst>
+  </p:timing>
+</p:sld>
+</file>
+
+<file path=ppt/slides/slide37.xml><?xml version="1.0" encoding="utf-8"?>
+<p:sld xmlns:a="http://schemas.openxmlformats.org/drawingml/2006/main" xmlns:r="http://schemas.openxmlformats.org/officeDocument/2006/relationships" xmlns:p="http://schemas.openxmlformats.org/presentationml/2006/main">
+  <p:cSld>
+    <p:bg>
+      <p:bgPr>
+        <a:blipFill dpi="0" rotWithShape="1">
+          <a:blip r:embed="rId2" cstate="print">
+            <a:lum/>
+          </a:blip>
+          <a:srcRect/>
+          <a:stretch>
+            <a:fillRect/>
+          </a:stretch>
+        </a:blipFill>
+        <a:effectLst/>
+      </p:bgPr>
+    </p:bg>
+    <p:spTree>
+      <p:nvGrpSpPr>
+        <p:cNvPr id="1" name=""/>
+        <p:cNvGrpSpPr/>
+        <p:nvPr/>
+      </p:nvGrpSpPr>
+      <p:grpSpPr>
+        <a:xfrm>
+          <a:off x="0" y="0"/>
+          <a:ext cx="0" cy="0"/>
+          <a:chOff x="0" y="0"/>
+          <a:chExt cx="0" cy="0"/>
+        </a:xfrm>
+      </p:grpSpPr>
+      <p:sp>
+        <p:nvSpPr>
+          <p:cNvPr id="22530" name="Rectangle 1"/>
+          <p:cNvSpPr>
+            <a:spLocks noChangeArrowheads="1"/>
+          </p:cNvSpPr>
+          <p:nvPr/>
+        </p:nvSpPr>
+        <p:spPr bwMode="auto">
+          <a:xfrm>
             <a:off x="381000" y="-76051"/>
             <a:ext cx="8305800" cy="461665"/>
           </a:xfrm>
@@ -38250,7 +39329,7 @@
 </p:sld>
 </file>
 
-<file path=ppt/slides/slide37.xml><?xml version="1.0" encoding="utf-8"?>
+<file path=ppt/slides/slide38.xml><?xml version="1.0" encoding="utf-8"?>
 <p:sld xmlns:a="http://schemas.openxmlformats.org/drawingml/2006/main" xmlns:r="http://schemas.openxmlformats.org/officeDocument/2006/relationships" xmlns:p="http://schemas.openxmlformats.org/presentationml/2006/main">
   <p:cSld>
     <p:bg>

</xml_diff>

<commit_message>
Fixed code samples in OOP pptx
</commit_message>
<xml_diff>
--- a/Presentation/lesson-02-oop.pptx
+++ b/Presentation/lesson-02-oop.pptx
@@ -329,7 +329,7 @@
             <a:fld id="{8E6E6A2A-E9D3-4A0D-B04A-ABDD367A1E08}" type="datetimeFigureOut">
               <a:rPr lang="ru-RU" smtClean="0"/>
               <a:pPr/>
-              <a:t>21.05.2014</a:t>
+              <a:t>23.05.2014</a:t>
             </a:fld>
             <a:endParaRPr lang="ru-RU" dirty="0"/>
           </a:p>
@@ -501,7 +501,7 @@
             <a:fld id="{8E6E6A2A-E9D3-4A0D-B04A-ABDD367A1E08}" type="datetimeFigureOut">
               <a:rPr lang="ru-RU" smtClean="0"/>
               <a:pPr/>
-              <a:t>21.05.2014</a:t>
+              <a:t>23.05.2014</a:t>
             </a:fld>
             <a:endParaRPr lang="ru-RU" dirty="0"/>
           </a:p>
@@ -683,7 +683,7 @@
             <a:fld id="{8E6E6A2A-E9D3-4A0D-B04A-ABDD367A1E08}" type="datetimeFigureOut">
               <a:rPr lang="ru-RU" smtClean="0"/>
               <a:pPr/>
-              <a:t>21.05.2014</a:t>
+              <a:t>23.05.2014</a:t>
             </a:fld>
             <a:endParaRPr lang="ru-RU" dirty="0"/>
           </a:p>
@@ -933,7 +933,7 @@
                 </a:solidFill>
               </a:rPr>
               <a:pPr/>
-              <a:t>21.05.2014</a:t>
+              <a:t>23.05.2014</a:t>
             </a:fld>
             <a:endParaRPr lang="ru-RU" dirty="0">
               <a:solidFill>
@@ -1135,7 +1135,7 @@
                 </a:solidFill>
               </a:rPr>
               <a:pPr/>
-              <a:t>21.05.2014</a:t>
+              <a:t>23.05.2014</a:t>
             </a:fld>
             <a:endParaRPr lang="ru-RU" dirty="0">
               <a:solidFill>
@@ -1413,7 +1413,7 @@
                 </a:solidFill>
               </a:rPr>
               <a:pPr/>
-              <a:t>21.05.2014</a:t>
+              <a:t>23.05.2014</a:t>
             </a:fld>
             <a:endParaRPr lang="ru-RU" dirty="0">
               <a:solidFill>
@@ -1733,7 +1733,7 @@
                 </a:solidFill>
               </a:rPr>
               <a:pPr/>
-              <a:t>21.05.2014</a:t>
+              <a:t>23.05.2014</a:t>
             </a:fld>
             <a:endParaRPr lang="ru-RU" dirty="0">
               <a:solidFill>
@@ -2187,7 +2187,7 @@
                 </a:solidFill>
               </a:rPr>
               <a:pPr/>
-              <a:t>21.05.2014</a:t>
+              <a:t>23.05.2014</a:t>
             </a:fld>
             <a:endParaRPr lang="ru-RU" dirty="0">
               <a:solidFill>
@@ -2337,7 +2337,7 @@
                 </a:solidFill>
               </a:rPr>
               <a:pPr/>
-              <a:t>21.05.2014</a:t>
+              <a:t>23.05.2014</a:t>
             </a:fld>
             <a:endParaRPr lang="ru-RU" dirty="0">
               <a:solidFill>
@@ -2464,7 +2464,7 @@
                 </a:solidFill>
               </a:rPr>
               <a:pPr/>
-              <a:t>21.05.2014</a:t>
+              <a:t>23.05.2014</a:t>
             </a:fld>
             <a:endParaRPr lang="ru-RU" dirty="0">
               <a:solidFill>
@@ -2773,7 +2773,7 @@
                 </a:solidFill>
               </a:rPr>
               <a:pPr/>
-              <a:t>21.05.2014</a:t>
+              <a:t>23.05.2014</a:t>
             </a:fld>
             <a:endParaRPr lang="ru-RU" dirty="0">
               <a:solidFill>
@@ -2969,7 +2969,7 @@
             <a:fld id="{8E6E6A2A-E9D3-4A0D-B04A-ABDD367A1E08}" type="datetimeFigureOut">
               <a:rPr lang="ru-RU" smtClean="0"/>
               <a:pPr/>
-              <a:t>21.05.2014</a:t>
+              <a:t>23.05.2014</a:t>
             </a:fld>
             <a:endParaRPr lang="ru-RU" dirty="0"/>
           </a:p>
@@ -3230,7 +3230,7 @@
                 </a:solidFill>
               </a:rPr>
               <a:pPr/>
-              <a:t>21.05.2014</a:t>
+              <a:t>23.05.2014</a:t>
             </a:fld>
             <a:endParaRPr lang="ru-RU" dirty="0">
               <a:solidFill>
@@ -3432,7 +3432,7 @@
                 </a:solidFill>
               </a:rPr>
               <a:pPr/>
-              <a:t>21.05.2014</a:t>
+              <a:t>23.05.2014</a:t>
             </a:fld>
             <a:endParaRPr lang="ru-RU" dirty="0">
               <a:solidFill>
@@ -3644,7 +3644,7 @@
                 </a:solidFill>
               </a:rPr>
               <a:pPr/>
-              <a:t>21.05.2014</a:t>
+              <a:t>23.05.2014</a:t>
             </a:fld>
             <a:endParaRPr lang="ru-RU" dirty="0">
               <a:solidFill>
@@ -5101,7 +5101,7 @@
             <a:fld id="{8E6E6A2A-E9D3-4A0D-B04A-ABDD367A1E08}" type="datetimeFigureOut">
               <a:rPr lang="ru-RU" smtClean="0"/>
               <a:pPr/>
-              <a:t>21.05.2014</a:t>
+              <a:t>23.05.2014</a:t>
             </a:fld>
             <a:endParaRPr lang="ru-RU" dirty="0"/>
           </a:p>
@@ -6005,7 +6005,7 @@
                 </a:solidFill>
               </a:rPr>
               <a:pPr/>
-              <a:t>21.05.2014</a:t>
+              <a:t>23.05.2014</a:t>
             </a:fld>
             <a:endParaRPr lang="ru-RU" dirty="0">
               <a:solidFill>
@@ -6279,7 +6279,7 @@
                 </a:solidFill>
               </a:rPr>
               <a:pPr/>
-              <a:t>21.05.2014</a:t>
+              <a:t>23.05.2014</a:t>
             </a:fld>
             <a:endParaRPr lang="ru-RU" dirty="0">
               <a:solidFill>
@@ -6481,7 +6481,7 @@
                 </a:solidFill>
               </a:rPr>
               <a:pPr/>
-              <a:t>21.05.2014</a:t>
+              <a:t>23.05.2014</a:t>
             </a:fld>
             <a:endParaRPr lang="ru-RU" dirty="0">
               <a:solidFill>
@@ -6759,7 +6759,7 @@
                 </a:solidFill>
               </a:rPr>
               <a:pPr/>
-              <a:t>21.05.2014</a:t>
+              <a:t>23.05.2014</a:t>
             </a:fld>
             <a:endParaRPr lang="ru-RU" dirty="0">
               <a:solidFill>
@@ -7079,7 +7079,7 @@
                 </a:solidFill>
               </a:rPr>
               <a:pPr/>
-              <a:t>21.05.2014</a:t>
+              <a:t>23.05.2014</a:t>
             </a:fld>
             <a:endParaRPr lang="ru-RU" dirty="0">
               <a:solidFill>
@@ -7393,7 +7393,7 @@
             <a:fld id="{8E6E6A2A-E9D3-4A0D-B04A-ABDD367A1E08}" type="datetimeFigureOut">
               <a:rPr lang="ru-RU" smtClean="0"/>
               <a:pPr/>
-              <a:t>21.05.2014</a:t>
+              <a:t>23.05.2014</a:t>
             </a:fld>
             <a:endParaRPr lang="ru-RU" dirty="0"/>
           </a:p>
@@ -7823,7 +7823,7 @@
                 </a:solidFill>
               </a:rPr>
               <a:pPr/>
-              <a:t>21.05.2014</a:t>
+              <a:t>23.05.2014</a:t>
             </a:fld>
             <a:endParaRPr lang="ru-RU" dirty="0">
               <a:solidFill>
@@ -7973,7 +7973,7 @@
                 </a:solidFill>
               </a:rPr>
               <a:pPr/>
-              <a:t>21.05.2014</a:t>
+              <a:t>23.05.2014</a:t>
             </a:fld>
             <a:endParaRPr lang="ru-RU" dirty="0">
               <a:solidFill>
@@ -8100,7 +8100,7 @@
                 </a:solidFill>
               </a:rPr>
               <a:pPr/>
-              <a:t>21.05.2014</a:t>
+              <a:t>23.05.2014</a:t>
             </a:fld>
             <a:endParaRPr lang="ru-RU" dirty="0">
               <a:solidFill>
@@ -8409,7 +8409,7 @@
                 </a:solidFill>
               </a:rPr>
               <a:pPr/>
-              <a:t>21.05.2014</a:t>
+              <a:t>23.05.2014</a:t>
             </a:fld>
             <a:endParaRPr lang="ru-RU" dirty="0">
               <a:solidFill>
@@ -8694,7 +8694,7 @@
                 </a:solidFill>
               </a:rPr>
               <a:pPr/>
-              <a:t>21.05.2014</a:t>
+              <a:t>23.05.2014</a:t>
             </a:fld>
             <a:endParaRPr lang="ru-RU" dirty="0">
               <a:solidFill>
@@ -8896,7 +8896,7 @@
                 </a:solidFill>
               </a:rPr>
               <a:pPr/>
-              <a:t>21.05.2014</a:t>
+              <a:t>23.05.2014</a:t>
             </a:fld>
             <a:endParaRPr lang="ru-RU" dirty="0">
               <a:solidFill>
@@ -9108,7 +9108,7 @@
                 </a:solidFill>
               </a:rPr>
               <a:pPr/>
-              <a:t>21.05.2014</a:t>
+              <a:t>23.05.2014</a:t>
             </a:fld>
             <a:endParaRPr lang="ru-RU" dirty="0">
               <a:solidFill>
@@ -9556,7 +9556,7 @@
             <a:fld id="{8E6E6A2A-E9D3-4A0D-B04A-ABDD367A1E08}" type="datetimeFigureOut">
               <a:rPr lang="ru-RU" smtClean="0"/>
               <a:pPr/>
-              <a:t>21.05.2014</a:t>
+              <a:t>23.05.2014</a:t>
             </a:fld>
             <a:endParaRPr lang="ru-RU" dirty="0"/>
           </a:p>
@@ -9676,7 +9676,7 @@
             <a:fld id="{8E6E6A2A-E9D3-4A0D-B04A-ABDD367A1E08}" type="datetimeFigureOut">
               <a:rPr lang="ru-RU" smtClean="0"/>
               <a:pPr/>
-              <a:t>21.05.2014</a:t>
+              <a:t>23.05.2014</a:t>
             </a:fld>
             <a:endParaRPr lang="ru-RU" dirty="0"/>
           </a:p>
@@ -9773,7 +9773,7 @@
             <a:fld id="{8E6E6A2A-E9D3-4A0D-B04A-ABDD367A1E08}" type="datetimeFigureOut">
               <a:rPr lang="ru-RU" smtClean="0"/>
               <a:pPr/>
-              <a:t>21.05.2014</a:t>
+              <a:t>23.05.2014</a:t>
             </a:fld>
             <a:endParaRPr lang="ru-RU" dirty="0"/>
           </a:p>
@@ -10052,7 +10052,7 @@
             <a:fld id="{8E6E6A2A-E9D3-4A0D-B04A-ABDD367A1E08}" type="datetimeFigureOut">
               <a:rPr lang="ru-RU" smtClean="0"/>
               <a:pPr/>
-              <a:t>21.05.2014</a:t>
+              <a:t>23.05.2014</a:t>
             </a:fld>
             <a:endParaRPr lang="ru-RU" dirty="0"/>
           </a:p>
@@ -10307,7 +10307,7 @@
             <a:fld id="{8E6E6A2A-E9D3-4A0D-B04A-ABDD367A1E08}" type="datetimeFigureOut">
               <a:rPr lang="ru-RU" smtClean="0"/>
               <a:pPr/>
-              <a:t>21.05.2014</a:t>
+              <a:t>23.05.2014</a:t>
             </a:fld>
             <a:endParaRPr lang="ru-RU" dirty="0"/>
           </a:p>
@@ -10522,7 +10522,7 @@
             <a:fld id="{8E6E6A2A-E9D3-4A0D-B04A-ABDD367A1E08}" type="datetimeFigureOut">
               <a:rPr lang="ru-RU" smtClean="0"/>
               <a:pPr/>
-              <a:t>21.05.2014</a:t>
+              <a:t>23.05.2014</a:t>
             </a:fld>
             <a:endParaRPr lang="ru-RU" dirty="0"/>
           </a:p>
@@ -11040,7 +11040,7 @@
                 </a:solidFill>
               </a:rPr>
               <a:pPr/>
-              <a:t>21.05.2014</a:t>
+              <a:t>23.05.2014</a:t>
             </a:fld>
             <a:endParaRPr lang="ru-RU" dirty="0">
               <a:solidFill>
@@ -11591,7 +11591,7 @@
                 </a:solidFill>
               </a:rPr>
               <a:pPr/>
-              <a:t>21.05.2014</a:t>
+              <a:t>23.05.2014</a:t>
             </a:fld>
             <a:endParaRPr lang="ru-RU" dirty="0">
               <a:solidFill>
@@ -12135,7 +12135,7 @@
                 </a:solidFill>
               </a:rPr>
               <a:pPr/>
-              <a:t>21.05.2014</a:t>
+              <a:t>23.05.2014</a:t>
             </a:fld>
             <a:endParaRPr lang="ru-RU" dirty="0">
               <a:solidFill>
@@ -13478,7 +13478,40 @@
                 <a:ea typeface="Calibri" pitchFamily="34" charset="0"/>
                 <a:cs typeface="Courier New" pitchFamily="49" charset="0"/>
               </a:rPr>
-              <a:t>public Point(int </a:t>
+              <a:t>public </a:t>
+            </a:r>
+            <a:r>
+              <a:rPr lang="be-BY" sz="1000" dirty="0" smtClean="0">
+                <a:solidFill>
+                  <a:schemeClr val="bg1"/>
+                </a:solidFill>
+                <a:latin typeface="Courier New" pitchFamily="49" charset="0"/>
+                <a:ea typeface="Calibri" pitchFamily="34" charset="0"/>
+                <a:cs typeface="Courier New" pitchFamily="49" charset="0"/>
+              </a:rPr>
+              <a:t>Point</a:t>
+            </a:r>
+            <a:r>
+              <a:rPr lang="en-US" sz="1000" dirty="0" smtClean="0">
+                <a:solidFill>
+                  <a:schemeClr val="bg1"/>
+                </a:solidFill>
+                <a:latin typeface="Courier New" pitchFamily="49" charset="0"/>
+                <a:ea typeface="Calibri" pitchFamily="34" charset="0"/>
+                <a:cs typeface="Courier New" pitchFamily="49" charset="0"/>
+              </a:rPr>
+              <a:t>2D</a:t>
+            </a:r>
+            <a:r>
+              <a:rPr lang="be-BY" sz="1000" dirty="0" smtClean="0">
+                <a:solidFill>
+                  <a:schemeClr val="bg1"/>
+                </a:solidFill>
+                <a:latin typeface="Courier New" pitchFamily="49" charset="0"/>
+                <a:ea typeface="Calibri" pitchFamily="34" charset="0"/>
+                <a:cs typeface="Courier New" pitchFamily="49" charset="0"/>
+              </a:rPr>
+              <a:t>(int </a:t>
             </a:r>
             <a:r>
               <a:rPr lang="en-US" sz="1000" dirty="0">
@@ -13579,18 +13612,29 @@
                 <a:ea typeface="Calibri" pitchFamily="34" charset="0"/>
                 <a:cs typeface="Courier New" pitchFamily="49" charset="0"/>
               </a:rPr>
-              <a:t>			</a:t>
-            </a:r>
-            <a:r>
-              <a:rPr lang="en-US" sz="1000" dirty="0" smtClean="0">
-                <a:solidFill>
-                  <a:schemeClr val="bg1"/>
-                </a:solidFill>
-                <a:latin typeface="Courier New" pitchFamily="49" charset="0"/>
-                <a:ea typeface="Calibri" pitchFamily="34" charset="0"/>
-                <a:cs typeface="Courier New" pitchFamily="49" charset="0"/>
-              </a:rPr>
-              <a:t>this,</a:t>
+              <a:t>		</a:t>
+            </a:r>
+            <a:r>
+              <a:rPr lang="en-US" sz="1000">
+                <a:solidFill>
+                  <a:schemeClr val="bg1"/>
+                </a:solidFill>
+                <a:latin typeface="Courier New" pitchFamily="49" charset="0"/>
+                <a:ea typeface="Calibri" pitchFamily="34" charset="0"/>
+                <a:cs typeface="Courier New" pitchFamily="49" charset="0"/>
+              </a:rPr>
+              <a:t>	</a:t>
+            </a:r>
+            <a:r>
+              <a:rPr lang="en-US" sz="1000" smtClean="0">
+                <a:solidFill>
+                  <a:schemeClr val="bg1"/>
+                </a:solidFill>
+                <a:latin typeface="Courier New" pitchFamily="49" charset="0"/>
+                <a:ea typeface="Calibri" pitchFamily="34" charset="0"/>
+                <a:cs typeface="Courier New" pitchFamily="49" charset="0"/>
+              </a:rPr>
+              <a:t>this.</a:t>
             </a:r>
             <a:r>
               <a:rPr lang="be-BY" sz="1000" dirty="0" smtClean="0">
@@ -14490,7 +14534,40 @@
                 <a:ea typeface="Calibri" pitchFamily="34" charset="0"/>
                 <a:cs typeface="Courier New" pitchFamily="49" charset="0"/>
               </a:rPr>
-              <a:t>public Point(int </a:t>
+              <a:t>public </a:t>
+            </a:r>
+            <a:r>
+              <a:rPr lang="be-BY" sz="1000" dirty="0" smtClean="0">
+                <a:solidFill>
+                  <a:schemeClr val="bg1"/>
+                </a:solidFill>
+                <a:latin typeface="Courier New" pitchFamily="49" charset="0"/>
+                <a:ea typeface="Calibri" pitchFamily="34" charset="0"/>
+                <a:cs typeface="Courier New" pitchFamily="49" charset="0"/>
+              </a:rPr>
+              <a:t>Point</a:t>
+            </a:r>
+            <a:r>
+              <a:rPr lang="en-US" sz="1000" dirty="0" smtClean="0">
+                <a:solidFill>
+                  <a:schemeClr val="bg1"/>
+                </a:solidFill>
+                <a:latin typeface="Courier New" pitchFamily="49" charset="0"/>
+                <a:ea typeface="Calibri" pitchFamily="34" charset="0"/>
+                <a:cs typeface="Courier New" pitchFamily="49" charset="0"/>
+              </a:rPr>
+              <a:t>2D</a:t>
+            </a:r>
+            <a:r>
+              <a:rPr lang="be-BY" sz="1000" dirty="0" smtClean="0">
+                <a:solidFill>
+                  <a:schemeClr val="bg1"/>
+                </a:solidFill>
+                <a:latin typeface="Courier New" pitchFamily="49" charset="0"/>
+                <a:ea typeface="Calibri" pitchFamily="34" charset="0"/>
+                <a:cs typeface="Courier New" pitchFamily="49" charset="0"/>
+              </a:rPr>
+              <a:t>(int </a:t>
             </a:r>
             <a:r>
               <a:rPr lang="en-US" sz="1000" dirty="0">
@@ -14602,7 +14679,7 @@
                 <a:ea typeface="Calibri" pitchFamily="34" charset="0"/>
                 <a:cs typeface="Courier New" pitchFamily="49" charset="0"/>
               </a:rPr>
-              <a:t>this,</a:t>
+              <a:t>this.</a:t>
             </a:r>
             <a:r>
               <a:rPr lang="be-BY" sz="1000" dirty="0" smtClean="0">
@@ -14813,7 +14890,29 @@
                 <a:ea typeface="Calibri" pitchFamily="34" charset="0"/>
                 <a:cs typeface="Courier New" pitchFamily="49" charset="0"/>
               </a:rPr>
-              <a:t>public Point</a:t>
+              <a:t>public </a:t>
+            </a:r>
+            <a:r>
+              <a:rPr lang="be-BY" sz="1000" dirty="0" smtClean="0">
+                <a:solidFill>
+                  <a:schemeClr val="bg1"/>
+                </a:solidFill>
+                <a:latin typeface="Courier New" pitchFamily="49" charset="0"/>
+                <a:ea typeface="Calibri" pitchFamily="34" charset="0"/>
+                <a:cs typeface="Courier New" pitchFamily="49" charset="0"/>
+              </a:rPr>
+              <a:t>Point</a:t>
+            </a:r>
+            <a:r>
+              <a:rPr lang="en-US" sz="1000" dirty="0" smtClean="0">
+                <a:solidFill>
+                  <a:schemeClr val="bg1"/>
+                </a:solidFill>
+                <a:latin typeface="Courier New" pitchFamily="49" charset="0"/>
+                <a:ea typeface="Calibri" pitchFamily="34" charset="0"/>
+                <a:cs typeface="Courier New" pitchFamily="49" charset="0"/>
+              </a:rPr>
+              <a:t>2D</a:t>
             </a:r>
             <a:r>
               <a:rPr lang="be-BY" sz="1000" dirty="0" smtClean="0">
@@ -15594,7 +15693,40 @@
                 <a:ea typeface="Calibri" pitchFamily="34" charset="0"/>
                 <a:cs typeface="Courier New" pitchFamily="49" charset="0"/>
               </a:rPr>
-              <a:t>public Point(int </a:t>
+              <a:t>public </a:t>
+            </a:r>
+            <a:r>
+              <a:rPr lang="be-BY" sz="1400" dirty="0" smtClean="0">
+                <a:solidFill>
+                  <a:schemeClr val="bg1"/>
+                </a:solidFill>
+                <a:latin typeface="Courier New" pitchFamily="49" charset="0"/>
+                <a:ea typeface="Calibri" pitchFamily="34" charset="0"/>
+                <a:cs typeface="Courier New" pitchFamily="49" charset="0"/>
+              </a:rPr>
+              <a:t>Point</a:t>
+            </a:r>
+            <a:r>
+              <a:rPr lang="en-US" sz="1400" dirty="0" smtClean="0">
+                <a:solidFill>
+                  <a:schemeClr val="bg1"/>
+                </a:solidFill>
+                <a:latin typeface="Courier New" pitchFamily="49" charset="0"/>
+                <a:ea typeface="Calibri" pitchFamily="34" charset="0"/>
+                <a:cs typeface="Courier New" pitchFamily="49" charset="0"/>
+              </a:rPr>
+              <a:t>2D</a:t>
+            </a:r>
+            <a:r>
+              <a:rPr lang="be-BY" sz="1400" dirty="0" smtClean="0">
+                <a:solidFill>
+                  <a:schemeClr val="bg1"/>
+                </a:solidFill>
+                <a:latin typeface="Courier New" pitchFamily="49" charset="0"/>
+                <a:ea typeface="Calibri" pitchFamily="34" charset="0"/>
+                <a:cs typeface="Courier New" pitchFamily="49" charset="0"/>
+              </a:rPr>
+              <a:t>(int </a:t>
             </a:r>
             <a:r>
               <a:rPr lang="en-US" sz="1400" dirty="0">
@@ -15707,7 +15839,7 @@
                 <a:ea typeface="Calibri" pitchFamily="34" charset="0"/>
                 <a:cs typeface="Courier New" pitchFamily="49" charset="0"/>
               </a:rPr>
-              <a:t>this,</a:t>
+              <a:t>this.</a:t>
             </a:r>
             <a:r>
               <a:rPr lang="be-BY" sz="1400" dirty="0" smtClean="0">
@@ -39214,16 +39346,7 @@
                 </a:solidFill>
                 <a:cs typeface="Times New Roman" pitchFamily="18" charset="0"/>
               </a:rPr>
-              <a:t>Домашнее </a:t>
-            </a:r>
-            <a:r>
-              <a:rPr lang="ru-RU" sz="2400" b="1" dirty="0" smtClean="0">
-                <a:solidFill>
-                  <a:schemeClr val="bg1"/>
-                </a:solidFill>
-                <a:cs typeface="Times New Roman" pitchFamily="18" charset="0"/>
-              </a:rPr>
-              <a:t>задание</a:t>
+              <a:t>Домашнее задание</a:t>
             </a:r>
             <a:endParaRPr lang="en-US" sz="2400" b="1" dirty="0">
               <a:solidFill>
@@ -40151,11 +40274,11 @@
   <p:clrMapOvr>
     <a:masterClrMapping/>
   </p:clrMapOvr>
-  <mc:AlternateContent xmlns:mc="http://schemas.openxmlformats.org/markup-compatibility/2006">
-    <mc:Choice xmlns:p14="http://schemas.microsoft.com/office/powerpoint/2010/main" Requires="p14">
+  <mc:AlternateContent xmlns:mc="http://schemas.openxmlformats.org/markup-compatibility/2006" xmlns:p14="http://schemas.microsoft.com/office/powerpoint/2010/main">
+    <mc:Choice Requires="p14">
       <p:transition spd="slow" p14:dur="2000"/>
     </mc:Choice>
-    <mc:Fallback>
+    <mc:Fallback xmlns="">
       <p:transition spd="slow"/>
     </mc:Fallback>
   </mc:AlternateContent>

</xml_diff>

<commit_message>
Added code navigation tips
</commit_message>
<xml_diff>
--- a/Presentation/lesson-02-oop.pptx
+++ b/Presentation/lesson-02-oop.pptx
@@ -44,8 +44,9 @@
     <p:sldId id="282" r:id="rId38"/>
     <p:sldId id="285" r:id="rId39"/>
     <p:sldId id="281" r:id="rId40"/>
-    <p:sldId id="287" r:id="rId41"/>
-    <p:sldId id="279" r:id="rId42"/>
+    <p:sldId id="300" r:id="rId41"/>
+    <p:sldId id="287" r:id="rId42"/>
+    <p:sldId id="279" r:id="rId43"/>
   </p:sldIdLst>
   <p:sldSz cx="9144000" cy="6858000" type="screen4x3"/>
   <p:notesSz cx="6858000" cy="9144000"/>
@@ -329,7 +330,7 @@
             <a:fld id="{8E6E6A2A-E9D3-4A0D-B04A-ABDD367A1E08}" type="datetimeFigureOut">
               <a:rPr lang="ru-RU" smtClean="0"/>
               <a:pPr/>
-              <a:t>23.05.2014</a:t>
+              <a:t>23.08.2014</a:t>
             </a:fld>
             <a:endParaRPr lang="ru-RU" dirty="0"/>
           </a:p>
@@ -501,7 +502,7 @@
             <a:fld id="{8E6E6A2A-E9D3-4A0D-B04A-ABDD367A1E08}" type="datetimeFigureOut">
               <a:rPr lang="ru-RU" smtClean="0"/>
               <a:pPr/>
-              <a:t>23.05.2014</a:t>
+              <a:t>23.08.2014</a:t>
             </a:fld>
             <a:endParaRPr lang="ru-RU" dirty="0"/>
           </a:p>
@@ -683,7 +684,7 @@
             <a:fld id="{8E6E6A2A-E9D3-4A0D-B04A-ABDD367A1E08}" type="datetimeFigureOut">
               <a:rPr lang="ru-RU" smtClean="0"/>
               <a:pPr/>
-              <a:t>23.05.2014</a:t>
+              <a:t>23.08.2014</a:t>
             </a:fld>
             <a:endParaRPr lang="ru-RU" dirty="0"/>
           </a:p>
@@ -933,7 +934,7 @@
                 </a:solidFill>
               </a:rPr>
               <a:pPr/>
-              <a:t>23.05.2014</a:t>
+              <a:t>23.08.2014</a:t>
             </a:fld>
             <a:endParaRPr lang="ru-RU" dirty="0">
               <a:solidFill>
@@ -1135,7 +1136,7 @@
                 </a:solidFill>
               </a:rPr>
               <a:pPr/>
-              <a:t>23.05.2014</a:t>
+              <a:t>23.08.2014</a:t>
             </a:fld>
             <a:endParaRPr lang="ru-RU" dirty="0">
               <a:solidFill>
@@ -1413,7 +1414,7 @@
                 </a:solidFill>
               </a:rPr>
               <a:pPr/>
-              <a:t>23.05.2014</a:t>
+              <a:t>23.08.2014</a:t>
             </a:fld>
             <a:endParaRPr lang="ru-RU" dirty="0">
               <a:solidFill>
@@ -1733,7 +1734,7 @@
                 </a:solidFill>
               </a:rPr>
               <a:pPr/>
-              <a:t>23.05.2014</a:t>
+              <a:t>23.08.2014</a:t>
             </a:fld>
             <a:endParaRPr lang="ru-RU" dirty="0">
               <a:solidFill>
@@ -2187,7 +2188,7 @@
                 </a:solidFill>
               </a:rPr>
               <a:pPr/>
-              <a:t>23.05.2014</a:t>
+              <a:t>23.08.2014</a:t>
             </a:fld>
             <a:endParaRPr lang="ru-RU" dirty="0">
               <a:solidFill>
@@ -2337,7 +2338,7 @@
                 </a:solidFill>
               </a:rPr>
               <a:pPr/>
-              <a:t>23.05.2014</a:t>
+              <a:t>23.08.2014</a:t>
             </a:fld>
             <a:endParaRPr lang="ru-RU" dirty="0">
               <a:solidFill>
@@ -2464,7 +2465,7 @@
                 </a:solidFill>
               </a:rPr>
               <a:pPr/>
-              <a:t>23.05.2014</a:t>
+              <a:t>23.08.2014</a:t>
             </a:fld>
             <a:endParaRPr lang="ru-RU" dirty="0">
               <a:solidFill>
@@ -2773,7 +2774,7 @@
                 </a:solidFill>
               </a:rPr>
               <a:pPr/>
-              <a:t>23.05.2014</a:t>
+              <a:t>23.08.2014</a:t>
             </a:fld>
             <a:endParaRPr lang="ru-RU" dirty="0">
               <a:solidFill>
@@ -2969,7 +2970,7 @@
             <a:fld id="{8E6E6A2A-E9D3-4A0D-B04A-ABDD367A1E08}" type="datetimeFigureOut">
               <a:rPr lang="ru-RU" smtClean="0"/>
               <a:pPr/>
-              <a:t>23.05.2014</a:t>
+              <a:t>23.08.2014</a:t>
             </a:fld>
             <a:endParaRPr lang="ru-RU" dirty="0"/>
           </a:p>
@@ -3230,7 +3231,7 @@
                 </a:solidFill>
               </a:rPr>
               <a:pPr/>
-              <a:t>23.05.2014</a:t>
+              <a:t>23.08.2014</a:t>
             </a:fld>
             <a:endParaRPr lang="ru-RU" dirty="0">
               <a:solidFill>
@@ -3432,7 +3433,7 @@
                 </a:solidFill>
               </a:rPr>
               <a:pPr/>
-              <a:t>23.05.2014</a:t>
+              <a:t>23.08.2014</a:t>
             </a:fld>
             <a:endParaRPr lang="ru-RU" dirty="0">
               <a:solidFill>
@@ -3644,7 +3645,7 @@
                 </a:solidFill>
               </a:rPr>
               <a:pPr/>
-              <a:t>23.05.2014</a:t>
+              <a:t>23.08.2014</a:t>
             </a:fld>
             <a:endParaRPr lang="ru-RU" dirty="0">
               <a:solidFill>
@@ -5101,7 +5102,7 @@
             <a:fld id="{8E6E6A2A-E9D3-4A0D-B04A-ABDD367A1E08}" type="datetimeFigureOut">
               <a:rPr lang="ru-RU" smtClean="0"/>
               <a:pPr/>
-              <a:t>23.05.2014</a:t>
+              <a:t>23.08.2014</a:t>
             </a:fld>
             <a:endParaRPr lang="ru-RU" dirty="0"/>
           </a:p>
@@ -6005,7 +6006,7 @@
                 </a:solidFill>
               </a:rPr>
               <a:pPr/>
-              <a:t>23.05.2014</a:t>
+              <a:t>23.08.2014</a:t>
             </a:fld>
             <a:endParaRPr lang="ru-RU" dirty="0">
               <a:solidFill>
@@ -6279,7 +6280,7 @@
                 </a:solidFill>
               </a:rPr>
               <a:pPr/>
-              <a:t>23.05.2014</a:t>
+              <a:t>23.08.2014</a:t>
             </a:fld>
             <a:endParaRPr lang="ru-RU" dirty="0">
               <a:solidFill>
@@ -6481,7 +6482,7 @@
                 </a:solidFill>
               </a:rPr>
               <a:pPr/>
-              <a:t>23.05.2014</a:t>
+              <a:t>23.08.2014</a:t>
             </a:fld>
             <a:endParaRPr lang="ru-RU" dirty="0">
               <a:solidFill>
@@ -6759,7 +6760,7 @@
                 </a:solidFill>
               </a:rPr>
               <a:pPr/>
-              <a:t>23.05.2014</a:t>
+              <a:t>23.08.2014</a:t>
             </a:fld>
             <a:endParaRPr lang="ru-RU" dirty="0">
               <a:solidFill>
@@ -7079,7 +7080,7 @@
                 </a:solidFill>
               </a:rPr>
               <a:pPr/>
-              <a:t>23.05.2014</a:t>
+              <a:t>23.08.2014</a:t>
             </a:fld>
             <a:endParaRPr lang="ru-RU" dirty="0">
               <a:solidFill>
@@ -7393,7 +7394,7 @@
             <a:fld id="{8E6E6A2A-E9D3-4A0D-B04A-ABDD367A1E08}" type="datetimeFigureOut">
               <a:rPr lang="ru-RU" smtClean="0"/>
               <a:pPr/>
-              <a:t>23.05.2014</a:t>
+              <a:t>23.08.2014</a:t>
             </a:fld>
             <a:endParaRPr lang="ru-RU" dirty="0"/>
           </a:p>
@@ -7823,7 +7824,7 @@
                 </a:solidFill>
               </a:rPr>
               <a:pPr/>
-              <a:t>23.05.2014</a:t>
+              <a:t>23.08.2014</a:t>
             </a:fld>
             <a:endParaRPr lang="ru-RU" dirty="0">
               <a:solidFill>
@@ -7973,7 +7974,7 @@
                 </a:solidFill>
               </a:rPr>
               <a:pPr/>
-              <a:t>23.05.2014</a:t>
+              <a:t>23.08.2014</a:t>
             </a:fld>
             <a:endParaRPr lang="ru-RU" dirty="0">
               <a:solidFill>
@@ -8100,7 +8101,7 @@
                 </a:solidFill>
               </a:rPr>
               <a:pPr/>
-              <a:t>23.05.2014</a:t>
+              <a:t>23.08.2014</a:t>
             </a:fld>
             <a:endParaRPr lang="ru-RU" dirty="0">
               <a:solidFill>
@@ -8409,7 +8410,7 @@
                 </a:solidFill>
               </a:rPr>
               <a:pPr/>
-              <a:t>23.05.2014</a:t>
+              <a:t>23.08.2014</a:t>
             </a:fld>
             <a:endParaRPr lang="ru-RU" dirty="0">
               <a:solidFill>
@@ -8694,7 +8695,7 @@
                 </a:solidFill>
               </a:rPr>
               <a:pPr/>
-              <a:t>23.05.2014</a:t>
+              <a:t>23.08.2014</a:t>
             </a:fld>
             <a:endParaRPr lang="ru-RU" dirty="0">
               <a:solidFill>
@@ -8896,7 +8897,7 @@
                 </a:solidFill>
               </a:rPr>
               <a:pPr/>
-              <a:t>23.05.2014</a:t>
+              <a:t>23.08.2014</a:t>
             </a:fld>
             <a:endParaRPr lang="ru-RU" dirty="0">
               <a:solidFill>
@@ -9108,7 +9109,7 @@
                 </a:solidFill>
               </a:rPr>
               <a:pPr/>
-              <a:t>23.05.2014</a:t>
+              <a:t>23.08.2014</a:t>
             </a:fld>
             <a:endParaRPr lang="ru-RU" dirty="0">
               <a:solidFill>
@@ -9556,7 +9557,7 @@
             <a:fld id="{8E6E6A2A-E9D3-4A0D-B04A-ABDD367A1E08}" type="datetimeFigureOut">
               <a:rPr lang="ru-RU" smtClean="0"/>
               <a:pPr/>
-              <a:t>23.05.2014</a:t>
+              <a:t>23.08.2014</a:t>
             </a:fld>
             <a:endParaRPr lang="ru-RU" dirty="0"/>
           </a:p>
@@ -9676,7 +9677,7 @@
             <a:fld id="{8E6E6A2A-E9D3-4A0D-B04A-ABDD367A1E08}" type="datetimeFigureOut">
               <a:rPr lang="ru-RU" smtClean="0"/>
               <a:pPr/>
-              <a:t>23.05.2014</a:t>
+              <a:t>23.08.2014</a:t>
             </a:fld>
             <a:endParaRPr lang="ru-RU" dirty="0"/>
           </a:p>
@@ -9773,7 +9774,7 @@
             <a:fld id="{8E6E6A2A-E9D3-4A0D-B04A-ABDD367A1E08}" type="datetimeFigureOut">
               <a:rPr lang="ru-RU" smtClean="0"/>
               <a:pPr/>
-              <a:t>23.05.2014</a:t>
+              <a:t>23.08.2014</a:t>
             </a:fld>
             <a:endParaRPr lang="ru-RU" dirty="0"/>
           </a:p>
@@ -10052,7 +10053,7 @@
             <a:fld id="{8E6E6A2A-E9D3-4A0D-B04A-ABDD367A1E08}" type="datetimeFigureOut">
               <a:rPr lang="ru-RU" smtClean="0"/>
               <a:pPr/>
-              <a:t>23.05.2014</a:t>
+              <a:t>23.08.2014</a:t>
             </a:fld>
             <a:endParaRPr lang="ru-RU" dirty="0"/>
           </a:p>
@@ -10307,7 +10308,7 @@
             <a:fld id="{8E6E6A2A-E9D3-4A0D-B04A-ABDD367A1E08}" type="datetimeFigureOut">
               <a:rPr lang="ru-RU" smtClean="0"/>
               <a:pPr/>
-              <a:t>23.05.2014</a:t>
+              <a:t>23.08.2014</a:t>
             </a:fld>
             <a:endParaRPr lang="ru-RU" dirty="0"/>
           </a:p>
@@ -10522,7 +10523,7 @@
             <a:fld id="{8E6E6A2A-E9D3-4A0D-B04A-ABDD367A1E08}" type="datetimeFigureOut">
               <a:rPr lang="ru-RU" smtClean="0"/>
               <a:pPr/>
-              <a:t>23.05.2014</a:t>
+              <a:t>23.08.2014</a:t>
             </a:fld>
             <a:endParaRPr lang="ru-RU" dirty="0"/>
           </a:p>
@@ -11040,7 +11041,7 @@
                 </a:solidFill>
               </a:rPr>
               <a:pPr/>
-              <a:t>23.05.2014</a:t>
+              <a:t>23.08.2014</a:t>
             </a:fld>
             <a:endParaRPr lang="ru-RU" dirty="0">
               <a:solidFill>
@@ -11591,7 +11592,7 @@
                 </a:solidFill>
               </a:rPr>
               <a:pPr/>
-              <a:t>23.05.2014</a:t>
+              <a:t>23.08.2014</a:t>
             </a:fld>
             <a:endParaRPr lang="ru-RU" dirty="0">
               <a:solidFill>
@@ -12135,7 +12136,7 @@
                 </a:solidFill>
               </a:rPr>
               <a:pPr/>
-              <a:t>23.05.2014</a:t>
+              <a:t>23.08.2014</a:t>
             </a:fld>
             <a:endParaRPr lang="ru-RU" dirty="0">
               <a:solidFill>
@@ -39268,6 +39269,293 @@
   <p:cSld>
     <p:bg>
       <p:bgPr>
+        <a:blipFill dpi="0" rotWithShape="1">
+          <a:blip r:embed="rId2" cstate="print">
+            <a:lum/>
+          </a:blip>
+          <a:srcRect/>
+          <a:stretch>
+            <a:fillRect/>
+          </a:stretch>
+        </a:blipFill>
+        <a:effectLst/>
+      </p:bgPr>
+    </p:bg>
+    <p:spTree>
+      <p:nvGrpSpPr>
+        <p:cNvPr id="1" name=""/>
+        <p:cNvGrpSpPr/>
+        <p:nvPr/>
+      </p:nvGrpSpPr>
+      <p:grpSpPr>
+        <a:xfrm>
+          <a:off x="0" y="0"/>
+          <a:ext cx="0" cy="0"/>
+          <a:chOff x="0" y="0"/>
+          <a:chExt cx="0" cy="0"/>
+        </a:xfrm>
+      </p:grpSpPr>
+      <p:sp>
+        <p:nvSpPr>
+          <p:cNvPr id="2" name="Title 1"/>
+          <p:cNvSpPr>
+            <a:spLocks noGrp="1"/>
+          </p:cNvSpPr>
+          <p:nvPr>
+            <p:ph type="title"/>
+          </p:nvPr>
+        </p:nvSpPr>
+        <p:spPr/>
+        <p:txBody>
+          <a:bodyPr>
+            <a:normAutofit/>
+          </a:bodyPr>
+          <a:lstStyle/>
+          <a:p>
+            <a:r>
+              <a:rPr lang="ru-RU" dirty="0" smtClean="0">
+                <a:solidFill>
+                  <a:schemeClr val="bg1"/>
+                </a:solidFill>
+              </a:rPr>
+              <a:t>Навигация по классам (типам)</a:t>
+            </a:r>
+            <a:endParaRPr lang="en-US" dirty="0">
+              <a:solidFill>
+                <a:schemeClr val="bg1"/>
+              </a:solidFill>
+            </a:endParaRPr>
+          </a:p>
+        </p:txBody>
+      </p:sp>
+      <p:sp>
+        <p:nvSpPr>
+          <p:cNvPr id="3" name="Content Placeholder 2"/>
+          <p:cNvSpPr>
+            <a:spLocks noGrp="1"/>
+          </p:cNvSpPr>
+          <p:nvPr>
+            <p:ph idx="1"/>
+          </p:nvPr>
+        </p:nvSpPr>
+        <p:spPr>
+          <a:xfrm>
+            <a:off x="457200" y="1600201"/>
+            <a:ext cx="8229600" cy="3845023"/>
+          </a:xfrm>
+        </p:spPr>
+        <p:txBody>
+          <a:bodyPr>
+            <a:normAutofit fontScale="92500" lnSpcReduction="20000"/>
+          </a:bodyPr>
+          <a:lstStyle/>
+          <a:p>
+            <a:r>
+              <a:rPr lang="ru-RU" dirty="0" smtClean="0">
+                <a:solidFill>
+                  <a:schemeClr val="bg1"/>
+                </a:solidFill>
+              </a:rPr>
+              <a:t>Окно </a:t>
+            </a:r>
+            <a:r>
+              <a:rPr lang="en-US" dirty="0" smtClean="0">
+                <a:solidFill>
+                  <a:srgbClr val="FFFF00"/>
+                </a:solidFill>
+              </a:rPr>
+              <a:t>Class View</a:t>
+            </a:r>
+            <a:r>
+              <a:rPr lang="en-US" dirty="0" smtClean="0">
+                <a:solidFill>
+                  <a:schemeClr val="bg1"/>
+                </a:solidFill>
+              </a:rPr>
+              <a:t> </a:t>
+            </a:r>
+            <a:r>
+              <a:rPr lang="ru-RU" dirty="0" smtClean="0">
+                <a:solidFill>
+                  <a:schemeClr val="bg1"/>
+                </a:solidFill>
+              </a:rPr>
+              <a:t>показывает все типы в текущем </a:t>
+            </a:r>
+            <a:r>
+              <a:rPr lang="en-US" dirty="0" smtClean="0">
+                <a:solidFill>
+                  <a:schemeClr val="bg1"/>
+                </a:solidFill>
+              </a:rPr>
+              <a:t>solution</a:t>
+            </a:r>
+          </a:p>
+          <a:p>
+            <a:r>
+              <a:rPr lang="ru-RU" dirty="0" smtClean="0">
+                <a:solidFill>
+                  <a:schemeClr val="bg1"/>
+                </a:solidFill>
+              </a:rPr>
+              <a:t>В проект можно добавить диаграмму классов </a:t>
+            </a:r>
+            <a:r>
+              <a:rPr lang="en-US" dirty="0" smtClean="0">
+                <a:solidFill>
+                  <a:schemeClr val="bg1"/>
+                </a:solidFill>
+              </a:rPr>
+              <a:t>(</a:t>
+            </a:r>
+            <a:r>
+              <a:rPr lang="en-US" dirty="0" smtClean="0">
+                <a:solidFill>
+                  <a:srgbClr val="FFFF00"/>
+                </a:solidFill>
+              </a:rPr>
+              <a:t>Class Diagram</a:t>
+            </a:r>
+            <a:r>
+              <a:rPr lang="en-US" dirty="0" smtClean="0">
+                <a:solidFill>
+                  <a:schemeClr val="bg1"/>
+                </a:solidFill>
+              </a:rPr>
+              <a:t>) </a:t>
+            </a:r>
+            <a:r>
+              <a:rPr lang="ru-RU" dirty="0" smtClean="0">
+                <a:solidFill>
+                  <a:schemeClr val="bg1"/>
+                </a:solidFill>
+              </a:rPr>
+              <a:t>и разместить на ней интесующие вас классы из теущего проекта</a:t>
+            </a:r>
+          </a:p>
+          <a:p>
+            <a:r>
+              <a:rPr lang="ru-RU" dirty="0" smtClean="0">
+                <a:solidFill>
+                  <a:schemeClr val="bg1"/>
+                </a:solidFill>
+              </a:rPr>
+              <a:t>Команда </a:t>
+            </a:r>
+            <a:r>
+              <a:rPr lang="en-US" dirty="0" smtClean="0">
+                <a:solidFill>
+                  <a:srgbClr val="FFFF00"/>
+                </a:solidFill>
+              </a:rPr>
+              <a:t>Go to Definition</a:t>
+            </a:r>
+            <a:r>
+              <a:rPr lang="en-US" dirty="0" smtClean="0">
+                <a:solidFill>
+                  <a:schemeClr val="bg1"/>
+                </a:solidFill>
+              </a:rPr>
+              <a:t> (F12)</a:t>
+            </a:r>
+            <a:endParaRPr lang="ru-RU" dirty="0" smtClean="0">
+              <a:solidFill>
+                <a:schemeClr val="bg1"/>
+              </a:solidFill>
+            </a:endParaRPr>
+          </a:p>
+          <a:p>
+            <a:r>
+              <a:rPr lang="ru-RU" dirty="0" smtClean="0">
+                <a:solidFill>
+                  <a:schemeClr val="bg1"/>
+                </a:solidFill>
+              </a:rPr>
+              <a:t>Над окном редактора находятся выпадающие списки позволяющие перейти к определению класса и/или его члену.</a:t>
+            </a:r>
+            <a:endParaRPr lang="en-US" dirty="0"/>
+          </a:p>
+        </p:txBody>
+      </p:sp>
+      <p:pic>
+        <p:nvPicPr>
+          <p:cNvPr id="1027" name="Picture 3"/>
+          <p:cNvPicPr>
+            <a:picLocks noChangeAspect="1" noChangeArrowheads="1"/>
+          </p:cNvPicPr>
+          <p:nvPr/>
+        </p:nvPicPr>
+        <p:blipFill>
+          <a:blip r:embed="rId3">
+            <a:extLst>
+              <a:ext uri="{28A0092B-C50C-407E-A947-70E740481C1C}">
+                <a14:useLocalDpi xmlns:a14="http://schemas.microsoft.com/office/drawing/2010/main" val="0"/>
+              </a:ext>
+            </a:extLst>
+          </a:blip>
+          <a:srcRect/>
+          <a:stretch>
+            <a:fillRect/>
+          </a:stretch>
+        </p:blipFill>
+        <p:spPr bwMode="auto">
+          <a:xfrm>
+            <a:off x="1595438" y="5285459"/>
+            <a:ext cx="5953125" cy="1181100"/>
+          </a:xfrm>
+          <a:prstGeom prst="rect">
+            <a:avLst/>
+          </a:prstGeom>
+          <a:noFill/>
+          <a:ln>
+            <a:noFill/>
+          </a:ln>
+          <a:extLst>
+            <a:ext uri="{909E8E84-426E-40DD-AFC4-6F175D3DCCD1}">
+              <a14:hiddenFill xmlns:a14="http://schemas.microsoft.com/office/drawing/2010/main">
+                <a:solidFill>
+                  <a:schemeClr val="accent1"/>
+                </a:solidFill>
+              </a14:hiddenFill>
+            </a:ext>
+            <a:ext uri="{91240B29-F687-4F45-9708-019B960494DF}">
+              <a14:hiddenLine xmlns:a14="http://schemas.microsoft.com/office/drawing/2010/main" w="9525">
+                <a:solidFill>
+                  <a:schemeClr val="tx1"/>
+                </a:solidFill>
+                <a:miter lim="800000"/>
+                <a:headEnd/>
+                <a:tailEnd/>
+              </a14:hiddenLine>
+            </a:ext>
+          </a:extLst>
+        </p:spPr>
+      </p:pic>
+    </p:spTree>
+    <p:extLst>
+      <p:ext uri="{BB962C8B-B14F-4D97-AF65-F5344CB8AC3E}">
+        <p14:creationId xmlns:p14="http://schemas.microsoft.com/office/powerpoint/2010/main" val="3114957160"/>
+      </p:ext>
+    </p:extLst>
+  </p:cSld>
+  <p:clrMapOvr>
+    <a:masterClrMapping/>
+  </p:clrMapOvr>
+  <p:timing>
+    <p:tnLst>
+      <p:par>
+        <p:cTn id="1" dur="indefinite" restart="never" nodeType="tmRoot"/>
+      </p:par>
+    </p:tnLst>
+  </p:timing>
+</p:sld>
+</file>
+
+<file path=ppt/slides/slide38.xml><?xml version="1.0" encoding="utf-8"?>
+<p:sld xmlns:a="http://schemas.openxmlformats.org/drawingml/2006/main" xmlns:r="http://schemas.openxmlformats.org/officeDocument/2006/relationships" xmlns:p="http://schemas.openxmlformats.org/presentationml/2006/main">
+  <p:cSld>
+    <p:bg>
+      <p:bgPr>
         <a:solidFill>
           <a:srgbClr val="6600CC"/>
         </a:solidFill>
@@ -39461,7 +39749,7 @@
 </p:sld>
 </file>
 
-<file path=ppt/slides/slide38.xml><?xml version="1.0" encoding="utf-8"?>
+<file path=ppt/slides/slide39.xml><?xml version="1.0" encoding="utf-8"?>
 <p:sld xmlns:a="http://schemas.openxmlformats.org/drawingml/2006/main" xmlns:r="http://schemas.openxmlformats.org/officeDocument/2006/relationships" xmlns:p="http://schemas.openxmlformats.org/presentationml/2006/main" show="0">
   <p:cSld>
     <p:bg>

</xml_diff>